<commit_message>
l4: catching up on commits
</commit_message>
<xml_diff>
--- a/earth_system_and_climate_4/term_2/poster/oxygen_poster.pptx
+++ b/earth_system_and_climate_4/term_2/poster/oxygen_poster.pptx
@@ -200,7 +200,7 @@
           <a:p>
             <a:fld id="{597BF9B5-34E6-3748-A3AE-97D3F6023AC7}" type="datetimeFigureOut">
               <a:rPr lang="en-GB" smtClean="0"/>
-              <a:t>19/01/2019</a:t>
+              <a:t>25/01/2019</a:t>
             </a:fld>
             <a:endParaRPr lang="en-GB" dirty="0"/>
           </a:p>
@@ -683,7 +683,7 @@
           <a:p>
             <a:fld id="{E93572D2-1BD6-954F-86C4-419D8535D635}" type="datetimeFigureOut">
               <a:rPr lang="en-GB" smtClean="0"/>
-              <a:t>19/01/2019</a:t>
+              <a:t>25/01/2019</a:t>
             </a:fld>
             <a:endParaRPr lang="en-GB" dirty="0"/>
           </a:p>
@@ -848,7 +848,7 @@
           <a:p>
             <a:fld id="{E93572D2-1BD6-954F-86C4-419D8535D635}" type="datetimeFigureOut">
               <a:rPr lang="en-GB" smtClean="0"/>
-              <a:t>19/01/2019</a:t>
+              <a:t>25/01/2019</a:t>
             </a:fld>
             <a:endParaRPr lang="en-GB" dirty="0"/>
           </a:p>
@@ -1023,7 +1023,7 @@
           <a:p>
             <a:fld id="{E93572D2-1BD6-954F-86C4-419D8535D635}" type="datetimeFigureOut">
               <a:rPr lang="en-GB" smtClean="0"/>
-              <a:t>19/01/2019</a:t>
+              <a:t>25/01/2019</a:t>
             </a:fld>
             <a:endParaRPr lang="en-GB" dirty="0"/>
           </a:p>
@@ -1188,7 +1188,7 @@
           <a:p>
             <a:fld id="{E93572D2-1BD6-954F-86C4-419D8535D635}" type="datetimeFigureOut">
               <a:rPr lang="en-GB" smtClean="0"/>
-              <a:t>19/01/2019</a:t>
+              <a:t>25/01/2019</a:t>
             </a:fld>
             <a:endParaRPr lang="en-GB" dirty="0"/>
           </a:p>
@@ -1427,7 +1427,7 @@
           <a:p>
             <a:fld id="{E93572D2-1BD6-954F-86C4-419D8535D635}" type="datetimeFigureOut">
               <a:rPr lang="en-GB" smtClean="0"/>
-              <a:t>19/01/2019</a:t>
+              <a:t>25/01/2019</a:t>
             </a:fld>
             <a:endParaRPr lang="en-GB" dirty="0"/>
           </a:p>
@@ -1654,7 +1654,7 @@
           <a:p>
             <a:fld id="{E93572D2-1BD6-954F-86C4-419D8535D635}" type="datetimeFigureOut">
               <a:rPr lang="en-GB" smtClean="0"/>
-              <a:t>19/01/2019</a:t>
+              <a:t>25/01/2019</a:t>
             </a:fld>
             <a:endParaRPr lang="en-GB" dirty="0"/>
           </a:p>
@@ -2016,7 +2016,7 @@
           <a:p>
             <a:fld id="{E93572D2-1BD6-954F-86C4-419D8535D635}" type="datetimeFigureOut">
               <a:rPr lang="en-GB" smtClean="0"/>
-              <a:t>19/01/2019</a:t>
+              <a:t>25/01/2019</a:t>
             </a:fld>
             <a:endParaRPr lang="en-GB" dirty="0"/>
           </a:p>
@@ -2129,7 +2129,7 @@
           <a:p>
             <a:fld id="{E93572D2-1BD6-954F-86C4-419D8535D635}" type="datetimeFigureOut">
               <a:rPr lang="en-GB" smtClean="0"/>
-              <a:t>19/01/2019</a:t>
+              <a:t>25/01/2019</a:t>
             </a:fld>
             <a:endParaRPr lang="en-GB" dirty="0"/>
           </a:p>
@@ -2219,7 +2219,7 @@
           <a:p>
             <a:fld id="{E93572D2-1BD6-954F-86C4-419D8535D635}" type="datetimeFigureOut">
               <a:rPr lang="en-GB" smtClean="0"/>
-              <a:t>19/01/2019</a:t>
+              <a:t>25/01/2019</a:t>
             </a:fld>
             <a:endParaRPr lang="en-GB" dirty="0"/>
           </a:p>
@@ -2491,7 +2491,7 @@
           <a:p>
             <a:fld id="{E93572D2-1BD6-954F-86C4-419D8535D635}" type="datetimeFigureOut">
               <a:rPr lang="en-GB" smtClean="0"/>
-              <a:t>19/01/2019</a:t>
+              <a:t>25/01/2019</a:t>
             </a:fld>
             <a:endParaRPr lang="en-GB" dirty="0"/>
           </a:p>
@@ -2742,7 +2742,7 @@
           <a:p>
             <a:fld id="{E93572D2-1BD6-954F-86C4-419D8535D635}" type="datetimeFigureOut">
               <a:rPr lang="en-GB" smtClean="0"/>
-              <a:t>19/01/2019</a:t>
+              <a:t>25/01/2019</a:t>
             </a:fld>
             <a:endParaRPr lang="en-GB" dirty="0"/>
           </a:p>
@@ -2950,7 +2950,7 @@
           <a:p>
             <a:fld id="{E93572D2-1BD6-954F-86C4-419D8535D635}" type="datetimeFigureOut">
               <a:rPr lang="en-GB" smtClean="0"/>
-              <a:t>19/01/2019</a:t>
+              <a:t>25/01/2019</a:t>
             </a:fld>
             <a:endParaRPr lang="en-GB" dirty="0"/>
           </a:p>
@@ -3510,8 +3510,8 @@
         </p:nvSpPr>
         <p:spPr>
           <a:xfrm>
-            <a:off x="12120776" y="1015688"/>
-            <a:ext cx="2579552" cy="623119"/>
+            <a:off x="12731750" y="1005175"/>
+            <a:ext cx="2387600" cy="623119"/>
           </a:xfrm>
           <a:prstGeom prst="rect">
             <a:avLst/>
@@ -3519,7 +3519,7 @@
           <a:noFill/>
         </p:spPr>
         <p:txBody>
-          <a:bodyPr wrap="none" rtlCol="0">
+          <a:bodyPr wrap="square" rtlCol="0">
             <a:spAutoFit/>
           </a:bodyPr>
           <a:lstStyle/>
@@ -3532,7 +3532,7 @@
                 <a:latin typeface="Roboto Mono Medium" pitchFamily="2" charset="0"/>
                 <a:ea typeface="Roboto Mono Medium" pitchFamily="2" charset="0"/>
               </a:rPr>
-              <a:t>JACKY CAO</a:t>
+              <a:t>Jacky Cao</a:t>
             </a:r>
           </a:p>
         </p:txBody>

</xml_diff>

<commit_message>
esc4: p: initial design of the poster
- layed out the general columns where things will be placed
</commit_message>
<xml_diff>
--- a/earth_system_and_climate_4/term_2/poster/oxygen_poster.pptx
+++ b/earth_system_and_climate_4/term_2/poster/oxygen_poster.pptx
@@ -2,7 +2,7 @@
 <file path=ppt/presentation.xml><?xml version="1.0" encoding="utf-8"?>
 <p:presentation xmlns:a="http://schemas.openxmlformats.org/drawingml/2006/main" xmlns:r="http://schemas.openxmlformats.org/officeDocument/2006/relationships" xmlns:p="http://schemas.openxmlformats.org/presentationml/2006/main" saveSubsetFonts="1" autoCompressPictures="0">
   <p:sldMasterIdLst>
-    <p:sldMasterId id="2147483672" r:id="rId1"/>
+    <p:sldMasterId id="2147483684" r:id="rId1"/>
   </p:sldMasterIdLst>
   <p:notesMasterIdLst>
     <p:notesMasterId r:id="rId3"/>
@@ -10,14 +10,14 @@
   <p:sldIdLst>
     <p:sldId id="256" r:id="rId2"/>
   </p:sldIdLst>
-  <p:sldSz cx="15119350" cy="21383625"/>
+  <p:sldSz cx="21383625" cy="15119350"/>
   <p:notesSz cx="6858000" cy="9144000"/>
   <p:defaultTextStyle>
     <a:defPPr>
       <a:defRPr lang="en-US"/>
     </a:defPPr>
-    <a:lvl1pPr marL="0" algn="l" defTabSz="1752082" rtl="0" eaLnBrk="1" latinLnBrk="0" hangingPunct="1">
-      <a:defRPr sz="3449" kern="1200">
+    <a:lvl1pPr marL="0" algn="l" defTabSz="457200" rtl="0" eaLnBrk="1" latinLnBrk="0" hangingPunct="1">
+      <a:defRPr sz="1800" kern="1200">
         <a:solidFill>
           <a:schemeClr val="tx1"/>
         </a:solidFill>
@@ -26,8 +26,8 @@
         <a:cs typeface="+mn-cs"/>
       </a:defRPr>
     </a:lvl1pPr>
-    <a:lvl2pPr marL="876041" algn="l" defTabSz="1752082" rtl="0" eaLnBrk="1" latinLnBrk="0" hangingPunct="1">
-      <a:defRPr sz="3449" kern="1200">
+    <a:lvl2pPr marL="457200" algn="l" defTabSz="457200" rtl="0" eaLnBrk="1" latinLnBrk="0" hangingPunct="1">
+      <a:defRPr sz="1800" kern="1200">
         <a:solidFill>
           <a:schemeClr val="tx1"/>
         </a:solidFill>
@@ -36,8 +36,8 @@
         <a:cs typeface="+mn-cs"/>
       </a:defRPr>
     </a:lvl2pPr>
-    <a:lvl3pPr marL="1752082" algn="l" defTabSz="1752082" rtl="0" eaLnBrk="1" latinLnBrk="0" hangingPunct="1">
-      <a:defRPr sz="3449" kern="1200">
+    <a:lvl3pPr marL="914400" algn="l" defTabSz="457200" rtl="0" eaLnBrk="1" latinLnBrk="0" hangingPunct="1">
+      <a:defRPr sz="1800" kern="1200">
         <a:solidFill>
           <a:schemeClr val="tx1"/>
         </a:solidFill>
@@ -46,8 +46,8 @@
         <a:cs typeface="+mn-cs"/>
       </a:defRPr>
     </a:lvl3pPr>
-    <a:lvl4pPr marL="2628123" algn="l" defTabSz="1752082" rtl="0" eaLnBrk="1" latinLnBrk="0" hangingPunct="1">
-      <a:defRPr sz="3449" kern="1200">
+    <a:lvl4pPr marL="1371600" algn="l" defTabSz="457200" rtl="0" eaLnBrk="1" latinLnBrk="0" hangingPunct="1">
+      <a:defRPr sz="1800" kern="1200">
         <a:solidFill>
           <a:schemeClr val="tx1"/>
         </a:solidFill>
@@ -56,8 +56,8 @@
         <a:cs typeface="+mn-cs"/>
       </a:defRPr>
     </a:lvl4pPr>
-    <a:lvl5pPr marL="3504164" algn="l" defTabSz="1752082" rtl="0" eaLnBrk="1" latinLnBrk="0" hangingPunct="1">
-      <a:defRPr sz="3449" kern="1200">
+    <a:lvl5pPr marL="1828800" algn="l" defTabSz="457200" rtl="0" eaLnBrk="1" latinLnBrk="0" hangingPunct="1">
+      <a:defRPr sz="1800" kern="1200">
         <a:solidFill>
           <a:schemeClr val="tx1"/>
         </a:solidFill>
@@ -66,8 +66,8 @@
         <a:cs typeface="+mn-cs"/>
       </a:defRPr>
     </a:lvl5pPr>
-    <a:lvl6pPr marL="4380205" algn="l" defTabSz="1752082" rtl="0" eaLnBrk="1" latinLnBrk="0" hangingPunct="1">
-      <a:defRPr sz="3449" kern="1200">
+    <a:lvl6pPr marL="2286000" algn="l" defTabSz="457200" rtl="0" eaLnBrk="1" latinLnBrk="0" hangingPunct="1">
+      <a:defRPr sz="1800" kern="1200">
         <a:solidFill>
           <a:schemeClr val="tx1"/>
         </a:solidFill>
@@ -76,8 +76,8 @@
         <a:cs typeface="+mn-cs"/>
       </a:defRPr>
     </a:lvl6pPr>
-    <a:lvl7pPr marL="5256246" algn="l" defTabSz="1752082" rtl="0" eaLnBrk="1" latinLnBrk="0" hangingPunct="1">
-      <a:defRPr sz="3449" kern="1200">
+    <a:lvl7pPr marL="2743200" algn="l" defTabSz="457200" rtl="0" eaLnBrk="1" latinLnBrk="0" hangingPunct="1">
+      <a:defRPr sz="1800" kern="1200">
         <a:solidFill>
           <a:schemeClr val="tx1"/>
         </a:solidFill>
@@ -86,8 +86,8 @@
         <a:cs typeface="+mn-cs"/>
       </a:defRPr>
     </a:lvl7pPr>
-    <a:lvl8pPr marL="6132286" algn="l" defTabSz="1752082" rtl="0" eaLnBrk="1" latinLnBrk="0" hangingPunct="1">
-      <a:defRPr sz="3449" kern="1200">
+    <a:lvl8pPr marL="3200400" algn="l" defTabSz="457200" rtl="0" eaLnBrk="1" latinLnBrk="0" hangingPunct="1">
+      <a:defRPr sz="1800" kern="1200">
         <a:solidFill>
           <a:schemeClr val="tx1"/>
         </a:solidFill>
@@ -96,8 +96,8 @@
         <a:cs typeface="+mn-cs"/>
       </a:defRPr>
     </a:lvl8pPr>
-    <a:lvl9pPr marL="7008327" algn="l" defTabSz="1752082" rtl="0" eaLnBrk="1" latinLnBrk="0" hangingPunct="1">
-      <a:defRPr sz="3449" kern="1200">
+    <a:lvl9pPr marL="3657600" algn="l" defTabSz="457200" rtl="0" eaLnBrk="1" latinLnBrk="0" hangingPunct="1">
+      <a:defRPr sz="1800" kern="1200">
         <a:solidFill>
           <a:schemeClr val="tx1"/>
         </a:solidFill>
@@ -200,7 +200,7 @@
           <a:p>
             <a:fld id="{597BF9B5-34E6-3748-A3AE-97D3F6023AC7}" type="datetimeFigureOut">
               <a:rPr lang="en-GB" smtClean="0"/>
-              <a:t>25/01/2019</a:t>
+              <a:t>13/02/2019</a:t>
             </a:fld>
             <a:endParaRPr lang="en-GB" dirty="0"/>
           </a:p>
@@ -218,8 +218,8 @@
         </p:nvSpPr>
         <p:spPr>
           <a:xfrm>
-            <a:off x="2338388" y="1143000"/>
-            <a:ext cx="2181225" cy="3086100"/>
+            <a:off x="1247775" y="1143000"/>
+            <a:ext cx="4362450" cy="3086100"/>
           </a:xfrm>
           <a:prstGeom prst="rect">
             <a:avLst/>
@@ -495,7 +495,12 @@
             <p:ph type="sldImg"/>
           </p:nvPr>
         </p:nvSpPr>
-        <p:spPr/>
+        <p:spPr>
+          <a:xfrm>
+            <a:off x="1247775" y="1143000"/>
+            <a:ext cx="4362450" cy="3086100"/>
+          </a:xfrm>
+        </p:spPr>
       </p:sp>
       <p:sp>
         <p:nvSpPr>
@@ -581,15 +586,15 @@
         </p:nvSpPr>
         <p:spPr>
           <a:xfrm>
-            <a:off x="1133951" y="3499590"/>
-            <a:ext cx="12851448" cy="7444669"/>
+            <a:off x="1603772" y="2474395"/>
+            <a:ext cx="18176081" cy="5263774"/>
           </a:xfrm>
         </p:spPr>
         <p:txBody>
           <a:bodyPr anchor="b"/>
           <a:lstStyle>
             <a:lvl1pPr algn="ctr">
-              <a:defRPr sz="9921"/>
+              <a:defRPr sz="13228"/>
             </a:lvl1pPr>
           </a:lstStyle>
           <a:p>
@@ -613,8 +618,8 @@
         </p:nvSpPr>
         <p:spPr>
           <a:xfrm>
-            <a:off x="1889919" y="11231355"/>
-            <a:ext cx="11339513" cy="5162758"/>
+            <a:off x="2672953" y="7941160"/>
+            <a:ext cx="16037719" cy="3650342"/>
           </a:xfrm>
         </p:spPr>
         <p:txBody>
@@ -622,39 +627,39 @@
           <a:lstStyle>
             <a:lvl1pPr marL="0" indent="0" algn="ctr">
               <a:buNone/>
+              <a:defRPr sz="5291"/>
+            </a:lvl1pPr>
+            <a:lvl2pPr marL="1007943" indent="0" algn="ctr">
+              <a:buNone/>
+              <a:defRPr sz="4409"/>
+            </a:lvl2pPr>
+            <a:lvl3pPr marL="2015886" indent="0" algn="ctr">
+              <a:buNone/>
               <a:defRPr sz="3968"/>
-            </a:lvl1pPr>
-            <a:lvl2pPr marL="755980" indent="0" algn="ctr">
-              <a:buNone/>
-              <a:defRPr sz="3307"/>
-            </a:lvl2pPr>
-            <a:lvl3pPr marL="1511960" indent="0" algn="ctr">
-              <a:buNone/>
-              <a:defRPr sz="2976"/>
             </a:lvl3pPr>
-            <a:lvl4pPr marL="2267941" indent="0" algn="ctr">
-              <a:buNone/>
-              <a:defRPr sz="2646"/>
+            <a:lvl4pPr marL="3023829" indent="0" algn="ctr">
+              <a:buNone/>
+              <a:defRPr sz="3527"/>
             </a:lvl4pPr>
-            <a:lvl5pPr marL="3023921" indent="0" algn="ctr">
-              <a:buNone/>
-              <a:defRPr sz="2646"/>
+            <a:lvl5pPr marL="4031772" indent="0" algn="ctr">
+              <a:buNone/>
+              <a:defRPr sz="3527"/>
             </a:lvl5pPr>
-            <a:lvl6pPr marL="3779901" indent="0" algn="ctr">
-              <a:buNone/>
-              <a:defRPr sz="2646"/>
+            <a:lvl6pPr marL="5039716" indent="0" algn="ctr">
+              <a:buNone/>
+              <a:defRPr sz="3527"/>
             </a:lvl6pPr>
-            <a:lvl7pPr marL="4535881" indent="0" algn="ctr">
-              <a:buNone/>
-              <a:defRPr sz="2646"/>
+            <a:lvl7pPr marL="6047659" indent="0" algn="ctr">
+              <a:buNone/>
+              <a:defRPr sz="3527"/>
             </a:lvl7pPr>
-            <a:lvl8pPr marL="5291861" indent="0" algn="ctr">
-              <a:buNone/>
-              <a:defRPr sz="2646"/>
+            <a:lvl8pPr marL="7055602" indent="0" algn="ctr">
+              <a:buNone/>
+              <a:defRPr sz="3527"/>
             </a:lvl8pPr>
-            <a:lvl9pPr marL="6047842" indent="0" algn="ctr">
-              <a:buNone/>
-              <a:defRPr sz="2646"/>
+            <a:lvl9pPr marL="8063545" indent="0" algn="ctr">
+              <a:buNone/>
+              <a:defRPr sz="3527"/>
             </a:lvl9pPr>
           </a:lstStyle>
           <a:p>
@@ -683,7 +688,7 @@
           <a:p>
             <a:fld id="{E93572D2-1BD6-954F-86C4-419D8535D635}" type="datetimeFigureOut">
               <a:rPr lang="en-GB" smtClean="0"/>
-              <a:t>25/01/2019</a:t>
+              <a:t>13/02/2019</a:t>
             </a:fld>
             <a:endParaRPr lang="en-GB" dirty="0"/>
           </a:p>
@@ -732,6 +737,11 @@
         </p:txBody>
       </p:sp>
     </p:spTree>
+    <p:extLst>
+      <p:ext uri="{BB962C8B-B14F-4D97-AF65-F5344CB8AC3E}">
+        <p14:creationId xmlns:p14="http://schemas.microsoft.com/office/powerpoint/2010/main" val="2419688936"/>
+      </p:ext>
+    </p:extLst>
   </p:cSld>
   <p:clrMapOvr>
     <a:masterClrMapping/>
@@ -848,7 +858,7 @@
           <a:p>
             <a:fld id="{E93572D2-1BD6-954F-86C4-419D8535D635}" type="datetimeFigureOut">
               <a:rPr lang="en-GB" smtClean="0"/>
-              <a:t>25/01/2019</a:t>
+              <a:t>13/02/2019</a:t>
             </a:fld>
             <a:endParaRPr lang="en-GB" dirty="0"/>
           </a:p>
@@ -897,6 +907,11 @@
         </p:txBody>
       </p:sp>
     </p:spTree>
+    <p:extLst>
+      <p:ext uri="{BB962C8B-B14F-4D97-AF65-F5344CB8AC3E}">
+        <p14:creationId xmlns:p14="http://schemas.microsoft.com/office/powerpoint/2010/main" val="2370305626"/>
+      </p:ext>
+    </p:extLst>
   </p:cSld>
   <p:clrMapOvr>
     <a:masterClrMapping/>
@@ -933,8 +948,8 @@
         </p:nvSpPr>
         <p:spPr>
           <a:xfrm>
-            <a:off x="10819786" y="1138480"/>
-            <a:ext cx="3260110" cy="18121634"/>
+            <a:off x="15302658" y="804966"/>
+            <a:ext cx="4610844" cy="12812950"/>
           </a:xfrm>
         </p:spPr>
         <p:txBody>
@@ -961,8 +976,8 @@
         </p:nvSpPr>
         <p:spPr>
           <a:xfrm>
-            <a:off x="1039456" y="1138480"/>
-            <a:ext cx="9591338" cy="18121634"/>
+            <a:off x="1470125" y="804966"/>
+            <a:ext cx="13565237" cy="12812950"/>
           </a:xfrm>
         </p:spPr>
         <p:txBody>
@@ -1023,7 +1038,7 @@
           <a:p>
             <a:fld id="{E93572D2-1BD6-954F-86C4-419D8535D635}" type="datetimeFigureOut">
               <a:rPr lang="en-GB" smtClean="0"/>
-              <a:t>25/01/2019</a:t>
+              <a:t>13/02/2019</a:t>
             </a:fld>
             <a:endParaRPr lang="en-GB" dirty="0"/>
           </a:p>
@@ -1072,6 +1087,11 @@
         </p:txBody>
       </p:sp>
     </p:spTree>
+    <p:extLst>
+      <p:ext uri="{BB962C8B-B14F-4D97-AF65-F5344CB8AC3E}">
+        <p14:creationId xmlns:p14="http://schemas.microsoft.com/office/powerpoint/2010/main" val="809799352"/>
+      </p:ext>
+    </p:extLst>
   </p:cSld>
   <p:clrMapOvr>
     <a:masterClrMapping/>
@@ -1188,7 +1208,7 @@
           <a:p>
             <a:fld id="{E93572D2-1BD6-954F-86C4-419D8535D635}" type="datetimeFigureOut">
               <a:rPr lang="en-GB" smtClean="0"/>
-              <a:t>25/01/2019</a:t>
+              <a:t>13/02/2019</a:t>
             </a:fld>
             <a:endParaRPr lang="en-GB" dirty="0"/>
           </a:p>
@@ -1237,6 +1257,11 @@
         </p:txBody>
       </p:sp>
     </p:spTree>
+    <p:extLst>
+      <p:ext uri="{BB962C8B-B14F-4D97-AF65-F5344CB8AC3E}">
+        <p14:creationId xmlns:p14="http://schemas.microsoft.com/office/powerpoint/2010/main" val="1028124729"/>
+      </p:ext>
+    </p:extLst>
   </p:cSld>
   <p:clrMapOvr>
     <a:masterClrMapping/>
@@ -1273,15 +1298,15 @@
         </p:nvSpPr>
         <p:spPr>
           <a:xfrm>
-            <a:off x="1031582" y="5331063"/>
-            <a:ext cx="13040439" cy="8894992"/>
+            <a:off x="1458988" y="3769342"/>
+            <a:ext cx="18443377" cy="6289229"/>
           </a:xfrm>
         </p:spPr>
         <p:txBody>
           <a:bodyPr anchor="b"/>
           <a:lstStyle>
             <a:lvl1pPr>
-              <a:defRPr sz="9921"/>
+              <a:defRPr sz="13228"/>
             </a:lvl1pPr>
           </a:lstStyle>
           <a:p>
@@ -1305,8 +1330,8 @@
         </p:nvSpPr>
         <p:spPr>
           <a:xfrm>
-            <a:off x="1031582" y="14310205"/>
-            <a:ext cx="13040439" cy="4677666"/>
+            <a:off x="1458988" y="10118069"/>
+            <a:ext cx="18443377" cy="3307357"/>
           </a:xfrm>
         </p:spPr>
         <p:txBody>
@@ -1314,15 +1339,15 @@
           <a:lstStyle>
             <a:lvl1pPr marL="0" indent="0">
               <a:buNone/>
-              <a:defRPr sz="3968">
+              <a:defRPr sz="5291">
                 <a:solidFill>
                   <a:schemeClr val="tx1"/>
                 </a:solidFill>
               </a:defRPr>
             </a:lvl1pPr>
-            <a:lvl2pPr marL="755980" indent="0">
-              <a:buNone/>
-              <a:defRPr sz="3307">
+            <a:lvl2pPr marL="1007943" indent="0">
+              <a:buNone/>
+              <a:defRPr sz="4409">
                 <a:solidFill>
                   <a:schemeClr val="tx1">
                     <a:tint val="75000"/>
@@ -1330,9 +1355,9 @@
                 </a:solidFill>
               </a:defRPr>
             </a:lvl2pPr>
-            <a:lvl3pPr marL="1511960" indent="0">
-              <a:buNone/>
-              <a:defRPr sz="2976">
+            <a:lvl3pPr marL="2015886" indent="0">
+              <a:buNone/>
+              <a:defRPr sz="3968">
                 <a:solidFill>
                   <a:schemeClr val="tx1">
                     <a:tint val="75000"/>
@@ -1340,9 +1365,9 @@
                 </a:solidFill>
               </a:defRPr>
             </a:lvl3pPr>
-            <a:lvl4pPr marL="2267941" indent="0">
-              <a:buNone/>
-              <a:defRPr sz="2646">
+            <a:lvl4pPr marL="3023829" indent="0">
+              <a:buNone/>
+              <a:defRPr sz="3527">
                 <a:solidFill>
                   <a:schemeClr val="tx1">
                     <a:tint val="75000"/>
@@ -1350,9 +1375,9 @@
                 </a:solidFill>
               </a:defRPr>
             </a:lvl4pPr>
-            <a:lvl5pPr marL="3023921" indent="0">
-              <a:buNone/>
-              <a:defRPr sz="2646">
+            <a:lvl5pPr marL="4031772" indent="0">
+              <a:buNone/>
+              <a:defRPr sz="3527">
                 <a:solidFill>
                   <a:schemeClr val="tx1">
                     <a:tint val="75000"/>
@@ -1360,9 +1385,9 @@
                 </a:solidFill>
               </a:defRPr>
             </a:lvl5pPr>
-            <a:lvl6pPr marL="3779901" indent="0">
-              <a:buNone/>
-              <a:defRPr sz="2646">
+            <a:lvl6pPr marL="5039716" indent="0">
+              <a:buNone/>
+              <a:defRPr sz="3527">
                 <a:solidFill>
                   <a:schemeClr val="tx1">
                     <a:tint val="75000"/>
@@ -1370,9 +1395,9 @@
                 </a:solidFill>
               </a:defRPr>
             </a:lvl6pPr>
-            <a:lvl7pPr marL="4535881" indent="0">
-              <a:buNone/>
-              <a:defRPr sz="2646">
+            <a:lvl7pPr marL="6047659" indent="0">
+              <a:buNone/>
+              <a:defRPr sz="3527">
                 <a:solidFill>
                   <a:schemeClr val="tx1">
                     <a:tint val="75000"/>
@@ -1380,9 +1405,9 @@
                 </a:solidFill>
               </a:defRPr>
             </a:lvl7pPr>
-            <a:lvl8pPr marL="5291861" indent="0">
-              <a:buNone/>
-              <a:defRPr sz="2646">
+            <a:lvl8pPr marL="7055602" indent="0">
+              <a:buNone/>
+              <a:defRPr sz="3527">
                 <a:solidFill>
                   <a:schemeClr val="tx1">
                     <a:tint val="75000"/>
@@ -1390,9 +1415,9 @@
                 </a:solidFill>
               </a:defRPr>
             </a:lvl8pPr>
-            <a:lvl9pPr marL="6047842" indent="0">
-              <a:buNone/>
-              <a:defRPr sz="2646">
+            <a:lvl9pPr marL="8063545" indent="0">
+              <a:buNone/>
+              <a:defRPr sz="3527">
                 <a:solidFill>
                   <a:schemeClr val="tx1">
                     <a:tint val="75000"/>
@@ -1427,7 +1452,7 @@
           <a:p>
             <a:fld id="{E93572D2-1BD6-954F-86C4-419D8535D635}" type="datetimeFigureOut">
               <a:rPr lang="en-GB" smtClean="0"/>
-              <a:t>25/01/2019</a:t>
+              <a:t>13/02/2019</a:t>
             </a:fld>
             <a:endParaRPr lang="en-GB" dirty="0"/>
           </a:p>
@@ -1476,6 +1501,11 @@
         </p:txBody>
       </p:sp>
     </p:spTree>
+    <p:extLst>
+      <p:ext uri="{BB962C8B-B14F-4D97-AF65-F5344CB8AC3E}">
+        <p14:creationId xmlns:p14="http://schemas.microsoft.com/office/powerpoint/2010/main" val="496439213"/>
+      </p:ext>
+    </p:extLst>
   </p:cSld>
   <p:clrMapOvr>
     <a:masterClrMapping/>
@@ -1535,8 +1565,8 @@
         </p:nvSpPr>
         <p:spPr>
           <a:xfrm>
-            <a:off x="1039455" y="5692400"/>
-            <a:ext cx="6425724" cy="13567714"/>
+            <a:off x="1470124" y="4024827"/>
+            <a:ext cx="9088041" cy="9593089"/>
           </a:xfrm>
         </p:spPr>
         <p:txBody>
@@ -1592,8 +1622,8 @@
         </p:nvSpPr>
         <p:spPr>
           <a:xfrm>
-            <a:off x="7654171" y="5692400"/>
-            <a:ext cx="6425724" cy="13567714"/>
+            <a:off x="10825460" y="4024827"/>
+            <a:ext cx="9088041" cy="9593089"/>
           </a:xfrm>
         </p:spPr>
         <p:txBody>
@@ -1654,7 +1684,7 @@
           <a:p>
             <a:fld id="{E93572D2-1BD6-954F-86C4-419D8535D635}" type="datetimeFigureOut">
               <a:rPr lang="en-GB" smtClean="0"/>
-              <a:t>25/01/2019</a:t>
+              <a:t>13/02/2019</a:t>
             </a:fld>
             <a:endParaRPr lang="en-GB" dirty="0"/>
           </a:p>
@@ -1703,6 +1733,11 @@
         </p:txBody>
       </p:sp>
     </p:spTree>
+    <p:extLst>
+      <p:ext uri="{BB962C8B-B14F-4D97-AF65-F5344CB8AC3E}">
+        <p14:creationId xmlns:p14="http://schemas.microsoft.com/office/powerpoint/2010/main" val="637726627"/>
+      </p:ext>
+    </p:extLst>
   </p:cSld>
   <p:clrMapOvr>
     <a:masterClrMapping/>
@@ -1739,8 +1774,8 @@
         </p:nvSpPr>
         <p:spPr>
           <a:xfrm>
-            <a:off x="1041425" y="1138485"/>
-            <a:ext cx="13040439" cy="4133179"/>
+            <a:off x="1472909" y="804969"/>
+            <a:ext cx="18443377" cy="2922375"/>
           </a:xfrm>
         </p:spPr>
         <p:txBody>
@@ -1767,8 +1802,8 @@
         </p:nvSpPr>
         <p:spPr>
           <a:xfrm>
-            <a:off x="1041426" y="5241960"/>
-            <a:ext cx="6396193" cy="2569003"/>
+            <a:off x="1472912" y="3706342"/>
+            <a:ext cx="9046274" cy="1816421"/>
           </a:xfrm>
         </p:spPr>
         <p:txBody>
@@ -1776,39 +1811,39 @@
           <a:lstStyle>
             <a:lvl1pPr marL="0" indent="0">
               <a:buNone/>
+              <a:defRPr sz="5291" b="1"/>
+            </a:lvl1pPr>
+            <a:lvl2pPr marL="1007943" indent="0">
+              <a:buNone/>
+              <a:defRPr sz="4409" b="1"/>
+            </a:lvl2pPr>
+            <a:lvl3pPr marL="2015886" indent="0">
+              <a:buNone/>
               <a:defRPr sz="3968" b="1"/>
-            </a:lvl1pPr>
-            <a:lvl2pPr marL="755980" indent="0">
-              <a:buNone/>
-              <a:defRPr sz="3307" b="1"/>
-            </a:lvl2pPr>
-            <a:lvl3pPr marL="1511960" indent="0">
-              <a:buNone/>
-              <a:defRPr sz="2976" b="1"/>
             </a:lvl3pPr>
-            <a:lvl4pPr marL="2267941" indent="0">
-              <a:buNone/>
-              <a:defRPr sz="2646" b="1"/>
+            <a:lvl4pPr marL="3023829" indent="0">
+              <a:buNone/>
+              <a:defRPr sz="3527" b="1"/>
             </a:lvl4pPr>
-            <a:lvl5pPr marL="3023921" indent="0">
-              <a:buNone/>
-              <a:defRPr sz="2646" b="1"/>
+            <a:lvl5pPr marL="4031772" indent="0">
+              <a:buNone/>
+              <a:defRPr sz="3527" b="1"/>
             </a:lvl5pPr>
-            <a:lvl6pPr marL="3779901" indent="0">
-              <a:buNone/>
-              <a:defRPr sz="2646" b="1"/>
+            <a:lvl6pPr marL="5039716" indent="0">
+              <a:buNone/>
+              <a:defRPr sz="3527" b="1"/>
             </a:lvl6pPr>
-            <a:lvl7pPr marL="4535881" indent="0">
-              <a:buNone/>
-              <a:defRPr sz="2646" b="1"/>
+            <a:lvl7pPr marL="6047659" indent="0">
+              <a:buNone/>
+              <a:defRPr sz="3527" b="1"/>
             </a:lvl7pPr>
-            <a:lvl8pPr marL="5291861" indent="0">
-              <a:buNone/>
-              <a:defRPr sz="2646" b="1"/>
+            <a:lvl8pPr marL="7055602" indent="0">
+              <a:buNone/>
+              <a:defRPr sz="3527" b="1"/>
             </a:lvl8pPr>
-            <a:lvl9pPr marL="6047842" indent="0">
-              <a:buNone/>
-              <a:defRPr sz="2646" b="1"/>
+            <a:lvl9pPr marL="8063545" indent="0">
+              <a:buNone/>
+              <a:defRPr sz="3527" b="1"/>
             </a:lvl9pPr>
           </a:lstStyle>
           <a:p>
@@ -1832,8 +1867,8 @@
         </p:nvSpPr>
         <p:spPr>
           <a:xfrm>
-            <a:off x="1041426" y="7810963"/>
-            <a:ext cx="6396193" cy="11488750"/>
+            <a:off x="1472912" y="5522763"/>
+            <a:ext cx="9046274" cy="8123152"/>
           </a:xfrm>
         </p:spPr>
         <p:txBody>
@@ -1889,8 +1924,8 @@
         </p:nvSpPr>
         <p:spPr>
           <a:xfrm>
-            <a:off x="7654172" y="5241960"/>
-            <a:ext cx="6427693" cy="2569003"/>
+            <a:off x="10825461" y="3706342"/>
+            <a:ext cx="9090826" cy="1816421"/>
           </a:xfrm>
         </p:spPr>
         <p:txBody>
@@ -1898,39 +1933,39 @@
           <a:lstStyle>
             <a:lvl1pPr marL="0" indent="0">
               <a:buNone/>
+              <a:defRPr sz="5291" b="1"/>
+            </a:lvl1pPr>
+            <a:lvl2pPr marL="1007943" indent="0">
+              <a:buNone/>
+              <a:defRPr sz="4409" b="1"/>
+            </a:lvl2pPr>
+            <a:lvl3pPr marL="2015886" indent="0">
+              <a:buNone/>
               <a:defRPr sz="3968" b="1"/>
-            </a:lvl1pPr>
-            <a:lvl2pPr marL="755980" indent="0">
-              <a:buNone/>
-              <a:defRPr sz="3307" b="1"/>
-            </a:lvl2pPr>
-            <a:lvl3pPr marL="1511960" indent="0">
-              <a:buNone/>
-              <a:defRPr sz="2976" b="1"/>
             </a:lvl3pPr>
-            <a:lvl4pPr marL="2267941" indent="0">
-              <a:buNone/>
-              <a:defRPr sz="2646" b="1"/>
+            <a:lvl4pPr marL="3023829" indent="0">
+              <a:buNone/>
+              <a:defRPr sz="3527" b="1"/>
             </a:lvl4pPr>
-            <a:lvl5pPr marL="3023921" indent="0">
-              <a:buNone/>
-              <a:defRPr sz="2646" b="1"/>
+            <a:lvl5pPr marL="4031772" indent="0">
+              <a:buNone/>
+              <a:defRPr sz="3527" b="1"/>
             </a:lvl5pPr>
-            <a:lvl6pPr marL="3779901" indent="0">
-              <a:buNone/>
-              <a:defRPr sz="2646" b="1"/>
+            <a:lvl6pPr marL="5039716" indent="0">
+              <a:buNone/>
+              <a:defRPr sz="3527" b="1"/>
             </a:lvl6pPr>
-            <a:lvl7pPr marL="4535881" indent="0">
-              <a:buNone/>
-              <a:defRPr sz="2646" b="1"/>
+            <a:lvl7pPr marL="6047659" indent="0">
+              <a:buNone/>
+              <a:defRPr sz="3527" b="1"/>
             </a:lvl7pPr>
-            <a:lvl8pPr marL="5291861" indent="0">
-              <a:buNone/>
-              <a:defRPr sz="2646" b="1"/>
+            <a:lvl8pPr marL="7055602" indent="0">
+              <a:buNone/>
+              <a:defRPr sz="3527" b="1"/>
             </a:lvl8pPr>
-            <a:lvl9pPr marL="6047842" indent="0">
-              <a:buNone/>
-              <a:defRPr sz="2646" b="1"/>
+            <a:lvl9pPr marL="8063545" indent="0">
+              <a:buNone/>
+              <a:defRPr sz="3527" b="1"/>
             </a:lvl9pPr>
           </a:lstStyle>
           <a:p>
@@ -1954,8 +1989,8 @@
         </p:nvSpPr>
         <p:spPr>
           <a:xfrm>
-            <a:off x="7654172" y="7810963"/>
-            <a:ext cx="6427693" cy="11488750"/>
+            <a:off x="10825461" y="5522763"/>
+            <a:ext cx="9090826" cy="8123152"/>
           </a:xfrm>
         </p:spPr>
         <p:txBody>
@@ -2016,7 +2051,7 @@
           <a:p>
             <a:fld id="{E93572D2-1BD6-954F-86C4-419D8535D635}" type="datetimeFigureOut">
               <a:rPr lang="en-GB" smtClean="0"/>
-              <a:t>25/01/2019</a:t>
+              <a:t>13/02/2019</a:t>
             </a:fld>
             <a:endParaRPr lang="en-GB" dirty="0"/>
           </a:p>
@@ -2065,6 +2100,11 @@
         </p:txBody>
       </p:sp>
     </p:spTree>
+    <p:extLst>
+      <p:ext uri="{BB962C8B-B14F-4D97-AF65-F5344CB8AC3E}">
+        <p14:creationId xmlns:p14="http://schemas.microsoft.com/office/powerpoint/2010/main" val="2010321731"/>
+      </p:ext>
+    </p:extLst>
   </p:cSld>
   <p:clrMapOvr>
     <a:masterClrMapping/>
@@ -2129,7 +2169,7 @@
           <a:p>
             <a:fld id="{E93572D2-1BD6-954F-86C4-419D8535D635}" type="datetimeFigureOut">
               <a:rPr lang="en-GB" smtClean="0"/>
-              <a:t>25/01/2019</a:t>
+              <a:t>13/02/2019</a:t>
             </a:fld>
             <a:endParaRPr lang="en-GB" dirty="0"/>
           </a:p>
@@ -2178,6 +2218,11 @@
         </p:txBody>
       </p:sp>
     </p:spTree>
+    <p:extLst>
+      <p:ext uri="{BB962C8B-B14F-4D97-AF65-F5344CB8AC3E}">
+        <p14:creationId xmlns:p14="http://schemas.microsoft.com/office/powerpoint/2010/main" val="331823076"/>
+      </p:ext>
+    </p:extLst>
   </p:cSld>
   <p:clrMapOvr>
     <a:masterClrMapping/>
@@ -2219,7 +2264,7 @@
           <a:p>
             <a:fld id="{E93572D2-1BD6-954F-86C4-419D8535D635}" type="datetimeFigureOut">
               <a:rPr lang="en-GB" smtClean="0"/>
-              <a:t>25/01/2019</a:t>
+              <a:t>13/02/2019</a:t>
             </a:fld>
             <a:endParaRPr lang="en-GB" dirty="0"/>
           </a:p>
@@ -2268,6 +2313,11 @@
         </p:txBody>
       </p:sp>
     </p:spTree>
+    <p:extLst>
+      <p:ext uri="{BB962C8B-B14F-4D97-AF65-F5344CB8AC3E}">
+        <p14:creationId xmlns:p14="http://schemas.microsoft.com/office/powerpoint/2010/main" val="3936642022"/>
+      </p:ext>
+    </p:extLst>
   </p:cSld>
   <p:clrMapOvr>
     <a:masterClrMapping/>
@@ -2304,15 +2354,15 @@
         </p:nvSpPr>
         <p:spPr>
           <a:xfrm>
-            <a:off x="1041425" y="1425575"/>
-            <a:ext cx="4876384" cy="4989513"/>
+            <a:off x="1472909" y="1007957"/>
+            <a:ext cx="6896776" cy="3527848"/>
           </a:xfrm>
         </p:spPr>
         <p:txBody>
           <a:bodyPr anchor="b"/>
           <a:lstStyle>
             <a:lvl1pPr>
-              <a:defRPr sz="5291"/>
+              <a:defRPr sz="7055"/>
             </a:lvl1pPr>
           </a:lstStyle>
           <a:p>
@@ -2336,39 +2386,39 @@
         </p:nvSpPr>
         <p:spPr>
           <a:xfrm>
-            <a:off x="6427693" y="3078850"/>
-            <a:ext cx="7654171" cy="15196234"/>
+            <a:off x="9090826" y="2176910"/>
+            <a:ext cx="10825460" cy="10744538"/>
           </a:xfrm>
         </p:spPr>
         <p:txBody>
           <a:bodyPr/>
           <a:lstStyle>
             <a:lvl1pPr>
-              <a:defRPr sz="5291"/>
+              <a:defRPr sz="7055"/>
             </a:lvl1pPr>
             <a:lvl2pPr>
-              <a:defRPr sz="4630"/>
+              <a:defRPr sz="6173"/>
             </a:lvl2pPr>
             <a:lvl3pPr>
-              <a:defRPr sz="3968"/>
+              <a:defRPr sz="5291"/>
             </a:lvl3pPr>
             <a:lvl4pPr>
-              <a:defRPr sz="3307"/>
+              <a:defRPr sz="4409"/>
             </a:lvl4pPr>
             <a:lvl5pPr>
-              <a:defRPr sz="3307"/>
+              <a:defRPr sz="4409"/>
             </a:lvl5pPr>
             <a:lvl6pPr>
-              <a:defRPr sz="3307"/>
+              <a:defRPr sz="4409"/>
             </a:lvl6pPr>
             <a:lvl7pPr>
-              <a:defRPr sz="3307"/>
+              <a:defRPr sz="4409"/>
             </a:lvl7pPr>
             <a:lvl8pPr>
-              <a:defRPr sz="3307"/>
+              <a:defRPr sz="4409"/>
             </a:lvl8pPr>
             <a:lvl9pPr>
-              <a:defRPr sz="3307"/>
+              <a:defRPr sz="4409"/>
             </a:lvl9pPr>
           </a:lstStyle>
           <a:p>
@@ -2421,8 +2471,8 @@
         </p:nvSpPr>
         <p:spPr>
           <a:xfrm>
-            <a:off x="1041425" y="6415088"/>
-            <a:ext cx="4876384" cy="11884743"/>
+            <a:off x="1472909" y="4535805"/>
+            <a:ext cx="6896776" cy="8403140"/>
           </a:xfrm>
         </p:spPr>
         <p:txBody>
@@ -2430,39 +2480,39 @@
           <a:lstStyle>
             <a:lvl1pPr marL="0" indent="0">
               <a:buNone/>
+              <a:defRPr sz="3527"/>
+            </a:lvl1pPr>
+            <a:lvl2pPr marL="1007943" indent="0">
+              <a:buNone/>
+              <a:defRPr sz="3086"/>
+            </a:lvl2pPr>
+            <a:lvl3pPr marL="2015886" indent="0">
+              <a:buNone/>
               <a:defRPr sz="2646"/>
-            </a:lvl1pPr>
-            <a:lvl2pPr marL="755980" indent="0">
-              <a:buNone/>
-              <a:defRPr sz="2315"/>
-            </a:lvl2pPr>
-            <a:lvl3pPr marL="1511960" indent="0">
-              <a:buNone/>
-              <a:defRPr sz="1984"/>
             </a:lvl3pPr>
-            <a:lvl4pPr marL="2267941" indent="0">
-              <a:buNone/>
-              <a:defRPr sz="1654"/>
+            <a:lvl4pPr marL="3023829" indent="0">
+              <a:buNone/>
+              <a:defRPr sz="2205"/>
             </a:lvl4pPr>
-            <a:lvl5pPr marL="3023921" indent="0">
-              <a:buNone/>
-              <a:defRPr sz="1654"/>
+            <a:lvl5pPr marL="4031772" indent="0">
+              <a:buNone/>
+              <a:defRPr sz="2205"/>
             </a:lvl5pPr>
-            <a:lvl6pPr marL="3779901" indent="0">
-              <a:buNone/>
-              <a:defRPr sz="1654"/>
+            <a:lvl6pPr marL="5039716" indent="0">
+              <a:buNone/>
+              <a:defRPr sz="2205"/>
             </a:lvl6pPr>
-            <a:lvl7pPr marL="4535881" indent="0">
-              <a:buNone/>
-              <a:defRPr sz="1654"/>
+            <a:lvl7pPr marL="6047659" indent="0">
+              <a:buNone/>
+              <a:defRPr sz="2205"/>
             </a:lvl7pPr>
-            <a:lvl8pPr marL="5291861" indent="0">
-              <a:buNone/>
-              <a:defRPr sz="1654"/>
+            <a:lvl8pPr marL="7055602" indent="0">
+              <a:buNone/>
+              <a:defRPr sz="2205"/>
             </a:lvl8pPr>
-            <a:lvl9pPr marL="6047842" indent="0">
-              <a:buNone/>
-              <a:defRPr sz="1654"/>
+            <a:lvl9pPr marL="8063545" indent="0">
+              <a:buNone/>
+              <a:defRPr sz="2205"/>
             </a:lvl9pPr>
           </a:lstStyle>
           <a:p>
@@ -2491,7 +2541,7 @@
           <a:p>
             <a:fld id="{E93572D2-1BD6-954F-86C4-419D8535D635}" type="datetimeFigureOut">
               <a:rPr lang="en-GB" smtClean="0"/>
-              <a:t>25/01/2019</a:t>
+              <a:t>13/02/2019</a:t>
             </a:fld>
             <a:endParaRPr lang="en-GB" dirty="0"/>
           </a:p>
@@ -2540,6 +2590,11 @@
         </p:txBody>
       </p:sp>
     </p:spTree>
+    <p:extLst>
+      <p:ext uri="{BB962C8B-B14F-4D97-AF65-F5344CB8AC3E}">
+        <p14:creationId xmlns:p14="http://schemas.microsoft.com/office/powerpoint/2010/main" val="131337154"/>
+      </p:ext>
+    </p:extLst>
   </p:cSld>
   <p:clrMapOvr>
     <a:masterClrMapping/>
@@ -2576,15 +2631,15 @@
         </p:nvSpPr>
         <p:spPr>
           <a:xfrm>
-            <a:off x="1041425" y="1425575"/>
-            <a:ext cx="4876384" cy="4989513"/>
+            <a:off x="1472909" y="1007957"/>
+            <a:ext cx="6896776" cy="3527848"/>
           </a:xfrm>
         </p:spPr>
         <p:txBody>
           <a:bodyPr anchor="b"/>
           <a:lstStyle>
             <a:lvl1pPr>
-              <a:defRPr sz="5291"/>
+              <a:defRPr sz="7055"/>
             </a:lvl1pPr>
           </a:lstStyle>
           <a:p>
@@ -2608,8 +2663,8 @@
         </p:nvSpPr>
         <p:spPr>
           <a:xfrm>
-            <a:off x="6427693" y="3078850"/>
-            <a:ext cx="7654171" cy="15196234"/>
+            <a:off x="9090826" y="2176910"/>
+            <a:ext cx="10825460" cy="10744538"/>
           </a:xfrm>
         </p:spPr>
         <p:txBody>
@@ -2617,46 +2672,47 @@
           <a:lstStyle>
             <a:lvl1pPr marL="0" indent="0">
               <a:buNone/>
+              <a:defRPr sz="7055"/>
+            </a:lvl1pPr>
+            <a:lvl2pPr marL="1007943" indent="0">
+              <a:buNone/>
+              <a:defRPr sz="6173"/>
+            </a:lvl2pPr>
+            <a:lvl3pPr marL="2015886" indent="0">
+              <a:buNone/>
               <a:defRPr sz="5291"/>
-            </a:lvl1pPr>
-            <a:lvl2pPr marL="755980" indent="0">
-              <a:buNone/>
-              <a:defRPr sz="4630"/>
-            </a:lvl2pPr>
-            <a:lvl3pPr marL="1511960" indent="0">
-              <a:buNone/>
-              <a:defRPr sz="3968"/>
             </a:lvl3pPr>
-            <a:lvl4pPr marL="2267941" indent="0">
-              <a:buNone/>
-              <a:defRPr sz="3307"/>
+            <a:lvl4pPr marL="3023829" indent="0">
+              <a:buNone/>
+              <a:defRPr sz="4409"/>
             </a:lvl4pPr>
-            <a:lvl5pPr marL="3023921" indent="0">
-              <a:buNone/>
-              <a:defRPr sz="3307"/>
+            <a:lvl5pPr marL="4031772" indent="0">
+              <a:buNone/>
+              <a:defRPr sz="4409"/>
             </a:lvl5pPr>
-            <a:lvl6pPr marL="3779901" indent="0">
-              <a:buNone/>
-              <a:defRPr sz="3307"/>
+            <a:lvl6pPr marL="5039716" indent="0">
+              <a:buNone/>
+              <a:defRPr sz="4409"/>
             </a:lvl6pPr>
-            <a:lvl7pPr marL="4535881" indent="0">
-              <a:buNone/>
-              <a:defRPr sz="3307"/>
+            <a:lvl7pPr marL="6047659" indent="0">
+              <a:buNone/>
+              <a:defRPr sz="4409"/>
             </a:lvl7pPr>
-            <a:lvl8pPr marL="5291861" indent="0">
-              <a:buNone/>
-              <a:defRPr sz="3307"/>
+            <a:lvl8pPr marL="7055602" indent="0">
+              <a:buNone/>
+              <a:defRPr sz="4409"/>
             </a:lvl8pPr>
-            <a:lvl9pPr marL="6047842" indent="0">
-              <a:buNone/>
-              <a:defRPr sz="3307"/>
+            <a:lvl9pPr marL="8063545" indent="0">
+              <a:buNone/>
+              <a:defRPr sz="4409"/>
             </a:lvl9pPr>
           </a:lstStyle>
           <a:p>
             <a:r>
-              <a:rPr lang="en-US" dirty="0"/>
-              <a:t>Drag picture to placeholder or click icon to add</a:t>
-            </a:r>
+              <a:rPr lang="en-US"/>
+              <a:t>Click icon to add picture</a:t>
+            </a:r>
+            <a:endParaRPr lang="en-US" dirty="0"/>
           </a:p>
         </p:txBody>
       </p:sp>
@@ -2672,8 +2728,8 @@
         </p:nvSpPr>
         <p:spPr>
           <a:xfrm>
-            <a:off x="1041425" y="6415088"/>
-            <a:ext cx="4876384" cy="11884743"/>
+            <a:off x="1472909" y="4535805"/>
+            <a:ext cx="6896776" cy="8403140"/>
           </a:xfrm>
         </p:spPr>
         <p:txBody>
@@ -2681,39 +2737,39 @@
           <a:lstStyle>
             <a:lvl1pPr marL="0" indent="0">
               <a:buNone/>
+              <a:defRPr sz="3527"/>
+            </a:lvl1pPr>
+            <a:lvl2pPr marL="1007943" indent="0">
+              <a:buNone/>
+              <a:defRPr sz="3086"/>
+            </a:lvl2pPr>
+            <a:lvl3pPr marL="2015886" indent="0">
+              <a:buNone/>
               <a:defRPr sz="2646"/>
-            </a:lvl1pPr>
-            <a:lvl2pPr marL="755980" indent="0">
-              <a:buNone/>
-              <a:defRPr sz="2315"/>
-            </a:lvl2pPr>
-            <a:lvl3pPr marL="1511960" indent="0">
-              <a:buNone/>
-              <a:defRPr sz="1984"/>
             </a:lvl3pPr>
-            <a:lvl4pPr marL="2267941" indent="0">
-              <a:buNone/>
-              <a:defRPr sz="1654"/>
+            <a:lvl4pPr marL="3023829" indent="0">
+              <a:buNone/>
+              <a:defRPr sz="2205"/>
             </a:lvl4pPr>
-            <a:lvl5pPr marL="3023921" indent="0">
-              <a:buNone/>
-              <a:defRPr sz="1654"/>
+            <a:lvl5pPr marL="4031772" indent="0">
+              <a:buNone/>
+              <a:defRPr sz="2205"/>
             </a:lvl5pPr>
-            <a:lvl6pPr marL="3779901" indent="0">
-              <a:buNone/>
-              <a:defRPr sz="1654"/>
+            <a:lvl6pPr marL="5039716" indent="0">
+              <a:buNone/>
+              <a:defRPr sz="2205"/>
             </a:lvl6pPr>
-            <a:lvl7pPr marL="4535881" indent="0">
-              <a:buNone/>
-              <a:defRPr sz="1654"/>
+            <a:lvl7pPr marL="6047659" indent="0">
+              <a:buNone/>
+              <a:defRPr sz="2205"/>
             </a:lvl7pPr>
-            <a:lvl8pPr marL="5291861" indent="0">
-              <a:buNone/>
-              <a:defRPr sz="1654"/>
+            <a:lvl8pPr marL="7055602" indent="0">
+              <a:buNone/>
+              <a:defRPr sz="2205"/>
             </a:lvl8pPr>
-            <a:lvl9pPr marL="6047842" indent="0">
-              <a:buNone/>
-              <a:defRPr sz="1654"/>
+            <a:lvl9pPr marL="8063545" indent="0">
+              <a:buNone/>
+              <a:defRPr sz="2205"/>
             </a:lvl9pPr>
           </a:lstStyle>
           <a:p>
@@ -2742,7 +2798,7 @@
           <a:p>
             <a:fld id="{E93572D2-1BD6-954F-86C4-419D8535D635}" type="datetimeFigureOut">
               <a:rPr lang="en-GB" smtClean="0"/>
-              <a:t>25/01/2019</a:t>
+              <a:t>13/02/2019</a:t>
             </a:fld>
             <a:endParaRPr lang="en-GB" dirty="0"/>
           </a:p>
@@ -2791,6 +2847,11 @@
         </p:txBody>
       </p:sp>
     </p:spTree>
+    <p:extLst>
+      <p:ext uri="{BB962C8B-B14F-4D97-AF65-F5344CB8AC3E}">
+        <p14:creationId xmlns:p14="http://schemas.microsoft.com/office/powerpoint/2010/main" val="2548771884"/>
+      </p:ext>
+    </p:extLst>
   </p:cSld>
   <p:clrMapOvr>
     <a:masterClrMapping/>
@@ -2832,8 +2893,8 @@
         </p:nvSpPr>
         <p:spPr>
           <a:xfrm>
-            <a:off x="1039456" y="1138485"/>
-            <a:ext cx="13040439" cy="4133179"/>
+            <a:off x="1470124" y="804969"/>
+            <a:ext cx="18443377" cy="2922375"/>
           </a:xfrm>
           <a:prstGeom prst="rect">
             <a:avLst/>
@@ -2865,8 +2926,8 @@
         </p:nvSpPr>
         <p:spPr>
           <a:xfrm>
-            <a:off x="1039456" y="5692400"/>
-            <a:ext cx="13040439" cy="13567714"/>
+            <a:off x="1470124" y="4024827"/>
+            <a:ext cx="18443377" cy="9593089"/>
           </a:xfrm>
           <a:prstGeom prst="rect">
             <a:avLst/>
@@ -2927,8 +2988,8 @@
         </p:nvSpPr>
         <p:spPr>
           <a:xfrm>
-            <a:off x="1039455" y="19819457"/>
-            <a:ext cx="3401854" cy="1138480"/>
+            <a:off x="1470124" y="14013401"/>
+            <a:ext cx="4811316" cy="804965"/>
           </a:xfrm>
           <a:prstGeom prst="rect">
             <a:avLst/>
@@ -2938,7 +2999,7 @@
           <a:bodyPr vert="horz" lIns="91440" tIns="45720" rIns="91440" bIns="45720" rtlCol="0" anchor="ctr"/>
           <a:lstStyle>
             <a:lvl1pPr algn="l">
-              <a:defRPr sz="1984">
+              <a:defRPr sz="2646">
                 <a:solidFill>
                   <a:schemeClr val="tx1">
                     <a:tint val="75000"/>
@@ -2950,7 +3011,7 @@
           <a:p>
             <a:fld id="{E93572D2-1BD6-954F-86C4-419D8535D635}" type="datetimeFigureOut">
               <a:rPr lang="en-GB" smtClean="0"/>
-              <a:t>25/01/2019</a:t>
+              <a:t>13/02/2019</a:t>
             </a:fld>
             <a:endParaRPr lang="en-GB" dirty="0"/>
           </a:p>
@@ -2968,8 +3029,8 @@
         </p:nvSpPr>
         <p:spPr>
           <a:xfrm>
-            <a:off x="5008285" y="19819457"/>
-            <a:ext cx="5102781" cy="1138480"/>
+            <a:off x="7083326" y="14013401"/>
+            <a:ext cx="7216973" cy="804965"/>
           </a:xfrm>
           <a:prstGeom prst="rect">
             <a:avLst/>
@@ -2979,7 +3040,7 @@
           <a:bodyPr vert="horz" lIns="91440" tIns="45720" rIns="91440" bIns="45720" rtlCol="0" anchor="ctr"/>
           <a:lstStyle>
             <a:lvl1pPr algn="ctr">
-              <a:defRPr sz="1984">
+              <a:defRPr sz="2646">
                 <a:solidFill>
                   <a:schemeClr val="tx1">
                     <a:tint val="75000"/>
@@ -3005,8 +3066,8 @@
         </p:nvSpPr>
         <p:spPr>
           <a:xfrm>
-            <a:off x="10678041" y="19819457"/>
-            <a:ext cx="3401854" cy="1138480"/>
+            <a:off x="15102185" y="14013401"/>
+            <a:ext cx="4811316" cy="804965"/>
           </a:xfrm>
           <a:prstGeom prst="rect">
             <a:avLst/>
@@ -3016,7 +3077,7 @@
           <a:bodyPr vert="horz" lIns="91440" tIns="45720" rIns="91440" bIns="45720" rtlCol="0" anchor="ctr"/>
           <a:lstStyle>
             <a:lvl1pPr algn="r">
-              <a:defRPr sz="1984">
+              <a:defRPr sz="2646">
                 <a:solidFill>
                   <a:schemeClr val="tx1">
                     <a:tint val="75000"/>
@@ -3037,27 +3098,27 @@
     </p:spTree>
     <p:extLst>
       <p:ext uri="{BB962C8B-B14F-4D97-AF65-F5344CB8AC3E}">
-        <p14:creationId xmlns:p14="http://schemas.microsoft.com/office/powerpoint/2010/main" val="935409011"/>
+        <p14:creationId xmlns:p14="http://schemas.microsoft.com/office/powerpoint/2010/main" val="1005966582"/>
       </p:ext>
     </p:extLst>
   </p:cSld>
   <p:clrMap bg1="lt1" tx1="dk1" bg2="lt2" tx2="dk2" accent1="accent1" accent2="accent2" accent3="accent3" accent4="accent4" accent5="accent5" accent6="accent6" hlink="hlink" folHlink="folHlink"/>
   <p:sldLayoutIdLst>
-    <p:sldLayoutId id="2147483673" r:id="rId1"/>
-    <p:sldLayoutId id="2147483674" r:id="rId2"/>
-    <p:sldLayoutId id="2147483675" r:id="rId3"/>
-    <p:sldLayoutId id="2147483676" r:id="rId4"/>
-    <p:sldLayoutId id="2147483677" r:id="rId5"/>
-    <p:sldLayoutId id="2147483678" r:id="rId6"/>
-    <p:sldLayoutId id="2147483679" r:id="rId7"/>
-    <p:sldLayoutId id="2147483680" r:id="rId8"/>
-    <p:sldLayoutId id="2147483681" r:id="rId9"/>
-    <p:sldLayoutId id="2147483682" r:id="rId10"/>
-    <p:sldLayoutId id="2147483683" r:id="rId11"/>
+    <p:sldLayoutId id="2147483685" r:id="rId1"/>
+    <p:sldLayoutId id="2147483686" r:id="rId2"/>
+    <p:sldLayoutId id="2147483687" r:id="rId3"/>
+    <p:sldLayoutId id="2147483688" r:id="rId4"/>
+    <p:sldLayoutId id="2147483689" r:id="rId5"/>
+    <p:sldLayoutId id="2147483690" r:id="rId6"/>
+    <p:sldLayoutId id="2147483691" r:id="rId7"/>
+    <p:sldLayoutId id="2147483692" r:id="rId8"/>
+    <p:sldLayoutId id="2147483693" r:id="rId9"/>
+    <p:sldLayoutId id="2147483694" r:id="rId10"/>
+    <p:sldLayoutId id="2147483695" r:id="rId11"/>
   </p:sldLayoutIdLst>
   <p:txStyles>
     <p:titleStyle>
-      <a:lvl1pPr algn="l" defTabSz="1511960" rtl="0" eaLnBrk="1" latinLnBrk="0" hangingPunct="1">
+      <a:lvl1pPr algn="l" defTabSz="2015886" rtl="0" eaLnBrk="1" latinLnBrk="0" hangingPunct="1">
         <a:lnSpc>
           <a:spcPct val="90000"/>
         </a:lnSpc>
@@ -3065,7 +3126,7 @@
           <a:spcPct val="0"/>
         </a:spcBef>
         <a:buNone/>
-        <a:defRPr sz="7275" kern="1200">
+        <a:defRPr sz="9700" kern="1200">
           <a:solidFill>
             <a:schemeClr val="tx1"/>
           </a:solidFill>
@@ -3076,16 +3137,16 @@
       </a:lvl1pPr>
     </p:titleStyle>
     <p:bodyStyle>
-      <a:lvl1pPr marL="377990" indent="-377990" algn="l" defTabSz="1511960" rtl="0" eaLnBrk="1" latinLnBrk="0" hangingPunct="1">
+      <a:lvl1pPr marL="503972" indent="-503972" algn="l" defTabSz="2015886" rtl="0" eaLnBrk="1" latinLnBrk="0" hangingPunct="1">
         <a:lnSpc>
           <a:spcPct val="90000"/>
         </a:lnSpc>
         <a:spcBef>
-          <a:spcPts val="1654"/>
+          <a:spcPts val="2205"/>
         </a:spcBef>
         <a:buFont typeface="Arial" panose="020B0604020202020204" pitchFamily="34" charset="0"/>
         <a:buChar char="•"/>
-        <a:defRPr sz="4630" kern="1200">
+        <a:defRPr sz="6173" kern="1200">
           <a:solidFill>
             <a:schemeClr val="tx1"/>
           </a:solidFill>
@@ -3094,12 +3155,48 @@
           <a:cs typeface="+mn-cs"/>
         </a:defRPr>
       </a:lvl1pPr>
-      <a:lvl2pPr marL="1133970" indent="-377990" algn="l" defTabSz="1511960" rtl="0" eaLnBrk="1" latinLnBrk="0" hangingPunct="1">
+      <a:lvl2pPr marL="1511915" indent="-503972" algn="l" defTabSz="2015886" rtl="0" eaLnBrk="1" latinLnBrk="0" hangingPunct="1">
         <a:lnSpc>
           <a:spcPct val="90000"/>
         </a:lnSpc>
         <a:spcBef>
-          <a:spcPts val="827"/>
+          <a:spcPts val="1102"/>
+        </a:spcBef>
+        <a:buFont typeface="Arial" panose="020B0604020202020204" pitchFamily="34" charset="0"/>
+        <a:buChar char="•"/>
+        <a:defRPr sz="5291" kern="1200">
+          <a:solidFill>
+            <a:schemeClr val="tx1"/>
+          </a:solidFill>
+          <a:latin typeface="+mn-lt"/>
+          <a:ea typeface="+mn-ea"/>
+          <a:cs typeface="+mn-cs"/>
+        </a:defRPr>
+      </a:lvl2pPr>
+      <a:lvl3pPr marL="2519858" indent="-503972" algn="l" defTabSz="2015886" rtl="0" eaLnBrk="1" latinLnBrk="0" hangingPunct="1">
+        <a:lnSpc>
+          <a:spcPct val="90000"/>
+        </a:lnSpc>
+        <a:spcBef>
+          <a:spcPts val="1102"/>
+        </a:spcBef>
+        <a:buFont typeface="Arial" panose="020B0604020202020204" pitchFamily="34" charset="0"/>
+        <a:buChar char="•"/>
+        <a:defRPr sz="4409" kern="1200">
+          <a:solidFill>
+            <a:schemeClr val="tx1"/>
+          </a:solidFill>
+          <a:latin typeface="+mn-lt"/>
+          <a:ea typeface="+mn-ea"/>
+          <a:cs typeface="+mn-cs"/>
+        </a:defRPr>
+      </a:lvl3pPr>
+      <a:lvl4pPr marL="3527801" indent="-503972" algn="l" defTabSz="2015886" rtl="0" eaLnBrk="1" latinLnBrk="0" hangingPunct="1">
+        <a:lnSpc>
+          <a:spcPct val="90000"/>
+        </a:lnSpc>
+        <a:spcBef>
+          <a:spcPts val="1102"/>
         </a:spcBef>
         <a:buFont typeface="Arial" panose="020B0604020202020204" pitchFamily="34" charset="0"/>
         <a:buChar char="•"/>
@@ -3111,53 +3208,17 @@
           <a:ea typeface="+mn-ea"/>
           <a:cs typeface="+mn-cs"/>
         </a:defRPr>
-      </a:lvl2pPr>
-      <a:lvl3pPr marL="1889951" indent="-377990" algn="l" defTabSz="1511960" rtl="0" eaLnBrk="1" latinLnBrk="0" hangingPunct="1">
+      </a:lvl4pPr>
+      <a:lvl5pPr marL="4535744" indent="-503972" algn="l" defTabSz="2015886" rtl="0" eaLnBrk="1" latinLnBrk="0" hangingPunct="1">
         <a:lnSpc>
           <a:spcPct val="90000"/>
         </a:lnSpc>
         <a:spcBef>
-          <a:spcPts val="827"/>
+          <a:spcPts val="1102"/>
         </a:spcBef>
         <a:buFont typeface="Arial" panose="020B0604020202020204" pitchFamily="34" charset="0"/>
         <a:buChar char="•"/>
-        <a:defRPr sz="3307" kern="1200">
-          <a:solidFill>
-            <a:schemeClr val="tx1"/>
-          </a:solidFill>
-          <a:latin typeface="+mn-lt"/>
-          <a:ea typeface="+mn-ea"/>
-          <a:cs typeface="+mn-cs"/>
-        </a:defRPr>
-      </a:lvl3pPr>
-      <a:lvl4pPr marL="2645931" indent="-377990" algn="l" defTabSz="1511960" rtl="0" eaLnBrk="1" latinLnBrk="0" hangingPunct="1">
-        <a:lnSpc>
-          <a:spcPct val="90000"/>
-        </a:lnSpc>
-        <a:spcBef>
-          <a:spcPts val="827"/>
-        </a:spcBef>
-        <a:buFont typeface="Arial" panose="020B0604020202020204" pitchFamily="34" charset="0"/>
-        <a:buChar char="•"/>
-        <a:defRPr sz="2976" kern="1200">
-          <a:solidFill>
-            <a:schemeClr val="tx1"/>
-          </a:solidFill>
-          <a:latin typeface="+mn-lt"/>
-          <a:ea typeface="+mn-ea"/>
-          <a:cs typeface="+mn-cs"/>
-        </a:defRPr>
-      </a:lvl4pPr>
-      <a:lvl5pPr marL="3401911" indent="-377990" algn="l" defTabSz="1511960" rtl="0" eaLnBrk="1" latinLnBrk="0" hangingPunct="1">
-        <a:lnSpc>
-          <a:spcPct val="90000"/>
-        </a:lnSpc>
-        <a:spcBef>
-          <a:spcPts val="827"/>
-        </a:spcBef>
-        <a:buFont typeface="Arial" panose="020B0604020202020204" pitchFamily="34" charset="0"/>
-        <a:buChar char="•"/>
-        <a:defRPr sz="2976" kern="1200">
+        <a:defRPr sz="3968" kern="1200">
           <a:solidFill>
             <a:schemeClr val="tx1"/>
           </a:solidFill>
@@ -3166,16 +3227,16 @@
           <a:cs typeface="+mn-cs"/>
         </a:defRPr>
       </a:lvl5pPr>
-      <a:lvl6pPr marL="4157891" indent="-377990" algn="l" defTabSz="1511960" rtl="0" eaLnBrk="1" latinLnBrk="0" hangingPunct="1">
+      <a:lvl6pPr marL="5543687" indent="-503972" algn="l" defTabSz="2015886" rtl="0" eaLnBrk="1" latinLnBrk="0" hangingPunct="1">
         <a:lnSpc>
           <a:spcPct val="90000"/>
         </a:lnSpc>
         <a:spcBef>
-          <a:spcPts val="827"/>
+          <a:spcPts val="1102"/>
         </a:spcBef>
         <a:buFont typeface="Arial" panose="020B0604020202020204" pitchFamily="34" charset="0"/>
         <a:buChar char="•"/>
-        <a:defRPr sz="2976" kern="1200">
+        <a:defRPr sz="3968" kern="1200">
           <a:solidFill>
             <a:schemeClr val="tx1"/>
           </a:solidFill>
@@ -3184,16 +3245,16 @@
           <a:cs typeface="+mn-cs"/>
         </a:defRPr>
       </a:lvl6pPr>
-      <a:lvl7pPr marL="4913871" indent="-377990" algn="l" defTabSz="1511960" rtl="0" eaLnBrk="1" latinLnBrk="0" hangingPunct="1">
+      <a:lvl7pPr marL="6551630" indent="-503972" algn="l" defTabSz="2015886" rtl="0" eaLnBrk="1" latinLnBrk="0" hangingPunct="1">
         <a:lnSpc>
           <a:spcPct val="90000"/>
         </a:lnSpc>
         <a:spcBef>
-          <a:spcPts val="827"/>
+          <a:spcPts val="1102"/>
         </a:spcBef>
         <a:buFont typeface="Arial" panose="020B0604020202020204" pitchFamily="34" charset="0"/>
         <a:buChar char="•"/>
-        <a:defRPr sz="2976" kern="1200">
+        <a:defRPr sz="3968" kern="1200">
           <a:solidFill>
             <a:schemeClr val="tx1"/>
           </a:solidFill>
@@ -3202,16 +3263,16 @@
           <a:cs typeface="+mn-cs"/>
         </a:defRPr>
       </a:lvl7pPr>
-      <a:lvl8pPr marL="5669852" indent="-377990" algn="l" defTabSz="1511960" rtl="0" eaLnBrk="1" latinLnBrk="0" hangingPunct="1">
+      <a:lvl8pPr marL="7559573" indent="-503972" algn="l" defTabSz="2015886" rtl="0" eaLnBrk="1" latinLnBrk="0" hangingPunct="1">
         <a:lnSpc>
           <a:spcPct val="90000"/>
         </a:lnSpc>
         <a:spcBef>
-          <a:spcPts val="827"/>
+          <a:spcPts val="1102"/>
         </a:spcBef>
         <a:buFont typeface="Arial" panose="020B0604020202020204" pitchFamily="34" charset="0"/>
         <a:buChar char="•"/>
-        <a:defRPr sz="2976" kern="1200">
+        <a:defRPr sz="3968" kern="1200">
           <a:solidFill>
             <a:schemeClr val="tx1"/>
           </a:solidFill>
@@ -3220,16 +3281,16 @@
           <a:cs typeface="+mn-cs"/>
         </a:defRPr>
       </a:lvl8pPr>
-      <a:lvl9pPr marL="6425832" indent="-377990" algn="l" defTabSz="1511960" rtl="0" eaLnBrk="1" latinLnBrk="0" hangingPunct="1">
+      <a:lvl9pPr marL="8567517" indent="-503972" algn="l" defTabSz="2015886" rtl="0" eaLnBrk="1" latinLnBrk="0" hangingPunct="1">
         <a:lnSpc>
           <a:spcPct val="90000"/>
         </a:lnSpc>
         <a:spcBef>
-          <a:spcPts val="827"/>
+          <a:spcPts val="1102"/>
         </a:spcBef>
         <a:buFont typeface="Arial" panose="020B0604020202020204" pitchFamily="34" charset="0"/>
         <a:buChar char="•"/>
-        <a:defRPr sz="2976" kern="1200">
+        <a:defRPr sz="3968" kern="1200">
           <a:solidFill>
             <a:schemeClr val="tx1"/>
           </a:solidFill>
@@ -3243,8 +3304,8 @@
       <a:defPPr>
         <a:defRPr lang="en-US"/>
       </a:defPPr>
-      <a:lvl1pPr marL="0" algn="l" defTabSz="1511960" rtl="0" eaLnBrk="1" latinLnBrk="0" hangingPunct="1">
-        <a:defRPr sz="2976" kern="1200">
+      <a:lvl1pPr marL="0" algn="l" defTabSz="2015886" rtl="0" eaLnBrk="1" latinLnBrk="0" hangingPunct="1">
+        <a:defRPr sz="3968" kern="1200">
           <a:solidFill>
             <a:schemeClr val="tx1"/>
           </a:solidFill>
@@ -3253,8 +3314,8 @@
           <a:cs typeface="+mn-cs"/>
         </a:defRPr>
       </a:lvl1pPr>
-      <a:lvl2pPr marL="755980" algn="l" defTabSz="1511960" rtl="0" eaLnBrk="1" latinLnBrk="0" hangingPunct="1">
-        <a:defRPr sz="2976" kern="1200">
+      <a:lvl2pPr marL="1007943" algn="l" defTabSz="2015886" rtl="0" eaLnBrk="1" latinLnBrk="0" hangingPunct="1">
+        <a:defRPr sz="3968" kern="1200">
           <a:solidFill>
             <a:schemeClr val="tx1"/>
           </a:solidFill>
@@ -3263,8 +3324,8 @@
           <a:cs typeface="+mn-cs"/>
         </a:defRPr>
       </a:lvl2pPr>
-      <a:lvl3pPr marL="1511960" algn="l" defTabSz="1511960" rtl="0" eaLnBrk="1" latinLnBrk="0" hangingPunct="1">
-        <a:defRPr sz="2976" kern="1200">
+      <a:lvl3pPr marL="2015886" algn="l" defTabSz="2015886" rtl="0" eaLnBrk="1" latinLnBrk="0" hangingPunct="1">
+        <a:defRPr sz="3968" kern="1200">
           <a:solidFill>
             <a:schemeClr val="tx1"/>
           </a:solidFill>
@@ -3273,8 +3334,8 @@
           <a:cs typeface="+mn-cs"/>
         </a:defRPr>
       </a:lvl3pPr>
-      <a:lvl4pPr marL="2267941" algn="l" defTabSz="1511960" rtl="0" eaLnBrk="1" latinLnBrk="0" hangingPunct="1">
-        <a:defRPr sz="2976" kern="1200">
+      <a:lvl4pPr marL="3023829" algn="l" defTabSz="2015886" rtl="0" eaLnBrk="1" latinLnBrk="0" hangingPunct="1">
+        <a:defRPr sz="3968" kern="1200">
           <a:solidFill>
             <a:schemeClr val="tx1"/>
           </a:solidFill>
@@ -3283,8 +3344,8 @@
           <a:cs typeface="+mn-cs"/>
         </a:defRPr>
       </a:lvl4pPr>
-      <a:lvl5pPr marL="3023921" algn="l" defTabSz="1511960" rtl="0" eaLnBrk="1" latinLnBrk="0" hangingPunct="1">
-        <a:defRPr sz="2976" kern="1200">
+      <a:lvl5pPr marL="4031772" algn="l" defTabSz="2015886" rtl="0" eaLnBrk="1" latinLnBrk="0" hangingPunct="1">
+        <a:defRPr sz="3968" kern="1200">
           <a:solidFill>
             <a:schemeClr val="tx1"/>
           </a:solidFill>
@@ -3293,8 +3354,8 @@
           <a:cs typeface="+mn-cs"/>
         </a:defRPr>
       </a:lvl5pPr>
-      <a:lvl6pPr marL="3779901" algn="l" defTabSz="1511960" rtl="0" eaLnBrk="1" latinLnBrk="0" hangingPunct="1">
-        <a:defRPr sz="2976" kern="1200">
+      <a:lvl6pPr marL="5039716" algn="l" defTabSz="2015886" rtl="0" eaLnBrk="1" latinLnBrk="0" hangingPunct="1">
+        <a:defRPr sz="3968" kern="1200">
           <a:solidFill>
             <a:schemeClr val="tx1"/>
           </a:solidFill>
@@ -3303,8 +3364,8 @@
           <a:cs typeface="+mn-cs"/>
         </a:defRPr>
       </a:lvl6pPr>
-      <a:lvl7pPr marL="4535881" algn="l" defTabSz="1511960" rtl="0" eaLnBrk="1" latinLnBrk="0" hangingPunct="1">
-        <a:defRPr sz="2976" kern="1200">
+      <a:lvl7pPr marL="6047659" algn="l" defTabSz="2015886" rtl="0" eaLnBrk="1" latinLnBrk="0" hangingPunct="1">
+        <a:defRPr sz="3968" kern="1200">
           <a:solidFill>
             <a:schemeClr val="tx1"/>
           </a:solidFill>
@@ -3313,8 +3374,8 @@
           <a:cs typeface="+mn-cs"/>
         </a:defRPr>
       </a:lvl7pPr>
-      <a:lvl8pPr marL="5291861" algn="l" defTabSz="1511960" rtl="0" eaLnBrk="1" latinLnBrk="0" hangingPunct="1">
-        <a:defRPr sz="2976" kern="1200">
+      <a:lvl8pPr marL="7055602" algn="l" defTabSz="2015886" rtl="0" eaLnBrk="1" latinLnBrk="0" hangingPunct="1">
+        <a:defRPr sz="3968" kern="1200">
           <a:solidFill>
             <a:schemeClr val="tx1"/>
           </a:solidFill>
@@ -3323,8 +3384,8 @@
           <a:cs typeface="+mn-cs"/>
         </a:defRPr>
       </a:lvl8pPr>
-      <a:lvl9pPr marL="6047842" algn="l" defTabSz="1511960" rtl="0" eaLnBrk="1" latinLnBrk="0" hangingPunct="1">
-        <a:defRPr sz="2976" kern="1200">
+      <a:lvl9pPr marL="8063545" algn="l" defTabSz="2015886" rtl="0" eaLnBrk="1" latinLnBrk="0" hangingPunct="1">
+        <a:defRPr sz="3968" kern="1200">
           <a:solidFill>
             <a:schemeClr val="tx1"/>
           </a:solidFill>
@@ -3344,7 +3405,7 @@
     <p:bg>
       <p:bgPr>
         <a:solidFill>
-          <a:srgbClr val="2096F4"/>
+          <a:srgbClr val="75C3F9"/>
         </a:solidFill>
         <a:effectLst/>
       </p:bgPr>
@@ -3365,10 +3426,10 @@
       </p:grpSpPr>
       <p:sp>
         <p:nvSpPr>
-          <p:cNvPr id="10" name="Rectangle 9">
+          <p:cNvPr id="7" name="Rectangle 6">
             <a:extLst>
               <a:ext uri="{FF2B5EF4-FFF2-40B4-BE49-F238E27FC236}">
-                <a16:creationId xmlns:a16="http://schemas.microsoft.com/office/drawing/2014/main" id="{597B6F52-0EF0-0A4D-BB93-A4014E03F90C}"/>
+                <a16:creationId xmlns:a16="http://schemas.microsoft.com/office/drawing/2014/main" id="{311483C7-B33B-DD4A-A839-CD47769B3E91}"/>
               </a:ext>
             </a:extLst>
           </p:cNvPr>
@@ -3377,8 +3438,8 @@
         </p:nvSpPr>
         <p:spPr>
           <a:xfrm>
-            <a:off x="-187569" y="1773367"/>
-            <a:ext cx="15521354" cy="19453023"/>
+            <a:off x="597619" y="228494"/>
+            <a:ext cx="20188381" cy="1511816"/>
           </a:xfrm>
           <a:prstGeom prst="rect">
             <a:avLst/>
@@ -3386,7 +3447,328 @@
           <a:solidFill>
             <a:srgbClr val="FFFFFF"/>
           </a:solidFill>
-          <a:ln>
+          <a:ln w="25400">
+            <a:solidFill>
+              <a:srgbClr val="2096F4"/>
+            </a:solidFill>
+          </a:ln>
+        </p:spPr>
+        <p:style>
+          <a:lnRef idx="2">
+            <a:schemeClr val="accent1">
+              <a:shade val="50000"/>
+            </a:schemeClr>
+          </a:lnRef>
+          <a:fillRef idx="1">
+            <a:schemeClr val="accent1"/>
+          </a:fillRef>
+          <a:effectRef idx="0">
+            <a:schemeClr val="accent1"/>
+          </a:effectRef>
+          <a:fontRef idx="minor">
+            <a:schemeClr val="lt1"/>
+          </a:fontRef>
+        </p:style>
+        <p:txBody>
+          <a:bodyPr rtlCol="0" anchor="ctr"/>
+          <a:lstStyle/>
+          <a:p>
+            <a:pPr algn="ctr"/>
+            <a:endParaRPr lang="en-GB" sz="2439" dirty="0"/>
+          </a:p>
+        </p:txBody>
+      </p:sp>
+      <p:sp>
+        <p:nvSpPr>
+          <p:cNvPr id="2" name="TextBox 1">
+            <a:extLst>
+              <a:ext uri="{FF2B5EF4-FFF2-40B4-BE49-F238E27FC236}">
+                <a16:creationId xmlns:a16="http://schemas.microsoft.com/office/drawing/2014/main" id="{3771C7A4-CC91-654B-93BC-444CCA96E073}"/>
+              </a:ext>
+            </a:extLst>
+          </p:cNvPr>
+          <p:cNvSpPr txBox="1"/>
+          <p:nvPr/>
+        </p:nvSpPr>
+        <p:spPr>
+          <a:xfrm>
+            <a:off x="5553533" y="513418"/>
+            <a:ext cx="10276557" cy="587411"/>
+          </a:xfrm>
+          <a:prstGeom prst="rect">
+            <a:avLst/>
+          </a:prstGeom>
+          <a:noFill/>
+        </p:spPr>
+        <p:txBody>
+          <a:bodyPr wrap="square" tIns="33090" bIns="0" rtlCol="0">
+            <a:spAutoFit/>
+          </a:bodyPr>
+          <a:lstStyle/>
+          <a:p>
+            <a:r>
+              <a:rPr lang="en-GB" sz="3600" b="1" dirty="0">
+                <a:latin typeface="Roboto" pitchFamily="2" charset="0"/>
+                <a:ea typeface="Roboto" pitchFamily="2" charset="0"/>
+              </a:rPr>
+              <a:t>Oxygen isotope evidence for Antarctic glaciation</a:t>
+            </a:r>
+          </a:p>
+        </p:txBody>
+      </p:sp>
+      <p:sp>
+        <p:nvSpPr>
+          <p:cNvPr id="3" name="TextBox 2">
+            <a:extLst>
+              <a:ext uri="{FF2B5EF4-FFF2-40B4-BE49-F238E27FC236}">
+                <a16:creationId xmlns:a16="http://schemas.microsoft.com/office/drawing/2014/main" id="{23E52F0A-6608-EC43-BF02-A0EF55224171}"/>
+              </a:ext>
+            </a:extLst>
+          </p:cNvPr>
+          <p:cNvSpPr txBox="1"/>
+          <p:nvPr/>
+        </p:nvSpPr>
+        <p:spPr>
+          <a:xfrm>
+            <a:off x="9735173" y="1100829"/>
+            <a:ext cx="1913276" cy="523220"/>
+          </a:xfrm>
+          <a:prstGeom prst="rect">
+            <a:avLst/>
+          </a:prstGeom>
+          <a:noFill/>
+        </p:spPr>
+        <p:txBody>
+          <a:bodyPr wrap="square" rtlCol="0">
+            <a:spAutoFit/>
+          </a:bodyPr>
+          <a:lstStyle/>
+          <a:p>
+            <a:r>
+              <a:rPr lang="en-GB" sz="2800" dirty="0">
+                <a:latin typeface="Roboto" pitchFamily="2" charset="0"/>
+                <a:ea typeface="Roboto" pitchFamily="2" charset="0"/>
+              </a:rPr>
+              <a:t>Jacky Cao</a:t>
+            </a:r>
+          </a:p>
+        </p:txBody>
+      </p:sp>
+      <p:pic>
+        <p:nvPicPr>
+          <p:cNvPr id="17" name="Picture 16" descr="A close up of a logo&#10;&#10;Description automatically generated">
+            <a:extLst>
+              <a:ext uri="{FF2B5EF4-FFF2-40B4-BE49-F238E27FC236}">
+                <a16:creationId xmlns:a16="http://schemas.microsoft.com/office/drawing/2014/main" id="{4B6DA67C-C988-F54C-8871-F73B3FD02A17}"/>
+              </a:ext>
+            </a:extLst>
+          </p:cNvPr>
+          <p:cNvPicPr>
+            <a:picLocks noChangeAspect="1"/>
+          </p:cNvPicPr>
+          <p:nvPr/>
+        </p:nvPicPr>
+        <p:blipFill rotWithShape="1">
+          <a:blip r:embed="rId3"/>
+          <a:srcRect l="11881" t="20486" r="10471" b="18823"/>
+          <a:stretch/>
+        </p:blipFill>
+        <p:spPr>
+          <a:xfrm>
+            <a:off x="17784715" y="396991"/>
+            <a:ext cx="2673142" cy="1230118"/>
+          </a:xfrm>
+          <a:prstGeom prst="rect">
+            <a:avLst/>
+          </a:prstGeom>
+        </p:spPr>
+      </p:pic>
+      <p:sp>
+        <p:nvSpPr>
+          <p:cNvPr id="20" name="Rectangle 19">
+            <a:extLst>
+              <a:ext uri="{FF2B5EF4-FFF2-40B4-BE49-F238E27FC236}">
+                <a16:creationId xmlns:a16="http://schemas.microsoft.com/office/drawing/2014/main" id="{EAE5546F-CC46-BD4B-9E55-15E49427DA01}"/>
+              </a:ext>
+            </a:extLst>
+          </p:cNvPr>
+          <p:cNvSpPr/>
+          <p:nvPr/>
+        </p:nvSpPr>
+        <p:spPr>
+          <a:xfrm>
+            <a:off x="597619" y="2095032"/>
+            <a:ext cx="6481605" cy="3833820"/>
+          </a:xfrm>
+          <a:prstGeom prst="rect">
+            <a:avLst/>
+          </a:prstGeom>
+          <a:solidFill>
+            <a:srgbClr val="FFFFFF"/>
+          </a:solidFill>
+          <a:ln w="25400">
+            <a:solidFill>
+              <a:srgbClr val="2096F4"/>
+            </a:solidFill>
+          </a:ln>
+        </p:spPr>
+        <p:style>
+          <a:lnRef idx="2">
+            <a:schemeClr val="accent1">
+              <a:shade val="50000"/>
+            </a:schemeClr>
+          </a:lnRef>
+          <a:fillRef idx="1">
+            <a:schemeClr val="accent1"/>
+          </a:fillRef>
+          <a:effectRef idx="0">
+            <a:schemeClr val="accent1"/>
+          </a:effectRef>
+          <a:fontRef idx="minor">
+            <a:schemeClr val="lt1"/>
+          </a:fontRef>
+        </p:style>
+        <p:txBody>
+          <a:bodyPr rtlCol="0" anchor="ctr"/>
+          <a:lstStyle/>
+          <a:p>
+            <a:pPr algn="ctr"/>
+            <a:endParaRPr lang="en-GB" sz="2439" dirty="0"/>
+          </a:p>
+        </p:txBody>
+      </p:sp>
+      <p:sp>
+        <p:nvSpPr>
+          <p:cNvPr id="21" name="Rectangle 20">
+            <a:extLst>
+              <a:ext uri="{FF2B5EF4-FFF2-40B4-BE49-F238E27FC236}">
+                <a16:creationId xmlns:a16="http://schemas.microsoft.com/office/drawing/2014/main" id="{BA01094B-E0C1-5645-AB9E-432E6C0BE28A}"/>
+              </a:ext>
+            </a:extLst>
+          </p:cNvPr>
+          <p:cNvSpPr/>
+          <p:nvPr/>
+        </p:nvSpPr>
+        <p:spPr>
+          <a:xfrm>
+            <a:off x="7451004" y="2095032"/>
+            <a:ext cx="6481605" cy="12627328"/>
+          </a:xfrm>
+          <a:prstGeom prst="rect">
+            <a:avLst/>
+          </a:prstGeom>
+          <a:solidFill>
+            <a:srgbClr val="FFFFFF"/>
+          </a:solidFill>
+          <a:ln w="25400">
+            <a:solidFill>
+              <a:srgbClr val="2096F4"/>
+            </a:solidFill>
+          </a:ln>
+        </p:spPr>
+        <p:style>
+          <a:lnRef idx="2">
+            <a:schemeClr val="accent1">
+              <a:shade val="50000"/>
+            </a:schemeClr>
+          </a:lnRef>
+          <a:fillRef idx="1">
+            <a:schemeClr val="accent1"/>
+          </a:fillRef>
+          <a:effectRef idx="0">
+            <a:schemeClr val="accent1"/>
+          </a:effectRef>
+          <a:fontRef idx="minor">
+            <a:schemeClr val="lt1"/>
+          </a:fontRef>
+        </p:style>
+        <p:txBody>
+          <a:bodyPr rtlCol="0" anchor="ctr"/>
+          <a:lstStyle/>
+          <a:p>
+            <a:pPr algn="ctr"/>
+            <a:endParaRPr lang="en-GB" sz="2439" dirty="0"/>
+          </a:p>
+        </p:txBody>
+      </p:sp>
+      <p:sp>
+        <p:nvSpPr>
+          <p:cNvPr id="22" name="Rectangle 21">
+            <a:extLst>
+              <a:ext uri="{FF2B5EF4-FFF2-40B4-BE49-F238E27FC236}">
+                <a16:creationId xmlns:a16="http://schemas.microsoft.com/office/drawing/2014/main" id="{E9210376-9F2D-0F40-9FCA-FDD84DFEC880}"/>
+              </a:ext>
+            </a:extLst>
+          </p:cNvPr>
+          <p:cNvSpPr/>
+          <p:nvPr/>
+        </p:nvSpPr>
+        <p:spPr>
+          <a:xfrm>
+            <a:off x="14304389" y="2095032"/>
+            <a:ext cx="6481605" cy="12627328"/>
+          </a:xfrm>
+          <a:prstGeom prst="rect">
+            <a:avLst/>
+          </a:prstGeom>
+          <a:solidFill>
+            <a:srgbClr val="FFFFFF"/>
+          </a:solidFill>
+          <a:ln w="25400">
+            <a:solidFill>
+              <a:srgbClr val="2096F4"/>
+            </a:solidFill>
+          </a:ln>
+        </p:spPr>
+        <p:style>
+          <a:lnRef idx="2">
+            <a:schemeClr val="accent1">
+              <a:shade val="50000"/>
+            </a:schemeClr>
+          </a:lnRef>
+          <a:fillRef idx="1">
+            <a:schemeClr val="accent1"/>
+          </a:fillRef>
+          <a:effectRef idx="0">
+            <a:schemeClr val="accent1"/>
+          </a:effectRef>
+          <a:fontRef idx="minor">
+            <a:schemeClr val="lt1"/>
+          </a:fontRef>
+        </p:style>
+        <p:txBody>
+          <a:bodyPr rtlCol="0" anchor="ctr"/>
+          <a:lstStyle/>
+          <a:p>
+            <a:pPr algn="ctr"/>
+            <a:endParaRPr lang="en-GB" sz="2439" dirty="0"/>
+          </a:p>
+        </p:txBody>
+      </p:sp>
+      <p:sp>
+        <p:nvSpPr>
+          <p:cNvPr id="23" name="Rectangle 22">
+            <a:extLst>
+              <a:ext uri="{FF2B5EF4-FFF2-40B4-BE49-F238E27FC236}">
+                <a16:creationId xmlns:a16="http://schemas.microsoft.com/office/drawing/2014/main" id="{235C7042-C6C2-CB46-ACD3-34CFBE877839}"/>
+              </a:ext>
+            </a:extLst>
+          </p:cNvPr>
+          <p:cNvSpPr/>
+          <p:nvPr/>
+        </p:nvSpPr>
+        <p:spPr>
+          <a:xfrm>
+            <a:off x="597618" y="2095032"/>
+            <a:ext cx="6481605" cy="568420"/>
+          </a:xfrm>
+          <a:prstGeom prst="rect">
+            <a:avLst/>
+          </a:prstGeom>
+          <a:solidFill>
+            <a:srgbClr val="2096F4"/>
+          </a:solidFill>
+          <a:ln w="25400">
             <a:noFill/>
           </a:ln>
         </p:spPr>
@@ -3411,16 +3793,16 @@
           <a:lstStyle/>
           <a:p>
             <a:pPr algn="ctr"/>
-            <a:endParaRPr lang="en-GB" dirty="0"/>
-          </a:p>
-        </p:txBody>
-      </p:sp>
-      <p:sp>
-        <p:nvSpPr>
-          <p:cNvPr id="2" name="TextBox 1">
+            <a:endParaRPr lang="en-GB" sz="2439" dirty="0"/>
+          </a:p>
+        </p:txBody>
+      </p:sp>
+      <p:sp>
+        <p:nvSpPr>
+          <p:cNvPr id="24" name="TextBox 23">
             <a:extLst>
               <a:ext uri="{FF2B5EF4-FFF2-40B4-BE49-F238E27FC236}">
-                <a16:creationId xmlns:a16="http://schemas.microsoft.com/office/drawing/2014/main" id="{3771C7A4-CC91-654B-93BC-444CCA96E073}"/>
+                <a16:creationId xmlns:a16="http://schemas.microsoft.com/office/drawing/2014/main" id="{6001C23B-B0B6-7149-B97B-E5D34C52A471}"/>
               </a:ext>
             </a:extLst>
           </p:cNvPr>
@@ -3429,8 +3811,8 @@
         </p:nvSpPr>
         <p:spPr>
           <a:xfrm>
-            <a:off x="446568" y="184943"/>
-            <a:ext cx="10139314" cy="785921"/>
+            <a:off x="2834123" y="2147092"/>
+            <a:ext cx="2008590" cy="464300"/>
           </a:xfrm>
           <a:prstGeom prst="rect">
             <a:avLst/>
@@ -3438,70 +3820,30 @@
           <a:noFill/>
         </p:spPr>
         <p:txBody>
-          <a:bodyPr wrap="none" tIns="46800" bIns="0" rtlCol="0">
+          <a:bodyPr wrap="square" tIns="33090" bIns="0" rtlCol="0">
             <a:spAutoFit/>
           </a:bodyPr>
           <a:lstStyle/>
           <a:p>
             <a:r>
-              <a:rPr lang="en-GB" sz="4800" b="1" dirty="0">
+              <a:rPr lang="en-GB" sz="2800" dirty="0">
                 <a:solidFill>
                   <a:schemeClr val="bg1"/>
                 </a:solidFill>
-                <a:latin typeface="Roboto Mono" pitchFamily="2" charset="0"/>
-                <a:ea typeface="Roboto Mono" pitchFamily="2" charset="0"/>
+                <a:latin typeface="Roboto" pitchFamily="2" charset="0"/>
+                <a:ea typeface="Roboto" pitchFamily="2" charset="0"/>
               </a:rPr>
-              <a:t>Oxygen isotope evidence for</a:t>
-            </a:r>
-          </a:p>
-        </p:txBody>
-      </p:sp>
-      <p:sp>
-        <p:nvSpPr>
-          <p:cNvPr id="8" name="Rectangle 7">
+              <a:t>ABSTRACT</a:t>
+            </a:r>
+          </a:p>
+        </p:txBody>
+      </p:sp>
+      <p:sp>
+        <p:nvSpPr>
+          <p:cNvPr id="25" name="TextBox 24">
             <a:extLst>
               <a:ext uri="{FF2B5EF4-FFF2-40B4-BE49-F238E27FC236}">
-                <a16:creationId xmlns:a16="http://schemas.microsoft.com/office/drawing/2014/main" id="{B977C068-1404-DD43-8D48-2A0AC0F6DCA4}"/>
-              </a:ext>
-            </a:extLst>
-          </p:cNvPr>
-          <p:cNvSpPr/>
-          <p:nvPr/>
-        </p:nvSpPr>
-        <p:spPr>
-          <a:xfrm>
-            <a:off x="446568" y="901237"/>
-            <a:ext cx="7558479" cy="830997"/>
-          </a:xfrm>
-          <a:prstGeom prst="rect">
-            <a:avLst/>
-          </a:prstGeom>
-        </p:spPr>
-        <p:txBody>
-          <a:bodyPr wrap="none">
-            <a:spAutoFit/>
-          </a:bodyPr>
-          <a:lstStyle/>
-          <a:p>
-            <a:r>
-              <a:rPr lang="en-GB" sz="4800" b="1" dirty="0">
-                <a:solidFill>
-                  <a:schemeClr val="bg1"/>
-                </a:solidFill>
-                <a:latin typeface="Roboto Mono" pitchFamily="2" charset="0"/>
-                <a:ea typeface="Roboto Mono" pitchFamily="2" charset="0"/>
-              </a:rPr>
-              <a:t>Antarctic glaciation</a:t>
-            </a:r>
-          </a:p>
-        </p:txBody>
-      </p:sp>
-      <p:sp>
-        <p:nvSpPr>
-          <p:cNvPr id="3" name="TextBox 2">
-            <a:extLst>
-              <a:ext uri="{FF2B5EF4-FFF2-40B4-BE49-F238E27FC236}">
-                <a16:creationId xmlns:a16="http://schemas.microsoft.com/office/drawing/2014/main" id="{23E52F0A-6608-EC43-BF02-A0EF55224171}"/>
+                <a16:creationId xmlns:a16="http://schemas.microsoft.com/office/drawing/2014/main" id="{66E55818-4206-724B-B2B0-308087FBC4EB}"/>
               </a:ext>
             </a:extLst>
           </p:cNvPr>
@@ -3510,8 +3852,8 @@
         </p:nvSpPr>
         <p:spPr>
           <a:xfrm>
-            <a:off x="12731750" y="1005175"/>
-            <a:ext cx="2387600" cy="623119"/>
+            <a:off x="715606" y="2759659"/>
+            <a:ext cx="1913276" cy="338554"/>
           </a:xfrm>
           <a:prstGeom prst="rect">
             <a:avLst/>
@@ -3525,14 +3867,210 @@
           <a:lstStyle/>
           <a:p>
             <a:r>
-              <a:rPr lang="en-GB" i="1" dirty="0">
+              <a:rPr lang="en-GB" sz="1600" dirty="0">
+                <a:latin typeface="Roboto" pitchFamily="2" charset="0"/>
+                <a:ea typeface="Roboto" pitchFamily="2" charset="0"/>
+              </a:rPr>
+              <a:t>Through</a:t>
+            </a:r>
+            <a:r>
+              <a:rPr lang="en-GB" sz="1400" dirty="0">
+                <a:latin typeface="Roboto" pitchFamily="2" charset="0"/>
+                <a:ea typeface="Roboto" pitchFamily="2" charset="0"/>
+              </a:rPr>
+              <a:t> </a:t>
+            </a:r>
+          </a:p>
+        </p:txBody>
+      </p:sp>
+      <p:sp>
+        <p:nvSpPr>
+          <p:cNvPr id="29" name="Rectangle 28">
+            <a:extLst>
+              <a:ext uri="{FF2B5EF4-FFF2-40B4-BE49-F238E27FC236}">
+                <a16:creationId xmlns:a16="http://schemas.microsoft.com/office/drawing/2014/main" id="{79B7E4D7-9CC3-534F-B609-D2275DAE79FE}"/>
+              </a:ext>
+            </a:extLst>
+          </p:cNvPr>
+          <p:cNvSpPr/>
+          <p:nvPr/>
+        </p:nvSpPr>
+        <p:spPr>
+          <a:xfrm>
+            <a:off x="597618" y="6283574"/>
+            <a:ext cx="6481605" cy="3833820"/>
+          </a:xfrm>
+          <a:prstGeom prst="rect">
+            <a:avLst/>
+          </a:prstGeom>
+          <a:solidFill>
+            <a:srgbClr val="FFFFFF"/>
+          </a:solidFill>
+          <a:ln w="25400">
+            <a:solidFill>
+              <a:srgbClr val="2096F4"/>
+            </a:solidFill>
+          </a:ln>
+        </p:spPr>
+        <p:style>
+          <a:lnRef idx="2">
+            <a:schemeClr val="accent1">
+              <a:shade val="50000"/>
+            </a:schemeClr>
+          </a:lnRef>
+          <a:fillRef idx="1">
+            <a:schemeClr val="accent1"/>
+          </a:fillRef>
+          <a:effectRef idx="0">
+            <a:schemeClr val="accent1"/>
+          </a:effectRef>
+          <a:fontRef idx="minor">
+            <a:schemeClr val="lt1"/>
+          </a:fontRef>
+        </p:style>
+        <p:txBody>
+          <a:bodyPr rtlCol="0" anchor="ctr"/>
+          <a:lstStyle/>
+          <a:p>
+            <a:pPr algn="ctr"/>
+            <a:endParaRPr lang="en-GB" sz="2439" dirty="0"/>
+          </a:p>
+        </p:txBody>
+      </p:sp>
+      <p:sp>
+        <p:nvSpPr>
+          <p:cNvPr id="30" name="Rectangle 29">
+            <a:extLst>
+              <a:ext uri="{FF2B5EF4-FFF2-40B4-BE49-F238E27FC236}">
+                <a16:creationId xmlns:a16="http://schemas.microsoft.com/office/drawing/2014/main" id="{2D659582-89A4-504D-BB7C-17796DBF1C1C}"/>
+              </a:ext>
+            </a:extLst>
+          </p:cNvPr>
+          <p:cNvSpPr/>
+          <p:nvPr/>
+        </p:nvSpPr>
+        <p:spPr>
+          <a:xfrm>
+            <a:off x="597617" y="6283574"/>
+            <a:ext cx="6481605" cy="568420"/>
+          </a:xfrm>
+          <a:prstGeom prst="rect">
+            <a:avLst/>
+          </a:prstGeom>
+          <a:solidFill>
+            <a:srgbClr val="2096F4"/>
+          </a:solidFill>
+          <a:ln w="25400">
+            <a:noFill/>
+          </a:ln>
+        </p:spPr>
+        <p:style>
+          <a:lnRef idx="2">
+            <a:schemeClr val="accent1">
+              <a:shade val="50000"/>
+            </a:schemeClr>
+          </a:lnRef>
+          <a:fillRef idx="1">
+            <a:schemeClr val="accent1"/>
+          </a:fillRef>
+          <a:effectRef idx="0">
+            <a:schemeClr val="accent1"/>
+          </a:effectRef>
+          <a:fontRef idx="minor">
+            <a:schemeClr val="lt1"/>
+          </a:fontRef>
+        </p:style>
+        <p:txBody>
+          <a:bodyPr rtlCol="0" anchor="ctr"/>
+          <a:lstStyle/>
+          <a:p>
+            <a:pPr algn="ctr"/>
+            <a:endParaRPr lang="en-GB" sz="2439" dirty="0"/>
+          </a:p>
+        </p:txBody>
+      </p:sp>
+      <p:sp>
+        <p:nvSpPr>
+          <p:cNvPr id="31" name="TextBox 30">
+            <a:extLst>
+              <a:ext uri="{FF2B5EF4-FFF2-40B4-BE49-F238E27FC236}">
+                <a16:creationId xmlns:a16="http://schemas.microsoft.com/office/drawing/2014/main" id="{86016B5C-64E9-3049-A205-3663C84D0E33}"/>
+              </a:ext>
+            </a:extLst>
+          </p:cNvPr>
+          <p:cNvSpPr txBox="1"/>
+          <p:nvPr/>
+        </p:nvSpPr>
+        <p:spPr>
+          <a:xfrm>
+            <a:off x="2443371" y="6335634"/>
+            <a:ext cx="2790093" cy="464300"/>
+          </a:xfrm>
+          <a:prstGeom prst="rect">
+            <a:avLst/>
+          </a:prstGeom>
+          <a:noFill/>
+        </p:spPr>
+        <p:txBody>
+          <a:bodyPr wrap="square" tIns="33090" bIns="0" rtlCol="0">
+            <a:spAutoFit/>
+          </a:bodyPr>
+          <a:lstStyle/>
+          <a:p>
+            <a:r>
+              <a:rPr lang="en-GB" sz="2800" dirty="0">
                 <a:solidFill>
                   <a:schemeClr val="bg1"/>
                 </a:solidFill>
-                <a:latin typeface="Roboto Mono Medium" pitchFamily="2" charset="0"/>
-                <a:ea typeface="Roboto Mono Medium" pitchFamily="2" charset="0"/>
+                <a:latin typeface="Roboto" pitchFamily="2" charset="0"/>
+                <a:ea typeface="Roboto" pitchFamily="2" charset="0"/>
               </a:rPr>
-              <a:t>Jacky Cao</a:t>
+              <a:t>INTRODUCTION</a:t>
+            </a:r>
+          </a:p>
+        </p:txBody>
+      </p:sp>
+      <p:sp>
+        <p:nvSpPr>
+          <p:cNvPr id="32" name="TextBox 31">
+            <a:extLst>
+              <a:ext uri="{FF2B5EF4-FFF2-40B4-BE49-F238E27FC236}">
+                <a16:creationId xmlns:a16="http://schemas.microsoft.com/office/drawing/2014/main" id="{267C125E-C7FD-AC43-9428-ACC0E403A784}"/>
+              </a:ext>
+            </a:extLst>
+          </p:cNvPr>
+          <p:cNvSpPr txBox="1"/>
+          <p:nvPr/>
+        </p:nvSpPr>
+        <p:spPr>
+          <a:xfrm>
+            <a:off x="715605" y="6948201"/>
+            <a:ext cx="1913276" cy="338554"/>
+          </a:xfrm>
+          <a:prstGeom prst="rect">
+            <a:avLst/>
+          </a:prstGeom>
+          <a:noFill/>
+        </p:spPr>
+        <p:txBody>
+          <a:bodyPr wrap="square" rtlCol="0">
+            <a:spAutoFit/>
+          </a:bodyPr>
+          <a:lstStyle/>
+          <a:p>
+            <a:r>
+              <a:rPr lang="en-GB" sz="1600" dirty="0">
+                <a:latin typeface="Roboto" pitchFamily="2" charset="0"/>
+                <a:ea typeface="Roboto" pitchFamily="2" charset="0"/>
+              </a:rPr>
+              <a:t>Through</a:t>
+            </a:r>
+            <a:r>
+              <a:rPr lang="en-GB" sz="1400" dirty="0">
+                <a:latin typeface="Roboto" pitchFamily="2" charset="0"/>
+                <a:ea typeface="Roboto" pitchFamily="2" charset="0"/>
+              </a:rPr>
+              <a:t> </a:t>
             </a:r>
           </a:p>
         </p:txBody>

</xml_diff>

<commit_message>
esc4: p: more sections added
</commit_message>
<xml_diff>
--- a/earth_system_and_climate_4/term_2/poster/oxygen_poster.pptx
+++ b/earth_system_and_climate_4/term_2/poster/oxygen_poster.pptx
@@ -3405,7 +3405,7 @@
     <p:bg>
       <p:bgPr>
         <a:solidFill>
-          <a:srgbClr val="75C3F9"/>
+          <a:srgbClr val="BBDEFB"/>
         </a:solidFill>
         <a:effectLst/>
       </p:bgPr>
@@ -3693,10 +3693,10 @@
       </p:sp>
       <p:sp>
         <p:nvSpPr>
-          <p:cNvPr id="22" name="Rectangle 21">
+          <p:cNvPr id="23" name="Rectangle 22">
             <a:extLst>
               <a:ext uri="{FF2B5EF4-FFF2-40B4-BE49-F238E27FC236}">
-                <a16:creationId xmlns:a16="http://schemas.microsoft.com/office/drawing/2014/main" id="{E9210376-9F2D-0F40-9FCA-FDD84DFEC880}"/>
+                <a16:creationId xmlns:a16="http://schemas.microsoft.com/office/drawing/2014/main" id="{235C7042-C6C2-CB46-ACD3-34CFBE877839}"/>
               </a:ext>
             </a:extLst>
           </p:cNvPr>
@@ -3705,19 +3705,17 @@
         </p:nvSpPr>
         <p:spPr>
           <a:xfrm>
-            <a:off x="14304389" y="2095032"/>
-            <a:ext cx="6481605" cy="12627328"/>
+            <a:off x="597618" y="2095032"/>
+            <a:ext cx="6481605" cy="568420"/>
           </a:xfrm>
           <a:prstGeom prst="rect">
             <a:avLst/>
           </a:prstGeom>
           <a:solidFill>
-            <a:srgbClr val="FFFFFF"/>
+            <a:srgbClr val="2096F4"/>
           </a:solidFill>
           <a:ln w="25400">
-            <a:solidFill>
-              <a:srgbClr val="2096F4"/>
-            </a:solidFill>
+            <a:noFill/>
           </a:ln>
         </p:spPr>
         <p:style>
@@ -3747,10 +3745,96 @@
       </p:sp>
       <p:sp>
         <p:nvSpPr>
-          <p:cNvPr id="23" name="Rectangle 22">
+          <p:cNvPr id="24" name="TextBox 23">
             <a:extLst>
               <a:ext uri="{FF2B5EF4-FFF2-40B4-BE49-F238E27FC236}">
-                <a16:creationId xmlns:a16="http://schemas.microsoft.com/office/drawing/2014/main" id="{235C7042-C6C2-CB46-ACD3-34CFBE877839}"/>
+                <a16:creationId xmlns:a16="http://schemas.microsoft.com/office/drawing/2014/main" id="{6001C23B-B0B6-7149-B97B-E5D34C52A471}"/>
+              </a:ext>
+            </a:extLst>
+          </p:cNvPr>
+          <p:cNvSpPr txBox="1"/>
+          <p:nvPr/>
+        </p:nvSpPr>
+        <p:spPr>
+          <a:xfrm>
+            <a:off x="3055204" y="2142938"/>
+            <a:ext cx="1566427" cy="464300"/>
+          </a:xfrm>
+          <a:prstGeom prst="rect">
+            <a:avLst/>
+          </a:prstGeom>
+          <a:noFill/>
+        </p:spPr>
+        <p:txBody>
+          <a:bodyPr wrap="square" tIns="33090" bIns="0" rtlCol="0">
+            <a:spAutoFit/>
+          </a:bodyPr>
+          <a:lstStyle/>
+          <a:p>
+            <a:r>
+              <a:rPr lang="en-GB" sz="2800" dirty="0">
+                <a:solidFill>
+                  <a:schemeClr val="bg1"/>
+                </a:solidFill>
+                <a:latin typeface="Roboto" pitchFamily="2" charset="0"/>
+                <a:ea typeface="Roboto" pitchFamily="2" charset="0"/>
+              </a:rPr>
+              <a:t>Abstract</a:t>
+            </a:r>
+          </a:p>
+        </p:txBody>
+      </p:sp>
+      <p:sp>
+        <p:nvSpPr>
+          <p:cNvPr id="25" name="TextBox 24">
+            <a:extLst>
+              <a:ext uri="{FF2B5EF4-FFF2-40B4-BE49-F238E27FC236}">
+                <a16:creationId xmlns:a16="http://schemas.microsoft.com/office/drawing/2014/main" id="{66E55818-4206-724B-B2B0-308087FBC4EB}"/>
+              </a:ext>
+            </a:extLst>
+          </p:cNvPr>
+          <p:cNvSpPr txBox="1"/>
+          <p:nvPr/>
+        </p:nvSpPr>
+        <p:spPr>
+          <a:xfrm>
+            <a:off x="715606" y="2759659"/>
+            <a:ext cx="1913276" cy="338554"/>
+          </a:xfrm>
+          <a:prstGeom prst="rect">
+            <a:avLst/>
+          </a:prstGeom>
+          <a:noFill/>
+        </p:spPr>
+        <p:txBody>
+          <a:bodyPr wrap="square" rtlCol="0">
+            <a:spAutoFit/>
+          </a:bodyPr>
+          <a:lstStyle/>
+          <a:p>
+            <a:r>
+              <a:rPr lang="en-GB" sz="1600" dirty="0">
+                <a:latin typeface="Roboto" pitchFamily="2" charset="0"/>
+                <a:ea typeface="Roboto" pitchFamily="2" charset="0"/>
+              </a:rPr>
+              <a:t>Through</a:t>
+            </a:r>
+            <a:r>
+              <a:rPr lang="en-GB" sz="1400" dirty="0">
+                <a:latin typeface="Roboto" pitchFamily="2" charset="0"/>
+                <a:ea typeface="Roboto" pitchFamily="2" charset="0"/>
+              </a:rPr>
+              <a:t> </a:t>
+            </a:r>
+          </a:p>
+        </p:txBody>
+      </p:sp>
+      <p:sp>
+        <p:nvSpPr>
+          <p:cNvPr id="29" name="Rectangle 28">
+            <a:extLst>
+              <a:ext uri="{FF2B5EF4-FFF2-40B4-BE49-F238E27FC236}">
+                <a16:creationId xmlns:a16="http://schemas.microsoft.com/office/drawing/2014/main" id="{79B7E4D7-9CC3-534F-B609-D2275DAE79FE}"/>
               </a:ext>
             </a:extLst>
           </p:cNvPr>
@@ -3759,17 +3843,19 @@
         </p:nvSpPr>
         <p:spPr>
           <a:xfrm>
-            <a:off x="597618" y="2095032"/>
-            <a:ext cx="6481605" cy="568420"/>
+            <a:off x="597618" y="6283574"/>
+            <a:ext cx="6481605" cy="3833820"/>
           </a:xfrm>
           <a:prstGeom prst="rect">
             <a:avLst/>
           </a:prstGeom>
           <a:solidFill>
-            <a:srgbClr val="2096F4"/>
+            <a:srgbClr val="FFFFFF"/>
           </a:solidFill>
           <a:ln w="25400">
-            <a:noFill/>
+            <a:solidFill>
+              <a:srgbClr val="2096F4"/>
+            </a:solidFill>
           </a:ln>
         </p:spPr>
         <p:style>
@@ -3799,96 +3885,10 @@
       </p:sp>
       <p:sp>
         <p:nvSpPr>
-          <p:cNvPr id="24" name="TextBox 23">
+          <p:cNvPr id="30" name="Rectangle 29">
             <a:extLst>
               <a:ext uri="{FF2B5EF4-FFF2-40B4-BE49-F238E27FC236}">
-                <a16:creationId xmlns:a16="http://schemas.microsoft.com/office/drawing/2014/main" id="{6001C23B-B0B6-7149-B97B-E5D34C52A471}"/>
-              </a:ext>
-            </a:extLst>
-          </p:cNvPr>
-          <p:cNvSpPr txBox="1"/>
-          <p:nvPr/>
-        </p:nvSpPr>
-        <p:spPr>
-          <a:xfrm>
-            <a:off x="2834123" y="2147092"/>
-            <a:ext cx="2008590" cy="464300"/>
-          </a:xfrm>
-          <a:prstGeom prst="rect">
-            <a:avLst/>
-          </a:prstGeom>
-          <a:noFill/>
-        </p:spPr>
-        <p:txBody>
-          <a:bodyPr wrap="square" tIns="33090" bIns="0" rtlCol="0">
-            <a:spAutoFit/>
-          </a:bodyPr>
-          <a:lstStyle/>
-          <a:p>
-            <a:r>
-              <a:rPr lang="en-GB" sz="2800" dirty="0">
-                <a:solidFill>
-                  <a:schemeClr val="bg1"/>
-                </a:solidFill>
-                <a:latin typeface="Roboto" pitchFamily="2" charset="0"/>
-                <a:ea typeface="Roboto" pitchFamily="2" charset="0"/>
-              </a:rPr>
-              <a:t>ABSTRACT</a:t>
-            </a:r>
-          </a:p>
-        </p:txBody>
-      </p:sp>
-      <p:sp>
-        <p:nvSpPr>
-          <p:cNvPr id="25" name="TextBox 24">
-            <a:extLst>
-              <a:ext uri="{FF2B5EF4-FFF2-40B4-BE49-F238E27FC236}">
-                <a16:creationId xmlns:a16="http://schemas.microsoft.com/office/drawing/2014/main" id="{66E55818-4206-724B-B2B0-308087FBC4EB}"/>
-              </a:ext>
-            </a:extLst>
-          </p:cNvPr>
-          <p:cNvSpPr txBox="1"/>
-          <p:nvPr/>
-        </p:nvSpPr>
-        <p:spPr>
-          <a:xfrm>
-            <a:off x="715606" y="2759659"/>
-            <a:ext cx="1913276" cy="338554"/>
-          </a:xfrm>
-          <a:prstGeom prst="rect">
-            <a:avLst/>
-          </a:prstGeom>
-          <a:noFill/>
-        </p:spPr>
-        <p:txBody>
-          <a:bodyPr wrap="square" rtlCol="0">
-            <a:spAutoFit/>
-          </a:bodyPr>
-          <a:lstStyle/>
-          <a:p>
-            <a:r>
-              <a:rPr lang="en-GB" sz="1600" dirty="0">
-                <a:latin typeface="Roboto" pitchFamily="2" charset="0"/>
-                <a:ea typeface="Roboto" pitchFamily="2" charset="0"/>
-              </a:rPr>
-              <a:t>Through</a:t>
-            </a:r>
-            <a:r>
-              <a:rPr lang="en-GB" sz="1400" dirty="0">
-                <a:latin typeface="Roboto" pitchFamily="2" charset="0"/>
-                <a:ea typeface="Roboto" pitchFamily="2" charset="0"/>
-              </a:rPr>
-              <a:t> </a:t>
-            </a:r>
-          </a:p>
-        </p:txBody>
-      </p:sp>
-      <p:sp>
-        <p:nvSpPr>
-          <p:cNvPr id="29" name="Rectangle 28">
-            <a:extLst>
-              <a:ext uri="{FF2B5EF4-FFF2-40B4-BE49-F238E27FC236}">
-                <a16:creationId xmlns:a16="http://schemas.microsoft.com/office/drawing/2014/main" id="{79B7E4D7-9CC3-534F-B609-D2275DAE79FE}"/>
+                <a16:creationId xmlns:a16="http://schemas.microsoft.com/office/drawing/2014/main" id="{2D659582-89A4-504D-BB7C-17796DBF1C1C}"/>
               </a:ext>
             </a:extLst>
           </p:cNvPr>
@@ -3897,19 +3897,17 @@
         </p:nvSpPr>
         <p:spPr>
           <a:xfrm>
-            <a:off x="597618" y="6283574"/>
-            <a:ext cx="6481605" cy="3833820"/>
+            <a:off x="597617" y="6283574"/>
+            <a:ext cx="6481605" cy="568420"/>
           </a:xfrm>
           <a:prstGeom prst="rect">
             <a:avLst/>
           </a:prstGeom>
           <a:solidFill>
-            <a:srgbClr val="FFFFFF"/>
+            <a:srgbClr val="2096F4"/>
           </a:solidFill>
           <a:ln w="25400">
-            <a:solidFill>
-              <a:srgbClr val="2096F4"/>
-            </a:solidFill>
+            <a:noFill/>
           </a:ln>
         </p:spPr>
         <p:style>
@@ -3939,10 +3937,96 @@
       </p:sp>
       <p:sp>
         <p:nvSpPr>
-          <p:cNvPr id="30" name="Rectangle 29">
+          <p:cNvPr id="31" name="TextBox 30">
             <a:extLst>
               <a:ext uri="{FF2B5EF4-FFF2-40B4-BE49-F238E27FC236}">
-                <a16:creationId xmlns:a16="http://schemas.microsoft.com/office/drawing/2014/main" id="{2D659582-89A4-504D-BB7C-17796DBF1C1C}"/>
+                <a16:creationId xmlns:a16="http://schemas.microsoft.com/office/drawing/2014/main" id="{86016B5C-64E9-3049-A205-3663C84D0E33}"/>
+              </a:ext>
+            </a:extLst>
+          </p:cNvPr>
+          <p:cNvSpPr txBox="1"/>
+          <p:nvPr/>
+        </p:nvSpPr>
+        <p:spPr>
+          <a:xfrm>
+            <a:off x="2759816" y="6335634"/>
+            <a:ext cx="2157204" cy="464300"/>
+          </a:xfrm>
+          <a:prstGeom prst="rect">
+            <a:avLst/>
+          </a:prstGeom>
+          <a:noFill/>
+        </p:spPr>
+        <p:txBody>
+          <a:bodyPr wrap="square" tIns="33090" bIns="0" rtlCol="0">
+            <a:spAutoFit/>
+          </a:bodyPr>
+          <a:lstStyle/>
+          <a:p>
+            <a:r>
+              <a:rPr lang="en-GB" sz="2800" dirty="0">
+                <a:solidFill>
+                  <a:schemeClr val="bg1"/>
+                </a:solidFill>
+                <a:latin typeface="Roboto" pitchFamily="2" charset="0"/>
+                <a:ea typeface="Roboto" pitchFamily="2" charset="0"/>
+              </a:rPr>
+              <a:t>Introduction</a:t>
+            </a:r>
+          </a:p>
+        </p:txBody>
+      </p:sp>
+      <p:sp>
+        <p:nvSpPr>
+          <p:cNvPr id="32" name="TextBox 31">
+            <a:extLst>
+              <a:ext uri="{FF2B5EF4-FFF2-40B4-BE49-F238E27FC236}">
+                <a16:creationId xmlns:a16="http://schemas.microsoft.com/office/drawing/2014/main" id="{267C125E-C7FD-AC43-9428-ACC0E403A784}"/>
+              </a:ext>
+            </a:extLst>
+          </p:cNvPr>
+          <p:cNvSpPr txBox="1"/>
+          <p:nvPr/>
+        </p:nvSpPr>
+        <p:spPr>
+          <a:xfrm>
+            <a:off x="715605" y="6948201"/>
+            <a:ext cx="1913276" cy="338554"/>
+          </a:xfrm>
+          <a:prstGeom prst="rect">
+            <a:avLst/>
+          </a:prstGeom>
+          <a:noFill/>
+        </p:spPr>
+        <p:txBody>
+          <a:bodyPr wrap="square" rtlCol="0">
+            <a:spAutoFit/>
+          </a:bodyPr>
+          <a:lstStyle/>
+          <a:p>
+            <a:r>
+              <a:rPr lang="en-GB" sz="1600" dirty="0">
+                <a:latin typeface="Roboto" pitchFamily="2" charset="0"/>
+                <a:ea typeface="Roboto" pitchFamily="2" charset="0"/>
+              </a:rPr>
+              <a:t>Through</a:t>
+            </a:r>
+            <a:r>
+              <a:rPr lang="en-GB" sz="1400" dirty="0">
+                <a:latin typeface="Roboto" pitchFamily="2" charset="0"/>
+                <a:ea typeface="Roboto" pitchFamily="2" charset="0"/>
+              </a:rPr>
+              <a:t> </a:t>
+            </a:r>
+          </a:p>
+        </p:txBody>
+      </p:sp>
+      <p:sp>
+        <p:nvSpPr>
+          <p:cNvPr id="33" name="Rectangle 32">
+            <a:extLst>
+              <a:ext uri="{FF2B5EF4-FFF2-40B4-BE49-F238E27FC236}">
+                <a16:creationId xmlns:a16="http://schemas.microsoft.com/office/drawing/2014/main" id="{B366E9D3-6164-724C-AA20-4109C7348225}"/>
               </a:ext>
             </a:extLst>
           </p:cNvPr>
@@ -3951,17 +4035,19 @@
         </p:nvSpPr>
         <p:spPr>
           <a:xfrm>
-            <a:off x="597617" y="6283574"/>
-            <a:ext cx="6481605" cy="568420"/>
+            <a:off x="14304390" y="11317315"/>
+            <a:ext cx="6481605" cy="3405044"/>
           </a:xfrm>
           <a:prstGeom prst="rect">
             <a:avLst/>
           </a:prstGeom>
           <a:solidFill>
-            <a:srgbClr val="2096F4"/>
+            <a:srgbClr val="FFFFFF"/>
           </a:solidFill>
           <a:ln w="25400">
-            <a:noFill/>
+            <a:solidFill>
+              <a:srgbClr val="2096F4"/>
+            </a:solidFill>
           </a:ln>
         </p:spPr>
         <p:style>
@@ -3991,10 +4077,62 @@
       </p:sp>
       <p:sp>
         <p:nvSpPr>
-          <p:cNvPr id="31" name="TextBox 30">
+          <p:cNvPr id="34" name="Rectangle 33">
             <a:extLst>
               <a:ext uri="{FF2B5EF4-FFF2-40B4-BE49-F238E27FC236}">
-                <a16:creationId xmlns:a16="http://schemas.microsoft.com/office/drawing/2014/main" id="{86016B5C-64E9-3049-A205-3663C84D0E33}"/>
+                <a16:creationId xmlns:a16="http://schemas.microsoft.com/office/drawing/2014/main" id="{8D597AAE-2967-F54E-910F-12C1BF33C1AD}"/>
+              </a:ext>
+            </a:extLst>
+          </p:cNvPr>
+          <p:cNvSpPr/>
+          <p:nvPr/>
+        </p:nvSpPr>
+        <p:spPr>
+          <a:xfrm>
+            <a:off x="14304389" y="11317315"/>
+            <a:ext cx="6481605" cy="504848"/>
+          </a:xfrm>
+          <a:prstGeom prst="rect">
+            <a:avLst/>
+          </a:prstGeom>
+          <a:solidFill>
+            <a:srgbClr val="2096F4"/>
+          </a:solidFill>
+          <a:ln w="25400">
+            <a:noFill/>
+          </a:ln>
+        </p:spPr>
+        <p:style>
+          <a:lnRef idx="2">
+            <a:schemeClr val="accent1">
+              <a:shade val="50000"/>
+            </a:schemeClr>
+          </a:lnRef>
+          <a:fillRef idx="1">
+            <a:schemeClr val="accent1"/>
+          </a:fillRef>
+          <a:effectRef idx="0">
+            <a:schemeClr val="accent1"/>
+          </a:effectRef>
+          <a:fontRef idx="minor">
+            <a:schemeClr val="lt1"/>
+          </a:fontRef>
+        </p:style>
+        <p:txBody>
+          <a:bodyPr rtlCol="0" anchor="ctr"/>
+          <a:lstStyle/>
+          <a:p>
+            <a:pPr algn="ctr"/>
+            <a:endParaRPr lang="en-GB" sz="2439" dirty="0"/>
+          </a:p>
+        </p:txBody>
+      </p:sp>
+      <p:sp>
+        <p:nvSpPr>
+          <p:cNvPr id="35" name="TextBox 34">
+            <a:extLst>
+              <a:ext uri="{FF2B5EF4-FFF2-40B4-BE49-F238E27FC236}">
+                <a16:creationId xmlns:a16="http://schemas.microsoft.com/office/drawing/2014/main" id="{DDDDCCA0-8FE3-DF4D-9C24-ECCFA2672A7B}"/>
               </a:ext>
             </a:extLst>
           </p:cNvPr>
@@ -4003,8 +4141,8 @@
         </p:nvSpPr>
         <p:spPr>
           <a:xfrm>
-            <a:off x="2443371" y="6335634"/>
-            <a:ext cx="2790093" cy="464300"/>
+            <a:off x="16525022" y="11337589"/>
+            <a:ext cx="2040337" cy="464300"/>
           </a:xfrm>
           <a:prstGeom prst="rect">
             <a:avLst/>
@@ -4025,17 +4163,17 @@
                 <a:latin typeface="Roboto" pitchFamily="2" charset="0"/>
                 <a:ea typeface="Roboto" pitchFamily="2" charset="0"/>
               </a:rPr>
-              <a:t>INTRODUCTION</a:t>
-            </a:r>
-          </a:p>
-        </p:txBody>
-      </p:sp>
-      <p:sp>
-        <p:nvSpPr>
-          <p:cNvPr id="32" name="TextBox 31">
+              <a:t>References</a:t>
+            </a:r>
+          </a:p>
+        </p:txBody>
+      </p:sp>
+      <p:sp>
+        <p:nvSpPr>
+          <p:cNvPr id="36" name="TextBox 35">
             <a:extLst>
               <a:ext uri="{FF2B5EF4-FFF2-40B4-BE49-F238E27FC236}">
-                <a16:creationId xmlns:a16="http://schemas.microsoft.com/office/drawing/2014/main" id="{267C125E-C7FD-AC43-9428-ACC0E403A784}"/>
+                <a16:creationId xmlns:a16="http://schemas.microsoft.com/office/drawing/2014/main" id="{F4BD6AEF-2B53-F545-A2BE-DFA8D74FB40B}"/>
               </a:ext>
             </a:extLst>
           </p:cNvPr>
@@ -4044,7 +4182,199 @@
         </p:nvSpPr>
         <p:spPr>
           <a:xfrm>
-            <a:off x="715605" y="6948201"/>
+            <a:off x="14422377" y="11981942"/>
+            <a:ext cx="1913276" cy="338554"/>
+          </a:xfrm>
+          <a:prstGeom prst="rect">
+            <a:avLst/>
+          </a:prstGeom>
+          <a:noFill/>
+        </p:spPr>
+        <p:txBody>
+          <a:bodyPr wrap="square" rtlCol="0">
+            <a:spAutoFit/>
+          </a:bodyPr>
+          <a:lstStyle/>
+          <a:p>
+            <a:r>
+              <a:rPr lang="en-GB" sz="1600" dirty="0">
+                <a:latin typeface="Roboto" pitchFamily="2" charset="0"/>
+                <a:ea typeface="Roboto" pitchFamily="2" charset="0"/>
+              </a:rPr>
+              <a:t>Through</a:t>
+            </a:r>
+            <a:r>
+              <a:rPr lang="en-GB" sz="1400" dirty="0">
+                <a:latin typeface="Roboto" pitchFamily="2" charset="0"/>
+                <a:ea typeface="Roboto" pitchFamily="2" charset="0"/>
+              </a:rPr>
+              <a:t> </a:t>
+            </a:r>
+          </a:p>
+        </p:txBody>
+      </p:sp>
+      <p:sp>
+        <p:nvSpPr>
+          <p:cNvPr id="37" name="Rectangle 36">
+            <a:extLst>
+              <a:ext uri="{FF2B5EF4-FFF2-40B4-BE49-F238E27FC236}">
+                <a16:creationId xmlns:a16="http://schemas.microsoft.com/office/drawing/2014/main" id="{F0A0EA86-7ADF-D245-A71E-D72FCB99B2C4}"/>
+              </a:ext>
+            </a:extLst>
+          </p:cNvPr>
+          <p:cNvSpPr/>
+          <p:nvPr/>
+        </p:nvSpPr>
+        <p:spPr>
+          <a:xfrm>
+            <a:off x="14304389" y="7559675"/>
+            <a:ext cx="6481605" cy="3405044"/>
+          </a:xfrm>
+          <a:prstGeom prst="rect">
+            <a:avLst/>
+          </a:prstGeom>
+          <a:solidFill>
+            <a:srgbClr val="FFFFFF"/>
+          </a:solidFill>
+          <a:ln w="25400">
+            <a:solidFill>
+              <a:srgbClr val="2096F4"/>
+            </a:solidFill>
+          </a:ln>
+        </p:spPr>
+        <p:style>
+          <a:lnRef idx="2">
+            <a:schemeClr val="accent1">
+              <a:shade val="50000"/>
+            </a:schemeClr>
+          </a:lnRef>
+          <a:fillRef idx="1">
+            <a:schemeClr val="accent1"/>
+          </a:fillRef>
+          <a:effectRef idx="0">
+            <a:schemeClr val="accent1"/>
+          </a:effectRef>
+          <a:fontRef idx="minor">
+            <a:schemeClr val="lt1"/>
+          </a:fontRef>
+        </p:style>
+        <p:txBody>
+          <a:bodyPr rtlCol="0" anchor="ctr"/>
+          <a:lstStyle/>
+          <a:p>
+            <a:pPr algn="ctr"/>
+            <a:endParaRPr lang="en-GB" sz="2439" dirty="0"/>
+          </a:p>
+        </p:txBody>
+      </p:sp>
+      <p:sp>
+        <p:nvSpPr>
+          <p:cNvPr id="38" name="Rectangle 37">
+            <a:extLst>
+              <a:ext uri="{FF2B5EF4-FFF2-40B4-BE49-F238E27FC236}">
+                <a16:creationId xmlns:a16="http://schemas.microsoft.com/office/drawing/2014/main" id="{F06E5A97-D224-004D-986F-3440A485D63D}"/>
+              </a:ext>
+            </a:extLst>
+          </p:cNvPr>
+          <p:cNvSpPr/>
+          <p:nvPr/>
+        </p:nvSpPr>
+        <p:spPr>
+          <a:xfrm>
+            <a:off x="14304388" y="7559675"/>
+            <a:ext cx="6481605" cy="504848"/>
+          </a:xfrm>
+          <a:prstGeom prst="rect">
+            <a:avLst/>
+          </a:prstGeom>
+          <a:solidFill>
+            <a:srgbClr val="2096F4"/>
+          </a:solidFill>
+          <a:ln w="25400">
+            <a:noFill/>
+          </a:ln>
+        </p:spPr>
+        <p:style>
+          <a:lnRef idx="2">
+            <a:schemeClr val="accent1">
+              <a:shade val="50000"/>
+            </a:schemeClr>
+          </a:lnRef>
+          <a:fillRef idx="1">
+            <a:schemeClr val="accent1"/>
+          </a:fillRef>
+          <a:effectRef idx="0">
+            <a:schemeClr val="accent1"/>
+          </a:effectRef>
+          <a:fontRef idx="minor">
+            <a:schemeClr val="lt1"/>
+          </a:fontRef>
+        </p:style>
+        <p:txBody>
+          <a:bodyPr rtlCol="0" anchor="ctr"/>
+          <a:lstStyle/>
+          <a:p>
+            <a:pPr algn="ctr"/>
+            <a:endParaRPr lang="en-GB" sz="2439" dirty="0"/>
+          </a:p>
+        </p:txBody>
+      </p:sp>
+      <p:sp>
+        <p:nvSpPr>
+          <p:cNvPr id="39" name="TextBox 38">
+            <a:extLst>
+              <a:ext uri="{FF2B5EF4-FFF2-40B4-BE49-F238E27FC236}">
+                <a16:creationId xmlns:a16="http://schemas.microsoft.com/office/drawing/2014/main" id="{B3253F4F-CAD3-124E-9760-3A4EBE5B7F65}"/>
+              </a:ext>
+            </a:extLst>
+          </p:cNvPr>
+          <p:cNvSpPr txBox="1"/>
+          <p:nvPr/>
+        </p:nvSpPr>
+        <p:spPr>
+          <a:xfrm>
+            <a:off x="16525021" y="7579949"/>
+            <a:ext cx="2248754" cy="464300"/>
+          </a:xfrm>
+          <a:prstGeom prst="rect">
+            <a:avLst/>
+          </a:prstGeom>
+          <a:noFill/>
+        </p:spPr>
+        <p:txBody>
+          <a:bodyPr wrap="square" tIns="33090" bIns="0" rtlCol="0">
+            <a:spAutoFit/>
+          </a:bodyPr>
+          <a:lstStyle/>
+          <a:p>
+            <a:r>
+              <a:rPr lang="en-GB" sz="2800" dirty="0">
+                <a:solidFill>
+                  <a:schemeClr val="bg1"/>
+                </a:solidFill>
+                <a:latin typeface="Roboto" pitchFamily="2" charset="0"/>
+                <a:ea typeface="Roboto" pitchFamily="2" charset="0"/>
+              </a:rPr>
+              <a:t>Conclusions</a:t>
+            </a:r>
+          </a:p>
+        </p:txBody>
+      </p:sp>
+      <p:sp>
+        <p:nvSpPr>
+          <p:cNvPr id="40" name="TextBox 39">
+            <a:extLst>
+              <a:ext uri="{FF2B5EF4-FFF2-40B4-BE49-F238E27FC236}">
+                <a16:creationId xmlns:a16="http://schemas.microsoft.com/office/drawing/2014/main" id="{AB80688C-1E9F-6D43-81CA-456F4D2B70DA}"/>
+              </a:ext>
+            </a:extLst>
+          </p:cNvPr>
+          <p:cNvSpPr txBox="1"/>
+          <p:nvPr/>
+        </p:nvSpPr>
+        <p:spPr>
+          <a:xfrm>
+            <a:off x="14422376" y="8224302"/>
             <a:ext cx="1913276" cy="338554"/>
           </a:xfrm>
           <a:prstGeom prst="rect">

</xml_diff>

<commit_message>
esc4: p: changed the poster template to one which is actually A3 size
</commit_message>
<xml_diff>
--- a/earth_system_and_climate_4/term_2/poster/oxygen_poster.pptx
+++ b/earth_system_and_climate_4/term_2/poster/oxygen_poster.pptx
@@ -2,7 +2,7 @@
 <file path=ppt/presentation.xml><?xml version="1.0" encoding="utf-8"?>
 <p:presentation xmlns:a="http://schemas.openxmlformats.org/drawingml/2006/main" xmlns:r="http://schemas.openxmlformats.org/officeDocument/2006/relationships" xmlns:p="http://schemas.openxmlformats.org/presentationml/2006/main" saveSubsetFonts="1" autoCompressPictures="0">
   <p:sldMasterIdLst>
-    <p:sldMasterId id="2147483684" r:id="rId1"/>
+    <p:sldMasterId id="2147483660" r:id="rId1"/>
   </p:sldMasterIdLst>
   <p:notesMasterIdLst>
     <p:notesMasterId r:id="rId3"/>
@@ -10,7 +10,7 @@
   <p:sldIdLst>
     <p:sldId id="256" r:id="rId2"/>
   </p:sldIdLst>
-  <p:sldSz cx="21383625" cy="15119350"/>
+  <p:sldSz cx="12801600" cy="9601200" type="A3"/>
   <p:notesSz cx="6858000" cy="9144000"/>
   <p:defaultTextStyle>
     <a:defPPr>
@@ -107,14 +107,6 @@
       </a:defRPr>
     </a:lvl9pPr>
   </p:defaultTextStyle>
-  <p:extLst>
-    <p:ext uri="{EFAFB233-063F-42B5-8137-9DF3F51BA10A}">
-      <p15:sldGuideLst xmlns:p15="http://schemas.microsoft.com/office/powerpoint/2012/main"/>
-    </p:ext>
-    <p:ext uri="{2D200454-40CA-4A62-9FC3-DE9A4176ACB9}">
-      <p15:notesGuideLst xmlns:p15="http://schemas.microsoft.com/office/powerpoint/2012/main"/>
-    </p:ext>
-  </p:extLst>
 </p:presentation>
 </file>
 
@@ -167,7 +159,7 @@
             </a:lvl1pPr>
           </a:lstStyle>
           <a:p>
-            <a:endParaRPr lang="en-GB" dirty="0"/>
+            <a:endParaRPr lang="en-GB"/>
           </a:p>
         </p:txBody>
       </p:sp>
@@ -198,11 +190,11 @@
             </a:lvl1pPr>
           </a:lstStyle>
           <a:p>
-            <a:fld id="{597BF9B5-34E6-3748-A3AE-97D3F6023AC7}" type="datetimeFigureOut">
+            <a:fld id="{9CF0DE25-9E52-B648-AE1D-256A10D77DBE}" type="datetimeFigureOut">
               <a:rPr lang="en-GB" smtClean="0"/>
               <a:t>13/02/2019</a:t>
             </a:fld>
-            <a:endParaRPr lang="en-GB" dirty="0"/>
+            <a:endParaRPr lang="en-GB"/>
           </a:p>
         </p:txBody>
       </p:sp>
@@ -218,8 +210,8 @@
         </p:nvSpPr>
         <p:spPr>
           <a:xfrm>
-            <a:off x="1247775" y="1143000"/>
-            <a:ext cx="4362450" cy="3086100"/>
+            <a:off x="1371600" y="1143000"/>
+            <a:ext cx="4114800" cy="3086100"/>
           </a:xfrm>
           <a:prstGeom prst="rect">
             <a:avLst/>
@@ -235,7 +227,7 @@
           <a:bodyPr vert="horz" lIns="91440" tIns="45720" rIns="91440" bIns="45720" rtlCol="0" anchor="ctr"/>
           <a:lstStyle/>
           <a:p>
-            <a:endParaRPr lang="en-GB" dirty="0"/>
+            <a:endParaRPr lang="en-GB"/>
           </a:p>
         </p:txBody>
       </p:sp>
@@ -265,7 +257,7 @@
             <a:pPr lvl="0"/>
             <a:r>
               <a:rPr lang="en-US"/>
-              <a:t>Edit Master text styles</a:t>
+              <a:t>Click to edit Master text styles</a:t>
             </a:r>
           </a:p>
           <a:p>
@@ -326,7 +318,7 @@
             </a:lvl1pPr>
           </a:lstStyle>
           <a:p>
-            <a:endParaRPr lang="en-GB" dirty="0"/>
+            <a:endParaRPr lang="en-GB"/>
           </a:p>
         </p:txBody>
       </p:sp>
@@ -357,25 +349,25 @@
             </a:lvl1pPr>
           </a:lstStyle>
           <a:p>
-            <a:fld id="{EB796617-FF49-1349-8887-453028D5524D}" type="slidenum">
+            <a:fld id="{A0CA6BF0-FC21-5B47-B2C2-2A354A9FE9E9}" type="slidenum">
               <a:rPr lang="en-GB" smtClean="0"/>
               <a:t>‹#›</a:t>
             </a:fld>
-            <a:endParaRPr lang="en-GB" dirty="0"/>
+            <a:endParaRPr lang="en-GB"/>
           </a:p>
         </p:txBody>
       </p:sp>
     </p:spTree>
     <p:extLst>
       <p:ext uri="{BB962C8B-B14F-4D97-AF65-F5344CB8AC3E}">
-        <p14:creationId xmlns:p14="http://schemas.microsoft.com/office/powerpoint/2010/main" val="1709751080"/>
+        <p14:creationId xmlns:p14="http://schemas.microsoft.com/office/powerpoint/2010/main" val="2572154941"/>
       </p:ext>
     </p:extLst>
   </p:cSld>
   <p:clrMap bg1="lt1" tx1="dk1" bg2="lt2" tx2="dk2" accent1="accent1" accent2="accent2" accent3="accent3" accent4="accent4" accent5="accent5" accent6="accent6" hlink="hlink" folHlink="folHlink"/>
   <p:notesStyle>
-    <a:lvl1pPr marL="0" algn="l" defTabSz="914400" rtl="0" eaLnBrk="1" latinLnBrk="0" hangingPunct="1">
-      <a:defRPr sz="1200" kern="1200">
+    <a:lvl1pPr marL="0" algn="l" defTabSz="1075334" rtl="0" eaLnBrk="1" latinLnBrk="0" hangingPunct="1">
+      <a:defRPr sz="1411" kern="1200">
         <a:solidFill>
           <a:schemeClr val="tx1"/>
         </a:solidFill>
@@ -384,8 +376,8 @@
         <a:cs typeface="+mn-cs"/>
       </a:defRPr>
     </a:lvl1pPr>
-    <a:lvl2pPr marL="457200" algn="l" defTabSz="914400" rtl="0" eaLnBrk="1" latinLnBrk="0" hangingPunct="1">
-      <a:defRPr sz="1200" kern="1200">
+    <a:lvl2pPr marL="537667" algn="l" defTabSz="1075334" rtl="0" eaLnBrk="1" latinLnBrk="0" hangingPunct="1">
+      <a:defRPr sz="1411" kern="1200">
         <a:solidFill>
           <a:schemeClr val="tx1"/>
         </a:solidFill>
@@ -394,8 +386,8 @@
         <a:cs typeface="+mn-cs"/>
       </a:defRPr>
     </a:lvl2pPr>
-    <a:lvl3pPr marL="914400" algn="l" defTabSz="914400" rtl="0" eaLnBrk="1" latinLnBrk="0" hangingPunct="1">
-      <a:defRPr sz="1200" kern="1200">
+    <a:lvl3pPr marL="1075334" algn="l" defTabSz="1075334" rtl="0" eaLnBrk="1" latinLnBrk="0" hangingPunct="1">
+      <a:defRPr sz="1411" kern="1200">
         <a:solidFill>
           <a:schemeClr val="tx1"/>
         </a:solidFill>
@@ -404,8 +396,8 @@
         <a:cs typeface="+mn-cs"/>
       </a:defRPr>
     </a:lvl3pPr>
-    <a:lvl4pPr marL="1371600" algn="l" defTabSz="914400" rtl="0" eaLnBrk="1" latinLnBrk="0" hangingPunct="1">
-      <a:defRPr sz="1200" kern="1200">
+    <a:lvl4pPr marL="1613002" algn="l" defTabSz="1075334" rtl="0" eaLnBrk="1" latinLnBrk="0" hangingPunct="1">
+      <a:defRPr sz="1411" kern="1200">
         <a:solidFill>
           <a:schemeClr val="tx1"/>
         </a:solidFill>
@@ -414,8 +406,8 @@
         <a:cs typeface="+mn-cs"/>
       </a:defRPr>
     </a:lvl4pPr>
-    <a:lvl5pPr marL="1828800" algn="l" defTabSz="914400" rtl="0" eaLnBrk="1" latinLnBrk="0" hangingPunct="1">
-      <a:defRPr sz="1200" kern="1200">
+    <a:lvl5pPr marL="2150669" algn="l" defTabSz="1075334" rtl="0" eaLnBrk="1" latinLnBrk="0" hangingPunct="1">
+      <a:defRPr sz="1411" kern="1200">
         <a:solidFill>
           <a:schemeClr val="tx1"/>
         </a:solidFill>
@@ -424,8 +416,8 @@
         <a:cs typeface="+mn-cs"/>
       </a:defRPr>
     </a:lvl5pPr>
-    <a:lvl6pPr marL="2286000" algn="l" defTabSz="914400" rtl="0" eaLnBrk="1" latinLnBrk="0" hangingPunct="1">
-      <a:defRPr sz="1200" kern="1200">
+    <a:lvl6pPr marL="2688336" algn="l" defTabSz="1075334" rtl="0" eaLnBrk="1" latinLnBrk="0" hangingPunct="1">
+      <a:defRPr sz="1411" kern="1200">
         <a:solidFill>
           <a:schemeClr val="tx1"/>
         </a:solidFill>
@@ -434,8 +426,8 @@
         <a:cs typeface="+mn-cs"/>
       </a:defRPr>
     </a:lvl6pPr>
-    <a:lvl7pPr marL="2743200" algn="l" defTabSz="914400" rtl="0" eaLnBrk="1" latinLnBrk="0" hangingPunct="1">
-      <a:defRPr sz="1200" kern="1200">
+    <a:lvl7pPr marL="3226003" algn="l" defTabSz="1075334" rtl="0" eaLnBrk="1" latinLnBrk="0" hangingPunct="1">
+      <a:defRPr sz="1411" kern="1200">
         <a:solidFill>
           <a:schemeClr val="tx1"/>
         </a:solidFill>
@@ -444,8 +436,8 @@
         <a:cs typeface="+mn-cs"/>
       </a:defRPr>
     </a:lvl7pPr>
-    <a:lvl8pPr marL="3200400" algn="l" defTabSz="914400" rtl="0" eaLnBrk="1" latinLnBrk="0" hangingPunct="1">
-      <a:defRPr sz="1200" kern="1200">
+    <a:lvl8pPr marL="3763670" algn="l" defTabSz="1075334" rtl="0" eaLnBrk="1" latinLnBrk="0" hangingPunct="1">
+      <a:defRPr sz="1411" kern="1200">
         <a:solidFill>
           <a:schemeClr val="tx1"/>
         </a:solidFill>
@@ -454,8 +446,8 @@
         <a:cs typeface="+mn-cs"/>
       </a:defRPr>
     </a:lvl8pPr>
-    <a:lvl9pPr marL="3657600" algn="l" defTabSz="914400" rtl="0" eaLnBrk="1" latinLnBrk="0" hangingPunct="1">
-      <a:defRPr sz="1200" kern="1200">
+    <a:lvl9pPr marL="4301338" algn="l" defTabSz="1075334" rtl="0" eaLnBrk="1" latinLnBrk="0" hangingPunct="1">
+      <a:defRPr sz="1411" kern="1200">
         <a:solidFill>
           <a:schemeClr val="tx1"/>
         </a:solidFill>
@@ -495,12 +487,7 @@
             <p:ph type="sldImg"/>
           </p:nvPr>
         </p:nvSpPr>
-        <p:spPr>
-          <a:xfrm>
-            <a:off x="1247775" y="1143000"/>
-            <a:ext cx="4362450" cy="3086100"/>
-          </a:xfrm>
-        </p:spPr>
+        <p:spPr/>
       </p:sp>
       <p:sp>
         <p:nvSpPr>
@@ -517,7 +504,7 @@
           <a:bodyPr/>
           <a:lstStyle/>
           <a:p>
-            <a:endParaRPr lang="en-GB" b="0" dirty="0"/>
+            <a:endParaRPr lang="en-GB" dirty="0"/>
           </a:p>
         </p:txBody>
       </p:sp>
@@ -528,7 +515,7 @@
             <a:spLocks noGrp="1"/>
           </p:cNvSpPr>
           <p:nvPr>
-            <p:ph type="sldNum" sz="quarter" idx="10"/>
+            <p:ph type="sldNum" sz="quarter" idx="5"/>
           </p:nvPr>
         </p:nvSpPr>
         <p:spPr/>
@@ -536,18 +523,18 @@
           <a:bodyPr/>
           <a:lstStyle/>
           <a:p>
-            <a:fld id="{EB796617-FF49-1349-8887-453028D5524D}" type="slidenum">
+            <a:fld id="{A0CA6BF0-FC21-5B47-B2C2-2A354A9FE9E9}" type="slidenum">
               <a:rPr lang="en-GB" smtClean="0"/>
               <a:t>1</a:t>
             </a:fld>
-            <a:endParaRPr lang="en-GB" dirty="0"/>
+            <a:endParaRPr lang="en-GB"/>
           </a:p>
         </p:txBody>
       </p:sp>
     </p:spTree>
     <p:extLst>
       <p:ext uri="{BB962C8B-B14F-4D97-AF65-F5344CB8AC3E}">
-        <p14:creationId xmlns:p14="http://schemas.microsoft.com/office/powerpoint/2010/main" val="1501858162"/>
+        <p14:creationId xmlns:p14="http://schemas.microsoft.com/office/powerpoint/2010/main" val="786289424"/>
       </p:ext>
     </p:extLst>
   </p:cSld>
@@ -586,15 +573,15 @@
         </p:nvSpPr>
         <p:spPr>
           <a:xfrm>
-            <a:off x="1603772" y="2474395"/>
-            <a:ext cx="18176081" cy="5263774"/>
+            <a:off x="960120" y="1571308"/>
+            <a:ext cx="10881360" cy="3342640"/>
           </a:xfrm>
         </p:spPr>
         <p:txBody>
           <a:bodyPr anchor="b"/>
           <a:lstStyle>
             <a:lvl1pPr algn="ctr">
-              <a:defRPr sz="13228"/>
+              <a:defRPr sz="8400"/>
             </a:lvl1pPr>
           </a:lstStyle>
           <a:p>
@@ -618,8 +605,8 @@
         </p:nvSpPr>
         <p:spPr>
           <a:xfrm>
-            <a:off x="2672953" y="7941160"/>
-            <a:ext cx="16037719" cy="3650342"/>
+            <a:off x="1600200" y="5042853"/>
+            <a:ext cx="9601200" cy="2318067"/>
           </a:xfrm>
         </p:spPr>
         <p:txBody>
@@ -627,39 +614,39 @@
           <a:lstStyle>
             <a:lvl1pPr marL="0" indent="0" algn="ctr">
               <a:buNone/>
-              <a:defRPr sz="5291"/>
+              <a:defRPr sz="3360"/>
             </a:lvl1pPr>
-            <a:lvl2pPr marL="1007943" indent="0" algn="ctr">
-              <a:buNone/>
-              <a:defRPr sz="4409"/>
+            <a:lvl2pPr marL="640080" indent="0" algn="ctr">
+              <a:buNone/>
+              <a:defRPr sz="2800"/>
             </a:lvl2pPr>
-            <a:lvl3pPr marL="2015886" indent="0" algn="ctr">
-              <a:buNone/>
-              <a:defRPr sz="3968"/>
+            <a:lvl3pPr marL="1280160" indent="0" algn="ctr">
+              <a:buNone/>
+              <a:defRPr sz="2520"/>
             </a:lvl3pPr>
-            <a:lvl4pPr marL="3023829" indent="0" algn="ctr">
-              <a:buNone/>
-              <a:defRPr sz="3527"/>
+            <a:lvl4pPr marL="1920240" indent="0" algn="ctr">
+              <a:buNone/>
+              <a:defRPr sz="2240"/>
             </a:lvl4pPr>
-            <a:lvl5pPr marL="4031772" indent="0" algn="ctr">
-              <a:buNone/>
-              <a:defRPr sz="3527"/>
+            <a:lvl5pPr marL="2560320" indent="0" algn="ctr">
+              <a:buNone/>
+              <a:defRPr sz="2240"/>
             </a:lvl5pPr>
-            <a:lvl6pPr marL="5039716" indent="0" algn="ctr">
-              <a:buNone/>
-              <a:defRPr sz="3527"/>
+            <a:lvl6pPr marL="3200400" indent="0" algn="ctr">
+              <a:buNone/>
+              <a:defRPr sz="2240"/>
             </a:lvl6pPr>
-            <a:lvl7pPr marL="6047659" indent="0" algn="ctr">
-              <a:buNone/>
-              <a:defRPr sz="3527"/>
+            <a:lvl7pPr marL="3840480" indent="0" algn="ctr">
+              <a:buNone/>
+              <a:defRPr sz="2240"/>
             </a:lvl7pPr>
-            <a:lvl8pPr marL="7055602" indent="0" algn="ctr">
-              <a:buNone/>
-              <a:defRPr sz="3527"/>
+            <a:lvl8pPr marL="4480560" indent="0" algn="ctr">
+              <a:buNone/>
+              <a:defRPr sz="2240"/>
             </a:lvl8pPr>
-            <a:lvl9pPr marL="8063545" indent="0" algn="ctr">
-              <a:buNone/>
-              <a:defRPr sz="3527"/>
+            <a:lvl9pPr marL="5120640" indent="0" algn="ctr">
+              <a:buNone/>
+              <a:defRPr sz="2240"/>
             </a:lvl9pPr>
           </a:lstStyle>
           <a:p>
@@ -686,11 +673,11 @@
           <a:bodyPr/>
           <a:lstStyle/>
           <a:p>
-            <a:fld id="{E93572D2-1BD6-954F-86C4-419D8535D635}" type="datetimeFigureOut">
+            <a:fld id="{A89845D4-B2ED-304C-AF78-76488BE9F915}" type="datetimeFigureOut">
               <a:rPr lang="en-GB" smtClean="0"/>
               <a:t>13/02/2019</a:t>
             </a:fld>
-            <a:endParaRPr lang="en-GB" dirty="0"/>
+            <a:endParaRPr lang="en-GB"/>
           </a:p>
         </p:txBody>
       </p:sp>
@@ -709,7 +696,7 @@
           <a:bodyPr/>
           <a:lstStyle/>
           <a:p>
-            <a:endParaRPr lang="en-GB" dirty="0"/>
+            <a:endParaRPr lang="en-GB"/>
           </a:p>
         </p:txBody>
       </p:sp>
@@ -728,18 +715,18 @@
           <a:bodyPr/>
           <a:lstStyle/>
           <a:p>
-            <a:fld id="{8EBCDA72-8231-1F4F-8A36-A4B0326CBB14}" type="slidenum">
+            <a:fld id="{A46F63F6-AF3A-4C4F-A332-A89ADE2DFFD5}" type="slidenum">
               <a:rPr lang="en-GB" smtClean="0"/>
               <a:t>‹#›</a:t>
             </a:fld>
-            <a:endParaRPr lang="en-GB" dirty="0"/>
+            <a:endParaRPr lang="en-GB"/>
           </a:p>
         </p:txBody>
       </p:sp>
     </p:spTree>
     <p:extLst>
       <p:ext uri="{BB962C8B-B14F-4D97-AF65-F5344CB8AC3E}">
-        <p14:creationId xmlns:p14="http://schemas.microsoft.com/office/powerpoint/2010/main" val="2419688936"/>
+        <p14:creationId xmlns:p14="http://schemas.microsoft.com/office/powerpoint/2010/main" val="2830877791"/>
       </p:ext>
     </p:extLst>
   </p:cSld>
@@ -856,11 +843,11 @@
           <a:bodyPr/>
           <a:lstStyle/>
           <a:p>
-            <a:fld id="{E93572D2-1BD6-954F-86C4-419D8535D635}" type="datetimeFigureOut">
+            <a:fld id="{A89845D4-B2ED-304C-AF78-76488BE9F915}" type="datetimeFigureOut">
               <a:rPr lang="en-GB" smtClean="0"/>
               <a:t>13/02/2019</a:t>
             </a:fld>
-            <a:endParaRPr lang="en-GB" dirty="0"/>
+            <a:endParaRPr lang="en-GB"/>
           </a:p>
         </p:txBody>
       </p:sp>
@@ -879,7 +866,7 @@
           <a:bodyPr/>
           <a:lstStyle/>
           <a:p>
-            <a:endParaRPr lang="en-GB" dirty="0"/>
+            <a:endParaRPr lang="en-GB"/>
           </a:p>
         </p:txBody>
       </p:sp>
@@ -898,18 +885,18 @@
           <a:bodyPr/>
           <a:lstStyle/>
           <a:p>
-            <a:fld id="{8EBCDA72-8231-1F4F-8A36-A4B0326CBB14}" type="slidenum">
+            <a:fld id="{A46F63F6-AF3A-4C4F-A332-A89ADE2DFFD5}" type="slidenum">
               <a:rPr lang="en-GB" smtClean="0"/>
               <a:t>‹#›</a:t>
             </a:fld>
-            <a:endParaRPr lang="en-GB" dirty="0"/>
+            <a:endParaRPr lang="en-GB"/>
           </a:p>
         </p:txBody>
       </p:sp>
     </p:spTree>
     <p:extLst>
       <p:ext uri="{BB962C8B-B14F-4D97-AF65-F5344CB8AC3E}">
-        <p14:creationId xmlns:p14="http://schemas.microsoft.com/office/powerpoint/2010/main" val="2370305626"/>
+        <p14:creationId xmlns:p14="http://schemas.microsoft.com/office/powerpoint/2010/main" val="708127155"/>
       </p:ext>
     </p:extLst>
   </p:cSld>
@@ -948,8 +935,8 @@
         </p:nvSpPr>
         <p:spPr>
           <a:xfrm>
-            <a:off x="15302658" y="804966"/>
-            <a:ext cx="4610844" cy="12812950"/>
+            <a:off x="9161146" y="511175"/>
+            <a:ext cx="2760345" cy="8136573"/>
           </a:xfrm>
         </p:spPr>
         <p:txBody>
@@ -976,8 +963,8 @@
         </p:nvSpPr>
         <p:spPr>
           <a:xfrm>
-            <a:off x="1470125" y="804966"/>
-            <a:ext cx="13565237" cy="12812950"/>
+            <a:off x="880111" y="511175"/>
+            <a:ext cx="8121015" cy="8136573"/>
           </a:xfrm>
         </p:spPr>
         <p:txBody>
@@ -1036,11 +1023,11 @@
           <a:bodyPr/>
           <a:lstStyle/>
           <a:p>
-            <a:fld id="{E93572D2-1BD6-954F-86C4-419D8535D635}" type="datetimeFigureOut">
+            <a:fld id="{A89845D4-B2ED-304C-AF78-76488BE9F915}" type="datetimeFigureOut">
               <a:rPr lang="en-GB" smtClean="0"/>
               <a:t>13/02/2019</a:t>
             </a:fld>
-            <a:endParaRPr lang="en-GB" dirty="0"/>
+            <a:endParaRPr lang="en-GB"/>
           </a:p>
         </p:txBody>
       </p:sp>
@@ -1059,7 +1046,7 @@
           <a:bodyPr/>
           <a:lstStyle/>
           <a:p>
-            <a:endParaRPr lang="en-GB" dirty="0"/>
+            <a:endParaRPr lang="en-GB"/>
           </a:p>
         </p:txBody>
       </p:sp>
@@ -1078,18 +1065,18 @@
           <a:bodyPr/>
           <a:lstStyle/>
           <a:p>
-            <a:fld id="{8EBCDA72-8231-1F4F-8A36-A4B0326CBB14}" type="slidenum">
+            <a:fld id="{A46F63F6-AF3A-4C4F-A332-A89ADE2DFFD5}" type="slidenum">
               <a:rPr lang="en-GB" smtClean="0"/>
               <a:t>‹#›</a:t>
             </a:fld>
-            <a:endParaRPr lang="en-GB" dirty="0"/>
+            <a:endParaRPr lang="en-GB"/>
           </a:p>
         </p:txBody>
       </p:sp>
     </p:spTree>
     <p:extLst>
       <p:ext uri="{BB962C8B-B14F-4D97-AF65-F5344CB8AC3E}">
-        <p14:creationId xmlns:p14="http://schemas.microsoft.com/office/powerpoint/2010/main" val="809799352"/>
+        <p14:creationId xmlns:p14="http://schemas.microsoft.com/office/powerpoint/2010/main" val="2552187929"/>
       </p:ext>
     </p:extLst>
   </p:cSld>
@@ -1206,11 +1193,11 @@
           <a:bodyPr/>
           <a:lstStyle/>
           <a:p>
-            <a:fld id="{E93572D2-1BD6-954F-86C4-419D8535D635}" type="datetimeFigureOut">
+            <a:fld id="{A89845D4-B2ED-304C-AF78-76488BE9F915}" type="datetimeFigureOut">
               <a:rPr lang="en-GB" smtClean="0"/>
               <a:t>13/02/2019</a:t>
             </a:fld>
-            <a:endParaRPr lang="en-GB" dirty="0"/>
+            <a:endParaRPr lang="en-GB"/>
           </a:p>
         </p:txBody>
       </p:sp>
@@ -1229,7 +1216,7 @@
           <a:bodyPr/>
           <a:lstStyle/>
           <a:p>
-            <a:endParaRPr lang="en-GB" dirty="0"/>
+            <a:endParaRPr lang="en-GB"/>
           </a:p>
         </p:txBody>
       </p:sp>
@@ -1248,18 +1235,18 @@
           <a:bodyPr/>
           <a:lstStyle/>
           <a:p>
-            <a:fld id="{8EBCDA72-8231-1F4F-8A36-A4B0326CBB14}" type="slidenum">
+            <a:fld id="{A46F63F6-AF3A-4C4F-A332-A89ADE2DFFD5}" type="slidenum">
               <a:rPr lang="en-GB" smtClean="0"/>
               <a:t>‹#›</a:t>
             </a:fld>
-            <a:endParaRPr lang="en-GB" dirty="0"/>
+            <a:endParaRPr lang="en-GB"/>
           </a:p>
         </p:txBody>
       </p:sp>
     </p:spTree>
     <p:extLst>
       <p:ext uri="{BB962C8B-B14F-4D97-AF65-F5344CB8AC3E}">
-        <p14:creationId xmlns:p14="http://schemas.microsoft.com/office/powerpoint/2010/main" val="1028124729"/>
+        <p14:creationId xmlns:p14="http://schemas.microsoft.com/office/powerpoint/2010/main" val="1534345289"/>
       </p:ext>
     </p:extLst>
   </p:cSld>
@@ -1298,15 +1285,15 @@
         </p:nvSpPr>
         <p:spPr>
           <a:xfrm>
-            <a:off x="1458988" y="3769342"/>
-            <a:ext cx="18443377" cy="6289229"/>
+            <a:off x="873443" y="2393635"/>
+            <a:ext cx="11041380" cy="3993832"/>
           </a:xfrm>
         </p:spPr>
         <p:txBody>
           <a:bodyPr anchor="b"/>
           <a:lstStyle>
             <a:lvl1pPr>
-              <a:defRPr sz="13228"/>
+              <a:defRPr sz="8400"/>
             </a:lvl1pPr>
           </a:lstStyle>
           <a:p>
@@ -1330,8 +1317,8 @@
         </p:nvSpPr>
         <p:spPr>
           <a:xfrm>
-            <a:off x="1458988" y="10118069"/>
-            <a:ext cx="18443377" cy="3307357"/>
+            <a:off x="873443" y="6425250"/>
+            <a:ext cx="11041380" cy="2100262"/>
           </a:xfrm>
         </p:spPr>
         <p:txBody>
@@ -1339,15 +1326,15 @@
           <a:lstStyle>
             <a:lvl1pPr marL="0" indent="0">
               <a:buNone/>
-              <a:defRPr sz="5291">
+              <a:defRPr sz="3360">
                 <a:solidFill>
                   <a:schemeClr val="tx1"/>
                 </a:solidFill>
               </a:defRPr>
             </a:lvl1pPr>
-            <a:lvl2pPr marL="1007943" indent="0">
-              <a:buNone/>
-              <a:defRPr sz="4409">
+            <a:lvl2pPr marL="640080" indent="0">
+              <a:buNone/>
+              <a:defRPr sz="2800">
                 <a:solidFill>
                   <a:schemeClr val="tx1">
                     <a:tint val="75000"/>
@@ -1355,9 +1342,9 @@
                 </a:solidFill>
               </a:defRPr>
             </a:lvl2pPr>
-            <a:lvl3pPr marL="2015886" indent="0">
-              <a:buNone/>
-              <a:defRPr sz="3968">
+            <a:lvl3pPr marL="1280160" indent="0">
+              <a:buNone/>
+              <a:defRPr sz="2520">
                 <a:solidFill>
                   <a:schemeClr val="tx1">
                     <a:tint val="75000"/>
@@ -1365,9 +1352,9 @@
                 </a:solidFill>
               </a:defRPr>
             </a:lvl3pPr>
-            <a:lvl4pPr marL="3023829" indent="0">
-              <a:buNone/>
-              <a:defRPr sz="3527">
+            <a:lvl4pPr marL="1920240" indent="0">
+              <a:buNone/>
+              <a:defRPr sz="2240">
                 <a:solidFill>
                   <a:schemeClr val="tx1">
                     <a:tint val="75000"/>
@@ -1375,9 +1362,9 @@
                 </a:solidFill>
               </a:defRPr>
             </a:lvl4pPr>
-            <a:lvl5pPr marL="4031772" indent="0">
-              <a:buNone/>
-              <a:defRPr sz="3527">
+            <a:lvl5pPr marL="2560320" indent="0">
+              <a:buNone/>
+              <a:defRPr sz="2240">
                 <a:solidFill>
                   <a:schemeClr val="tx1">
                     <a:tint val="75000"/>
@@ -1385,9 +1372,9 @@
                 </a:solidFill>
               </a:defRPr>
             </a:lvl5pPr>
-            <a:lvl6pPr marL="5039716" indent="0">
-              <a:buNone/>
-              <a:defRPr sz="3527">
+            <a:lvl6pPr marL="3200400" indent="0">
+              <a:buNone/>
+              <a:defRPr sz="2240">
                 <a:solidFill>
                   <a:schemeClr val="tx1">
                     <a:tint val="75000"/>
@@ -1395,9 +1382,9 @@
                 </a:solidFill>
               </a:defRPr>
             </a:lvl6pPr>
-            <a:lvl7pPr marL="6047659" indent="0">
-              <a:buNone/>
-              <a:defRPr sz="3527">
+            <a:lvl7pPr marL="3840480" indent="0">
+              <a:buNone/>
+              <a:defRPr sz="2240">
                 <a:solidFill>
                   <a:schemeClr val="tx1">
                     <a:tint val="75000"/>
@@ -1405,9 +1392,9 @@
                 </a:solidFill>
               </a:defRPr>
             </a:lvl7pPr>
-            <a:lvl8pPr marL="7055602" indent="0">
-              <a:buNone/>
-              <a:defRPr sz="3527">
+            <a:lvl8pPr marL="4480560" indent="0">
+              <a:buNone/>
+              <a:defRPr sz="2240">
                 <a:solidFill>
                   <a:schemeClr val="tx1">
                     <a:tint val="75000"/>
@@ -1415,9 +1402,9 @@
                 </a:solidFill>
               </a:defRPr>
             </a:lvl8pPr>
-            <a:lvl9pPr marL="8063545" indent="0">
-              <a:buNone/>
-              <a:defRPr sz="3527">
+            <a:lvl9pPr marL="5120640" indent="0">
+              <a:buNone/>
+              <a:defRPr sz="2240">
                 <a:solidFill>
                   <a:schemeClr val="tx1">
                     <a:tint val="75000"/>
@@ -1450,11 +1437,11 @@
           <a:bodyPr/>
           <a:lstStyle/>
           <a:p>
-            <a:fld id="{E93572D2-1BD6-954F-86C4-419D8535D635}" type="datetimeFigureOut">
+            <a:fld id="{A89845D4-B2ED-304C-AF78-76488BE9F915}" type="datetimeFigureOut">
               <a:rPr lang="en-GB" smtClean="0"/>
               <a:t>13/02/2019</a:t>
             </a:fld>
-            <a:endParaRPr lang="en-GB" dirty="0"/>
+            <a:endParaRPr lang="en-GB"/>
           </a:p>
         </p:txBody>
       </p:sp>
@@ -1473,7 +1460,7 @@
           <a:bodyPr/>
           <a:lstStyle/>
           <a:p>
-            <a:endParaRPr lang="en-GB" dirty="0"/>
+            <a:endParaRPr lang="en-GB"/>
           </a:p>
         </p:txBody>
       </p:sp>
@@ -1492,18 +1479,18 @@
           <a:bodyPr/>
           <a:lstStyle/>
           <a:p>
-            <a:fld id="{8EBCDA72-8231-1F4F-8A36-A4B0326CBB14}" type="slidenum">
+            <a:fld id="{A46F63F6-AF3A-4C4F-A332-A89ADE2DFFD5}" type="slidenum">
               <a:rPr lang="en-GB" smtClean="0"/>
               <a:t>‹#›</a:t>
             </a:fld>
-            <a:endParaRPr lang="en-GB" dirty="0"/>
+            <a:endParaRPr lang="en-GB"/>
           </a:p>
         </p:txBody>
       </p:sp>
     </p:spTree>
     <p:extLst>
       <p:ext uri="{BB962C8B-B14F-4D97-AF65-F5344CB8AC3E}">
-        <p14:creationId xmlns:p14="http://schemas.microsoft.com/office/powerpoint/2010/main" val="496439213"/>
+        <p14:creationId xmlns:p14="http://schemas.microsoft.com/office/powerpoint/2010/main" val="3659787844"/>
       </p:ext>
     </p:extLst>
   </p:cSld>
@@ -1565,8 +1552,8 @@
         </p:nvSpPr>
         <p:spPr>
           <a:xfrm>
-            <a:off x="1470124" y="4024827"/>
-            <a:ext cx="9088041" cy="9593089"/>
+            <a:off x="880110" y="2555875"/>
+            <a:ext cx="5440680" cy="6091873"/>
           </a:xfrm>
         </p:spPr>
         <p:txBody>
@@ -1622,8 +1609,8 @@
         </p:nvSpPr>
         <p:spPr>
           <a:xfrm>
-            <a:off x="10825460" y="4024827"/>
-            <a:ext cx="9088041" cy="9593089"/>
+            <a:off x="6480810" y="2555875"/>
+            <a:ext cx="5440680" cy="6091873"/>
           </a:xfrm>
         </p:spPr>
         <p:txBody>
@@ -1682,11 +1669,11 @@
           <a:bodyPr/>
           <a:lstStyle/>
           <a:p>
-            <a:fld id="{E93572D2-1BD6-954F-86C4-419D8535D635}" type="datetimeFigureOut">
+            <a:fld id="{A89845D4-B2ED-304C-AF78-76488BE9F915}" type="datetimeFigureOut">
               <a:rPr lang="en-GB" smtClean="0"/>
               <a:t>13/02/2019</a:t>
             </a:fld>
-            <a:endParaRPr lang="en-GB" dirty="0"/>
+            <a:endParaRPr lang="en-GB"/>
           </a:p>
         </p:txBody>
       </p:sp>
@@ -1705,7 +1692,7 @@
           <a:bodyPr/>
           <a:lstStyle/>
           <a:p>
-            <a:endParaRPr lang="en-GB" dirty="0"/>
+            <a:endParaRPr lang="en-GB"/>
           </a:p>
         </p:txBody>
       </p:sp>
@@ -1724,18 +1711,18 @@
           <a:bodyPr/>
           <a:lstStyle/>
           <a:p>
-            <a:fld id="{8EBCDA72-8231-1F4F-8A36-A4B0326CBB14}" type="slidenum">
+            <a:fld id="{A46F63F6-AF3A-4C4F-A332-A89ADE2DFFD5}" type="slidenum">
               <a:rPr lang="en-GB" smtClean="0"/>
               <a:t>‹#›</a:t>
             </a:fld>
-            <a:endParaRPr lang="en-GB" dirty="0"/>
+            <a:endParaRPr lang="en-GB"/>
           </a:p>
         </p:txBody>
       </p:sp>
     </p:spTree>
     <p:extLst>
       <p:ext uri="{BB962C8B-B14F-4D97-AF65-F5344CB8AC3E}">
-        <p14:creationId xmlns:p14="http://schemas.microsoft.com/office/powerpoint/2010/main" val="637726627"/>
+        <p14:creationId xmlns:p14="http://schemas.microsoft.com/office/powerpoint/2010/main" val="219750533"/>
       </p:ext>
     </p:extLst>
   </p:cSld>
@@ -1774,8 +1761,8 @@
         </p:nvSpPr>
         <p:spPr>
           <a:xfrm>
-            <a:off x="1472909" y="804969"/>
-            <a:ext cx="18443377" cy="2922375"/>
+            <a:off x="881777" y="511177"/>
+            <a:ext cx="11041380" cy="1855788"/>
           </a:xfrm>
         </p:spPr>
         <p:txBody>
@@ -1802,8 +1789,8 @@
         </p:nvSpPr>
         <p:spPr>
           <a:xfrm>
-            <a:off x="1472912" y="3706342"/>
-            <a:ext cx="9046274" cy="1816421"/>
+            <a:off x="881779" y="2353628"/>
+            <a:ext cx="5415676" cy="1153477"/>
           </a:xfrm>
         </p:spPr>
         <p:txBody>
@@ -1811,39 +1798,39 @@
           <a:lstStyle>
             <a:lvl1pPr marL="0" indent="0">
               <a:buNone/>
-              <a:defRPr sz="5291" b="1"/>
+              <a:defRPr sz="3360" b="1"/>
             </a:lvl1pPr>
-            <a:lvl2pPr marL="1007943" indent="0">
-              <a:buNone/>
-              <a:defRPr sz="4409" b="1"/>
+            <a:lvl2pPr marL="640080" indent="0">
+              <a:buNone/>
+              <a:defRPr sz="2800" b="1"/>
             </a:lvl2pPr>
-            <a:lvl3pPr marL="2015886" indent="0">
-              <a:buNone/>
-              <a:defRPr sz="3968" b="1"/>
+            <a:lvl3pPr marL="1280160" indent="0">
+              <a:buNone/>
+              <a:defRPr sz="2520" b="1"/>
             </a:lvl3pPr>
-            <a:lvl4pPr marL="3023829" indent="0">
-              <a:buNone/>
-              <a:defRPr sz="3527" b="1"/>
+            <a:lvl4pPr marL="1920240" indent="0">
+              <a:buNone/>
+              <a:defRPr sz="2240" b="1"/>
             </a:lvl4pPr>
-            <a:lvl5pPr marL="4031772" indent="0">
-              <a:buNone/>
-              <a:defRPr sz="3527" b="1"/>
+            <a:lvl5pPr marL="2560320" indent="0">
+              <a:buNone/>
+              <a:defRPr sz="2240" b="1"/>
             </a:lvl5pPr>
-            <a:lvl6pPr marL="5039716" indent="0">
-              <a:buNone/>
-              <a:defRPr sz="3527" b="1"/>
+            <a:lvl6pPr marL="3200400" indent="0">
+              <a:buNone/>
+              <a:defRPr sz="2240" b="1"/>
             </a:lvl6pPr>
-            <a:lvl7pPr marL="6047659" indent="0">
-              <a:buNone/>
-              <a:defRPr sz="3527" b="1"/>
+            <a:lvl7pPr marL="3840480" indent="0">
+              <a:buNone/>
+              <a:defRPr sz="2240" b="1"/>
             </a:lvl7pPr>
-            <a:lvl8pPr marL="7055602" indent="0">
-              <a:buNone/>
-              <a:defRPr sz="3527" b="1"/>
+            <a:lvl8pPr marL="4480560" indent="0">
+              <a:buNone/>
+              <a:defRPr sz="2240" b="1"/>
             </a:lvl8pPr>
-            <a:lvl9pPr marL="8063545" indent="0">
-              <a:buNone/>
-              <a:defRPr sz="3527" b="1"/>
+            <a:lvl9pPr marL="5120640" indent="0">
+              <a:buNone/>
+              <a:defRPr sz="2240" b="1"/>
             </a:lvl9pPr>
           </a:lstStyle>
           <a:p>
@@ -1867,8 +1854,8 @@
         </p:nvSpPr>
         <p:spPr>
           <a:xfrm>
-            <a:off x="1472912" y="5522763"/>
-            <a:ext cx="9046274" cy="8123152"/>
+            <a:off x="881779" y="3507105"/>
+            <a:ext cx="5415676" cy="5158423"/>
           </a:xfrm>
         </p:spPr>
         <p:txBody>
@@ -1924,8 +1911,8 @@
         </p:nvSpPr>
         <p:spPr>
           <a:xfrm>
-            <a:off x="10825461" y="3706342"/>
-            <a:ext cx="9090826" cy="1816421"/>
+            <a:off x="6480811" y="2353628"/>
+            <a:ext cx="5442347" cy="1153477"/>
           </a:xfrm>
         </p:spPr>
         <p:txBody>
@@ -1933,39 +1920,39 @@
           <a:lstStyle>
             <a:lvl1pPr marL="0" indent="0">
               <a:buNone/>
-              <a:defRPr sz="5291" b="1"/>
+              <a:defRPr sz="3360" b="1"/>
             </a:lvl1pPr>
-            <a:lvl2pPr marL="1007943" indent="0">
-              <a:buNone/>
-              <a:defRPr sz="4409" b="1"/>
+            <a:lvl2pPr marL="640080" indent="0">
+              <a:buNone/>
+              <a:defRPr sz="2800" b="1"/>
             </a:lvl2pPr>
-            <a:lvl3pPr marL="2015886" indent="0">
-              <a:buNone/>
-              <a:defRPr sz="3968" b="1"/>
+            <a:lvl3pPr marL="1280160" indent="0">
+              <a:buNone/>
+              <a:defRPr sz="2520" b="1"/>
             </a:lvl3pPr>
-            <a:lvl4pPr marL="3023829" indent="0">
-              <a:buNone/>
-              <a:defRPr sz="3527" b="1"/>
+            <a:lvl4pPr marL="1920240" indent="0">
+              <a:buNone/>
+              <a:defRPr sz="2240" b="1"/>
             </a:lvl4pPr>
-            <a:lvl5pPr marL="4031772" indent="0">
-              <a:buNone/>
-              <a:defRPr sz="3527" b="1"/>
+            <a:lvl5pPr marL="2560320" indent="0">
+              <a:buNone/>
+              <a:defRPr sz="2240" b="1"/>
             </a:lvl5pPr>
-            <a:lvl6pPr marL="5039716" indent="0">
-              <a:buNone/>
-              <a:defRPr sz="3527" b="1"/>
+            <a:lvl6pPr marL="3200400" indent="0">
+              <a:buNone/>
+              <a:defRPr sz="2240" b="1"/>
             </a:lvl6pPr>
-            <a:lvl7pPr marL="6047659" indent="0">
-              <a:buNone/>
-              <a:defRPr sz="3527" b="1"/>
+            <a:lvl7pPr marL="3840480" indent="0">
+              <a:buNone/>
+              <a:defRPr sz="2240" b="1"/>
             </a:lvl7pPr>
-            <a:lvl8pPr marL="7055602" indent="0">
-              <a:buNone/>
-              <a:defRPr sz="3527" b="1"/>
+            <a:lvl8pPr marL="4480560" indent="0">
+              <a:buNone/>
+              <a:defRPr sz="2240" b="1"/>
             </a:lvl8pPr>
-            <a:lvl9pPr marL="8063545" indent="0">
-              <a:buNone/>
-              <a:defRPr sz="3527" b="1"/>
+            <a:lvl9pPr marL="5120640" indent="0">
+              <a:buNone/>
+              <a:defRPr sz="2240" b="1"/>
             </a:lvl9pPr>
           </a:lstStyle>
           <a:p>
@@ -1989,8 +1976,8 @@
         </p:nvSpPr>
         <p:spPr>
           <a:xfrm>
-            <a:off x="10825461" y="5522763"/>
-            <a:ext cx="9090826" cy="8123152"/>
+            <a:off x="6480811" y="3507105"/>
+            <a:ext cx="5442347" cy="5158423"/>
           </a:xfrm>
         </p:spPr>
         <p:txBody>
@@ -2049,11 +2036,11 @@
           <a:bodyPr/>
           <a:lstStyle/>
           <a:p>
-            <a:fld id="{E93572D2-1BD6-954F-86C4-419D8535D635}" type="datetimeFigureOut">
+            <a:fld id="{A89845D4-B2ED-304C-AF78-76488BE9F915}" type="datetimeFigureOut">
               <a:rPr lang="en-GB" smtClean="0"/>
               <a:t>13/02/2019</a:t>
             </a:fld>
-            <a:endParaRPr lang="en-GB" dirty="0"/>
+            <a:endParaRPr lang="en-GB"/>
           </a:p>
         </p:txBody>
       </p:sp>
@@ -2072,7 +2059,7 @@
           <a:bodyPr/>
           <a:lstStyle/>
           <a:p>
-            <a:endParaRPr lang="en-GB" dirty="0"/>
+            <a:endParaRPr lang="en-GB"/>
           </a:p>
         </p:txBody>
       </p:sp>
@@ -2091,18 +2078,18 @@
           <a:bodyPr/>
           <a:lstStyle/>
           <a:p>
-            <a:fld id="{8EBCDA72-8231-1F4F-8A36-A4B0326CBB14}" type="slidenum">
+            <a:fld id="{A46F63F6-AF3A-4C4F-A332-A89ADE2DFFD5}" type="slidenum">
               <a:rPr lang="en-GB" smtClean="0"/>
               <a:t>‹#›</a:t>
             </a:fld>
-            <a:endParaRPr lang="en-GB" dirty="0"/>
+            <a:endParaRPr lang="en-GB"/>
           </a:p>
         </p:txBody>
       </p:sp>
     </p:spTree>
     <p:extLst>
       <p:ext uri="{BB962C8B-B14F-4D97-AF65-F5344CB8AC3E}">
-        <p14:creationId xmlns:p14="http://schemas.microsoft.com/office/powerpoint/2010/main" val="2010321731"/>
+        <p14:creationId xmlns:p14="http://schemas.microsoft.com/office/powerpoint/2010/main" val="1536117661"/>
       </p:ext>
     </p:extLst>
   </p:cSld>
@@ -2167,11 +2154,11 @@
           <a:bodyPr/>
           <a:lstStyle/>
           <a:p>
-            <a:fld id="{E93572D2-1BD6-954F-86C4-419D8535D635}" type="datetimeFigureOut">
+            <a:fld id="{A89845D4-B2ED-304C-AF78-76488BE9F915}" type="datetimeFigureOut">
               <a:rPr lang="en-GB" smtClean="0"/>
               <a:t>13/02/2019</a:t>
             </a:fld>
-            <a:endParaRPr lang="en-GB" dirty="0"/>
+            <a:endParaRPr lang="en-GB"/>
           </a:p>
         </p:txBody>
       </p:sp>
@@ -2190,7 +2177,7 @@
           <a:bodyPr/>
           <a:lstStyle/>
           <a:p>
-            <a:endParaRPr lang="en-GB" dirty="0"/>
+            <a:endParaRPr lang="en-GB"/>
           </a:p>
         </p:txBody>
       </p:sp>
@@ -2209,18 +2196,18 @@
           <a:bodyPr/>
           <a:lstStyle/>
           <a:p>
-            <a:fld id="{8EBCDA72-8231-1F4F-8A36-A4B0326CBB14}" type="slidenum">
+            <a:fld id="{A46F63F6-AF3A-4C4F-A332-A89ADE2DFFD5}" type="slidenum">
               <a:rPr lang="en-GB" smtClean="0"/>
               <a:t>‹#›</a:t>
             </a:fld>
-            <a:endParaRPr lang="en-GB" dirty="0"/>
+            <a:endParaRPr lang="en-GB"/>
           </a:p>
         </p:txBody>
       </p:sp>
     </p:spTree>
     <p:extLst>
       <p:ext uri="{BB962C8B-B14F-4D97-AF65-F5344CB8AC3E}">
-        <p14:creationId xmlns:p14="http://schemas.microsoft.com/office/powerpoint/2010/main" val="331823076"/>
+        <p14:creationId xmlns:p14="http://schemas.microsoft.com/office/powerpoint/2010/main" val="1913242079"/>
       </p:ext>
     </p:extLst>
   </p:cSld>
@@ -2262,11 +2249,11 @@
           <a:bodyPr/>
           <a:lstStyle/>
           <a:p>
-            <a:fld id="{E93572D2-1BD6-954F-86C4-419D8535D635}" type="datetimeFigureOut">
+            <a:fld id="{A89845D4-B2ED-304C-AF78-76488BE9F915}" type="datetimeFigureOut">
               <a:rPr lang="en-GB" smtClean="0"/>
               <a:t>13/02/2019</a:t>
             </a:fld>
-            <a:endParaRPr lang="en-GB" dirty="0"/>
+            <a:endParaRPr lang="en-GB"/>
           </a:p>
         </p:txBody>
       </p:sp>
@@ -2285,7 +2272,7 @@
           <a:bodyPr/>
           <a:lstStyle/>
           <a:p>
-            <a:endParaRPr lang="en-GB" dirty="0"/>
+            <a:endParaRPr lang="en-GB"/>
           </a:p>
         </p:txBody>
       </p:sp>
@@ -2304,18 +2291,18 @@
           <a:bodyPr/>
           <a:lstStyle/>
           <a:p>
-            <a:fld id="{8EBCDA72-8231-1F4F-8A36-A4B0326CBB14}" type="slidenum">
+            <a:fld id="{A46F63F6-AF3A-4C4F-A332-A89ADE2DFFD5}" type="slidenum">
               <a:rPr lang="en-GB" smtClean="0"/>
               <a:t>‹#›</a:t>
             </a:fld>
-            <a:endParaRPr lang="en-GB" dirty="0"/>
+            <a:endParaRPr lang="en-GB"/>
           </a:p>
         </p:txBody>
       </p:sp>
     </p:spTree>
     <p:extLst>
       <p:ext uri="{BB962C8B-B14F-4D97-AF65-F5344CB8AC3E}">
-        <p14:creationId xmlns:p14="http://schemas.microsoft.com/office/powerpoint/2010/main" val="3936642022"/>
+        <p14:creationId xmlns:p14="http://schemas.microsoft.com/office/powerpoint/2010/main" val="2810415177"/>
       </p:ext>
     </p:extLst>
   </p:cSld>
@@ -2354,15 +2341,15 @@
         </p:nvSpPr>
         <p:spPr>
           <a:xfrm>
-            <a:off x="1472909" y="1007957"/>
-            <a:ext cx="6896776" cy="3527848"/>
+            <a:off x="881778" y="640080"/>
+            <a:ext cx="4128849" cy="2240280"/>
           </a:xfrm>
         </p:spPr>
         <p:txBody>
           <a:bodyPr anchor="b"/>
           <a:lstStyle>
             <a:lvl1pPr>
-              <a:defRPr sz="7055"/>
+              <a:defRPr sz="4480"/>
             </a:lvl1pPr>
           </a:lstStyle>
           <a:p>
@@ -2386,39 +2373,39 @@
         </p:nvSpPr>
         <p:spPr>
           <a:xfrm>
-            <a:off x="9090826" y="2176910"/>
-            <a:ext cx="10825460" cy="10744538"/>
+            <a:off x="5442347" y="1382397"/>
+            <a:ext cx="6480810" cy="6823075"/>
           </a:xfrm>
         </p:spPr>
         <p:txBody>
           <a:bodyPr/>
           <a:lstStyle>
             <a:lvl1pPr>
-              <a:defRPr sz="7055"/>
+              <a:defRPr sz="4480"/>
             </a:lvl1pPr>
             <a:lvl2pPr>
-              <a:defRPr sz="6173"/>
+              <a:defRPr sz="3920"/>
             </a:lvl2pPr>
             <a:lvl3pPr>
-              <a:defRPr sz="5291"/>
+              <a:defRPr sz="3360"/>
             </a:lvl3pPr>
             <a:lvl4pPr>
-              <a:defRPr sz="4409"/>
+              <a:defRPr sz="2800"/>
             </a:lvl4pPr>
             <a:lvl5pPr>
-              <a:defRPr sz="4409"/>
+              <a:defRPr sz="2800"/>
             </a:lvl5pPr>
             <a:lvl6pPr>
-              <a:defRPr sz="4409"/>
+              <a:defRPr sz="2800"/>
             </a:lvl6pPr>
             <a:lvl7pPr>
-              <a:defRPr sz="4409"/>
+              <a:defRPr sz="2800"/>
             </a:lvl7pPr>
             <a:lvl8pPr>
-              <a:defRPr sz="4409"/>
+              <a:defRPr sz="2800"/>
             </a:lvl8pPr>
             <a:lvl9pPr>
-              <a:defRPr sz="4409"/>
+              <a:defRPr sz="2800"/>
             </a:lvl9pPr>
           </a:lstStyle>
           <a:p>
@@ -2471,8 +2458,8 @@
         </p:nvSpPr>
         <p:spPr>
           <a:xfrm>
-            <a:off x="1472909" y="4535805"/>
-            <a:ext cx="6896776" cy="8403140"/>
+            <a:off x="881778" y="2880360"/>
+            <a:ext cx="4128849" cy="5336223"/>
           </a:xfrm>
         </p:spPr>
         <p:txBody>
@@ -2480,39 +2467,39 @@
           <a:lstStyle>
             <a:lvl1pPr marL="0" indent="0">
               <a:buNone/>
-              <a:defRPr sz="3527"/>
+              <a:defRPr sz="2240"/>
             </a:lvl1pPr>
-            <a:lvl2pPr marL="1007943" indent="0">
-              <a:buNone/>
-              <a:defRPr sz="3086"/>
+            <a:lvl2pPr marL="640080" indent="0">
+              <a:buNone/>
+              <a:defRPr sz="1960"/>
             </a:lvl2pPr>
-            <a:lvl3pPr marL="2015886" indent="0">
-              <a:buNone/>
-              <a:defRPr sz="2646"/>
+            <a:lvl3pPr marL="1280160" indent="0">
+              <a:buNone/>
+              <a:defRPr sz="1680"/>
             </a:lvl3pPr>
-            <a:lvl4pPr marL="3023829" indent="0">
-              <a:buNone/>
-              <a:defRPr sz="2205"/>
+            <a:lvl4pPr marL="1920240" indent="0">
+              <a:buNone/>
+              <a:defRPr sz="1400"/>
             </a:lvl4pPr>
-            <a:lvl5pPr marL="4031772" indent="0">
-              <a:buNone/>
-              <a:defRPr sz="2205"/>
+            <a:lvl5pPr marL="2560320" indent="0">
+              <a:buNone/>
+              <a:defRPr sz="1400"/>
             </a:lvl5pPr>
-            <a:lvl6pPr marL="5039716" indent="0">
-              <a:buNone/>
-              <a:defRPr sz="2205"/>
+            <a:lvl6pPr marL="3200400" indent="0">
+              <a:buNone/>
+              <a:defRPr sz="1400"/>
             </a:lvl6pPr>
-            <a:lvl7pPr marL="6047659" indent="0">
-              <a:buNone/>
-              <a:defRPr sz="2205"/>
+            <a:lvl7pPr marL="3840480" indent="0">
+              <a:buNone/>
+              <a:defRPr sz="1400"/>
             </a:lvl7pPr>
-            <a:lvl8pPr marL="7055602" indent="0">
-              <a:buNone/>
-              <a:defRPr sz="2205"/>
+            <a:lvl8pPr marL="4480560" indent="0">
+              <a:buNone/>
+              <a:defRPr sz="1400"/>
             </a:lvl8pPr>
-            <a:lvl9pPr marL="8063545" indent="0">
-              <a:buNone/>
-              <a:defRPr sz="2205"/>
+            <a:lvl9pPr marL="5120640" indent="0">
+              <a:buNone/>
+              <a:defRPr sz="1400"/>
             </a:lvl9pPr>
           </a:lstStyle>
           <a:p>
@@ -2539,11 +2526,11 @@
           <a:bodyPr/>
           <a:lstStyle/>
           <a:p>
-            <a:fld id="{E93572D2-1BD6-954F-86C4-419D8535D635}" type="datetimeFigureOut">
+            <a:fld id="{A89845D4-B2ED-304C-AF78-76488BE9F915}" type="datetimeFigureOut">
               <a:rPr lang="en-GB" smtClean="0"/>
               <a:t>13/02/2019</a:t>
             </a:fld>
-            <a:endParaRPr lang="en-GB" dirty="0"/>
+            <a:endParaRPr lang="en-GB"/>
           </a:p>
         </p:txBody>
       </p:sp>
@@ -2562,7 +2549,7 @@
           <a:bodyPr/>
           <a:lstStyle/>
           <a:p>
-            <a:endParaRPr lang="en-GB" dirty="0"/>
+            <a:endParaRPr lang="en-GB"/>
           </a:p>
         </p:txBody>
       </p:sp>
@@ -2581,18 +2568,18 @@
           <a:bodyPr/>
           <a:lstStyle/>
           <a:p>
-            <a:fld id="{8EBCDA72-8231-1F4F-8A36-A4B0326CBB14}" type="slidenum">
+            <a:fld id="{A46F63F6-AF3A-4C4F-A332-A89ADE2DFFD5}" type="slidenum">
               <a:rPr lang="en-GB" smtClean="0"/>
               <a:t>‹#›</a:t>
             </a:fld>
-            <a:endParaRPr lang="en-GB" dirty="0"/>
+            <a:endParaRPr lang="en-GB"/>
           </a:p>
         </p:txBody>
       </p:sp>
     </p:spTree>
     <p:extLst>
       <p:ext uri="{BB962C8B-B14F-4D97-AF65-F5344CB8AC3E}">
-        <p14:creationId xmlns:p14="http://schemas.microsoft.com/office/powerpoint/2010/main" val="131337154"/>
+        <p14:creationId xmlns:p14="http://schemas.microsoft.com/office/powerpoint/2010/main" val="821825096"/>
       </p:ext>
     </p:extLst>
   </p:cSld>
@@ -2631,15 +2618,15 @@
         </p:nvSpPr>
         <p:spPr>
           <a:xfrm>
-            <a:off x="1472909" y="1007957"/>
-            <a:ext cx="6896776" cy="3527848"/>
+            <a:off x="881778" y="640080"/>
+            <a:ext cx="4128849" cy="2240280"/>
           </a:xfrm>
         </p:spPr>
         <p:txBody>
           <a:bodyPr anchor="b"/>
           <a:lstStyle>
             <a:lvl1pPr>
-              <a:defRPr sz="7055"/>
+              <a:defRPr sz="4480"/>
             </a:lvl1pPr>
           </a:lstStyle>
           <a:p>
@@ -2663,8 +2650,8 @@
         </p:nvSpPr>
         <p:spPr>
           <a:xfrm>
-            <a:off x="9090826" y="2176910"/>
-            <a:ext cx="10825460" cy="10744538"/>
+            <a:off x="5442347" y="1382397"/>
+            <a:ext cx="6480810" cy="6823075"/>
           </a:xfrm>
         </p:spPr>
         <p:txBody>
@@ -2672,39 +2659,39 @@
           <a:lstStyle>
             <a:lvl1pPr marL="0" indent="0">
               <a:buNone/>
-              <a:defRPr sz="7055"/>
+              <a:defRPr sz="4480"/>
             </a:lvl1pPr>
-            <a:lvl2pPr marL="1007943" indent="0">
-              <a:buNone/>
-              <a:defRPr sz="6173"/>
+            <a:lvl2pPr marL="640080" indent="0">
+              <a:buNone/>
+              <a:defRPr sz="3920"/>
             </a:lvl2pPr>
-            <a:lvl3pPr marL="2015886" indent="0">
-              <a:buNone/>
-              <a:defRPr sz="5291"/>
+            <a:lvl3pPr marL="1280160" indent="0">
+              <a:buNone/>
+              <a:defRPr sz="3360"/>
             </a:lvl3pPr>
-            <a:lvl4pPr marL="3023829" indent="0">
-              <a:buNone/>
-              <a:defRPr sz="4409"/>
+            <a:lvl4pPr marL="1920240" indent="0">
+              <a:buNone/>
+              <a:defRPr sz="2800"/>
             </a:lvl4pPr>
-            <a:lvl5pPr marL="4031772" indent="0">
-              <a:buNone/>
-              <a:defRPr sz="4409"/>
+            <a:lvl5pPr marL="2560320" indent="0">
+              <a:buNone/>
+              <a:defRPr sz="2800"/>
             </a:lvl5pPr>
-            <a:lvl6pPr marL="5039716" indent="0">
-              <a:buNone/>
-              <a:defRPr sz="4409"/>
+            <a:lvl6pPr marL="3200400" indent="0">
+              <a:buNone/>
+              <a:defRPr sz="2800"/>
             </a:lvl6pPr>
-            <a:lvl7pPr marL="6047659" indent="0">
-              <a:buNone/>
-              <a:defRPr sz="4409"/>
+            <a:lvl7pPr marL="3840480" indent="0">
+              <a:buNone/>
+              <a:defRPr sz="2800"/>
             </a:lvl7pPr>
-            <a:lvl8pPr marL="7055602" indent="0">
-              <a:buNone/>
-              <a:defRPr sz="4409"/>
+            <a:lvl8pPr marL="4480560" indent="0">
+              <a:buNone/>
+              <a:defRPr sz="2800"/>
             </a:lvl8pPr>
-            <a:lvl9pPr marL="8063545" indent="0">
-              <a:buNone/>
-              <a:defRPr sz="4409"/>
+            <a:lvl9pPr marL="5120640" indent="0">
+              <a:buNone/>
+              <a:defRPr sz="2800"/>
             </a:lvl9pPr>
           </a:lstStyle>
           <a:p>
@@ -2728,8 +2715,8 @@
         </p:nvSpPr>
         <p:spPr>
           <a:xfrm>
-            <a:off x="1472909" y="4535805"/>
-            <a:ext cx="6896776" cy="8403140"/>
+            <a:off x="881778" y="2880360"/>
+            <a:ext cx="4128849" cy="5336223"/>
           </a:xfrm>
         </p:spPr>
         <p:txBody>
@@ -2737,39 +2724,39 @@
           <a:lstStyle>
             <a:lvl1pPr marL="0" indent="0">
               <a:buNone/>
-              <a:defRPr sz="3527"/>
+              <a:defRPr sz="2240"/>
             </a:lvl1pPr>
-            <a:lvl2pPr marL="1007943" indent="0">
-              <a:buNone/>
-              <a:defRPr sz="3086"/>
+            <a:lvl2pPr marL="640080" indent="0">
+              <a:buNone/>
+              <a:defRPr sz="1960"/>
             </a:lvl2pPr>
-            <a:lvl3pPr marL="2015886" indent="0">
-              <a:buNone/>
-              <a:defRPr sz="2646"/>
+            <a:lvl3pPr marL="1280160" indent="0">
+              <a:buNone/>
+              <a:defRPr sz="1680"/>
             </a:lvl3pPr>
-            <a:lvl4pPr marL="3023829" indent="0">
-              <a:buNone/>
-              <a:defRPr sz="2205"/>
+            <a:lvl4pPr marL="1920240" indent="0">
+              <a:buNone/>
+              <a:defRPr sz="1400"/>
             </a:lvl4pPr>
-            <a:lvl5pPr marL="4031772" indent="0">
-              <a:buNone/>
-              <a:defRPr sz="2205"/>
+            <a:lvl5pPr marL="2560320" indent="0">
+              <a:buNone/>
+              <a:defRPr sz="1400"/>
             </a:lvl5pPr>
-            <a:lvl6pPr marL="5039716" indent="0">
-              <a:buNone/>
-              <a:defRPr sz="2205"/>
+            <a:lvl6pPr marL="3200400" indent="0">
+              <a:buNone/>
+              <a:defRPr sz="1400"/>
             </a:lvl6pPr>
-            <a:lvl7pPr marL="6047659" indent="0">
-              <a:buNone/>
-              <a:defRPr sz="2205"/>
+            <a:lvl7pPr marL="3840480" indent="0">
+              <a:buNone/>
+              <a:defRPr sz="1400"/>
             </a:lvl7pPr>
-            <a:lvl8pPr marL="7055602" indent="0">
-              <a:buNone/>
-              <a:defRPr sz="2205"/>
+            <a:lvl8pPr marL="4480560" indent="0">
+              <a:buNone/>
+              <a:defRPr sz="1400"/>
             </a:lvl8pPr>
-            <a:lvl9pPr marL="8063545" indent="0">
-              <a:buNone/>
-              <a:defRPr sz="2205"/>
+            <a:lvl9pPr marL="5120640" indent="0">
+              <a:buNone/>
+              <a:defRPr sz="1400"/>
             </a:lvl9pPr>
           </a:lstStyle>
           <a:p>
@@ -2796,11 +2783,11 @@
           <a:bodyPr/>
           <a:lstStyle/>
           <a:p>
-            <a:fld id="{E93572D2-1BD6-954F-86C4-419D8535D635}" type="datetimeFigureOut">
+            <a:fld id="{A89845D4-B2ED-304C-AF78-76488BE9F915}" type="datetimeFigureOut">
               <a:rPr lang="en-GB" smtClean="0"/>
               <a:t>13/02/2019</a:t>
             </a:fld>
-            <a:endParaRPr lang="en-GB" dirty="0"/>
+            <a:endParaRPr lang="en-GB"/>
           </a:p>
         </p:txBody>
       </p:sp>
@@ -2819,7 +2806,7 @@
           <a:bodyPr/>
           <a:lstStyle/>
           <a:p>
-            <a:endParaRPr lang="en-GB" dirty="0"/>
+            <a:endParaRPr lang="en-GB"/>
           </a:p>
         </p:txBody>
       </p:sp>
@@ -2838,18 +2825,18 @@
           <a:bodyPr/>
           <a:lstStyle/>
           <a:p>
-            <a:fld id="{8EBCDA72-8231-1F4F-8A36-A4B0326CBB14}" type="slidenum">
+            <a:fld id="{A46F63F6-AF3A-4C4F-A332-A89ADE2DFFD5}" type="slidenum">
               <a:rPr lang="en-GB" smtClean="0"/>
               <a:t>‹#›</a:t>
             </a:fld>
-            <a:endParaRPr lang="en-GB" dirty="0"/>
+            <a:endParaRPr lang="en-GB"/>
           </a:p>
         </p:txBody>
       </p:sp>
     </p:spTree>
     <p:extLst>
       <p:ext uri="{BB962C8B-B14F-4D97-AF65-F5344CB8AC3E}">
-        <p14:creationId xmlns:p14="http://schemas.microsoft.com/office/powerpoint/2010/main" val="2548771884"/>
+        <p14:creationId xmlns:p14="http://schemas.microsoft.com/office/powerpoint/2010/main" val="2121661289"/>
       </p:ext>
     </p:extLst>
   </p:cSld>
@@ -2893,8 +2880,8 @@
         </p:nvSpPr>
         <p:spPr>
           <a:xfrm>
-            <a:off x="1470124" y="804969"/>
-            <a:ext cx="18443377" cy="2922375"/>
+            <a:off x="880110" y="511177"/>
+            <a:ext cx="11041380" cy="1855788"/>
           </a:xfrm>
           <a:prstGeom prst="rect">
             <a:avLst/>
@@ -2926,8 +2913,8 @@
         </p:nvSpPr>
         <p:spPr>
           <a:xfrm>
-            <a:off x="1470124" y="4024827"/>
-            <a:ext cx="18443377" cy="9593089"/>
+            <a:off x="880110" y="2555875"/>
+            <a:ext cx="11041380" cy="6091873"/>
           </a:xfrm>
           <a:prstGeom prst="rect">
             <a:avLst/>
@@ -2988,8 +2975,8 @@
         </p:nvSpPr>
         <p:spPr>
           <a:xfrm>
-            <a:off x="1470124" y="14013401"/>
-            <a:ext cx="4811316" cy="804965"/>
+            <a:off x="880110" y="8898892"/>
+            <a:ext cx="2880360" cy="511175"/>
           </a:xfrm>
           <a:prstGeom prst="rect">
             <a:avLst/>
@@ -2999,7 +2986,7 @@
           <a:bodyPr vert="horz" lIns="91440" tIns="45720" rIns="91440" bIns="45720" rtlCol="0" anchor="ctr"/>
           <a:lstStyle>
             <a:lvl1pPr algn="l">
-              <a:defRPr sz="2646">
+              <a:defRPr sz="1680">
                 <a:solidFill>
                   <a:schemeClr val="tx1">
                     <a:tint val="75000"/>
@@ -3009,11 +2996,11 @@
             </a:lvl1pPr>
           </a:lstStyle>
           <a:p>
-            <a:fld id="{E93572D2-1BD6-954F-86C4-419D8535D635}" type="datetimeFigureOut">
+            <a:fld id="{A89845D4-B2ED-304C-AF78-76488BE9F915}" type="datetimeFigureOut">
               <a:rPr lang="en-GB" smtClean="0"/>
               <a:t>13/02/2019</a:t>
             </a:fld>
-            <a:endParaRPr lang="en-GB" dirty="0"/>
+            <a:endParaRPr lang="en-GB"/>
           </a:p>
         </p:txBody>
       </p:sp>
@@ -3029,8 +3016,8 @@
         </p:nvSpPr>
         <p:spPr>
           <a:xfrm>
-            <a:off x="7083326" y="14013401"/>
-            <a:ext cx="7216973" cy="804965"/>
+            <a:off x="4240530" y="8898892"/>
+            <a:ext cx="4320540" cy="511175"/>
           </a:xfrm>
           <a:prstGeom prst="rect">
             <a:avLst/>
@@ -3040,7 +3027,7 @@
           <a:bodyPr vert="horz" lIns="91440" tIns="45720" rIns="91440" bIns="45720" rtlCol="0" anchor="ctr"/>
           <a:lstStyle>
             <a:lvl1pPr algn="ctr">
-              <a:defRPr sz="2646">
+              <a:defRPr sz="1680">
                 <a:solidFill>
                   <a:schemeClr val="tx1">
                     <a:tint val="75000"/>
@@ -3050,7 +3037,7 @@
             </a:lvl1pPr>
           </a:lstStyle>
           <a:p>
-            <a:endParaRPr lang="en-GB" dirty="0"/>
+            <a:endParaRPr lang="en-GB"/>
           </a:p>
         </p:txBody>
       </p:sp>
@@ -3066,8 +3053,8 @@
         </p:nvSpPr>
         <p:spPr>
           <a:xfrm>
-            <a:off x="15102185" y="14013401"/>
-            <a:ext cx="4811316" cy="804965"/>
+            <a:off x="9041130" y="8898892"/>
+            <a:ext cx="2880360" cy="511175"/>
           </a:xfrm>
           <a:prstGeom prst="rect">
             <a:avLst/>
@@ -3077,7 +3064,7 @@
           <a:bodyPr vert="horz" lIns="91440" tIns="45720" rIns="91440" bIns="45720" rtlCol="0" anchor="ctr"/>
           <a:lstStyle>
             <a:lvl1pPr algn="r">
-              <a:defRPr sz="2646">
+              <a:defRPr sz="1680">
                 <a:solidFill>
                   <a:schemeClr val="tx1">
                     <a:tint val="75000"/>
@@ -3087,38 +3074,38 @@
             </a:lvl1pPr>
           </a:lstStyle>
           <a:p>
-            <a:fld id="{8EBCDA72-8231-1F4F-8A36-A4B0326CBB14}" type="slidenum">
+            <a:fld id="{A46F63F6-AF3A-4C4F-A332-A89ADE2DFFD5}" type="slidenum">
               <a:rPr lang="en-GB" smtClean="0"/>
               <a:t>‹#›</a:t>
             </a:fld>
-            <a:endParaRPr lang="en-GB" dirty="0"/>
+            <a:endParaRPr lang="en-GB"/>
           </a:p>
         </p:txBody>
       </p:sp>
     </p:spTree>
     <p:extLst>
       <p:ext uri="{BB962C8B-B14F-4D97-AF65-F5344CB8AC3E}">
-        <p14:creationId xmlns:p14="http://schemas.microsoft.com/office/powerpoint/2010/main" val="1005966582"/>
+        <p14:creationId xmlns:p14="http://schemas.microsoft.com/office/powerpoint/2010/main" val="2605006959"/>
       </p:ext>
     </p:extLst>
   </p:cSld>
   <p:clrMap bg1="lt1" tx1="dk1" bg2="lt2" tx2="dk2" accent1="accent1" accent2="accent2" accent3="accent3" accent4="accent4" accent5="accent5" accent6="accent6" hlink="hlink" folHlink="folHlink"/>
   <p:sldLayoutIdLst>
-    <p:sldLayoutId id="2147483685" r:id="rId1"/>
-    <p:sldLayoutId id="2147483686" r:id="rId2"/>
-    <p:sldLayoutId id="2147483687" r:id="rId3"/>
-    <p:sldLayoutId id="2147483688" r:id="rId4"/>
-    <p:sldLayoutId id="2147483689" r:id="rId5"/>
-    <p:sldLayoutId id="2147483690" r:id="rId6"/>
-    <p:sldLayoutId id="2147483691" r:id="rId7"/>
-    <p:sldLayoutId id="2147483692" r:id="rId8"/>
-    <p:sldLayoutId id="2147483693" r:id="rId9"/>
-    <p:sldLayoutId id="2147483694" r:id="rId10"/>
-    <p:sldLayoutId id="2147483695" r:id="rId11"/>
+    <p:sldLayoutId id="2147483661" r:id="rId1"/>
+    <p:sldLayoutId id="2147483662" r:id="rId2"/>
+    <p:sldLayoutId id="2147483663" r:id="rId3"/>
+    <p:sldLayoutId id="2147483664" r:id="rId4"/>
+    <p:sldLayoutId id="2147483665" r:id="rId5"/>
+    <p:sldLayoutId id="2147483666" r:id="rId6"/>
+    <p:sldLayoutId id="2147483667" r:id="rId7"/>
+    <p:sldLayoutId id="2147483668" r:id="rId8"/>
+    <p:sldLayoutId id="2147483669" r:id="rId9"/>
+    <p:sldLayoutId id="2147483670" r:id="rId10"/>
+    <p:sldLayoutId id="2147483671" r:id="rId11"/>
   </p:sldLayoutIdLst>
   <p:txStyles>
     <p:titleStyle>
-      <a:lvl1pPr algn="l" defTabSz="2015886" rtl="0" eaLnBrk="1" latinLnBrk="0" hangingPunct="1">
+      <a:lvl1pPr algn="l" defTabSz="1280160" rtl="0" eaLnBrk="1" latinLnBrk="0" hangingPunct="1">
         <a:lnSpc>
           <a:spcPct val="90000"/>
         </a:lnSpc>
@@ -3126,7 +3113,7 @@
           <a:spcPct val="0"/>
         </a:spcBef>
         <a:buNone/>
-        <a:defRPr sz="9700" kern="1200">
+        <a:defRPr sz="6160" kern="1200">
           <a:solidFill>
             <a:schemeClr val="tx1"/>
           </a:solidFill>
@@ -3137,16 +3124,16 @@
       </a:lvl1pPr>
     </p:titleStyle>
     <p:bodyStyle>
-      <a:lvl1pPr marL="503972" indent="-503972" algn="l" defTabSz="2015886" rtl="0" eaLnBrk="1" latinLnBrk="0" hangingPunct="1">
+      <a:lvl1pPr marL="320040" indent="-320040" algn="l" defTabSz="1280160" rtl="0" eaLnBrk="1" latinLnBrk="0" hangingPunct="1">
         <a:lnSpc>
           <a:spcPct val="90000"/>
         </a:lnSpc>
         <a:spcBef>
-          <a:spcPts val="2205"/>
+          <a:spcPts val="1400"/>
         </a:spcBef>
         <a:buFont typeface="Arial" panose="020B0604020202020204" pitchFamily="34" charset="0"/>
         <a:buChar char="•"/>
-        <a:defRPr sz="6173" kern="1200">
+        <a:defRPr sz="3920" kern="1200">
           <a:solidFill>
             <a:schemeClr val="tx1"/>
           </a:solidFill>
@@ -3155,16 +3142,16 @@
           <a:cs typeface="+mn-cs"/>
         </a:defRPr>
       </a:lvl1pPr>
-      <a:lvl2pPr marL="1511915" indent="-503972" algn="l" defTabSz="2015886" rtl="0" eaLnBrk="1" latinLnBrk="0" hangingPunct="1">
+      <a:lvl2pPr marL="960120" indent="-320040" algn="l" defTabSz="1280160" rtl="0" eaLnBrk="1" latinLnBrk="0" hangingPunct="1">
         <a:lnSpc>
           <a:spcPct val="90000"/>
         </a:lnSpc>
         <a:spcBef>
-          <a:spcPts val="1102"/>
+          <a:spcPts val="700"/>
         </a:spcBef>
         <a:buFont typeface="Arial" panose="020B0604020202020204" pitchFamily="34" charset="0"/>
         <a:buChar char="•"/>
-        <a:defRPr sz="5291" kern="1200">
+        <a:defRPr sz="3360" kern="1200">
           <a:solidFill>
             <a:schemeClr val="tx1"/>
           </a:solidFill>
@@ -3173,16 +3160,16 @@
           <a:cs typeface="+mn-cs"/>
         </a:defRPr>
       </a:lvl2pPr>
-      <a:lvl3pPr marL="2519858" indent="-503972" algn="l" defTabSz="2015886" rtl="0" eaLnBrk="1" latinLnBrk="0" hangingPunct="1">
+      <a:lvl3pPr marL="1600200" indent="-320040" algn="l" defTabSz="1280160" rtl="0" eaLnBrk="1" latinLnBrk="0" hangingPunct="1">
         <a:lnSpc>
           <a:spcPct val="90000"/>
         </a:lnSpc>
         <a:spcBef>
-          <a:spcPts val="1102"/>
+          <a:spcPts val="700"/>
         </a:spcBef>
         <a:buFont typeface="Arial" panose="020B0604020202020204" pitchFamily="34" charset="0"/>
         <a:buChar char="•"/>
-        <a:defRPr sz="4409" kern="1200">
+        <a:defRPr sz="2800" kern="1200">
           <a:solidFill>
             <a:schemeClr val="tx1"/>
           </a:solidFill>
@@ -3191,16 +3178,16 @@
           <a:cs typeface="+mn-cs"/>
         </a:defRPr>
       </a:lvl3pPr>
-      <a:lvl4pPr marL="3527801" indent="-503972" algn="l" defTabSz="2015886" rtl="0" eaLnBrk="1" latinLnBrk="0" hangingPunct="1">
+      <a:lvl4pPr marL="2240280" indent="-320040" algn="l" defTabSz="1280160" rtl="0" eaLnBrk="1" latinLnBrk="0" hangingPunct="1">
         <a:lnSpc>
           <a:spcPct val="90000"/>
         </a:lnSpc>
         <a:spcBef>
-          <a:spcPts val="1102"/>
+          <a:spcPts val="700"/>
         </a:spcBef>
         <a:buFont typeface="Arial" panose="020B0604020202020204" pitchFamily="34" charset="0"/>
         <a:buChar char="•"/>
-        <a:defRPr sz="3968" kern="1200">
+        <a:defRPr sz="2520" kern="1200">
           <a:solidFill>
             <a:schemeClr val="tx1"/>
           </a:solidFill>
@@ -3209,16 +3196,16 @@
           <a:cs typeface="+mn-cs"/>
         </a:defRPr>
       </a:lvl4pPr>
-      <a:lvl5pPr marL="4535744" indent="-503972" algn="l" defTabSz="2015886" rtl="0" eaLnBrk="1" latinLnBrk="0" hangingPunct="1">
+      <a:lvl5pPr marL="2880360" indent="-320040" algn="l" defTabSz="1280160" rtl="0" eaLnBrk="1" latinLnBrk="0" hangingPunct="1">
         <a:lnSpc>
           <a:spcPct val="90000"/>
         </a:lnSpc>
         <a:spcBef>
-          <a:spcPts val="1102"/>
+          <a:spcPts val="700"/>
         </a:spcBef>
         <a:buFont typeface="Arial" panose="020B0604020202020204" pitchFamily="34" charset="0"/>
         <a:buChar char="•"/>
-        <a:defRPr sz="3968" kern="1200">
+        <a:defRPr sz="2520" kern="1200">
           <a:solidFill>
             <a:schemeClr val="tx1"/>
           </a:solidFill>
@@ -3227,16 +3214,16 @@
           <a:cs typeface="+mn-cs"/>
         </a:defRPr>
       </a:lvl5pPr>
-      <a:lvl6pPr marL="5543687" indent="-503972" algn="l" defTabSz="2015886" rtl="0" eaLnBrk="1" latinLnBrk="0" hangingPunct="1">
+      <a:lvl6pPr marL="3520440" indent="-320040" algn="l" defTabSz="1280160" rtl="0" eaLnBrk="1" latinLnBrk="0" hangingPunct="1">
         <a:lnSpc>
           <a:spcPct val="90000"/>
         </a:lnSpc>
         <a:spcBef>
-          <a:spcPts val="1102"/>
+          <a:spcPts val="700"/>
         </a:spcBef>
         <a:buFont typeface="Arial" panose="020B0604020202020204" pitchFamily="34" charset="0"/>
         <a:buChar char="•"/>
-        <a:defRPr sz="3968" kern="1200">
+        <a:defRPr sz="2520" kern="1200">
           <a:solidFill>
             <a:schemeClr val="tx1"/>
           </a:solidFill>
@@ -3245,16 +3232,16 @@
           <a:cs typeface="+mn-cs"/>
         </a:defRPr>
       </a:lvl6pPr>
-      <a:lvl7pPr marL="6551630" indent="-503972" algn="l" defTabSz="2015886" rtl="0" eaLnBrk="1" latinLnBrk="0" hangingPunct="1">
+      <a:lvl7pPr marL="4160520" indent="-320040" algn="l" defTabSz="1280160" rtl="0" eaLnBrk="1" latinLnBrk="0" hangingPunct="1">
         <a:lnSpc>
           <a:spcPct val="90000"/>
         </a:lnSpc>
         <a:spcBef>
-          <a:spcPts val="1102"/>
+          <a:spcPts val="700"/>
         </a:spcBef>
         <a:buFont typeface="Arial" panose="020B0604020202020204" pitchFamily="34" charset="0"/>
         <a:buChar char="•"/>
-        <a:defRPr sz="3968" kern="1200">
+        <a:defRPr sz="2520" kern="1200">
           <a:solidFill>
             <a:schemeClr val="tx1"/>
           </a:solidFill>
@@ -3263,16 +3250,16 @@
           <a:cs typeface="+mn-cs"/>
         </a:defRPr>
       </a:lvl7pPr>
-      <a:lvl8pPr marL="7559573" indent="-503972" algn="l" defTabSz="2015886" rtl="0" eaLnBrk="1" latinLnBrk="0" hangingPunct="1">
+      <a:lvl8pPr marL="4800600" indent="-320040" algn="l" defTabSz="1280160" rtl="0" eaLnBrk="1" latinLnBrk="0" hangingPunct="1">
         <a:lnSpc>
           <a:spcPct val="90000"/>
         </a:lnSpc>
         <a:spcBef>
-          <a:spcPts val="1102"/>
+          <a:spcPts val="700"/>
         </a:spcBef>
         <a:buFont typeface="Arial" panose="020B0604020202020204" pitchFamily="34" charset="0"/>
         <a:buChar char="•"/>
-        <a:defRPr sz="3968" kern="1200">
+        <a:defRPr sz="2520" kern="1200">
           <a:solidFill>
             <a:schemeClr val="tx1"/>
           </a:solidFill>
@@ -3281,16 +3268,16 @@
           <a:cs typeface="+mn-cs"/>
         </a:defRPr>
       </a:lvl8pPr>
-      <a:lvl9pPr marL="8567517" indent="-503972" algn="l" defTabSz="2015886" rtl="0" eaLnBrk="1" latinLnBrk="0" hangingPunct="1">
+      <a:lvl9pPr marL="5440680" indent="-320040" algn="l" defTabSz="1280160" rtl="0" eaLnBrk="1" latinLnBrk="0" hangingPunct="1">
         <a:lnSpc>
           <a:spcPct val="90000"/>
         </a:lnSpc>
         <a:spcBef>
-          <a:spcPts val="1102"/>
+          <a:spcPts val="700"/>
         </a:spcBef>
         <a:buFont typeface="Arial" panose="020B0604020202020204" pitchFamily="34" charset="0"/>
         <a:buChar char="•"/>
-        <a:defRPr sz="3968" kern="1200">
+        <a:defRPr sz="2520" kern="1200">
           <a:solidFill>
             <a:schemeClr val="tx1"/>
           </a:solidFill>
@@ -3304,8 +3291,8 @@
       <a:defPPr>
         <a:defRPr lang="en-US"/>
       </a:defPPr>
-      <a:lvl1pPr marL="0" algn="l" defTabSz="2015886" rtl="0" eaLnBrk="1" latinLnBrk="0" hangingPunct="1">
-        <a:defRPr sz="3968" kern="1200">
+      <a:lvl1pPr marL="0" algn="l" defTabSz="1280160" rtl="0" eaLnBrk="1" latinLnBrk="0" hangingPunct="1">
+        <a:defRPr sz="2520" kern="1200">
           <a:solidFill>
             <a:schemeClr val="tx1"/>
           </a:solidFill>
@@ -3314,8 +3301,8 @@
           <a:cs typeface="+mn-cs"/>
         </a:defRPr>
       </a:lvl1pPr>
-      <a:lvl2pPr marL="1007943" algn="l" defTabSz="2015886" rtl="0" eaLnBrk="1" latinLnBrk="0" hangingPunct="1">
-        <a:defRPr sz="3968" kern="1200">
+      <a:lvl2pPr marL="640080" algn="l" defTabSz="1280160" rtl="0" eaLnBrk="1" latinLnBrk="0" hangingPunct="1">
+        <a:defRPr sz="2520" kern="1200">
           <a:solidFill>
             <a:schemeClr val="tx1"/>
           </a:solidFill>
@@ -3324,8 +3311,8 @@
           <a:cs typeface="+mn-cs"/>
         </a:defRPr>
       </a:lvl2pPr>
-      <a:lvl3pPr marL="2015886" algn="l" defTabSz="2015886" rtl="0" eaLnBrk="1" latinLnBrk="0" hangingPunct="1">
-        <a:defRPr sz="3968" kern="1200">
+      <a:lvl3pPr marL="1280160" algn="l" defTabSz="1280160" rtl="0" eaLnBrk="1" latinLnBrk="0" hangingPunct="1">
+        <a:defRPr sz="2520" kern="1200">
           <a:solidFill>
             <a:schemeClr val="tx1"/>
           </a:solidFill>
@@ -3334,8 +3321,8 @@
           <a:cs typeface="+mn-cs"/>
         </a:defRPr>
       </a:lvl3pPr>
-      <a:lvl4pPr marL="3023829" algn="l" defTabSz="2015886" rtl="0" eaLnBrk="1" latinLnBrk="0" hangingPunct="1">
-        <a:defRPr sz="3968" kern="1200">
+      <a:lvl4pPr marL="1920240" algn="l" defTabSz="1280160" rtl="0" eaLnBrk="1" latinLnBrk="0" hangingPunct="1">
+        <a:defRPr sz="2520" kern="1200">
           <a:solidFill>
             <a:schemeClr val="tx1"/>
           </a:solidFill>
@@ -3344,8 +3331,8 @@
           <a:cs typeface="+mn-cs"/>
         </a:defRPr>
       </a:lvl4pPr>
-      <a:lvl5pPr marL="4031772" algn="l" defTabSz="2015886" rtl="0" eaLnBrk="1" latinLnBrk="0" hangingPunct="1">
-        <a:defRPr sz="3968" kern="1200">
+      <a:lvl5pPr marL="2560320" algn="l" defTabSz="1280160" rtl="0" eaLnBrk="1" latinLnBrk="0" hangingPunct="1">
+        <a:defRPr sz="2520" kern="1200">
           <a:solidFill>
             <a:schemeClr val="tx1"/>
           </a:solidFill>
@@ -3354,8 +3341,8 @@
           <a:cs typeface="+mn-cs"/>
         </a:defRPr>
       </a:lvl5pPr>
-      <a:lvl6pPr marL="5039716" algn="l" defTabSz="2015886" rtl="0" eaLnBrk="1" latinLnBrk="0" hangingPunct="1">
-        <a:defRPr sz="3968" kern="1200">
+      <a:lvl6pPr marL="3200400" algn="l" defTabSz="1280160" rtl="0" eaLnBrk="1" latinLnBrk="0" hangingPunct="1">
+        <a:defRPr sz="2520" kern="1200">
           <a:solidFill>
             <a:schemeClr val="tx1"/>
           </a:solidFill>
@@ -3364,8 +3351,8 @@
           <a:cs typeface="+mn-cs"/>
         </a:defRPr>
       </a:lvl6pPr>
-      <a:lvl7pPr marL="6047659" algn="l" defTabSz="2015886" rtl="0" eaLnBrk="1" latinLnBrk="0" hangingPunct="1">
-        <a:defRPr sz="3968" kern="1200">
+      <a:lvl7pPr marL="3840480" algn="l" defTabSz="1280160" rtl="0" eaLnBrk="1" latinLnBrk="0" hangingPunct="1">
+        <a:defRPr sz="2520" kern="1200">
           <a:solidFill>
             <a:schemeClr val="tx1"/>
           </a:solidFill>
@@ -3374,8 +3361,8 @@
           <a:cs typeface="+mn-cs"/>
         </a:defRPr>
       </a:lvl7pPr>
-      <a:lvl8pPr marL="7055602" algn="l" defTabSz="2015886" rtl="0" eaLnBrk="1" latinLnBrk="0" hangingPunct="1">
-        <a:defRPr sz="3968" kern="1200">
+      <a:lvl8pPr marL="4480560" algn="l" defTabSz="1280160" rtl="0" eaLnBrk="1" latinLnBrk="0" hangingPunct="1">
+        <a:defRPr sz="2520" kern="1200">
           <a:solidFill>
             <a:schemeClr val="tx1"/>
           </a:solidFill>
@@ -3384,8 +3371,8 @@
           <a:cs typeface="+mn-cs"/>
         </a:defRPr>
       </a:lvl8pPr>
-      <a:lvl9pPr marL="8063545" algn="l" defTabSz="2015886" rtl="0" eaLnBrk="1" latinLnBrk="0" hangingPunct="1">
-        <a:defRPr sz="3968" kern="1200">
+      <a:lvl9pPr marL="5120640" algn="l" defTabSz="1280160" rtl="0" eaLnBrk="1" latinLnBrk="0" hangingPunct="1">
+        <a:defRPr sz="2520" kern="1200">
           <a:solidFill>
             <a:schemeClr val="tx1"/>
           </a:solidFill>
@@ -3426,10 +3413,10 @@
       </p:grpSpPr>
       <p:sp>
         <p:nvSpPr>
-          <p:cNvPr id="7" name="Rectangle 6">
+          <p:cNvPr id="25" name="Rectangle 24">
             <a:extLst>
               <a:ext uri="{FF2B5EF4-FFF2-40B4-BE49-F238E27FC236}">
-                <a16:creationId xmlns:a16="http://schemas.microsoft.com/office/drawing/2014/main" id="{311483C7-B33B-DD4A-A839-CD47769B3E91}"/>
+                <a16:creationId xmlns:a16="http://schemas.microsoft.com/office/drawing/2014/main" id="{0150C22A-0726-924D-B55F-815537C64269}"/>
               </a:ext>
             </a:extLst>
           </p:cNvPr>
@@ -3438,8 +3425,8 @@
         </p:nvSpPr>
         <p:spPr>
           <a:xfrm>
-            <a:off x="597619" y="228494"/>
-            <a:ext cx="20188381" cy="1511816"/>
+            <a:off x="220134" y="228105"/>
+            <a:ext cx="12310534" cy="771853"/>
           </a:xfrm>
           <a:prstGeom prst="rect">
             <a:avLst/>
@@ -3480,10 +3467,10 @@
       </p:sp>
       <p:sp>
         <p:nvSpPr>
-          <p:cNvPr id="2" name="TextBox 1">
+          <p:cNvPr id="26" name="TextBox 25">
             <a:extLst>
               <a:ext uri="{FF2B5EF4-FFF2-40B4-BE49-F238E27FC236}">
-                <a16:creationId xmlns:a16="http://schemas.microsoft.com/office/drawing/2014/main" id="{3771C7A4-CC91-654B-93BC-444CCA96E073}"/>
+                <a16:creationId xmlns:a16="http://schemas.microsoft.com/office/drawing/2014/main" id="{17CD0585-92A4-7D4F-923D-95B11159D3DC}"/>
               </a:ext>
             </a:extLst>
           </p:cNvPr>
@@ -3492,8 +3479,8 @@
         </p:nvSpPr>
         <p:spPr>
           <a:xfrm>
-            <a:off x="5553533" y="513418"/>
-            <a:ext cx="10276557" cy="587411"/>
+            <a:off x="3957034" y="320207"/>
+            <a:ext cx="4887532" cy="279634"/>
           </a:xfrm>
           <a:prstGeom prst="rect">
             <a:avLst/>
@@ -3507,7 +3494,7 @@
           <a:lstStyle/>
           <a:p>
             <a:r>
-              <a:rPr lang="en-GB" sz="3600" b="1" dirty="0">
+              <a:rPr lang="en-GB" sz="1600" b="1" dirty="0">
                 <a:latin typeface="Roboto" pitchFamily="2" charset="0"/>
                 <a:ea typeface="Roboto" pitchFamily="2" charset="0"/>
               </a:rPr>
@@ -3518,10 +3505,10 @@
       </p:sp>
       <p:sp>
         <p:nvSpPr>
-          <p:cNvPr id="3" name="TextBox 2">
+          <p:cNvPr id="27" name="TextBox 26">
             <a:extLst>
               <a:ext uri="{FF2B5EF4-FFF2-40B4-BE49-F238E27FC236}">
-                <a16:creationId xmlns:a16="http://schemas.microsoft.com/office/drawing/2014/main" id="{23E52F0A-6608-EC43-BF02-A0EF55224171}"/>
+                <a16:creationId xmlns:a16="http://schemas.microsoft.com/office/drawing/2014/main" id="{6C1B990A-2D77-EC48-AD37-A4FA3CD5EDB1}"/>
               </a:ext>
             </a:extLst>
           </p:cNvPr>
@@ -3530,8 +3517,8 @@
         </p:nvSpPr>
         <p:spPr>
           <a:xfrm>
-            <a:off x="9735173" y="1100829"/>
-            <a:ext cx="1913276" cy="523220"/>
+            <a:off x="5828430" y="599841"/>
+            <a:ext cx="1093942" cy="307777"/>
           </a:xfrm>
           <a:prstGeom prst="rect">
             <a:avLst/>
@@ -3545,7 +3532,7 @@
           <a:lstStyle/>
           <a:p>
             <a:r>
-              <a:rPr lang="en-GB" sz="2800" dirty="0">
+              <a:rPr lang="en-GB" sz="1400" dirty="0">
                 <a:latin typeface="Roboto" pitchFamily="2" charset="0"/>
                 <a:ea typeface="Roboto" pitchFamily="2" charset="0"/>
               </a:rPr>
@@ -3556,10 +3543,10 @@
       </p:sp>
       <p:pic>
         <p:nvPicPr>
-          <p:cNvPr id="17" name="Picture 16" descr="A close up of a logo&#10;&#10;Description automatically generated">
+          <p:cNvPr id="28" name="Picture 27" descr="A close up of a logo&#10;&#10;Description automatically generated">
             <a:extLst>
               <a:ext uri="{FF2B5EF4-FFF2-40B4-BE49-F238E27FC236}">
-                <a16:creationId xmlns:a16="http://schemas.microsoft.com/office/drawing/2014/main" id="{4B6DA67C-C988-F54C-8871-F73B3FD02A17}"/>
+                <a16:creationId xmlns:a16="http://schemas.microsoft.com/office/drawing/2014/main" id="{6530F423-09D5-ED42-8E44-49985BCE2164}"/>
               </a:ext>
             </a:extLst>
           </p:cNvPr>
@@ -3575,8 +3562,8 @@
         </p:blipFill>
         <p:spPr>
           <a:xfrm>
-            <a:off x="17784715" y="396991"/>
-            <a:ext cx="2673142" cy="1230118"/>
+            <a:off x="11074399" y="310384"/>
+            <a:ext cx="1323563" cy="609074"/>
           </a:xfrm>
           <a:prstGeom prst="rect">
             <a:avLst/>
@@ -3585,10 +3572,10 @@
       </p:pic>
       <p:sp>
         <p:nvSpPr>
-          <p:cNvPr id="20" name="Rectangle 19">
+          <p:cNvPr id="29" name="Rectangle 28">
             <a:extLst>
               <a:ext uri="{FF2B5EF4-FFF2-40B4-BE49-F238E27FC236}">
-                <a16:creationId xmlns:a16="http://schemas.microsoft.com/office/drawing/2014/main" id="{EAE5546F-CC46-BD4B-9E55-15E49427DA01}"/>
+                <a16:creationId xmlns:a16="http://schemas.microsoft.com/office/drawing/2014/main" id="{C50B3262-8478-BA4E-99A4-77E9E57DB607}"/>
               </a:ext>
             </a:extLst>
           </p:cNvPr>
@@ -3597,8 +3584,8 @@
         </p:nvSpPr>
         <p:spPr>
           <a:xfrm>
-            <a:off x="597619" y="2095032"/>
-            <a:ext cx="6481605" cy="3833820"/>
+            <a:off x="220136" y="1187252"/>
+            <a:ext cx="3922373" cy="2274567"/>
           </a:xfrm>
           <a:prstGeom prst="rect">
             <a:avLst/>
@@ -3639,10 +3626,10 @@
       </p:sp>
       <p:sp>
         <p:nvSpPr>
-          <p:cNvPr id="21" name="Rectangle 20">
+          <p:cNvPr id="31" name="Rectangle 30">
             <a:extLst>
               <a:ext uri="{FF2B5EF4-FFF2-40B4-BE49-F238E27FC236}">
-                <a16:creationId xmlns:a16="http://schemas.microsoft.com/office/drawing/2014/main" id="{BA01094B-E0C1-5645-AB9E-432E6C0BE28A}"/>
+                <a16:creationId xmlns:a16="http://schemas.microsoft.com/office/drawing/2014/main" id="{D8B18BB1-3EFC-DD4D-951B-DD4AB14E2E42}"/>
               </a:ext>
             </a:extLst>
           </p:cNvPr>
@@ -3651,8 +3638,146 @@
         </p:nvSpPr>
         <p:spPr>
           <a:xfrm>
-            <a:off x="7451004" y="2095032"/>
-            <a:ext cx="6481605" cy="12627328"/>
+            <a:off x="220135" y="1187252"/>
+            <a:ext cx="3922371" cy="333172"/>
+          </a:xfrm>
+          <a:prstGeom prst="rect">
+            <a:avLst/>
+          </a:prstGeom>
+          <a:solidFill>
+            <a:srgbClr val="2096F4"/>
+          </a:solidFill>
+          <a:ln w="25400">
+            <a:noFill/>
+          </a:ln>
+        </p:spPr>
+        <p:style>
+          <a:lnRef idx="2">
+            <a:schemeClr val="accent1">
+              <a:shade val="50000"/>
+            </a:schemeClr>
+          </a:lnRef>
+          <a:fillRef idx="1">
+            <a:schemeClr val="accent1"/>
+          </a:fillRef>
+          <a:effectRef idx="0">
+            <a:schemeClr val="accent1"/>
+          </a:effectRef>
+          <a:fontRef idx="minor">
+            <a:schemeClr val="lt1"/>
+          </a:fontRef>
+        </p:style>
+        <p:txBody>
+          <a:bodyPr rtlCol="0" anchor="ctr"/>
+          <a:lstStyle/>
+          <a:p>
+            <a:pPr algn="ctr"/>
+            <a:endParaRPr lang="en-GB" sz="2439" dirty="0"/>
+          </a:p>
+        </p:txBody>
+      </p:sp>
+      <p:sp>
+        <p:nvSpPr>
+          <p:cNvPr id="32" name="TextBox 31">
+            <a:extLst>
+              <a:ext uri="{FF2B5EF4-FFF2-40B4-BE49-F238E27FC236}">
+                <a16:creationId xmlns:a16="http://schemas.microsoft.com/office/drawing/2014/main" id="{A1B961FD-759D-4A4F-8641-48EFF1CFD032}"/>
+              </a:ext>
+            </a:extLst>
+          </p:cNvPr>
+          <p:cNvSpPr txBox="1"/>
+          <p:nvPr/>
+        </p:nvSpPr>
+        <p:spPr>
+          <a:xfrm>
+            <a:off x="1722240" y="1229409"/>
+            <a:ext cx="918143" cy="248857"/>
+          </a:xfrm>
+          <a:prstGeom prst="rect">
+            <a:avLst/>
+          </a:prstGeom>
+          <a:noFill/>
+        </p:spPr>
+        <p:txBody>
+          <a:bodyPr wrap="square" tIns="33090" bIns="0" rtlCol="0">
+            <a:spAutoFit/>
+          </a:bodyPr>
+          <a:lstStyle/>
+          <a:p>
+            <a:r>
+              <a:rPr lang="en-GB" sz="1400" dirty="0">
+                <a:solidFill>
+                  <a:schemeClr val="bg1"/>
+                </a:solidFill>
+                <a:latin typeface="Roboto" pitchFamily="2" charset="0"/>
+                <a:ea typeface="Roboto" pitchFamily="2" charset="0"/>
+              </a:rPr>
+              <a:t>Abstract</a:t>
+            </a:r>
+          </a:p>
+        </p:txBody>
+      </p:sp>
+      <p:sp>
+        <p:nvSpPr>
+          <p:cNvPr id="33" name="TextBox 32">
+            <a:extLst>
+              <a:ext uri="{FF2B5EF4-FFF2-40B4-BE49-F238E27FC236}">
+                <a16:creationId xmlns:a16="http://schemas.microsoft.com/office/drawing/2014/main" id="{BDAD9AC9-8A6C-CC4B-8B30-50D35A98743E}"/>
+              </a:ext>
+            </a:extLst>
+          </p:cNvPr>
+          <p:cNvSpPr txBox="1"/>
+          <p:nvPr/>
+        </p:nvSpPr>
+        <p:spPr>
+          <a:xfrm>
+            <a:off x="220131" y="1520424"/>
+            <a:ext cx="3922365" cy="307777"/>
+          </a:xfrm>
+          <a:prstGeom prst="rect">
+            <a:avLst/>
+          </a:prstGeom>
+          <a:noFill/>
+        </p:spPr>
+        <p:txBody>
+          <a:bodyPr wrap="square" rtlCol="0">
+            <a:spAutoFit/>
+          </a:bodyPr>
+          <a:lstStyle/>
+          <a:p>
+            <a:r>
+              <a:rPr lang="en-GB" sz="1200" dirty="0">
+                <a:latin typeface="Roboto" pitchFamily="2" charset="0"/>
+                <a:ea typeface="Roboto" pitchFamily="2" charset="0"/>
+              </a:rPr>
+              <a:t>Through</a:t>
+            </a:r>
+            <a:r>
+              <a:rPr lang="en-GB" sz="1400" dirty="0">
+                <a:latin typeface="Roboto" pitchFamily="2" charset="0"/>
+                <a:ea typeface="Roboto" pitchFamily="2" charset="0"/>
+              </a:rPr>
+              <a:t> </a:t>
+            </a:r>
+          </a:p>
+        </p:txBody>
+      </p:sp>
+      <p:sp>
+        <p:nvSpPr>
+          <p:cNvPr id="34" name="Rectangle 33">
+            <a:extLst>
+              <a:ext uri="{FF2B5EF4-FFF2-40B4-BE49-F238E27FC236}">
+                <a16:creationId xmlns:a16="http://schemas.microsoft.com/office/drawing/2014/main" id="{2CCBC15F-07DD-A343-AF0A-4B1F39E40EDF}"/>
+              </a:ext>
+            </a:extLst>
+          </p:cNvPr>
+          <p:cNvSpPr/>
+          <p:nvPr/>
+        </p:nvSpPr>
+        <p:spPr>
+          <a:xfrm>
+            <a:off x="220136" y="3628405"/>
+            <a:ext cx="3922370" cy="2320052"/>
           </a:xfrm>
           <a:prstGeom prst="rect">
             <a:avLst/>
@@ -3693,10 +3818,10 @@
       </p:sp>
       <p:sp>
         <p:nvSpPr>
-          <p:cNvPr id="23" name="Rectangle 22">
+          <p:cNvPr id="35" name="Rectangle 34">
             <a:extLst>
               <a:ext uri="{FF2B5EF4-FFF2-40B4-BE49-F238E27FC236}">
-                <a16:creationId xmlns:a16="http://schemas.microsoft.com/office/drawing/2014/main" id="{235C7042-C6C2-CB46-ACD3-34CFBE877839}"/>
+                <a16:creationId xmlns:a16="http://schemas.microsoft.com/office/drawing/2014/main" id="{CA6A4130-6366-8044-AAA1-74704DAE9E1D}"/>
               </a:ext>
             </a:extLst>
           </p:cNvPr>
@@ -3705,8 +3830,8 @@
         </p:nvSpPr>
         <p:spPr>
           <a:xfrm>
-            <a:off x="597618" y="2095032"/>
-            <a:ext cx="6481605" cy="568420"/>
+            <a:off x="220134" y="3628404"/>
+            <a:ext cx="3922365" cy="343981"/>
           </a:xfrm>
           <a:prstGeom prst="rect">
             <a:avLst/>
@@ -3745,10 +3870,10 @@
       </p:sp>
       <p:sp>
         <p:nvSpPr>
-          <p:cNvPr id="24" name="TextBox 23">
+          <p:cNvPr id="36" name="TextBox 35">
             <a:extLst>
               <a:ext uri="{FF2B5EF4-FFF2-40B4-BE49-F238E27FC236}">
-                <a16:creationId xmlns:a16="http://schemas.microsoft.com/office/drawing/2014/main" id="{6001C23B-B0B6-7149-B97B-E5D34C52A471}"/>
+                <a16:creationId xmlns:a16="http://schemas.microsoft.com/office/drawing/2014/main" id="{32195D72-C876-A348-80D7-A1E12E37C742}"/>
               </a:ext>
             </a:extLst>
           </p:cNvPr>
@@ -3757,8 +3882,8 @@
         </p:nvSpPr>
         <p:spPr>
           <a:xfrm>
-            <a:off x="3055204" y="2142938"/>
-            <a:ext cx="1566427" cy="464300"/>
+            <a:off x="1562626" y="3657565"/>
+            <a:ext cx="1237373" cy="248857"/>
           </a:xfrm>
           <a:prstGeom prst="rect">
             <a:avLst/>
@@ -3772,69 +3897,149 @@
           <a:lstStyle/>
           <a:p>
             <a:r>
-              <a:rPr lang="en-GB" sz="2800" dirty="0">
+              <a:rPr lang="en-GB" sz="1400" dirty="0">
                 <a:solidFill>
                   <a:schemeClr val="bg1"/>
                 </a:solidFill>
                 <a:latin typeface="Roboto" pitchFamily="2" charset="0"/>
                 <a:ea typeface="Roboto" pitchFamily="2" charset="0"/>
               </a:rPr>
-              <a:t>Abstract</a:t>
-            </a:r>
-          </a:p>
-        </p:txBody>
-      </p:sp>
-      <p:sp>
-        <p:nvSpPr>
-          <p:cNvPr id="25" name="TextBox 24">
+              <a:t>Introduction</a:t>
+            </a:r>
+          </a:p>
+        </p:txBody>
+      </p:sp>
+      <mc:AlternateContent xmlns:mc="http://schemas.openxmlformats.org/markup-compatibility/2006">
+        <mc:Choice xmlns:a14="http://schemas.microsoft.com/office/drawing/2010/main" Requires="a14">
+          <p:sp>
+            <p:nvSpPr>
+              <p:cNvPr id="37" name="TextBox 36">
+                <a:extLst>
+                  <a:ext uri="{FF2B5EF4-FFF2-40B4-BE49-F238E27FC236}">
+                    <a16:creationId xmlns:a16="http://schemas.microsoft.com/office/drawing/2014/main" id="{60CBB938-5930-E546-95EC-CCCF5EA54887}"/>
+                  </a:ext>
+                </a:extLst>
+              </p:cNvPr>
+              <p:cNvSpPr txBox="1"/>
+              <p:nvPr/>
+            </p:nvSpPr>
+            <p:spPr>
+              <a:xfrm>
+                <a:off x="220132" y="4013637"/>
+                <a:ext cx="3922365" cy="667300"/>
+              </a:xfrm>
+              <a:prstGeom prst="rect">
+                <a:avLst/>
+              </a:prstGeom>
+              <a:noFill/>
+            </p:spPr>
+            <p:txBody>
+              <a:bodyPr wrap="square" rtlCol="0">
+                <a:spAutoFit/>
+              </a:bodyPr>
+              <a:lstStyle/>
+              <a:p>
+                <a:r>
+                  <a:rPr lang="en-GB" sz="1200" dirty="0">
+                    <a:latin typeface="Roboto" pitchFamily="2" charset="0"/>
+                    <a:ea typeface="Roboto" pitchFamily="2" charset="0"/>
+                  </a:rPr>
+                  <a:t>The dynamic evolution of Antarctic glaciation can be demonstrated through the study the </a:t>
+                </a:r>
+                <a14:m>
+                  <m:oMath xmlns:m="http://schemas.openxmlformats.org/officeDocument/2006/math">
+                    <m:sSup>
+                      <m:sSupPr>
+                        <m:ctrlPr>
+                          <a:rPr lang="en-GB" sz="1200" b="0" i="1" smtClean="0">
+                            <a:latin typeface="Cambria Math" panose="02040503050406030204" pitchFamily="18" charset="0"/>
+                            <a:ea typeface="Cambria Math" panose="02040503050406030204" pitchFamily="18" charset="0"/>
+                          </a:rPr>
+                        </m:ctrlPr>
+                      </m:sSupPr>
+                      <m:e>
+                        <m:r>
+                          <a:rPr lang="en-GB" sz="1200" i="1" smtClean="0">
+                            <a:latin typeface="Cambria Math" panose="02040503050406030204" pitchFamily="18" charset="0"/>
+                            <a:ea typeface="Cambria Math" panose="02040503050406030204" pitchFamily="18" charset="0"/>
+                          </a:rPr>
+                          <m:t>𝛿</m:t>
+                        </m:r>
+                      </m:e>
+                      <m:sup>
+                        <m:r>
+                          <a:rPr lang="en-GB" sz="1200" b="0" i="1" smtClean="0">
+                            <a:latin typeface="Cambria Math" panose="02040503050406030204" pitchFamily="18" charset="0"/>
+                            <a:ea typeface="Cambria Math" panose="02040503050406030204" pitchFamily="18" charset="0"/>
+                          </a:rPr>
+                          <m:t>18</m:t>
+                        </m:r>
+                      </m:sup>
+                    </m:sSup>
+                  </m:oMath>
+                </a14:m>
+                <a:r>
+                  <a:rPr lang="en-GB" sz="1200" b="0" dirty="0">
+                    <a:latin typeface="Roboto" pitchFamily="2" charset="0"/>
+                    <a:ea typeface="Roboto" pitchFamily="2" charset="0"/>
+                  </a:rPr>
+                  <a:t>O ratio in foraminifera. </a:t>
+                </a:r>
+              </a:p>
+            </p:txBody>
+          </p:sp>
+        </mc:Choice>
+        <mc:Fallback>
+          <p:sp>
+            <p:nvSpPr>
+              <p:cNvPr id="37" name="TextBox 36">
+                <a:extLst>
+                  <a:ext uri="{FF2B5EF4-FFF2-40B4-BE49-F238E27FC236}">
+                    <a16:creationId xmlns:a16="http://schemas.microsoft.com/office/drawing/2014/main" id="{60CBB938-5930-E546-95EC-CCCF5EA54887}"/>
+                  </a:ext>
+                </a:extLst>
+              </p:cNvPr>
+              <p:cNvSpPr txBox="1">
+                <a:spLocks noRot="1" noChangeAspect="1" noMove="1" noResize="1" noEditPoints="1" noAdjustHandles="1" noChangeArrowheads="1" noChangeShapeType="1" noTextEdit="1"/>
+              </p:cNvSpPr>
+              <p:nvPr/>
+            </p:nvSpPr>
+            <p:spPr>
+              <a:xfrm>
+                <a:off x="220132" y="4013637"/>
+                <a:ext cx="3922365" cy="667300"/>
+              </a:xfrm>
+              <a:prstGeom prst="rect">
+                <a:avLst/>
+              </a:prstGeom>
+              <a:blipFill>
+                <a:blip r:embed="rId4"/>
+                <a:stretch>
+                  <a:fillRect b="-1852"/>
+                </a:stretch>
+              </a:blipFill>
+            </p:spPr>
+            <p:txBody>
+              <a:bodyPr/>
+              <a:lstStyle/>
+              <a:p>
+                <a:r>
+                  <a:rPr lang="en-GB">
+                    <a:noFill/>
+                  </a:rPr>
+                  <a:t> </a:t>
+                </a:r>
+              </a:p>
+            </p:txBody>
+          </p:sp>
+        </mc:Fallback>
+      </mc:AlternateContent>
+      <p:sp>
+        <p:nvSpPr>
+          <p:cNvPr id="38" name="Rectangle 37">
             <a:extLst>
               <a:ext uri="{FF2B5EF4-FFF2-40B4-BE49-F238E27FC236}">
-                <a16:creationId xmlns:a16="http://schemas.microsoft.com/office/drawing/2014/main" id="{66E55818-4206-724B-B2B0-308087FBC4EB}"/>
-              </a:ext>
-            </a:extLst>
-          </p:cNvPr>
-          <p:cNvSpPr txBox="1"/>
-          <p:nvPr/>
-        </p:nvSpPr>
-        <p:spPr>
-          <a:xfrm>
-            <a:off x="715606" y="2759659"/>
-            <a:ext cx="1913276" cy="338554"/>
-          </a:xfrm>
-          <a:prstGeom prst="rect">
-            <a:avLst/>
-          </a:prstGeom>
-          <a:noFill/>
-        </p:spPr>
-        <p:txBody>
-          <a:bodyPr wrap="square" rtlCol="0">
-            <a:spAutoFit/>
-          </a:bodyPr>
-          <a:lstStyle/>
-          <a:p>
-            <a:r>
-              <a:rPr lang="en-GB" sz="1600" dirty="0">
-                <a:latin typeface="Roboto" pitchFamily="2" charset="0"/>
-                <a:ea typeface="Roboto" pitchFamily="2" charset="0"/>
-              </a:rPr>
-              <a:t>Through</a:t>
-            </a:r>
-            <a:r>
-              <a:rPr lang="en-GB" sz="1400" dirty="0">
-                <a:latin typeface="Roboto" pitchFamily="2" charset="0"/>
-                <a:ea typeface="Roboto" pitchFamily="2" charset="0"/>
-              </a:rPr>
-              <a:t> </a:t>
-            </a:r>
-          </a:p>
-        </p:txBody>
-      </p:sp>
-      <p:sp>
-        <p:nvSpPr>
-          <p:cNvPr id="29" name="Rectangle 28">
-            <a:extLst>
-              <a:ext uri="{FF2B5EF4-FFF2-40B4-BE49-F238E27FC236}">
-                <a16:creationId xmlns:a16="http://schemas.microsoft.com/office/drawing/2014/main" id="{79B7E4D7-9CC3-534F-B609-D2275DAE79FE}"/>
+                <a16:creationId xmlns:a16="http://schemas.microsoft.com/office/drawing/2014/main" id="{331A5D98-51BE-DD43-8C10-3349CDD47201}"/>
               </a:ext>
             </a:extLst>
           </p:cNvPr>
@@ -3843,8 +4048,8 @@
         </p:nvSpPr>
         <p:spPr>
           <a:xfrm>
-            <a:off x="597618" y="6283574"/>
-            <a:ext cx="6481605" cy="3833820"/>
+            <a:off x="8608289" y="7377270"/>
+            <a:ext cx="3922360" cy="2060576"/>
           </a:xfrm>
           <a:prstGeom prst="rect">
             <a:avLst/>
@@ -3885,10 +4090,10 @@
       </p:sp>
       <p:sp>
         <p:nvSpPr>
-          <p:cNvPr id="30" name="Rectangle 29">
+          <p:cNvPr id="39" name="Rectangle 38">
             <a:extLst>
               <a:ext uri="{FF2B5EF4-FFF2-40B4-BE49-F238E27FC236}">
-                <a16:creationId xmlns:a16="http://schemas.microsoft.com/office/drawing/2014/main" id="{2D659582-89A4-504D-BB7C-17796DBF1C1C}"/>
+                <a16:creationId xmlns:a16="http://schemas.microsoft.com/office/drawing/2014/main" id="{5966A89F-F6BD-D142-9582-9BB3E9733D85}"/>
               </a:ext>
             </a:extLst>
           </p:cNvPr>
@@ -3897,8 +4102,8 @@
         </p:nvSpPr>
         <p:spPr>
           <a:xfrm>
-            <a:off x="597617" y="6283574"/>
-            <a:ext cx="6481605" cy="568420"/>
+            <a:off x="8608287" y="7377270"/>
+            <a:ext cx="3922353" cy="305510"/>
           </a:xfrm>
           <a:prstGeom prst="rect">
             <a:avLst/>
@@ -3937,10 +4142,10 @@
       </p:sp>
       <p:sp>
         <p:nvSpPr>
-          <p:cNvPr id="31" name="TextBox 30">
+          <p:cNvPr id="40" name="TextBox 39">
             <a:extLst>
               <a:ext uri="{FF2B5EF4-FFF2-40B4-BE49-F238E27FC236}">
-                <a16:creationId xmlns:a16="http://schemas.microsoft.com/office/drawing/2014/main" id="{86016B5C-64E9-3049-A205-3663C84D0E33}"/>
+                <a16:creationId xmlns:a16="http://schemas.microsoft.com/office/drawing/2014/main" id="{EEAD3DFD-0300-B84D-8410-55F3F02F4FFD}"/>
               </a:ext>
             </a:extLst>
           </p:cNvPr>
@@ -3949,8 +4154,8 @@
         </p:nvSpPr>
         <p:spPr>
           <a:xfrm>
-            <a:off x="2759816" y="6335634"/>
-            <a:ext cx="2157204" cy="464300"/>
+            <a:off x="10021709" y="7405596"/>
+            <a:ext cx="1163969" cy="248857"/>
           </a:xfrm>
           <a:prstGeom prst="rect">
             <a:avLst/>
@@ -3964,24 +4169,24 @@
           <a:lstStyle/>
           <a:p>
             <a:r>
-              <a:rPr lang="en-GB" sz="2800" dirty="0">
+              <a:rPr lang="en-GB" sz="1400" dirty="0">
                 <a:solidFill>
                   <a:schemeClr val="bg1"/>
                 </a:solidFill>
                 <a:latin typeface="Roboto" pitchFamily="2" charset="0"/>
                 <a:ea typeface="Roboto" pitchFamily="2" charset="0"/>
               </a:rPr>
-              <a:t>Introduction</a:t>
-            </a:r>
-          </a:p>
-        </p:txBody>
-      </p:sp>
-      <p:sp>
-        <p:nvSpPr>
-          <p:cNvPr id="32" name="TextBox 31">
+              <a:t>References</a:t>
+            </a:r>
+          </a:p>
+        </p:txBody>
+      </p:sp>
+      <p:sp>
+        <p:nvSpPr>
+          <p:cNvPr id="41" name="TextBox 40">
             <a:extLst>
               <a:ext uri="{FF2B5EF4-FFF2-40B4-BE49-F238E27FC236}">
-                <a16:creationId xmlns:a16="http://schemas.microsoft.com/office/drawing/2014/main" id="{267C125E-C7FD-AC43-9428-ACC0E403A784}"/>
+                <a16:creationId xmlns:a16="http://schemas.microsoft.com/office/drawing/2014/main" id="{92B08984-FB3D-1943-B137-F1A86AC8C1E0}"/>
               </a:ext>
             </a:extLst>
           </p:cNvPr>
@@ -3990,8 +4195,8 @@
         </p:nvSpPr>
         <p:spPr>
           <a:xfrm>
-            <a:off x="715605" y="6948201"/>
-            <a:ext cx="1913276" cy="338554"/>
+            <a:off x="8608287" y="7711106"/>
+            <a:ext cx="3922353" cy="461665"/>
           </a:xfrm>
           <a:prstGeom prst="rect">
             <a:avLst/>
@@ -4004,29 +4209,79 @@
           </a:bodyPr>
           <a:lstStyle/>
           <a:p>
-            <a:r>
-              <a:rPr lang="en-GB" sz="1600" dirty="0">
+            <a:pPr algn="just"/>
+            <a:r>
+              <a:rPr lang="en-GB" sz="800" dirty="0">
                 <a:latin typeface="Roboto" pitchFamily="2" charset="0"/>
                 <a:ea typeface="Roboto" pitchFamily="2" charset="0"/>
               </a:rPr>
-              <a:t>Through</a:t>
-            </a:r>
-            <a:r>
-              <a:rPr lang="en-GB" sz="1400" dirty="0">
+              <a:t>Kennett, J. P. (1977). </a:t>
+            </a:r>
+            <a:r>
+              <a:rPr lang="en-GB" sz="800" dirty="0" err="1">
                 <a:latin typeface="Roboto" pitchFamily="2" charset="0"/>
                 <a:ea typeface="Roboto" pitchFamily="2" charset="0"/>
               </a:rPr>
-              <a:t> </a:t>
-            </a:r>
-          </a:p>
-        </p:txBody>
-      </p:sp>
-      <p:sp>
-        <p:nvSpPr>
-          <p:cNvPr id="33" name="Rectangle 32">
+              <a:t>Cenozoic</a:t>
+            </a:r>
+            <a:r>
+              <a:rPr lang="en-GB" sz="800" dirty="0">
+                <a:latin typeface="Roboto" pitchFamily="2" charset="0"/>
+                <a:ea typeface="Roboto" pitchFamily="2" charset="0"/>
+              </a:rPr>
+              <a:t> evolution of Antarctic glaciation, the circum‐Antarctic Ocean, and their impact on global </a:t>
+            </a:r>
+            <a:r>
+              <a:rPr lang="en-GB" sz="800" dirty="0" err="1">
+                <a:latin typeface="Roboto" pitchFamily="2" charset="0"/>
+                <a:ea typeface="Roboto" pitchFamily="2" charset="0"/>
+              </a:rPr>
+              <a:t>paleoceanography</a:t>
+            </a:r>
+            <a:r>
+              <a:rPr lang="en-GB" sz="800" dirty="0">
+                <a:latin typeface="Roboto" pitchFamily="2" charset="0"/>
+                <a:ea typeface="Roboto" pitchFamily="2" charset="0"/>
+              </a:rPr>
+              <a:t>. </a:t>
+            </a:r>
+            <a:r>
+              <a:rPr lang="en-GB" sz="800" i="1" dirty="0">
+                <a:latin typeface="Roboto" pitchFamily="2" charset="0"/>
+                <a:ea typeface="Roboto" pitchFamily="2" charset="0"/>
+              </a:rPr>
+              <a:t>Journal of geophysical research</a:t>
+            </a:r>
+            <a:r>
+              <a:rPr lang="en-GB" sz="800" dirty="0">
+                <a:latin typeface="Roboto" pitchFamily="2" charset="0"/>
+                <a:ea typeface="Roboto" pitchFamily="2" charset="0"/>
+              </a:rPr>
+              <a:t>, </a:t>
+            </a:r>
+            <a:r>
+              <a:rPr lang="en-GB" sz="800" i="1" dirty="0">
+                <a:latin typeface="Roboto" pitchFamily="2" charset="0"/>
+                <a:ea typeface="Roboto" pitchFamily="2" charset="0"/>
+              </a:rPr>
+              <a:t>82</a:t>
+            </a:r>
+            <a:r>
+              <a:rPr lang="en-GB" sz="800" dirty="0">
+                <a:latin typeface="Roboto" pitchFamily="2" charset="0"/>
+                <a:ea typeface="Roboto" pitchFamily="2" charset="0"/>
+              </a:rPr>
+              <a:t>(27), 3843-3860.</a:t>
+            </a:r>
+          </a:p>
+        </p:txBody>
+      </p:sp>
+      <p:sp>
+        <p:nvSpPr>
+          <p:cNvPr id="42" name="Rectangle 41">
             <a:extLst>
               <a:ext uri="{FF2B5EF4-FFF2-40B4-BE49-F238E27FC236}">
-                <a16:creationId xmlns:a16="http://schemas.microsoft.com/office/drawing/2014/main" id="{B366E9D3-6164-724C-AA20-4109C7348225}"/>
+                <a16:creationId xmlns:a16="http://schemas.microsoft.com/office/drawing/2014/main" id="{4F67DFFE-5E52-2D49-B479-0EA5DBF070F0}"/>
               </a:ext>
             </a:extLst>
           </p:cNvPr>
@@ -4035,8 +4290,8 @@
         </p:nvSpPr>
         <p:spPr>
           <a:xfrm>
-            <a:off x="14304390" y="11317315"/>
-            <a:ext cx="6481605" cy="3405044"/>
+            <a:off x="8608296" y="3751645"/>
+            <a:ext cx="3922369" cy="2060576"/>
           </a:xfrm>
           <a:prstGeom prst="rect">
             <a:avLst/>
@@ -4077,10 +4332,10 @@
       </p:sp>
       <p:sp>
         <p:nvSpPr>
-          <p:cNvPr id="34" name="Rectangle 33">
+          <p:cNvPr id="43" name="Rectangle 42">
             <a:extLst>
               <a:ext uri="{FF2B5EF4-FFF2-40B4-BE49-F238E27FC236}">
-                <a16:creationId xmlns:a16="http://schemas.microsoft.com/office/drawing/2014/main" id="{8D597AAE-2967-F54E-910F-12C1BF33C1AD}"/>
+                <a16:creationId xmlns:a16="http://schemas.microsoft.com/office/drawing/2014/main" id="{23FE515B-2C34-8E4A-8AAB-0EC1CACACE68}"/>
               </a:ext>
             </a:extLst>
           </p:cNvPr>
@@ -4089,8 +4344,8 @@
         </p:nvSpPr>
         <p:spPr>
           <a:xfrm>
-            <a:off x="14304389" y="11317315"/>
-            <a:ext cx="6481605" cy="504848"/>
+            <a:off x="8608295" y="3751645"/>
+            <a:ext cx="3922362" cy="305510"/>
           </a:xfrm>
           <a:prstGeom prst="rect">
             <a:avLst/>
@@ -4129,10 +4384,10 @@
       </p:sp>
       <p:sp>
         <p:nvSpPr>
-          <p:cNvPr id="35" name="TextBox 34">
+          <p:cNvPr id="44" name="TextBox 43">
             <a:extLst>
               <a:ext uri="{FF2B5EF4-FFF2-40B4-BE49-F238E27FC236}">
-                <a16:creationId xmlns:a16="http://schemas.microsoft.com/office/drawing/2014/main" id="{DDDDCCA0-8FE3-DF4D-9C24-ECCFA2672A7B}"/>
+                <a16:creationId xmlns:a16="http://schemas.microsoft.com/office/drawing/2014/main" id="{8D3E38F7-8C75-1140-BA60-5E3F5D293071}"/>
               </a:ext>
             </a:extLst>
           </p:cNvPr>
@@ -4141,8 +4396,8 @@
         </p:nvSpPr>
         <p:spPr>
           <a:xfrm>
-            <a:off x="16525022" y="11337589"/>
-            <a:ext cx="2040337" cy="464300"/>
+            <a:off x="9923271" y="3759556"/>
+            <a:ext cx="1360844" cy="256931"/>
           </a:xfrm>
           <a:prstGeom prst="rect">
             <a:avLst/>
@@ -4156,24 +4411,24 @@
           <a:lstStyle/>
           <a:p>
             <a:r>
-              <a:rPr lang="en-GB" sz="2800" dirty="0">
+              <a:rPr lang="en-GB" sz="1400" dirty="0">
                 <a:solidFill>
                   <a:schemeClr val="bg1"/>
                 </a:solidFill>
                 <a:latin typeface="Roboto" pitchFamily="2" charset="0"/>
                 <a:ea typeface="Roboto" pitchFamily="2" charset="0"/>
               </a:rPr>
-              <a:t>References</a:t>
-            </a:r>
-          </a:p>
-        </p:txBody>
-      </p:sp>
-      <p:sp>
-        <p:nvSpPr>
-          <p:cNvPr id="36" name="TextBox 35">
+              <a:t>Conclusions</a:t>
+            </a:r>
+          </a:p>
+        </p:txBody>
+      </p:sp>
+      <p:sp>
+        <p:nvSpPr>
+          <p:cNvPr id="45" name="TextBox 44">
             <a:extLst>
               <a:ext uri="{FF2B5EF4-FFF2-40B4-BE49-F238E27FC236}">
-                <a16:creationId xmlns:a16="http://schemas.microsoft.com/office/drawing/2014/main" id="{F4BD6AEF-2B53-F545-A2BE-DFA8D74FB40B}"/>
+                <a16:creationId xmlns:a16="http://schemas.microsoft.com/office/drawing/2014/main" id="{9DABFDE9-1655-E944-8CE8-6B2021FA0C54}"/>
               </a:ext>
             </a:extLst>
           </p:cNvPr>
@@ -4182,8 +4437,8 @@
         </p:nvSpPr>
         <p:spPr>
           <a:xfrm>
-            <a:off x="14422377" y="11981942"/>
-            <a:ext cx="1913276" cy="338554"/>
+            <a:off x="8608287" y="4057155"/>
+            <a:ext cx="3922362" cy="276999"/>
           </a:xfrm>
           <a:prstGeom prst="rect">
             <a:avLst/>
@@ -4197,28 +4452,21 @@
           <a:lstStyle/>
           <a:p>
             <a:r>
-              <a:rPr lang="en-GB" sz="1600" dirty="0">
+              <a:rPr lang="en-GB" sz="1200" dirty="0">
                 <a:latin typeface="Roboto" pitchFamily="2" charset="0"/>
                 <a:ea typeface="Roboto" pitchFamily="2" charset="0"/>
               </a:rPr>
-              <a:t>Through</a:t>
-            </a:r>
-            <a:r>
-              <a:rPr lang="en-GB" sz="1400" dirty="0">
-                <a:latin typeface="Roboto" pitchFamily="2" charset="0"/>
-                <a:ea typeface="Roboto" pitchFamily="2" charset="0"/>
-              </a:rPr>
-              <a:t> </a:t>
-            </a:r>
-          </a:p>
-        </p:txBody>
-      </p:sp>
-      <p:sp>
-        <p:nvSpPr>
-          <p:cNvPr id="37" name="Rectangle 36">
+              <a:t>Through </a:t>
+            </a:r>
+          </a:p>
+        </p:txBody>
+      </p:sp>
+      <p:sp>
+        <p:nvSpPr>
+          <p:cNvPr id="51" name="Rectangle 50">
             <a:extLst>
               <a:ext uri="{FF2B5EF4-FFF2-40B4-BE49-F238E27FC236}">
-                <a16:creationId xmlns:a16="http://schemas.microsoft.com/office/drawing/2014/main" id="{F0A0EA86-7ADF-D245-A71E-D72FCB99B2C4}"/>
+                <a16:creationId xmlns:a16="http://schemas.microsoft.com/office/drawing/2014/main" id="{F1CFD042-EFB7-4544-986D-C373E0472E30}"/>
               </a:ext>
             </a:extLst>
           </p:cNvPr>
@@ -4227,8 +4475,8 @@
         </p:nvSpPr>
         <p:spPr>
           <a:xfrm>
-            <a:off x="14304389" y="7559675"/>
-            <a:ext cx="6481605" cy="3405044"/>
+            <a:off x="4414214" y="1187251"/>
+            <a:ext cx="3922373" cy="8250595"/>
           </a:xfrm>
           <a:prstGeom prst="rect">
             <a:avLst/>
@@ -4269,10 +4517,10 @@
       </p:sp>
       <p:sp>
         <p:nvSpPr>
-          <p:cNvPr id="38" name="Rectangle 37">
+          <p:cNvPr id="52" name="Rectangle 51">
             <a:extLst>
               <a:ext uri="{FF2B5EF4-FFF2-40B4-BE49-F238E27FC236}">
-                <a16:creationId xmlns:a16="http://schemas.microsoft.com/office/drawing/2014/main" id="{F06E5A97-D224-004D-986F-3440A485D63D}"/>
+                <a16:creationId xmlns:a16="http://schemas.microsoft.com/office/drawing/2014/main" id="{56218C27-98F3-A644-974C-677982192052}"/>
               </a:ext>
             </a:extLst>
           </p:cNvPr>
@@ -4281,17 +4529,19 @@
         </p:nvSpPr>
         <p:spPr>
           <a:xfrm>
-            <a:off x="14304388" y="7559675"/>
-            <a:ext cx="6481605" cy="504848"/>
+            <a:off x="8608295" y="1191476"/>
+            <a:ext cx="3922373" cy="2274567"/>
           </a:xfrm>
           <a:prstGeom prst="rect">
             <a:avLst/>
           </a:prstGeom>
           <a:solidFill>
-            <a:srgbClr val="2096F4"/>
+            <a:srgbClr val="FFFFFF"/>
           </a:solidFill>
           <a:ln w="25400">
-            <a:noFill/>
+            <a:solidFill>
+              <a:srgbClr val="2096F4"/>
+            </a:solidFill>
           </a:ln>
         </p:spPr>
         <p:style>
@@ -4319,96 +4569,10 @@
           </a:p>
         </p:txBody>
       </p:sp>
-      <p:sp>
-        <p:nvSpPr>
-          <p:cNvPr id="39" name="TextBox 38">
-            <a:extLst>
-              <a:ext uri="{FF2B5EF4-FFF2-40B4-BE49-F238E27FC236}">
-                <a16:creationId xmlns:a16="http://schemas.microsoft.com/office/drawing/2014/main" id="{B3253F4F-CAD3-124E-9760-3A4EBE5B7F65}"/>
-              </a:ext>
-            </a:extLst>
-          </p:cNvPr>
-          <p:cNvSpPr txBox="1"/>
-          <p:nvPr/>
-        </p:nvSpPr>
-        <p:spPr>
-          <a:xfrm>
-            <a:off x="16525021" y="7579949"/>
-            <a:ext cx="2248754" cy="464300"/>
-          </a:xfrm>
-          <a:prstGeom prst="rect">
-            <a:avLst/>
-          </a:prstGeom>
-          <a:noFill/>
-        </p:spPr>
-        <p:txBody>
-          <a:bodyPr wrap="square" tIns="33090" bIns="0" rtlCol="0">
-            <a:spAutoFit/>
-          </a:bodyPr>
-          <a:lstStyle/>
-          <a:p>
-            <a:r>
-              <a:rPr lang="en-GB" sz="2800" dirty="0">
-                <a:solidFill>
-                  <a:schemeClr val="bg1"/>
-                </a:solidFill>
-                <a:latin typeface="Roboto" pitchFamily="2" charset="0"/>
-                <a:ea typeface="Roboto" pitchFamily="2" charset="0"/>
-              </a:rPr>
-              <a:t>Conclusions</a:t>
-            </a:r>
-          </a:p>
-        </p:txBody>
-      </p:sp>
-      <p:sp>
-        <p:nvSpPr>
-          <p:cNvPr id="40" name="TextBox 39">
-            <a:extLst>
-              <a:ext uri="{FF2B5EF4-FFF2-40B4-BE49-F238E27FC236}">
-                <a16:creationId xmlns:a16="http://schemas.microsoft.com/office/drawing/2014/main" id="{AB80688C-1E9F-6D43-81CA-456F4D2B70DA}"/>
-              </a:ext>
-            </a:extLst>
-          </p:cNvPr>
-          <p:cNvSpPr txBox="1"/>
-          <p:nvPr/>
-        </p:nvSpPr>
-        <p:spPr>
-          <a:xfrm>
-            <a:off x="14422376" y="8224302"/>
-            <a:ext cx="1913276" cy="338554"/>
-          </a:xfrm>
-          <a:prstGeom prst="rect">
-            <a:avLst/>
-          </a:prstGeom>
-          <a:noFill/>
-        </p:spPr>
-        <p:txBody>
-          <a:bodyPr wrap="square" rtlCol="0">
-            <a:spAutoFit/>
-          </a:bodyPr>
-          <a:lstStyle/>
-          <a:p>
-            <a:r>
-              <a:rPr lang="en-GB" sz="1600" dirty="0">
-                <a:latin typeface="Roboto" pitchFamily="2" charset="0"/>
-                <a:ea typeface="Roboto" pitchFamily="2" charset="0"/>
-              </a:rPr>
-              <a:t>Through</a:t>
-            </a:r>
-            <a:r>
-              <a:rPr lang="en-GB" sz="1400" dirty="0">
-                <a:latin typeface="Roboto" pitchFamily="2" charset="0"/>
-                <a:ea typeface="Roboto" pitchFamily="2" charset="0"/>
-              </a:rPr>
-              <a:t> </a:t>
-            </a:r>
-          </a:p>
-        </p:txBody>
-      </p:sp>
     </p:spTree>
     <p:extLst>
       <p:ext uri="{BB962C8B-B14F-4D97-AF65-F5344CB8AC3E}">
-        <p14:creationId xmlns:p14="http://schemas.microsoft.com/office/powerpoint/2010/main" val="560034957"/>
+        <p14:creationId xmlns:p14="http://schemas.microsoft.com/office/powerpoint/2010/main" val="4222702525"/>
       </p:ext>
     </p:extLst>
   </p:cSld>

</xml_diff>

<commit_message>
esc4: p: researching what to write for now
</commit_message>
<xml_diff>
--- a/earth_system_and_climate_4/term_2/poster/oxygen_poster.pptx
+++ b/earth_system_and_climate_4/term_2/poster/oxygen_poster.pptx
@@ -3425,7 +3425,7 @@
         </p:nvSpPr>
         <p:spPr>
           <a:xfrm>
-            <a:off x="220134" y="228105"/>
+            <a:off x="245533" y="183500"/>
             <a:ext cx="12310534" cy="771853"/>
           </a:xfrm>
           <a:prstGeom prst="rect">
@@ -3479,8 +3479,8 @@
         </p:nvSpPr>
         <p:spPr>
           <a:xfrm>
-            <a:off x="3957034" y="320207"/>
-            <a:ext cx="4887532" cy="279634"/>
+            <a:off x="3793970" y="289617"/>
+            <a:ext cx="5264458" cy="310412"/>
           </a:xfrm>
           <a:prstGeom prst="rect">
             <a:avLst/>
@@ -3494,7 +3494,7 @@
           <a:lstStyle/>
           <a:p>
             <a:r>
-              <a:rPr lang="en-GB" sz="1600" b="1" dirty="0">
+              <a:rPr lang="en-GB" b="1" dirty="0">
                 <a:latin typeface="Roboto" pitchFamily="2" charset="0"/>
                 <a:ea typeface="Roboto" pitchFamily="2" charset="0"/>
               </a:rPr>
@@ -3517,8 +3517,8 @@
         </p:nvSpPr>
         <p:spPr>
           <a:xfrm>
-            <a:off x="5828430" y="599841"/>
-            <a:ext cx="1093942" cy="307777"/>
+            <a:off x="5822298" y="600029"/>
+            <a:ext cx="1207801" cy="338554"/>
           </a:xfrm>
           <a:prstGeom prst="rect">
             <a:avLst/>
@@ -3532,7 +3532,7 @@
           <a:lstStyle/>
           <a:p>
             <a:r>
-              <a:rPr lang="en-GB" sz="1400" dirty="0">
+              <a:rPr lang="en-GB" sz="1600" dirty="0">
                 <a:latin typeface="Roboto" pitchFamily="2" charset="0"/>
                 <a:ea typeface="Roboto" pitchFamily="2" charset="0"/>
               </a:rPr>
@@ -3562,7 +3562,7 @@
         </p:blipFill>
         <p:spPr>
           <a:xfrm>
-            <a:off x="11074399" y="310384"/>
+            <a:off x="11099798" y="265779"/>
             <a:ext cx="1323563" cy="609074"/>
           </a:xfrm>
           <a:prstGeom prst="rect">
@@ -3584,7 +3584,7 @@
         </p:nvSpPr>
         <p:spPr>
           <a:xfrm>
-            <a:off x="220136" y="1187252"/>
+            <a:off x="245535" y="1142647"/>
             <a:ext cx="3922373" cy="2274567"/>
           </a:xfrm>
           <a:prstGeom prst="rect">
@@ -3638,7 +3638,7 @@
         </p:nvSpPr>
         <p:spPr>
           <a:xfrm>
-            <a:off x="220135" y="1187252"/>
+            <a:off x="245534" y="1142647"/>
             <a:ext cx="3922371" cy="333172"/>
           </a:xfrm>
           <a:prstGeom prst="rect">
@@ -3690,7 +3690,7 @@
         </p:nvSpPr>
         <p:spPr>
           <a:xfrm>
-            <a:off x="1722240" y="1229409"/>
+            <a:off x="1747639" y="1184804"/>
             <a:ext cx="918143" cy="248857"/>
           </a:xfrm>
           <a:prstGeom prst="rect">
@@ -3705,7 +3705,7 @@
           <a:lstStyle/>
           <a:p>
             <a:r>
-              <a:rPr lang="en-GB" sz="1400" dirty="0">
+              <a:rPr lang="en-GB" sz="1400" b="1" dirty="0">
                 <a:solidFill>
                   <a:schemeClr val="bg1"/>
                 </a:solidFill>
@@ -3731,7 +3731,7 @@
         </p:nvSpPr>
         <p:spPr>
           <a:xfrm>
-            <a:off x="220131" y="1520424"/>
+            <a:off x="245527" y="1433661"/>
             <a:ext cx="3922365" cy="307777"/>
           </a:xfrm>
           <a:prstGeom prst="rect">
@@ -3750,7 +3750,7 @@
                 <a:latin typeface="Roboto" pitchFamily="2" charset="0"/>
                 <a:ea typeface="Roboto" pitchFamily="2" charset="0"/>
               </a:rPr>
-              <a:t>Through</a:t>
+              <a:t>Through ice-core studies </a:t>
             </a:r>
             <a:r>
               <a:rPr lang="en-GB" sz="1400" dirty="0">
@@ -3776,7 +3776,7 @@
         </p:nvSpPr>
         <p:spPr>
           <a:xfrm>
-            <a:off x="220136" y="3628405"/>
+            <a:off x="245535" y="3583800"/>
             <a:ext cx="3922370" cy="2320052"/>
           </a:xfrm>
           <a:prstGeom prst="rect">
@@ -3830,7 +3830,7 @@
         </p:nvSpPr>
         <p:spPr>
           <a:xfrm>
-            <a:off x="220134" y="3628404"/>
+            <a:off x="245533" y="3583799"/>
             <a:ext cx="3922365" cy="343981"/>
           </a:xfrm>
           <a:prstGeom prst="rect">
@@ -3882,7 +3882,7 @@
         </p:nvSpPr>
         <p:spPr>
           <a:xfrm>
-            <a:off x="1562626" y="3657565"/>
+            <a:off x="1588025" y="3612960"/>
             <a:ext cx="1237373" cy="248857"/>
           </a:xfrm>
           <a:prstGeom prst="rect">
@@ -3897,7 +3897,7 @@
           <a:lstStyle/>
           <a:p>
             <a:r>
-              <a:rPr lang="en-GB" sz="1400" dirty="0">
+              <a:rPr lang="en-GB" sz="1400" b="1" dirty="0">
                 <a:solidFill>
                   <a:schemeClr val="bg1"/>
                 </a:solidFill>
@@ -3925,8 +3925,8 @@
             </p:nvSpPr>
             <p:spPr>
               <a:xfrm>
-                <a:off x="220132" y="4013637"/>
-                <a:ext cx="3922365" cy="667300"/>
+                <a:off x="245530" y="3924892"/>
+                <a:ext cx="3922365" cy="1015663"/>
               </a:xfrm>
               <a:prstGeom prst="rect">
                 <a:avLst/>
@@ -3939,12 +3939,13 @@
               </a:bodyPr>
               <a:lstStyle/>
               <a:p>
+                <a:pPr algn="just"/>
                 <a:r>
                   <a:rPr lang="en-GB" sz="1200" dirty="0">
                     <a:latin typeface="Roboto" pitchFamily="2" charset="0"/>
                     <a:ea typeface="Roboto" pitchFamily="2" charset="0"/>
                   </a:rPr>
-                  <a:t>The dynamic evolution of Antarctic glaciation can be demonstrated through the study the </a:t>
+                  <a:t>The dynamic evolution of Antarctic glaciation can be demonstrated through the study of the </a:t>
                 </a:r>
                 <a14:m>
                   <m:oMath xmlns:m="http://schemas.openxmlformats.org/officeDocument/2006/math">
@@ -3983,7 +3984,21 @@
                     <a:latin typeface="Roboto" pitchFamily="2" charset="0"/>
                     <a:ea typeface="Roboto" pitchFamily="2" charset="0"/>
                   </a:rPr>
-                  <a:t>O ratio in foraminifera. </a:t>
+                  <a:t>O ratio in foraminifera. As demonstrated by </a:t>
+                </a:r>
+                <a:r>
+                  <a:rPr lang="en-GB" sz="1200" b="0" dirty="0" err="1">
+                    <a:latin typeface="Roboto" pitchFamily="2" charset="0"/>
+                    <a:ea typeface="Roboto" pitchFamily="2" charset="0"/>
+                  </a:rPr>
+                  <a:t>Emiliani</a:t>
+                </a:r>
+                <a:r>
+                  <a:rPr lang="en-GB" sz="1200" b="0" dirty="0">
+                    <a:latin typeface="Roboto" pitchFamily="2" charset="0"/>
+                    <a:ea typeface="Roboto" pitchFamily="2" charset="0"/>
+                  </a:rPr>
+                  <a:t> (1955), this signal is a result of the isotopic composition of seawater and the change in temperatures. </a:t>
                 </a:r>
               </a:p>
             </p:txBody>
@@ -4006,8 +4021,8 @@
             </p:nvSpPr>
             <p:spPr>
               <a:xfrm>
-                <a:off x="220132" y="4013637"/>
-                <a:ext cx="3922365" cy="667300"/>
+                <a:off x="245530" y="3924892"/>
+                <a:ext cx="3922365" cy="1015663"/>
               </a:xfrm>
               <a:prstGeom prst="rect">
                 <a:avLst/>
@@ -4015,7 +4030,7 @@
               <a:blipFill>
                 <a:blip r:embed="rId4"/>
                 <a:stretch>
-                  <a:fillRect b="-1852"/>
+                  <a:fillRect b="-2469"/>
                 </a:stretch>
               </a:blipFill>
             </p:spPr>
@@ -4048,7 +4063,7 @@
         </p:nvSpPr>
         <p:spPr>
           <a:xfrm>
-            <a:off x="8608289" y="7377270"/>
+            <a:off x="8633688" y="7332665"/>
             <a:ext cx="3922360" cy="2060576"/>
           </a:xfrm>
           <a:prstGeom prst="rect">
@@ -4102,7 +4117,7 @@
         </p:nvSpPr>
         <p:spPr>
           <a:xfrm>
-            <a:off x="8608287" y="7377270"/>
+            <a:off x="8633686" y="7332665"/>
             <a:ext cx="3922353" cy="305510"/>
           </a:xfrm>
           <a:prstGeom prst="rect">
@@ -4154,7 +4169,7 @@
         </p:nvSpPr>
         <p:spPr>
           <a:xfrm>
-            <a:off x="10021709" y="7405596"/>
+            <a:off x="10047107" y="7332665"/>
             <a:ext cx="1163969" cy="248857"/>
           </a:xfrm>
           <a:prstGeom prst="rect">
@@ -4169,7 +4184,7 @@
           <a:lstStyle/>
           <a:p>
             <a:r>
-              <a:rPr lang="en-GB" sz="1400" dirty="0">
+              <a:rPr lang="en-GB" sz="1400" b="1" dirty="0">
                 <a:solidFill>
                   <a:schemeClr val="bg1"/>
                 </a:solidFill>
@@ -4195,8 +4210,8 @@
         </p:nvSpPr>
         <p:spPr>
           <a:xfrm>
-            <a:off x="8608287" y="7711106"/>
-            <a:ext cx="3922353" cy="461665"/>
+            <a:off x="8633686" y="7666501"/>
+            <a:ext cx="3922353" cy="707886"/>
           </a:xfrm>
           <a:prstGeom prst="rect">
             <a:avLst/>
@@ -4211,6 +4226,51 @@
           <a:p>
             <a:pPr algn="just"/>
             <a:r>
+              <a:rPr lang="en-GB" sz="800" dirty="0" err="1">
+                <a:latin typeface="Roboto" pitchFamily="2" charset="0"/>
+                <a:ea typeface="Roboto" pitchFamily="2" charset="0"/>
+              </a:rPr>
+              <a:t>Emiliani</a:t>
+            </a:r>
+            <a:r>
+              <a:rPr lang="en-GB" sz="800" dirty="0">
+                <a:latin typeface="Roboto" pitchFamily="2" charset="0"/>
+                <a:ea typeface="Roboto" pitchFamily="2" charset="0"/>
+              </a:rPr>
+              <a:t>, C. (1955). Pleistocene temperatures. </a:t>
+            </a:r>
+            <a:r>
+              <a:rPr lang="en-GB" sz="800" i="1" dirty="0">
+                <a:latin typeface="Roboto" pitchFamily="2" charset="0"/>
+                <a:ea typeface="Roboto" pitchFamily="2" charset="0"/>
+              </a:rPr>
+              <a:t>The Journal of Geology</a:t>
+            </a:r>
+            <a:r>
+              <a:rPr lang="en-GB" sz="800" dirty="0">
+                <a:latin typeface="Roboto" pitchFamily="2" charset="0"/>
+                <a:ea typeface="Roboto" pitchFamily="2" charset="0"/>
+              </a:rPr>
+              <a:t>, </a:t>
+            </a:r>
+            <a:r>
+              <a:rPr lang="en-GB" sz="800" i="1" dirty="0">
+                <a:latin typeface="Roboto" pitchFamily="2" charset="0"/>
+                <a:ea typeface="Roboto" pitchFamily="2" charset="0"/>
+              </a:rPr>
+              <a:t>63</a:t>
+            </a:r>
+            <a:r>
+              <a:rPr lang="en-GB" sz="800" dirty="0">
+                <a:latin typeface="Roboto" pitchFamily="2" charset="0"/>
+                <a:ea typeface="Roboto" pitchFamily="2" charset="0"/>
+              </a:rPr>
+              <a:t>(6), 538-578.</a:t>
+            </a:r>
+          </a:p>
+          <a:p>
+            <a:pPr algn="just"/>
+            <a:r>
               <a:rPr lang="en-GB" sz="800" dirty="0">
                 <a:latin typeface="Roboto" pitchFamily="2" charset="0"/>
                 <a:ea typeface="Roboto" pitchFamily="2" charset="0"/>
@@ -4250,7 +4310,7 @@
                 <a:latin typeface="Roboto" pitchFamily="2" charset="0"/>
                 <a:ea typeface="Roboto" pitchFamily="2" charset="0"/>
               </a:rPr>
-              <a:t>Journal of geophysical research</a:t>
+              <a:t>Journal of Geophysical Research</a:t>
             </a:r>
             <a:r>
               <a:rPr lang="en-GB" sz="800" dirty="0">
@@ -4290,7 +4350,7 @@
         </p:nvSpPr>
         <p:spPr>
           <a:xfrm>
-            <a:off x="8608296" y="3751645"/>
+            <a:off x="8633695" y="3707040"/>
             <a:ext cx="3922369" cy="2060576"/>
           </a:xfrm>
           <a:prstGeom prst="rect">
@@ -4344,7 +4404,7 @@
         </p:nvSpPr>
         <p:spPr>
           <a:xfrm>
-            <a:off x="8608295" y="3751645"/>
+            <a:off x="8633694" y="3707040"/>
             <a:ext cx="3922362" cy="305510"/>
           </a:xfrm>
           <a:prstGeom prst="rect">
@@ -4396,7 +4456,7 @@
         </p:nvSpPr>
         <p:spPr>
           <a:xfrm>
-            <a:off x="9923271" y="3759556"/>
+            <a:off x="9948670" y="3714951"/>
             <a:ext cx="1360844" cy="256931"/>
           </a:xfrm>
           <a:prstGeom prst="rect">
@@ -4411,7 +4471,7 @@
           <a:lstStyle/>
           <a:p>
             <a:r>
-              <a:rPr lang="en-GB" sz="1400" dirty="0">
+              <a:rPr lang="en-GB" sz="1400" b="1" dirty="0">
                 <a:solidFill>
                   <a:schemeClr val="bg1"/>
                 </a:solidFill>
@@ -4437,7 +4497,7 @@
         </p:nvSpPr>
         <p:spPr>
           <a:xfrm>
-            <a:off x="8608287" y="4057155"/>
+            <a:off x="8633686" y="4012550"/>
             <a:ext cx="3922362" cy="276999"/>
           </a:xfrm>
           <a:prstGeom prst="rect">
@@ -4475,7 +4535,7 @@
         </p:nvSpPr>
         <p:spPr>
           <a:xfrm>
-            <a:off x="4414214" y="1187251"/>
+            <a:off x="4439613" y="1142646"/>
             <a:ext cx="3922373" cy="8250595"/>
           </a:xfrm>
           <a:prstGeom prst="rect">
@@ -4529,7 +4589,7 @@
         </p:nvSpPr>
         <p:spPr>
           <a:xfrm>
-            <a:off x="8608295" y="1191476"/>
+            <a:off x="8633694" y="1146871"/>
             <a:ext cx="3922373" cy="2274567"/>
           </a:xfrm>
           <a:prstGeom prst="rect">

</xml_diff>

<commit_message>
esc4: p: more introduction work
</commit_message>
<xml_diff>
--- a/earth_system_and_climate_4/term_2/poster/oxygen_poster.pptx
+++ b/earth_system_and_climate_4/term_2/poster/oxygen_poster.pptx
@@ -107,6 +107,11 @@
       </a:defRPr>
     </a:lvl9pPr>
   </p:defaultTextStyle>
+  <p:extLst>
+    <p:ext uri="{EFAFB233-063F-42B5-8137-9DF3F51BA10A}">
+      <p15:sldGuideLst xmlns:p15="http://schemas.microsoft.com/office/powerpoint/2012/main"/>
+    </p:ext>
+  </p:extLst>
 </p:presentation>
 </file>
 
@@ -192,7 +197,7 @@
           <a:p>
             <a:fld id="{9CF0DE25-9E52-B648-AE1D-256A10D77DBE}" type="datetimeFigureOut">
               <a:rPr lang="en-GB" smtClean="0"/>
-              <a:t>13/02/2019</a:t>
+              <a:t>27/02/2019</a:t>
             </a:fld>
             <a:endParaRPr lang="en-GB"/>
           </a:p>
@@ -675,7 +680,7 @@
           <a:p>
             <a:fld id="{A89845D4-B2ED-304C-AF78-76488BE9F915}" type="datetimeFigureOut">
               <a:rPr lang="en-GB" smtClean="0"/>
-              <a:t>13/02/2019</a:t>
+              <a:t>27/02/2019</a:t>
             </a:fld>
             <a:endParaRPr lang="en-GB"/>
           </a:p>
@@ -845,7 +850,7 @@
           <a:p>
             <a:fld id="{A89845D4-B2ED-304C-AF78-76488BE9F915}" type="datetimeFigureOut">
               <a:rPr lang="en-GB" smtClean="0"/>
-              <a:t>13/02/2019</a:t>
+              <a:t>27/02/2019</a:t>
             </a:fld>
             <a:endParaRPr lang="en-GB"/>
           </a:p>
@@ -1025,7 +1030,7 @@
           <a:p>
             <a:fld id="{A89845D4-B2ED-304C-AF78-76488BE9F915}" type="datetimeFigureOut">
               <a:rPr lang="en-GB" smtClean="0"/>
-              <a:t>13/02/2019</a:t>
+              <a:t>27/02/2019</a:t>
             </a:fld>
             <a:endParaRPr lang="en-GB"/>
           </a:p>
@@ -1195,7 +1200,7 @@
           <a:p>
             <a:fld id="{A89845D4-B2ED-304C-AF78-76488BE9F915}" type="datetimeFigureOut">
               <a:rPr lang="en-GB" smtClean="0"/>
-              <a:t>13/02/2019</a:t>
+              <a:t>27/02/2019</a:t>
             </a:fld>
             <a:endParaRPr lang="en-GB"/>
           </a:p>
@@ -1439,7 +1444,7 @@
           <a:p>
             <a:fld id="{A89845D4-B2ED-304C-AF78-76488BE9F915}" type="datetimeFigureOut">
               <a:rPr lang="en-GB" smtClean="0"/>
-              <a:t>13/02/2019</a:t>
+              <a:t>27/02/2019</a:t>
             </a:fld>
             <a:endParaRPr lang="en-GB"/>
           </a:p>
@@ -1671,7 +1676,7 @@
           <a:p>
             <a:fld id="{A89845D4-B2ED-304C-AF78-76488BE9F915}" type="datetimeFigureOut">
               <a:rPr lang="en-GB" smtClean="0"/>
-              <a:t>13/02/2019</a:t>
+              <a:t>27/02/2019</a:t>
             </a:fld>
             <a:endParaRPr lang="en-GB"/>
           </a:p>
@@ -2038,7 +2043,7 @@
           <a:p>
             <a:fld id="{A89845D4-B2ED-304C-AF78-76488BE9F915}" type="datetimeFigureOut">
               <a:rPr lang="en-GB" smtClean="0"/>
-              <a:t>13/02/2019</a:t>
+              <a:t>27/02/2019</a:t>
             </a:fld>
             <a:endParaRPr lang="en-GB"/>
           </a:p>
@@ -2156,7 +2161,7 @@
           <a:p>
             <a:fld id="{A89845D4-B2ED-304C-AF78-76488BE9F915}" type="datetimeFigureOut">
               <a:rPr lang="en-GB" smtClean="0"/>
-              <a:t>13/02/2019</a:t>
+              <a:t>27/02/2019</a:t>
             </a:fld>
             <a:endParaRPr lang="en-GB"/>
           </a:p>
@@ -2251,7 +2256,7 @@
           <a:p>
             <a:fld id="{A89845D4-B2ED-304C-AF78-76488BE9F915}" type="datetimeFigureOut">
               <a:rPr lang="en-GB" smtClean="0"/>
-              <a:t>13/02/2019</a:t>
+              <a:t>27/02/2019</a:t>
             </a:fld>
             <a:endParaRPr lang="en-GB"/>
           </a:p>
@@ -2528,7 +2533,7 @@
           <a:p>
             <a:fld id="{A89845D4-B2ED-304C-AF78-76488BE9F915}" type="datetimeFigureOut">
               <a:rPr lang="en-GB" smtClean="0"/>
-              <a:t>13/02/2019</a:t>
+              <a:t>27/02/2019</a:t>
             </a:fld>
             <a:endParaRPr lang="en-GB"/>
           </a:p>
@@ -2785,7 +2790,7 @@
           <a:p>
             <a:fld id="{A89845D4-B2ED-304C-AF78-76488BE9F915}" type="datetimeFigureOut">
               <a:rPr lang="en-GB" smtClean="0"/>
-              <a:t>13/02/2019</a:t>
+              <a:t>27/02/2019</a:t>
             </a:fld>
             <a:endParaRPr lang="en-GB"/>
           </a:p>
@@ -2998,7 +3003,7 @@
           <a:p>
             <a:fld id="{A89845D4-B2ED-304C-AF78-76488BE9F915}" type="datetimeFigureOut">
               <a:rPr lang="en-GB" smtClean="0"/>
-              <a:t>13/02/2019</a:t>
+              <a:t>27/02/2019</a:t>
             </a:fld>
             <a:endParaRPr lang="en-GB"/>
           </a:p>
@@ -3392,7 +3397,7 @@
     <p:bg>
       <p:bgPr>
         <a:solidFill>
-          <a:srgbClr val="BBDEFB"/>
+          <a:srgbClr val="E3F2FD"/>
         </a:solidFill>
         <a:effectLst/>
       </p:bgPr>
@@ -3461,7 +3466,11 @@
           <a:lstStyle/>
           <a:p>
             <a:pPr algn="ctr"/>
-            <a:endParaRPr lang="en-GB" sz="2439" dirty="0"/>
+            <a:endParaRPr lang="en-GB" sz="2439" dirty="0">
+              <a:latin typeface="Lato" panose="020F0502020204030203" pitchFamily="34" charset="0"/>
+              <a:ea typeface="Lato" panose="020F0502020204030203" pitchFamily="34" charset="0"/>
+              <a:cs typeface="Lato" panose="020F0502020204030203" pitchFamily="34" charset="0"/>
+            </a:endParaRPr>
           </a:p>
         </p:txBody>
       </p:sp>
@@ -3479,7 +3488,7 @@
         </p:nvSpPr>
         <p:spPr>
           <a:xfrm>
-            <a:off x="3793970" y="289617"/>
+            <a:off x="3793969" y="236559"/>
             <a:ext cx="5264458" cy="310412"/>
           </a:xfrm>
           <a:prstGeom prst="rect">
@@ -3495,8 +3504,9 @@
           <a:p>
             <a:r>
               <a:rPr lang="en-GB" b="1" dirty="0">
-                <a:latin typeface="Roboto" pitchFamily="2" charset="0"/>
-                <a:ea typeface="Roboto" pitchFamily="2" charset="0"/>
+                <a:latin typeface="Lato" panose="020F0502020204030203" pitchFamily="34" charset="0"/>
+                <a:ea typeface="Lato" panose="020F0502020204030203" pitchFamily="34" charset="0"/>
+                <a:cs typeface="Lato" panose="020F0502020204030203" pitchFamily="34" charset="0"/>
               </a:rPr>
               <a:t>Oxygen isotope evidence for Antarctic glaciation</a:t>
             </a:r>
@@ -3517,8 +3527,8 @@
         </p:nvSpPr>
         <p:spPr>
           <a:xfrm>
-            <a:off x="5822298" y="600029"/>
-            <a:ext cx="1207801" cy="338554"/>
+            <a:off x="5895647" y="546971"/>
+            <a:ext cx="1010303" cy="307777"/>
           </a:xfrm>
           <a:prstGeom prst="rect">
             <a:avLst/>
@@ -3532,9 +3542,10 @@
           <a:lstStyle/>
           <a:p>
             <a:r>
-              <a:rPr lang="en-GB" sz="1600" dirty="0">
-                <a:latin typeface="Roboto" pitchFamily="2" charset="0"/>
-                <a:ea typeface="Roboto" pitchFamily="2" charset="0"/>
+              <a:rPr lang="en-GB" sz="1400" dirty="0">
+                <a:latin typeface="Lato" panose="020F0502020204030203" pitchFamily="34" charset="0"/>
+                <a:ea typeface="Lato" panose="020F0502020204030203" pitchFamily="34" charset="0"/>
+                <a:cs typeface="Lato" panose="020F0502020204030203" pitchFamily="34" charset="0"/>
               </a:rPr>
               <a:t>Jacky Cao</a:t>
             </a:r>
@@ -3620,7 +3631,11 @@
           <a:lstStyle/>
           <a:p>
             <a:pPr algn="ctr"/>
-            <a:endParaRPr lang="en-GB" sz="2439" dirty="0"/>
+            <a:endParaRPr lang="en-GB" sz="2439" dirty="0">
+              <a:latin typeface="Lato" panose="020F0502020204030203" pitchFamily="34" charset="0"/>
+              <a:ea typeface="Lato" panose="020F0502020204030203" pitchFamily="34" charset="0"/>
+              <a:cs typeface="Lato" panose="020F0502020204030203" pitchFamily="34" charset="0"/>
+            </a:endParaRPr>
           </a:p>
         </p:txBody>
       </p:sp>
@@ -3672,7 +3687,11 @@
           <a:lstStyle/>
           <a:p>
             <a:pPr algn="ctr"/>
-            <a:endParaRPr lang="en-GB" sz="2439" dirty="0"/>
+            <a:endParaRPr lang="en-GB" sz="2439" dirty="0">
+              <a:latin typeface="Lato" panose="020F0502020204030203" pitchFamily="34" charset="0"/>
+              <a:ea typeface="Lato" panose="020F0502020204030203" pitchFamily="34" charset="0"/>
+              <a:cs typeface="Lato" panose="020F0502020204030203" pitchFamily="34" charset="0"/>
+            </a:endParaRPr>
           </a:p>
         </p:txBody>
       </p:sp>
@@ -3709,8 +3728,9 @@
                 <a:solidFill>
                   <a:schemeClr val="bg1"/>
                 </a:solidFill>
-                <a:latin typeface="Roboto" pitchFamily="2" charset="0"/>
-                <a:ea typeface="Roboto" pitchFamily="2" charset="0"/>
+                <a:latin typeface="Lato" panose="020F0502020204030203" pitchFamily="34" charset="0"/>
+                <a:ea typeface="Lato" panose="020F0502020204030203" pitchFamily="34" charset="0"/>
+                <a:cs typeface="Lato" panose="020F0502020204030203" pitchFamily="34" charset="0"/>
               </a:rPr>
               <a:t>Abstract</a:t>
             </a:r>
@@ -3747,15 +3767,17 @@
           <a:p>
             <a:r>
               <a:rPr lang="en-GB" sz="1200" dirty="0">
-                <a:latin typeface="Roboto" pitchFamily="2" charset="0"/>
-                <a:ea typeface="Roboto" pitchFamily="2" charset="0"/>
+                <a:latin typeface="Lato" panose="020F0502020204030203" pitchFamily="34" charset="0"/>
+                <a:ea typeface="Lato" panose="020F0502020204030203" pitchFamily="34" charset="0"/>
+                <a:cs typeface="Lato" panose="020F0502020204030203" pitchFamily="34" charset="0"/>
               </a:rPr>
               <a:t>Through ice-core studies </a:t>
             </a:r>
             <a:r>
               <a:rPr lang="en-GB" sz="1400" dirty="0">
-                <a:latin typeface="Roboto" pitchFamily="2" charset="0"/>
-                <a:ea typeface="Roboto" pitchFamily="2" charset="0"/>
+                <a:latin typeface="Lato" panose="020F0502020204030203" pitchFamily="34" charset="0"/>
+                <a:ea typeface="Lato" panose="020F0502020204030203" pitchFamily="34" charset="0"/>
+                <a:cs typeface="Lato" panose="020F0502020204030203" pitchFamily="34" charset="0"/>
               </a:rPr>
               <a:t> </a:t>
             </a:r>
@@ -3812,7 +3834,11 @@
           <a:lstStyle/>
           <a:p>
             <a:pPr algn="ctr"/>
-            <a:endParaRPr lang="en-GB" sz="2439" dirty="0"/>
+            <a:endParaRPr lang="en-GB" sz="2439" dirty="0">
+              <a:latin typeface="Lato" panose="020F0502020204030203" pitchFamily="34" charset="0"/>
+              <a:ea typeface="Lato" panose="020F0502020204030203" pitchFamily="34" charset="0"/>
+              <a:cs typeface="Lato" panose="020F0502020204030203" pitchFamily="34" charset="0"/>
+            </a:endParaRPr>
           </a:p>
         </p:txBody>
       </p:sp>
@@ -3864,7 +3890,11 @@
           <a:lstStyle/>
           <a:p>
             <a:pPr algn="ctr"/>
-            <a:endParaRPr lang="en-GB" sz="2439" dirty="0"/>
+            <a:endParaRPr lang="en-GB" sz="2439" dirty="0">
+              <a:latin typeface="Lato" panose="020F0502020204030203" pitchFamily="34" charset="0"/>
+              <a:ea typeface="Lato" panose="020F0502020204030203" pitchFamily="34" charset="0"/>
+              <a:cs typeface="Lato" panose="020F0502020204030203" pitchFamily="34" charset="0"/>
+            </a:endParaRPr>
           </a:p>
         </p:txBody>
       </p:sp>
@@ -3901,8 +3931,9 @@
                 <a:solidFill>
                   <a:schemeClr val="bg1"/>
                 </a:solidFill>
-                <a:latin typeface="Roboto" pitchFamily="2" charset="0"/>
-                <a:ea typeface="Roboto" pitchFamily="2" charset="0"/>
+                <a:latin typeface="Lato" panose="020F0502020204030203" pitchFamily="34" charset="0"/>
+                <a:ea typeface="Lato" panose="020F0502020204030203" pitchFamily="34" charset="0"/>
+                <a:cs typeface="Lato" panose="020F0502020204030203" pitchFamily="34" charset="0"/>
               </a:rPr>
               <a:t>Introduction</a:t>
             </a:r>
@@ -3926,7 +3957,7 @@
             <p:spPr>
               <a:xfrm>
                 <a:off x="245530" y="3924892"/>
-                <a:ext cx="3922365" cy="1015663"/>
+                <a:ext cx="3922365" cy="1384995"/>
               </a:xfrm>
               <a:prstGeom prst="rect">
                 <a:avLst/>
@@ -3942,10 +3973,11 @@
                 <a:pPr algn="just"/>
                 <a:r>
                   <a:rPr lang="en-GB" sz="1200" dirty="0">
-                    <a:latin typeface="Roboto" pitchFamily="2" charset="0"/>
-                    <a:ea typeface="Roboto" pitchFamily="2" charset="0"/>
+                    <a:latin typeface="Lato" panose="020F0502020204030203" pitchFamily="34" charset="0"/>
+                    <a:ea typeface="Lato" panose="020F0502020204030203" pitchFamily="34" charset="0"/>
+                    <a:cs typeface="Lato" panose="020F0502020204030203" pitchFamily="34" charset="0"/>
                   </a:rPr>
-                  <a:t>The dynamic evolution of Antarctic glaciation can be demonstrated through the study of the </a:t>
+                  <a:t>The dynamic evolution of Antarctic glaciation can be established through the </a:t>
                 </a:r>
                 <a14:m>
                   <m:oMath xmlns:m="http://schemas.openxmlformats.org/officeDocument/2006/math">
@@ -3981,25 +4013,41 @@
                 </a14:m>
                 <a:r>
                   <a:rPr lang="en-GB" sz="1200" b="0" dirty="0">
-                    <a:latin typeface="Roboto" pitchFamily="2" charset="0"/>
-                    <a:ea typeface="Roboto" pitchFamily="2" charset="0"/>
+                    <a:latin typeface="Lato" panose="020F0502020204030203" pitchFamily="34" charset="0"/>
+                    <a:ea typeface="Lato" panose="020F0502020204030203" pitchFamily="34" charset="0"/>
+                    <a:cs typeface="Lato" panose="020F0502020204030203" pitchFamily="34" charset="0"/>
                   </a:rPr>
-                  <a:t>O ratio in foraminifera. As demonstrated by </a:t>
+                  <a:t>O ratio in sedimented foraminifera. </a:t>
                 </a:r>
                 <a:r>
                   <a:rPr lang="en-GB" sz="1200" b="0" dirty="0" err="1">
-                    <a:latin typeface="Roboto" pitchFamily="2" charset="0"/>
-                    <a:ea typeface="Roboto" pitchFamily="2" charset="0"/>
+                    <a:latin typeface="Lato" panose="020F0502020204030203" pitchFamily="34" charset="0"/>
+                    <a:ea typeface="Lato" panose="020F0502020204030203" pitchFamily="34" charset="0"/>
+                    <a:cs typeface="Lato" panose="020F0502020204030203" pitchFamily="34" charset="0"/>
                   </a:rPr>
                   <a:t>Emiliani</a:t>
                 </a:r>
                 <a:r>
                   <a:rPr lang="en-GB" sz="1200" b="0" dirty="0">
-                    <a:latin typeface="Roboto" pitchFamily="2" charset="0"/>
-                    <a:ea typeface="Roboto" pitchFamily="2" charset="0"/>
+                    <a:latin typeface="Lato" panose="020F0502020204030203" pitchFamily="34" charset="0"/>
+                    <a:ea typeface="Lato" panose="020F0502020204030203" pitchFamily="34" charset="0"/>
+                    <a:cs typeface="Lato" panose="020F0502020204030203" pitchFamily="34" charset="0"/>
                   </a:rPr>
-                  <a:t> (1955), this signal is a result of the isotopic composition of seawater and the change in temperatures. </a:t>
+                  <a:t> (1955) demonstrates that this oxygen signal is a result of changes in the isotopic composition and temperature of seawater. The most prominent climatic shift due to glacial-interglacial transition occurred ca. </a:t>
                 </a:r>
+                <a:r>
+                  <a:rPr lang="en-GB" sz="1200" b="0">
+                    <a:latin typeface="Lato" panose="020F0502020204030203" pitchFamily="34" charset="0"/>
+                    <a:ea typeface="Lato" panose="020F0502020204030203" pitchFamily="34" charset="0"/>
+                    <a:cs typeface="Lato" panose="020F0502020204030203" pitchFamily="34" charset="0"/>
+                  </a:rPr>
+                  <a:t>33.8 Ma </a:t>
+                </a:r>
+                <a:endParaRPr lang="en-GB" sz="1200" b="0" dirty="0">
+                  <a:latin typeface="Lato" panose="020F0502020204030203" pitchFamily="34" charset="0"/>
+                  <a:ea typeface="Lato" panose="020F0502020204030203" pitchFamily="34" charset="0"/>
+                  <a:cs typeface="Lato" panose="020F0502020204030203" pitchFamily="34" charset="0"/>
+                </a:endParaRPr>
               </a:p>
             </p:txBody>
           </p:sp>
@@ -4022,7 +4070,7 @@
             <p:spPr>
               <a:xfrm>
                 <a:off x="245530" y="3924892"/>
-                <a:ext cx="3922365" cy="1015663"/>
+                <a:ext cx="3922365" cy="1384995"/>
               </a:xfrm>
               <a:prstGeom prst="rect">
                 <a:avLst/>
@@ -4030,7 +4078,7 @@
               <a:blipFill>
                 <a:blip r:embed="rId4"/>
                 <a:stretch>
-                  <a:fillRect b="-2469"/>
+                  <a:fillRect b="-1818"/>
                 </a:stretch>
               </a:blipFill>
             </p:spPr>
@@ -4099,7 +4147,11 @@
           <a:lstStyle/>
           <a:p>
             <a:pPr algn="ctr"/>
-            <a:endParaRPr lang="en-GB" sz="2439" dirty="0"/>
+            <a:endParaRPr lang="en-GB" sz="2439" dirty="0">
+              <a:latin typeface="Lato" panose="020F0502020204030203" pitchFamily="34" charset="0"/>
+              <a:ea typeface="Lato" panose="020F0502020204030203" pitchFamily="34" charset="0"/>
+              <a:cs typeface="Lato" panose="020F0502020204030203" pitchFamily="34" charset="0"/>
+            </a:endParaRPr>
           </a:p>
         </p:txBody>
       </p:sp>
@@ -4151,7 +4203,11 @@
           <a:lstStyle/>
           <a:p>
             <a:pPr algn="ctr"/>
-            <a:endParaRPr lang="en-GB" sz="2439" dirty="0"/>
+            <a:endParaRPr lang="en-GB" sz="2439" dirty="0">
+              <a:latin typeface="Lato" panose="020F0502020204030203" pitchFamily="34" charset="0"/>
+              <a:ea typeface="Lato" panose="020F0502020204030203" pitchFamily="34" charset="0"/>
+              <a:cs typeface="Lato" panose="020F0502020204030203" pitchFamily="34" charset="0"/>
+            </a:endParaRPr>
           </a:p>
         </p:txBody>
       </p:sp>
@@ -4188,8 +4244,9 @@
                 <a:solidFill>
                   <a:schemeClr val="bg1"/>
                 </a:solidFill>
-                <a:latin typeface="Roboto" pitchFamily="2" charset="0"/>
-                <a:ea typeface="Roboto" pitchFamily="2" charset="0"/>
+                <a:latin typeface="Lato" panose="020F0502020204030203" pitchFamily="34" charset="0"/>
+                <a:ea typeface="Lato" panose="020F0502020204030203" pitchFamily="34" charset="0"/>
+                <a:cs typeface="Lato" panose="020F0502020204030203" pitchFamily="34" charset="0"/>
               </a:rPr>
               <a:t>References</a:t>
             </a:r>
@@ -4227,43 +4284,49 @@
             <a:pPr algn="just"/>
             <a:r>
               <a:rPr lang="en-GB" sz="800" dirty="0" err="1">
-                <a:latin typeface="Roboto" pitchFamily="2" charset="0"/>
-                <a:ea typeface="Roboto" pitchFamily="2" charset="0"/>
+                <a:latin typeface="Lato" panose="020F0502020204030203" pitchFamily="34" charset="0"/>
+                <a:ea typeface="Lato" panose="020F0502020204030203" pitchFamily="34" charset="0"/>
+                <a:cs typeface="Lato" panose="020F0502020204030203" pitchFamily="34" charset="0"/>
               </a:rPr>
               <a:t>Emiliani</a:t>
             </a:r>
             <a:r>
               <a:rPr lang="en-GB" sz="800" dirty="0">
-                <a:latin typeface="Roboto" pitchFamily="2" charset="0"/>
-                <a:ea typeface="Roboto" pitchFamily="2" charset="0"/>
+                <a:latin typeface="Lato" panose="020F0502020204030203" pitchFamily="34" charset="0"/>
+                <a:ea typeface="Lato" panose="020F0502020204030203" pitchFamily="34" charset="0"/>
+                <a:cs typeface="Lato" panose="020F0502020204030203" pitchFamily="34" charset="0"/>
               </a:rPr>
               <a:t>, C. (1955). Pleistocene temperatures. </a:t>
             </a:r>
             <a:r>
               <a:rPr lang="en-GB" sz="800" i="1" dirty="0">
-                <a:latin typeface="Roboto" pitchFamily="2" charset="0"/>
-                <a:ea typeface="Roboto" pitchFamily="2" charset="0"/>
+                <a:latin typeface="Lato" panose="020F0502020204030203" pitchFamily="34" charset="0"/>
+                <a:ea typeface="Lato" panose="020F0502020204030203" pitchFamily="34" charset="0"/>
+                <a:cs typeface="Lato" panose="020F0502020204030203" pitchFamily="34" charset="0"/>
               </a:rPr>
               <a:t>The Journal of Geology</a:t>
             </a:r>
             <a:r>
               <a:rPr lang="en-GB" sz="800" dirty="0">
-                <a:latin typeface="Roboto" pitchFamily="2" charset="0"/>
-                <a:ea typeface="Roboto" pitchFamily="2" charset="0"/>
+                <a:latin typeface="Lato" panose="020F0502020204030203" pitchFamily="34" charset="0"/>
+                <a:ea typeface="Lato" panose="020F0502020204030203" pitchFamily="34" charset="0"/>
+                <a:cs typeface="Lato" panose="020F0502020204030203" pitchFamily="34" charset="0"/>
               </a:rPr>
               <a:t>, </a:t>
             </a:r>
             <a:r>
               <a:rPr lang="en-GB" sz="800" i="1" dirty="0">
-                <a:latin typeface="Roboto" pitchFamily="2" charset="0"/>
-                <a:ea typeface="Roboto" pitchFamily="2" charset="0"/>
+                <a:latin typeface="Lato" panose="020F0502020204030203" pitchFamily="34" charset="0"/>
+                <a:ea typeface="Lato" panose="020F0502020204030203" pitchFamily="34" charset="0"/>
+                <a:cs typeface="Lato" panose="020F0502020204030203" pitchFamily="34" charset="0"/>
               </a:rPr>
               <a:t>63</a:t>
             </a:r>
             <a:r>
               <a:rPr lang="en-GB" sz="800" dirty="0">
-                <a:latin typeface="Roboto" pitchFamily="2" charset="0"/>
-                <a:ea typeface="Roboto" pitchFamily="2" charset="0"/>
+                <a:latin typeface="Lato" panose="020F0502020204030203" pitchFamily="34" charset="0"/>
+                <a:ea typeface="Lato" panose="020F0502020204030203" pitchFamily="34" charset="0"/>
+                <a:cs typeface="Lato" panose="020F0502020204030203" pitchFamily="34" charset="0"/>
               </a:rPr>
               <a:t>(6), 538-578.</a:t>
             </a:r>
@@ -4272,64 +4335,73 @@
             <a:pPr algn="just"/>
             <a:r>
               <a:rPr lang="en-GB" sz="800" dirty="0">
-                <a:latin typeface="Roboto" pitchFamily="2" charset="0"/>
-                <a:ea typeface="Roboto" pitchFamily="2" charset="0"/>
+                <a:latin typeface="Lato" panose="020F0502020204030203" pitchFamily="34" charset="0"/>
+                <a:ea typeface="Lato" panose="020F0502020204030203" pitchFamily="34" charset="0"/>
+                <a:cs typeface="Lato" panose="020F0502020204030203" pitchFamily="34" charset="0"/>
               </a:rPr>
               <a:t>Kennett, J. P. (1977). </a:t>
             </a:r>
             <a:r>
               <a:rPr lang="en-GB" sz="800" dirty="0" err="1">
-                <a:latin typeface="Roboto" pitchFamily="2" charset="0"/>
-                <a:ea typeface="Roboto" pitchFamily="2" charset="0"/>
+                <a:latin typeface="Lato" panose="020F0502020204030203" pitchFamily="34" charset="0"/>
+                <a:ea typeface="Lato" panose="020F0502020204030203" pitchFamily="34" charset="0"/>
+                <a:cs typeface="Lato" panose="020F0502020204030203" pitchFamily="34" charset="0"/>
               </a:rPr>
               <a:t>Cenozoic</a:t>
             </a:r>
             <a:r>
               <a:rPr lang="en-GB" sz="800" dirty="0">
-                <a:latin typeface="Roboto" pitchFamily="2" charset="0"/>
-                <a:ea typeface="Roboto" pitchFamily="2" charset="0"/>
+                <a:latin typeface="Lato" panose="020F0502020204030203" pitchFamily="34" charset="0"/>
+                <a:ea typeface="Lato" panose="020F0502020204030203" pitchFamily="34" charset="0"/>
+                <a:cs typeface="Lato" panose="020F0502020204030203" pitchFamily="34" charset="0"/>
               </a:rPr>
               <a:t> evolution of Antarctic glaciation, the circum‐Antarctic Ocean, and their impact on global </a:t>
             </a:r>
             <a:r>
               <a:rPr lang="en-GB" sz="800" dirty="0" err="1">
-                <a:latin typeface="Roboto" pitchFamily="2" charset="0"/>
-                <a:ea typeface="Roboto" pitchFamily="2" charset="0"/>
+                <a:latin typeface="Lato" panose="020F0502020204030203" pitchFamily="34" charset="0"/>
+                <a:ea typeface="Lato" panose="020F0502020204030203" pitchFamily="34" charset="0"/>
+                <a:cs typeface="Lato" panose="020F0502020204030203" pitchFamily="34" charset="0"/>
               </a:rPr>
               <a:t>paleoceanography</a:t>
             </a:r>
             <a:r>
               <a:rPr lang="en-GB" sz="800" dirty="0">
-                <a:latin typeface="Roboto" pitchFamily="2" charset="0"/>
-                <a:ea typeface="Roboto" pitchFamily="2" charset="0"/>
+                <a:latin typeface="Lato" panose="020F0502020204030203" pitchFamily="34" charset="0"/>
+                <a:ea typeface="Lato" panose="020F0502020204030203" pitchFamily="34" charset="0"/>
+                <a:cs typeface="Lato" panose="020F0502020204030203" pitchFamily="34" charset="0"/>
               </a:rPr>
               <a:t>. </a:t>
             </a:r>
             <a:r>
               <a:rPr lang="en-GB" sz="800" i="1" dirty="0">
-                <a:latin typeface="Roboto" pitchFamily="2" charset="0"/>
-                <a:ea typeface="Roboto" pitchFamily="2" charset="0"/>
+                <a:latin typeface="Lato" panose="020F0502020204030203" pitchFamily="34" charset="0"/>
+                <a:ea typeface="Lato" panose="020F0502020204030203" pitchFamily="34" charset="0"/>
+                <a:cs typeface="Lato" panose="020F0502020204030203" pitchFamily="34" charset="0"/>
               </a:rPr>
               <a:t>Journal of Geophysical Research</a:t>
             </a:r>
             <a:r>
               <a:rPr lang="en-GB" sz="800" dirty="0">
-                <a:latin typeface="Roboto" pitchFamily="2" charset="0"/>
-                <a:ea typeface="Roboto" pitchFamily="2" charset="0"/>
+                <a:latin typeface="Lato" panose="020F0502020204030203" pitchFamily="34" charset="0"/>
+                <a:ea typeface="Lato" panose="020F0502020204030203" pitchFamily="34" charset="0"/>
+                <a:cs typeface="Lato" panose="020F0502020204030203" pitchFamily="34" charset="0"/>
               </a:rPr>
               <a:t>, </a:t>
             </a:r>
             <a:r>
               <a:rPr lang="en-GB" sz="800" i="1" dirty="0">
-                <a:latin typeface="Roboto" pitchFamily="2" charset="0"/>
-                <a:ea typeface="Roboto" pitchFamily="2" charset="0"/>
+                <a:latin typeface="Lato" panose="020F0502020204030203" pitchFamily="34" charset="0"/>
+                <a:ea typeface="Lato" panose="020F0502020204030203" pitchFamily="34" charset="0"/>
+                <a:cs typeface="Lato" panose="020F0502020204030203" pitchFamily="34" charset="0"/>
               </a:rPr>
               <a:t>82</a:t>
             </a:r>
             <a:r>
               <a:rPr lang="en-GB" sz="800" dirty="0">
-                <a:latin typeface="Roboto" pitchFamily="2" charset="0"/>
-                <a:ea typeface="Roboto" pitchFamily="2" charset="0"/>
+                <a:latin typeface="Lato" panose="020F0502020204030203" pitchFamily="34" charset="0"/>
+                <a:ea typeface="Lato" panose="020F0502020204030203" pitchFamily="34" charset="0"/>
+                <a:cs typeface="Lato" panose="020F0502020204030203" pitchFamily="34" charset="0"/>
               </a:rPr>
               <a:t>(27), 3843-3860.</a:t>
             </a:r>
@@ -4386,7 +4458,11 @@
           <a:lstStyle/>
           <a:p>
             <a:pPr algn="ctr"/>
-            <a:endParaRPr lang="en-GB" sz="2439" dirty="0"/>
+            <a:endParaRPr lang="en-GB" sz="2439" dirty="0">
+              <a:latin typeface="Lato" panose="020F0502020204030203" pitchFamily="34" charset="0"/>
+              <a:ea typeface="Lato" panose="020F0502020204030203" pitchFamily="34" charset="0"/>
+              <a:cs typeface="Lato" panose="020F0502020204030203" pitchFamily="34" charset="0"/>
+            </a:endParaRPr>
           </a:p>
         </p:txBody>
       </p:sp>
@@ -4438,7 +4514,11 @@
           <a:lstStyle/>
           <a:p>
             <a:pPr algn="ctr"/>
-            <a:endParaRPr lang="en-GB" sz="2439" dirty="0"/>
+            <a:endParaRPr lang="en-GB" sz="2439" dirty="0">
+              <a:latin typeface="Lato" panose="020F0502020204030203" pitchFamily="34" charset="0"/>
+              <a:ea typeface="Lato" panose="020F0502020204030203" pitchFamily="34" charset="0"/>
+              <a:cs typeface="Lato" panose="020F0502020204030203" pitchFamily="34" charset="0"/>
+            </a:endParaRPr>
           </a:p>
         </p:txBody>
       </p:sp>
@@ -4475,8 +4555,9 @@
                 <a:solidFill>
                   <a:schemeClr val="bg1"/>
                 </a:solidFill>
-                <a:latin typeface="Roboto" pitchFamily="2" charset="0"/>
-                <a:ea typeface="Roboto" pitchFamily="2" charset="0"/>
+                <a:latin typeface="Lato" panose="020F0502020204030203" pitchFamily="34" charset="0"/>
+                <a:ea typeface="Lato" panose="020F0502020204030203" pitchFamily="34" charset="0"/>
+                <a:cs typeface="Lato" panose="020F0502020204030203" pitchFamily="34" charset="0"/>
               </a:rPr>
               <a:t>Conclusions</a:t>
             </a:r>
@@ -4513,8 +4594,9 @@
           <a:p>
             <a:r>
               <a:rPr lang="en-GB" sz="1200" dirty="0">
-                <a:latin typeface="Roboto" pitchFamily="2" charset="0"/>
-                <a:ea typeface="Roboto" pitchFamily="2" charset="0"/>
+                <a:latin typeface="Lato" panose="020F0502020204030203" pitchFamily="34" charset="0"/>
+                <a:ea typeface="Lato" panose="020F0502020204030203" pitchFamily="34" charset="0"/>
+                <a:cs typeface="Lato" panose="020F0502020204030203" pitchFamily="34" charset="0"/>
               </a:rPr>
               <a:t>Through </a:t>
             </a:r>
@@ -4571,7 +4653,11 @@
           <a:lstStyle/>
           <a:p>
             <a:pPr algn="ctr"/>
-            <a:endParaRPr lang="en-GB" sz="2439" dirty="0"/>
+            <a:endParaRPr lang="en-GB" sz="2439" dirty="0">
+              <a:latin typeface="Lato" panose="020F0502020204030203" pitchFamily="34" charset="0"/>
+              <a:ea typeface="Lato" panose="020F0502020204030203" pitchFamily="34" charset="0"/>
+              <a:cs typeface="Lato" panose="020F0502020204030203" pitchFamily="34" charset="0"/>
+            </a:endParaRPr>
           </a:p>
         </p:txBody>
       </p:sp>
@@ -4625,10 +4711,61 @@
           <a:lstStyle/>
           <a:p>
             <a:pPr algn="ctr"/>
-            <a:endParaRPr lang="en-GB" sz="2439" dirty="0"/>
-          </a:p>
-        </p:txBody>
-      </p:sp>
+            <a:endParaRPr lang="en-GB" sz="2439" dirty="0">
+              <a:latin typeface="Lato" panose="020F0502020204030203" pitchFamily="34" charset="0"/>
+              <a:ea typeface="Lato" panose="020F0502020204030203" pitchFamily="34" charset="0"/>
+              <a:cs typeface="Lato" panose="020F0502020204030203" pitchFamily="34" charset="0"/>
+            </a:endParaRPr>
+          </a:p>
+        </p:txBody>
+      </p:sp>
+      <p:pic>
+        <p:nvPicPr>
+          <p:cNvPr id="24" name="Picture 14" descr="Cover">
+            <a:extLst>
+              <a:ext uri="{FF2B5EF4-FFF2-40B4-BE49-F238E27FC236}">
+                <a16:creationId xmlns:a16="http://schemas.microsoft.com/office/drawing/2014/main" id="{81386948-EC04-1943-856D-CDA05136C9C7}"/>
+              </a:ext>
+            </a:extLst>
+          </p:cNvPr>
+          <p:cNvPicPr>
+            <a:picLocks noChangeAspect="1" noChangeArrowheads="1"/>
+          </p:cNvPicPr>
+          <p:nvPr/>
+        </p:nvPicPr>
+        <p:blipFill>
+          <a:blip r:embed="rId5">
+            <a:extLst>
+              <a:ext uri="{28A0092B-C50C-407E-A947-70E740481C1C}">
+                <a14:useLocalDpi xmlns:a14="http://schemas.microsoft.com/office/drawing/2010/main" val="0"/>
+              </a:ext>
+            </a:extLst>
+          </a:blip>
+          <a:srcRect/>
+          <a:stretch>
+            <a:fillRect/>
+          </a:stretch>
+        </p:blipFill>
+        <p:spPr bwMode="auto">
+          <a:xfrm>
+            <a:off x="4439592" y="1427591"/>
+            <a:ext cx="4114800" cy="2690813"/>
+          </a:xfrm>
+          <a:prstGeom prst="rect">
+            <a:avLst/>
+          </a:prstGeom>
+          <a:noFill/>
+          <a:extLst>
+            <a:ext uri="{909E8E84-426E-40DD-AFC4-6F175D3DCCD1}">
+              <a14:hiddenFill xmlns:a14="http://schemas.microsoft.com/office/drawing/2010/main">
+                <a:solidFill>
+                  <a:srgbClr val="FFFFFF"/>
+                </a:solidFill>
+              </a14:hiddenFill>
+            </a:ext>
+          </a:extLst>
+        </p:spPr>
+      </p:pic>
     </p:spTree>
     <p:extLst>
       <p:ext uri="{BB962C8B-B14F-4D97-AF65-F5344CB8AC3E}">

</xml_diff>

<commit_message>
esc4: p: finished introduction and relation to ESC
</commit_message>
<xml_diff>
--- a/earth_system_and_climate_4/term_2/poster/oxygen_poster.pptx
+++ b/earth_system_and_climate_4/term_2/poster/oxygen_poster.pptx
@@ -3798,8 +3798,8 @@
         </p:nvSpPr>
         <p:spPr>
           <a:xfrm>
-            <a:off x="245535" y="3583800"/>
-            <a:ext cx="3922370" cy="2320052"/>
+            <a:off x="245535" y="3583799"/>
+            <a:ext cx="3922370" cy="3248801"/>
           </a:xfrm>
           <a:prstGeom prst="rect">
             <a:avLst/>
@@ -3956,8 +3956,8 @@
             </p:nvSpPr>
             <p:spPr>
               <a:xfrm>
-                <a:off x="245530" y="3924892"/>
-                <a:ext cx="3922365" cy="1384995"/>
+                <a:off x="245519" y="3923164"/>
+                <a:ext cx="3922365" cy="3046988"/>
               </a:xfrm>
               <a:prstGeom prst="rect">
                 <a:avLst/>
@@ -3972,19 +3972,43 @@
               <a:p>
                 <a:pPr algn="just"/>
                 <a:r>
+                  <a:rPr lang="en-GB" sz="1200" b="0" dirty="0">
+                    <a:latin typeface="Lato" panose="020F0502020204030203" pitchFamily="34" charset="0"/>
+                    <a:ea typeface="Lato" panose="020F0502020204030203" pitchFamily="34" charset="0"/>
+                    <a:cs typeface="Lato" panose="020F0502020204030203" pitchFamily="34" charset="0"/>
+                  </a:rPr>
+                  <a:t>One of the most prominent climatic changes in Earth’s history occurred in the </a:t>
+                </a:r>
+                <a:r>
+                  <a:rPr lang="en-GB" sz="1200" b="0" dirty="0" err="1">
+                    <a:latin typeface="Lato" panose="020F0502020204030203" pitchFamily="34" charset="0"/>
+                    <a:ea typeface="Lato" panose="020F0502020204030203" pitchFamily="34" charset="0"/>
+                    <a:cs typeface="Lato" panose="020F0502020204030203" pitchFamily="34" charset="0"/>
+                  </a:rPr>
+                  <a:t>Cenozoic</a:t>
+                </a:r>
+                <a:r>
+                  <a:rPr lang="en-GB" sz="1200" b="0" dirty="0">
+                    <a:latin typeface="Lato" panose="020F0502020204030203" pitchFamily="34" charset="0"/>
+                    <a:ea typeface="Lato" panose="020F0502020204030203" pitchFamily="34" charset="0"/>
+                    <a:cs typeface="Lato" panose="020F0502020204030203" pitchFamily="34" charset="0"/>
+                  </a:rPr>
+                  <a:t> near to the Eocene-Oligocene transition, ca. 33.8 Ma</a:t>
+                </a:r>
+                <a:r>
                   <a:rPr lang="en-GB" sz="1200" dirty="0">
                     <a:latin typeface="Lato" panose="020F0502020204030203" pitchFamily="34" charset="0"/>
                     <a:ea typeface="Lato" panose="020F0502020204030203" pitchFamily="34" charset="0"/>
                     <a:cs typeface="Lato" panose="020F0502020204030203" pitchFamily="34" charset="0"/>
                   </a:rPr>
-                  <a:t>The dynamic evolution of Antarctic glaciation can be established through the </a:t>
+                  <a:t>. At this boundary the decrease in global temperatures lead to effects such as permanent ice-sheet formation on Antarctica. Through studying the </a:t>
                 </a:r>
                 <a14:m>
                   <m:oMath xmlns:m="http://schemas.openxmlformats.org/officeDocument/2006/math">
                     <m:sSup>
                       <m:sSupPr>
                         <m:ctrlPr>
-                          <a:rPr lang="en-GB" sz="1200" b="0" i="1" smtClean="0">
+                          <a:rPr lang="en-GB" sz="1200" i="1">
                             <a:latin typeface="Cambria Math" panose="02040503050406030204" pitchFamily="18" charset="0"/>
                             <a:ea typeface="Cambria Math" panose="02040503050406030204" pitchFamily="18" charset="0"/>
                           </a:rPr>
@@ -3992,7 +4016,7 @@
                       </m:sSupPr>
                       <m:e>
                         <m:r>
-                          <a:rPr lang="en-GB" sz="1200" i="1" smtClean="0">
+                          <a:rPr lang="en-GB" sz="1200" i="1">
                             <a:latin typeface="Cambria Math" panose="02040503050406030204" pitchFamily="18" charset="0"/>
                             <a:ea typeface="Cambria Math" panose="02040503050406030204" pitchFamily="18" charset="0"/>
                           </a:rPr>
@@ -4001,7 +4025,7 @@
                       </m:e>
                       <m:sup>
                         <m:r>
-                          <a:rPr lang="en-GB" sz="1200" b="0" i="1" smtClean="0">
+                          <a:rPr lang="en-GB" sz="1200" i="1">
                             <a:latin typeface="Cambria Math" panose="02040503050406030204" pitchFamily="18" charset="0"/>
                             <a:ea typeface="Cambria Math" panose="02040503050406030204" pitchFamily="18" charset="0"/>
                           </a:rPr>
@@ -4012,15 +4036,15 @@
                   </m:oMath>
                 </a14:m>
                 <a:r>
-                  <a:rPr lang="en-GB" sz="1200" b="0" dirty="0">
+                  <a:rPr lang="en-GB" sz="1200" dirty="0">
                     <a:latin typeface="Lato" panose="020F0502020204030203" pitchFamily="34" charset="0"/>
                     <a:ea typeface="Lato" panose="020F0502020204030203" pitchFamily="34" charset="0"/>
                     <a:cs typeface="Lato" panose="020F0502020204030203" pitchFamily="34" charset="0"/>
                   </a:rPr>
-                  <a:t>O ratio in sedimented foraminifera. </a:t>
+                  <a:t>O ratio in sedimented foraminifera from ice-core samples, this glaciation can be placed into a long history of glacial-interglacial shifts. Changes in the isotopic composition and temperature of seawater results in variations in the oxygen ratio (</a:t>
                 </a:r>
                 <a:r>
-                  <a:rPr lang="en-GB" sz="1200" b="0" dirty="0" err="1">
+                  <a:rPr lang="en-GB" sz="1200" dirty="0" err="1">
                     <a:latin typeface="Lato" panose="020F0502020204030203" pitchFamily="34" charset="0"/>
                     <a:ea typeface="Lato" panose="020F0502020204030203" pitchFamily="34" charset="0"/>
                     <a:cs typeface="Lato" panose="020F0502020204030203" pitchFamily="34" charset="0"/>
@@ -4028,21 +4052,51 @@
                   <a:t>Emiliani</a:t>
                 </a:r>
                 <a:r>
-                  <a:rPr lang="en-GB" sz="1200" b="0" dirty="0">
+                  <a:rPr lang="en-GB" sz="1200" dirty="0">
                     <a:latin typeface="Lato" panose="020F0502020204030203" pitchFamily="34" charset="0"/>
                     <a:ea typeface="Lato" panose="020F0502020204030203" pitchFamily="34" charset="0"/>
                     <a:cs typeface="Lato" panose="020F0502020204030203" pitchFamily="34" charset="0"/>
                   </a:rPr>
-                  <a:t> (1955) demonstrates that this oxygen signal is a result of changes in the isotopic composition and temperature of seawater. The most prominent climatic shift due to glacial-interglacial transition occurred ca. </a:t>
+                  <a:t> 1955), thus the larger climate picture can be reconstructed.</a:t>
                 </a:r>
+              </a:p>
+              <a:p>
+                <a:pPr algn="just"/>
+                <a:endParaRPr lang="en-GB" sz="1200" b="1" i="1" dirty="0">
+                  <a:latin typeface="Lato" panose="020F0502020204030203" pitchFamily="34" charset="0"/>
+                  <a:ea typeface="Lato" panose="020F0502020204030203" pitchFamily="34" charset="0"/>
+                  <a:cs typeface="Lato" panose="020F0502020204030203" pitchFamily="34" charset="0"/>
+                </a:endParaRPr>
+              </a:p>
+              <a:p>
+                <a:pPr algn="just"/>
                 <a:r>
-                  <a:rPr lang="en-GB" sz="1200" b="0">
+                  <a:rPr lang="en-GB" sz="1200" dirty="0">
                     <a:latin typeface="Lato" panose="020F0502020204030203" pitchFamily="34" charset="0"/>
                     <a:ea typeface="Lato" panose="020F0502020204030203" pitchFamily="34" charset="0"/>
                     <a:cs typeface="Lato" panose="020F0502020204030203" pitchFamily="34" charset="0"/>
                   </a:rPr>
-                  <a:t>33.8 Ma </a:t>
+                  <a:t>The following should therefore be investigated: </a:t>
                 </a:r>
+              </a:p>
+              <a:p>
+                <a:pPr algn="just"/>
+                <a:r>
+                  <a:rPr lang="en-GB" sz="1200" b="1" i="1" dirty="0">
+                    <a:latin typeface="Lato" panose="020F0502020204030203" pitchFamily="34" charset="0"/>
+                    <a:ea typeface="Lato" panose="020F0502020204030203" pitchFamily="34" charset="0"/>
+                    <a:cs typeface="Lato" panose="020F0502020204030203" pitchFamily="34" charset="0"/>
+                  </a:rPr>
+                  <a:t>Is there oxygen isotope evidence which demonstrates Antarctic glaciation? </a:t>
+                </a:r>
+                <a:endParaRPr lang="en-GB" sz="1200" dirty="0">
+                  <a:latin typeface="Lato" panose="020F0502020204030203" pitchFamily="34" charset="0"/>
+                  <a:ea typeface="Lato" panose="020F0502020204030203" pitchFamily="34" charset="0"/>
+                  <a:cs typeface="Lato" panose="020F0502020204030203" pitchFamily="34" charset="0"/>
+                </a:endParaRPr>
+              </a:p>
+              <a:p>
+                <a:pPr algn="just"/>
                 <a:endParaRPr lang="en-GB" sz="1200" b="0" dirty="0">
                   <a:latin typeface="Lato" panose="020F0502020204030203" pitchFamily="34" charset="0"/>
                   <a:ea typeface="Lato" panose="020F0502020204030203" pitchFamily="34" charset="0"/>
@@ -4069,8 +4123,8 @@
             </p:nvSpPr>
             <p:spPr>
               <a:xfrm>
-                <a:off x="245530" y="3924892"/>
-                <a:ext cx="3922365" cy="1384995"/>
+                <a:off x="245519" y="3923164"/>
+                <a:ext cx="3922365" cy="3046988"/>
               </a:xfrm>
               <a:prstGeom prst="rect">
                 <a:avLst/>
@@ -4078,7 +4132,7 @@
               <a:blipFill>
                 <a:blip r:embed="rId4"/>
                 <a:stretch>
-                  <a:fillRect b="-1818"/>
+                  <a:fillRect/>
                 </a:stretch>
               </a:blipFill>
             </p:spPr>
@@ -4719,53 +4773,104 @@
           </a:p>
         </p:txBody>
       </p:sp>
-      <p:pic>
-        <p:nvPicPr>
-          <p:cNvPr id="24" name="Picture 14" descr="Cover">
+      <p:sp>
+        <p:nvSpPr>
+          <p:cNvPr id="30" name="Rectangle 29">
             <a:extLst>
               <a:ext uri="{FF2B5EF4-FFF2-40B4-BE49-F238E27FC236}">
-                <a16:creationId xmlns:a16="http://schemas.microsoft.com/office/drawing/2014/main" id="{81386948-EC04-1943-856D-CDA05136C9C7}"/>
+                <a16:creationId xmlns:a16="http://schemas.microsoft.com/office/drawing/2014/main" id="{080FDE6A-C607-E74A-9CEE-BE42562C605A}"/>
               </a:ext>
             </a:extLst>
           </p:cNvPr>
-          <p:cNvPicPr>
-            <a:picLocks noChangeAspect="1" noChangeArrowheads="1"/>
-          </p:cNvPicPr>
+          <p:cNvSpPr/>
           <p:nvPr/>
-        </p:nvPicPr>
-        <p:blipFill>
-          <a:blip r:embed="rId5">
+        </p:nvSpPr>
+        <p:spPr>
+          <a:xfrm>
+            <a:off x="8633679" y="6179763"/>
+            <a:ext cx="3922360" cy="1030288"/>
+          </a:xfrm>
+          <a:prstGeom prst="rect">
+            <a:avLst/>
+          </a:prstGeom>
+          <a:solidFill>
+            <a:srgbClr val="FFFFFF"/>
+          </a:solidFill>
+          <a:ln w="25400">
+            <a:solidFill>
+              <a:srgbClr val="2096F4"/>
+            </a:solidFill>
+          </a:ln>
+        </p:spPr>
+        <p:style>
+          <a:lnRef idx="2">
+            <a:schemeClr val="accent1">
+              <a:shade val="50000"/>
+            </a:schemeClr>
+          </a:lnRef>
+          <a:fillRef idx="1">
+            <a:schemeClr val="accent1"/>
+          </a:fillRef>
+          <a:effectRef idx="0">
+            <a:schemeClr val="accent1"/>
+          </a:effectRef>
+          <a:fontRef idx="minor">
+            <a:schemeClr val="lt1"/>
+          </a:fontRef>
+        </p:style>
+        <p:txBody>
+          <a:bodyPr rtlCol="0" anchor="ctr"/>
+          <a:lstStyle/>
+          <a:p>
+            <a:pPr algn="ctr"/>
+            <a:endParaRPr lang="en-GB" sz="2439" dirty="0">
+              <a:latin typeface="Lato" panose="020F0502020204030203" pitchFamily="34" charset="0"/>
+              <a:ea typeface="Lato" panose="020F0502020204030203" pitchFamily="34" charset="0"/>
+              <a:cs typeface="Lato" panose="020F0502020204030203" pitchFamily="34" charset="0"/>
+            </a:endParaRPr>
+          </a:p>
+        </p:txBody>
+      </p:sp>
+      <p:sp>
+        <p:nvSpPr>
+          <p:cNvPr id="46" name="TextBox 45">
             <a:extLst>
-              <a:ext uri="{28A0092B-C50C-407E-A947-70E740481C1C}">
-                <a14:useLocalDpi xmlns:a14="http://schemas.microsoft.com/office/drawing/2010/main" val="0"/>
+              <a:ext uri="{FF2B5EF4-FFF2-40B4-BE49-F238E27FC236}">
+                <a16:creationId xmlns:a16="http://schemas.microsoft.com/office/drawing/2014/main" id="{AF71F8FE-2F69-7447-AE47-DC47CD3E58A4}"/>
               </a:ext>
             </a:extLst>
-          </a:blip>
-          <a:srcRect/>
-          <a:stretch>
-            <a:fillRect/>
-          </a:stretch>
-        </p:blipFill>
-        <p:spPr bwMode="auto">
+          </p:cNvPr>
+          <p:cNvSpPr txBox="1"/>
+          <p:nvPr/>
+        </p:nvSpPr>
+        <p:spPr>
           <a:xfrm>
-            <a:off x="4439592" y="1427591"/>
-            <a:ext cx="4114800" cy="2690813"/>
+            <a:off x="8633674" y="6175164"/>
+            <a:ext cx="3922365" cy="1015663"/>
           </a:xfrm>
           <a:prstGeom prst="rect">
             <a:avLst/>
           </a:prstGeom>
           <a:noFill/>
-          <a:extLst>
-            <a:ext uri="{909E8E84-426E-40DD-AFC4-6F175D3DCCD1}">
-              <a14:hiddenFill xmlns:a14="http://schemas.microsoft.com/office/drawing/2010/main">
-                <a:solidFill>
-                  <a:srgbClr val="FFFFFF"/>
-                </a:solidFill>
-              </a14:hiddenFill>
-            </a:ext>
-          </a:extLst>
         </p:spPr>
-      </p:pic>
+        <p:txBody>
+          <a:bodyPr wrap="square" rtlCol="0">
+            <a:spAutoFit/>
+          </a:bodyPr>
+          <a:lstStyle/>
+          <a:p>
+            <a:pPr algn="just"/>
+            <a:r>
+              <a:rPr lang="en-GB" sz="1200" b="0" dirty="0">
+                <a:latin typeface="Lato" panose="020F0502020204030203" pitchFamily="34" charset="0"/>
+                <a:ea typeface="Lato" panose="020F0502020204030203" pitchFamily="34" charset="0"/>
+                <a:cs typeface="Lato" panose="020F0502020204030203" pitchFamily="34" charset="0"/>
+              </a:rPr>
+              <a:t>This topic returns to the idea of how isotopes such as oxygen can be used to reconstruct paleotemperatures and climates. This in turn could provide potential evidence and support for hypotheses such as the “over-chill”, “over-kill”, or “over-ill” theories. </a:t>
+            </a:r>
+          </a:p>
+        </p:txBody>
+      </p:sp>
     </p:spTree>
     <p:extLst>
       <p:ext uri="{BB962C8B-B14F-4D97-AF65-F5344CB8AC3E}">

</xml_diff>

<commit_message>
esc4: p: antarctic drilling section
</commit_message>
<xml_diff>
--- a/earth_system_and_climate_4/term_2/poster/oxygen_poster.pptx
+++ b/earth_system_and_climate_4/term_2/poster/oxygen_poster.pptx
@@ -4321,8 +4321,8 @@
         </p:nvSpPr>
         <p:spPr>
           <a:xfrm>
-            <a:off x="8633686" y="7666501"/>
-            <a:ext cx="3922353" cy="707886"/>
+            <a:off x="8633679" y="7616965"/>
+            <a:ext cx="3922353" cy="830997"/>
           </a:xfrm>
           <a:prstGeom prst="rect">
             <a:avLst/>
@@ -4337,6 +4337,49 @@
           <a:p>
             <a:pPr algn="just"/>
             <a:r>
+              <a:rPr lang="en-GB" sz="800" dirty="0">
+                <a:latin typeface="Lato" panose="020F0502020204030203" pitchFamily="34" charset="0"/>
+                <a:ea typeface="Lato" panose="020F0502020204030203" pitchFamily="34" charset="0"/>
+                <a:cs typeface="Lato" panose="020F0502020204030203" pitchFamily="34" charset="0"/>
+              </a:rPr>
+              <a:t>Carter, A., Riley, T. R., Hillenbrand, C. D., &amp; </a:t>
+            </a:r>
+            <a:r>
+              <a:rPr lang="en-GB" sz="800" dirty="0" err="1">
+                <a:latin typeface="Lato" panose="020F0502020204030203" pitchFamily="34" charset="0"/>
+                <a:ea typeface="Lato" panose="020F0502020204030203" pitchFamily="34" charset="0"/>
+                <a:cs typeface="Lato" panose="020F0502020204030203" pitchFamily="34" charset="0"/>
+              </a:rPr>
+              <a:t>Rittner</a:t>
+            </a:r>
+            <a:r>
+              <a:rPr lang="en-GB" sz="800" dirty="0">
+                <a:latin typeface="Lato" panose="020F0502020204030203" pitchFamily="34" charset="0"/>
+                <a:ea typeface="Lato" panose="020F0502020204030203" pitchFamily="34" charset="0"/>
+                <a:cs typeface="Lato" panose="020F0502020204030203" pitchFamily="34" charset="0"/>
+              </a:rPr>
+              <a:t>, M. (2017). Widespread Antarctic glaciation during the late Eocene. </a:t>
+            </a:r>
+            <a:r>
+              <a:rPr lang="en-GB" sz="800" i="1" dirty="0">
+                <a:latin typeface="Lato" panose="020F0502020204030203" pitchFamily="34" charset="0"/>
+                <a:ea typeface="Lato" panose="020F0502020204030203" pitchFamily="34" charset="0"/>
+                <a:cs typeface="Lato" panose="020F0502020204030203" pitchFamily="34" charset="0"/>
+              </a:rPr>
+              <a:t>Earth and Planetary Science Letters</a:t>
+            </a:r>
+            <a:r>
+              <a:rPr lang="en-GB" sz="800" dirty="0">
+                <a:latin typeface="Lato" panose="020F0502020204030203" pitchFamily="34" charset="0"/>
+                <a:ea typeface="Lato" panose="020F0502020204030203" pitchFamily="34" charset="0"/>
+                <a:cs typeface="Lato" panose="020F0502020204030203" pitchFamily="34" charset="0"/>
+              </a:rPr>
+              <a:t>, 458, 49-57.</a:t>
+            </a:r>
+          </a:p>
+          <a:p>
+            <a:pPr algn="just"/>
+            <a:r>
               <a:rPr lang="en-GB" sz="800" dirty="0" err="1">
                 <a:latin typeface="Lato" panose="020F0502020204030203" pitchFamily="34" charset="0"/>
                 <a:ea typeface="Lato" panose="020F0502020204030203" pitchFamily="34" charset="0"/>
@@ -4358,7 +4401,15 @@
                 <a:ea typeface="Lato" panose="020F0502020204030203" pitchFamily="34" charset="0"/>
                 <a:cs typeface="Lato" panose="020F0502020204030203" pitchFamily="34" charset="0"/>
               </a:rPr>
-              <a:t>The Journal of Geology</a:t>
+              <a:t>J </a:t>
+            </a:r>
+            <a:r>
+              <a:rPr lang="en-GB" sz="800" i="1" dirty="0" err="1">
+                <a:latin typeface="Lato" panose="020F0502020204030203" pitchFamily="34" charset="0"/>
+                <a:ea typeface="Lato" panose="020F0502020204030203" pitchFamily="34" charset="0"/>
+                <a:cs typeface="Lato" panose="020F0502020204030203" pitchFamily="34" charset="0"/>
+              </a:rPr>
+              <a:t>Geol</a:t>
             </a:r>
             <a:r>
               <a:rPr lang="en-GB" sz="800" dirty="0">
@@ -4845,7 +4896,7 @@
         </p:nvSpPr>
         <p:spPr>
           <a:xfrm>
-            <a:off x="8633674" y="6175164"/>
+            <a:off x="8633674" y="6199268"/>
             <a:ext cx="3922365" cy="1015663"/>
           </a:xfrm>
           <a:prstGeom prst="rect">
@@ -4866,7 +4917,454 @@
                 <a:ea typeface="Lato" panose="020F0502020204030203" pitchFamily="34" charset="0"/>
                 <a:cs typeface="Lato" panose="020F0502020204030203" pitchFamily="34" charset="0"/>
               </a:rPr>
-              <a:t>This topic returns to the idea of how isotopes such as oxygen can be used to reconstruct paleotemperatures and climates. This in turn could provide potential evidence and support for hypotheses such as the “over-chill”, “over-kill”, or “over-ill” theories. </a:t>
+              <a:t>This topic returns to the idea of how isotopes such as oxygen can be used to reconstruct paleotemperatures and climates, this in turn could provide potential evidence and support for hypotheses such as the “over-chill”, “over-kill”, or “over-ill” theories. </a:t>
+            </a:r>
+          </a:p>
+        </p:txBody>
+      </p:sp>
+      <p:sp>
+        <p:nvSpPr>
+          <p:cNvPr id="50" name="Rectangle 49">
+            <a:extLst>
+              <a:ext uri="{FF2B5EF4-FFF2-40B4-BE49-F238E27FC236}">
+                <a16:creationId xmlns:a16="http://schemas.microsoft.com/office/drawing/2014/main" id="{3E8C918B-92A3-4341-9FBB-51B85D3353A3}"/>
+              </a:ext>
+            </a:extLst>
+          </p:cNvPr>
+          <p:cNvSpPr/>
+          <p:nvPr/>
+        </p:nvSpPr>
+        <p:spPr>
+          <a:xfrm>
+            <a:off x="246728" y="7005378"/>
+            <a:ext cx="3922373" cy="2387863"/>
+          </a:xfrm>
+          <a:prstGeom prst="rect">
+            <a:avLst/>
+          </a:prstGeom>
+          <a:solidFill>
+            <a:srgbClr val="FFFFFF"/>
+          </a:solidFill>
+          <a:ln w="25400">
+            <a:solidFill>
+              <a:srgbClr val="2096F4"/>
+            </a:solidFill>
+          </a:ln>
+        </p:spPr>
+        <p:style>
+          <a:lnRef idx="2">
+            <a:schemeClr val="accent1">
+              <a:shade val="50000"/>
+            </a:schemeClr>
+          </a:lnRef>
+          <a:fillRef idx="1">
+            <a:schemeClr val="accent1"/>
+          </a:fillRef>
+          <a:effectRef idx="0">
+            <a:schemeClr val="accent1"/>
+          </a:effectRef>
+          <a:fontRef idx="minor">
+            <a:schemeClr val="lt1"/>
+          </a:fontRef>
+        </p:style>
+        <p:txBody>
+          <a:bodyPr rtlCol="0" anchor="ctr"/>
+          <a:lstStyle/>
+          <a:p>
+            <a:pPr algn="ctr"/>
+            <a:endParaRPr lang="en-GB" sz="2439" dirty="0">
+              <a:latin typeface="Lato" panose="020F0502020204030203" pitchFamily="34" charset="0"/>
+              <a:ea typeface="Lato" panose="020F0502020204030203" pitchFamily="34" charset="0"/>
+              <a:cs typeface="Lato" panose="020F0502020204030203" pitchFamily="34" charset="0"/>
+            </a:endParaRPr>
+          </a:p>
+        </p:txBody>
+      </p:sp>
+      <p:sp>
+        <p:nvSpPr>
+          <p:cNvPr id="48" name="Rectangle 47">
+            <a:extLst>
+              <a:ext uri="{FF2B5EF4-FFF2-40B4-BE49-F238E27FC236}">
+                <a16:creationId xmlns:a16="http://schemas.microsoft.com/office/drawing/2014/main" id="{33CC256B-0CA1-0D41-84B9-E230972BD910}"/>
+              </a:ext>
+            </a:extLst>
+          </p:cNvPr>
+          <p:cNvSpPr/>
+          <p:nvPr/>
+        </p:nvSpPr>
+        <p:spPr>
+          <a:xfrm>
+            <a:off x="246740" y="7000158"/>
+            <a:ext cx="3922365" cy="343981"/>
+          </a:xfrm>
+          <a:prstGeom prst="rect">
+            <a:avLst/>
+          </a:prstGeom>
+          <a:solidFill>
+            <a:srgbClr val="2096F4"/>
+          </a:solidFill>
+          <a:ln w="25400">
+            <a:noFill/>
+          </a:ln>
+        </p:spPr>
+        <p:style>
+          <a:lnRef idx="2">
+            <a:schemeClr val="accent1">
+              <a:shade val="50000"/>
+            </a:schemeClr>
+          </a:lnRef>
+          <a:fillRef idx="1">
+            <a:schemeClr val="accent1"/>
+          </a:fillRef>
+          <a:effectRef idx="0">
+            <a:schemeClr val="accent1"/>
+          </a:effectRef>
+          <a:fontRef idx="minor">
+            <a:schemeClr val="lt1"/>
+          </a:fontRef>
+        </p:style>
+        <p:txBody>
+          <a:bodyPr rtlCol="0" anchor="ctr"/>
+          <a:lstStyle/>
+          <a:p>
+            <a:pPr algn="ctr"/>
+            <a:endParaRPr lang="en-GB" sz="2439" dirty="0">
+              <a:latin typeface="Lato" panose="020F0502020204030203" pitchFamily="34" charset="0"/>
+              <a:ea typeface="Lato" panose="020F0502020204030203" pitchFamily="34" charset="0"/>
+              <a:cs typeface="Lato" panose="020F0502020204030203" pitchFamily="34" charset="0"/>
+            </a:endParaRPr>
+          </a:p>
+        </p:txBody>
+      </p:sp>
+      <p:sp>
+        <p:nvSpPr>
+          <p:cNvPr id="49" name="TextBox 48">
+            <a:extLst>
+              <a:ext uri="{FF2B5EF4-FFF2-40B4-BE49-F238E27FC236}">
+                <a16:creationId xmlns:a16="http://schemas.microsoft.com/office/drawing/2014/main" id="{C91C5F4C-0D5F-F24A-B7D7-D333A74CC15D}"/>
+              </a:ext>
+            </a:extLst>
+          </p:cNvPr>
+          <p:cNvSpPr txBox="1"/>
+          <p:nvPr/>
+        </p:nvSpPr>
+        <p:spPr>
+          <a:xfrm>
+            <a:off x="1441503" y="7048626"/>
+            <a:ext cx="1543435" cy="246677"/>
+          </a:xfrm>
+          <a:prstGeom prst="rect">
+            <a:avLst/>
+          </a:prstGeom>
+          <a:noFill/>
+        </p:spPr>
+        <p:txBody>
+          <a:bodyPr wrap="square" tIns="33090" bIns="0" rtlCol="0">
+            <a:spAutoFit/>
+          </a:bodyPr>
+          <a:lstStyle/>
+          <a:p>
+            <a:r>
+              <a:rPr lang="en-GB" sz="1400" b="1" dirty="0">
+                <a:solidFill>
+                  <a:schemeClr val="bg1"/>
+                </a:solidFill>
+                <a:latin typeface="Lato" panose="020F0502020204030203" pitchFamily="34" charset="0"/>
+                <a:ea typeface="Lato" panose="020F0502020204030203" pitchFamily="34" charset="0"/>
+                <a:cs typeface="Lato" panose="020F0502020204030203" pitchFamily="34" charset="0"/>
+              </a:rPr>
+              <a:t>Antarctic Drilling</a:t>
+            </a:r>
+          </a:p>
+        </p:txBody>
+      </p:sp>
+      <p:grpSp>
+        <p:nvGrpSpPr>
+          <p:cNvPr id="5" name="Group 4">
+            <a:extLst>
+              <a:ext uri="{FF2B5EF4-FFF2-40B4-BE49-F238E27FC236}">
+                <a16:creationId xmlns:a16="http://schemas.microsoft.com/office/drawing/2014/main" id="{CA44B67D-2EFA-A541-B7FE-5E89620BF48F}"/>
+              </a:ext>
+            </a:extLst>
+          </p:cNvPr>
+          <p:cNvGrpSpPr/>
+          <p:nvPr/>
+        </p:nvGrpSpPr>
+        <p:grpSpPr>
+          <a:xfrm>
+            <a:off x="2162008" y="7349359"/>
+            <a:ext cx="1933843" cy="1756322"/>
+            <a:chOff x="4422325" y="2088976"/>
+            <a:chExt cx="7543796" cy="6851297"/>
+          </a:xfrm>
+        </p:grpSpPr>
+        <p:pic>
+          <p:nvPicPr>
+            <p:cNvPr id="3" name="Picture 2">
+              <a:extLst>
+                <a:ext uri="{FF2B5EF4-FFF2-40B4-BE49-F238E27FC236}">
+                  <a16:creationId xmlns:a16="http://schemas.microsoft.com/office/drawing/2014/main" id="{F037F696-1091-7042-9461-180F85E87174}"/>
+                </a:ext>
+              </a:extLst>
+            </p:cNvPr>
+            <p:cNvPicPr>
+              <a:picLocks noChangeAspect="1"/>
+            </p:cNvPicPr>
+            <p:nvPr/>
+          </p:nvPicPr>
+          <p:blipFill>
+            <a:blip r:embed="rId5"/>
+            <a:stretch>
+              <a:fillRect/>
+            </a:stretch>
+          </p:blipFill>
+          <p:spPr>
+            <a:xfrm>
+              <a:off x="4422325" y="2126522"/>
+              <a:ext cx="7543796" cy="6813751"/>
+            </a:xfrm>
+            <a:prstGeom prst="rect">
+              <a:avLst/>
+            </a:prstGeom>
+          </p:spPr>
+        </p:pic>
+        <p:sp>
+          <p:nvSpPr>
+            <p:cNvPr id="4" name="Rectangle 3">
+              <a:extLst>
+                <a:ext uri="{FF2B5EF4-FFF2-40B4-BE49-F238E27FC236}">
+                  <a16:creationId xmlns:a16="http://schemas.microsoft.com/office/drawing/2014/main" id="{F7CEA5BE-1205-0149-A265-D5D6730545A8}"/>
+                </a:ext>
+              </a:extLst>
+            </p:cNvPr>
+            <p:cNvSpPr/>
+            <p:nvPr/>
+          </p:nvSpPr>
+          <p:spPr>
+            <a:xfrm>
+              <a:off x="4439614" y="2088976"/>
+              <a:ext cx="775853" cy="869947"/>
+            </a:xfrm>
+            <a:prstGeom prst="rect">
+              <a:avLst/>
+            </a:prstGeom>
+            <a:solidFill>
+              <a:schemeClr val="bg1"/>
+            </a:solidFill>
+            <a:ln>
+              <a:noFill/>
+            </a:ln>
+          </p:spPr>
+          <p:style>
+            <a:lnRef idx="2">
+              <a:schemeClr val="accent1">
+                <a:shade val="50000"/>
+              </a:schemeClr>
+            </a:lnRef>
+            <a:fillRef idx="1">
+              <a:schemeClr val="accent1"/>
+            </a:fillRef>
+            <a:effectRef idx="0">
+              <a:schemeClr val="accent1"/>
+            </a:effectRef>
+            <a:fontRef idx="minor">
+              <a:schemeClr val="lt1"/>
+            </a:fontRef>
+          </p:style>
+          <p:txBody>
+            <a:bodyPr rtlCol="0" anchor="ctr"/>
+            <a:lstStyle/>
+            <a:p>
+              <a:pPr algn="ctr"/>
+              <a:endParaRPr lang="en-GB" dirty="0"/>
+            </a:p>
+          </p:txBody>
+        </p:sp>
+        <p:sp>
+          <p:nvSpPr>
+            <p:cNvPr id="53" name="Rectangle 52">
+              <a:extLst>
+                <a:ext uri="{FF2B5EF4-FFF2-40B4-BE49-F238E27FC236}">
+                  <a16:creationId xmlns:a16="http://schemas.microsoft.com/office/drawing/2014/main" id="{FC58F348-2283-C24B-A2EB-1E41279839BD}"/>
+                </a:ext>
+              </a:extLst>
+            </p:cNvPr>
+            <p:cNvSpPr/>
+            <p:nvPr/>
+          </p:nvSpPr>
+          <p:spPr>
+            <a:xfrm>
+              <a:off x="4988725" y="2785308"/>
+              <a:ext cx="681372" cy="394615"/>
+            </a:xfrm>
+            <a:prstGeom prst="rect">
+              <a:avLst/>
+            </a:prstGeom>
+            <a:solidFill>
+              <a:schemeClr val="bg1"/>
+            </a:solidFill>
+            <a:ln>
+              <a:noFill/>
+            </a:ln>
+          </p:spPr>
+          <p:style>
+            <a:lnRef idx="2">
+              <a:schemeClr val="accent1">
+                <a:shade val="50000"/>
+              </a:schemeClr>
+            </a:lnRef>
+            <a:fillRef idx="1">
+              <a:schemeClr val="accent1"/>
+            </a:fillRef>
+            <a:effectRef idx="0">
+              <a:schemeClr val="accent1"/>
+            </a:effectRef>
+            <a:fontRef idx="minor">
+              <a:schemeClr val="lt1"/>
+            </a:fontRef>
+          </p:style>
+          <p:txBody>
+            <a:bodyPr rtlCol="0" anchor="ctr"/>
+            <a:lstStyle/>
+            <a:p>
+              <a:pPr algn="ctr"/>
+              <a:endParaRPr lang="en-GB" dirty="0"/>
+            </a:p>
+          </p:txBody>
+        </p:sp>
+        <p:sp>
+          <p:nvSpPr>
+            <p:cNvPr id="54" name="Rectangle 53">
+              <a:extLst>
+                <a:ext uri="{FF2B5EF4-FFF2-40B4-BE49-F238E27FC236}">
+                  <a16:creationId xmlns:a16="http://schemas.microsoft.com/office/drawing/2014/main" id="{4E89297C-0B14-1645-8412-DAEA1A877E87}"/>
+                </a:ext>
+              </a:extLst>
+            </p:cNvPr>
+            <p:cNvSpPr/>
+            <p:nvPr/>
+          </p:nvSpPr>
+          <p:spPr>
+            <a:xfrm>
+              <a:off x="5337335" y="2895599"/>
+              <a:ext cx="353033" cy="626253"/>
+            </a:xfrm>
+            <a:prstGeom prst="rect">
+              <a:avLst/>
+            </a:prstGeom>
+            <a:solidFill>
+              <a:schemeClr val="bg1"/>
+            </a:solidFill>
+            <a:ln>
+              <a:noFill/>
+            </a:ln>
+          </p:spPr>
+          <p:style>
+            <a:lnRef idx="2">
+              <a:schemeClr val="accent1">
+                <a:shade val="50000"/>
+              </a:schemeClr>
+            </a:lnRef>
+            <a:fillRef idx="1">
+              <a:schemeClr val="accent1"/>
+            </a:fillRef>
+            <a:effectRef idx="0">
+              <a:schemeClr val="accent1"/>
+            </a:effectRef>
+            <a:fontRef idx="minor">
+              <a:schemeClr val="lt1"/>
+            </a:fontRef>
+          </p:style>
+          <p:txBody>
+            <a:bodyPr rtlCol="0" anchor="ctr"/>
+            <a:lstStyle/>
+            <a:p>
+              <a:pPr algn="ctr"/>
+              <a:endParaRPr lang="en-GB"/>
+            </a:p>
+          </p:txBody>
+        </p:sp>
+      </p:grpSp>
+      <p:sp>
+        <p:nvSpPr>
+          <p:cNvPr id="56" name="TextBox 55">
+            <a:extLst>
+              <a:ext uri="{FF2B5EF4-FFF2-40B4-BE49-F238E27FC236}">
+                <a16:creationId xmlns:a16="http://schemas.microsoft.com/office/drawing/2014/main" id="{B0771E8B-C509-AB42-9E94-D671A6460B04}"/>
+              </a:ext>
+            </a:extLst>
+          </p:cNvPr>
+          <p:cNvSpPr txBox="1"/>
+          <p:nvPr/>
+        </p:nvSpPr>
+        <p:spPr>
+          <a:xfrm>
+            <a:off x="244213" y="7339966"/>
+            <a:ext cx="1752665" cy="276999"/>
+          </a:xfrm>
+          <a:prstGeom prst="rect">
+            <a:avLst/>
+          </a:prstGeom>
+          <a:noFill/>
+        </p:spPr>
+        <p:txBody>
+          <a:bodyPr wrap="square" rtlCol="0">
+            <a:spAutoFit/>
+          </a:bodyPr>
+          <a:lstStyle/>
+          <a:p>
+            <a:pPr algn="just"/>
+            <a:r>
+              <a:rPr lang="en-GB" sz="1200" b="0" dirty="0" err="1">
+                <a:latin typeface="Lato" panose="020F0502020204030203" pitchFamily="34" charset="0"/>
+                <a:ea typeface="Lato" panose="020F0502020204030203" pitchFamily="34" charset="0"/>
+                <a:cs typeface="Lato" panose="020F0502020204030203" pitchFamily="34" charset="0"/>
+              </a:rPr>
+              <a:t>asdlaksdml</a:t>
+            </a:r>
+            <a:endParaRPr lang="en-GB" sz="1200" b="0" dirty="0">
+              <a:latin typeface="Lato" panose="020F0502020204030203" pitchFamily="34" charset="0"/>
+              <a:ea typeface="Lato" panose="020F0502020204030203" pitchFamily="34" charset="0"/>
+              <a:cs typeface="Lato" panose="020F0502020204030203" pitchFamily="34" charset="0"/>
+            </a:endParaRPr>
+          </a:p>
+        </p:txBody>
+      </p:sp>
+      <p:sp>
+        <p:nvSpPr>
+          <p:cNvPr id="57" name="TextBox 56">
+            <a:extLst>
+              <a:ext uri="{FF2B5EF4-FFF2-40B4-BE49-F238E27FC236}">
+                <a16:creationId xmlns:a16="http://schemas.microsoft.com/office/drawing/2014/main" id="{C6480716-8C9C-D542-B59B-3E0092D27B8B}"/>
+              </a:ext>
+            </a:extLst>
+          </p:cNvPr>
+          <p:cNvSpPr txBox="1"/>
+          <p:nvPr/>
+        </p:nvSpPr>
+        <p:spPr>
+          <a:xfrm>
+            <a:off x="1996878" y="9074241"/>
+            <a:ext cx="2198153" cy="338554"/>
+          </a:xfrm>
+          <a:prstGeom prst="rect">
+            <a:avLst/>
+          </a:prstGeom>
+          <a:noFill/>
+        </p:spPr>
+        <p:txBody>
+          <a:bodyPr wrap="square" rtlCol="0">
+            <a:spAutoFit/>
+          </a:bodyPr>
+          <a:lstStyle/>
+          <a:p>
+            <a:r>
+              <a:rPr lang="en-GB" sz="800" dirty="0">
+                <a:latin typeface="Lato" panose="020F0502020204030203" pitchFamily="34" charset="0"/>
+                <a:ea typeface="Lato" panose="020F0502020204030203" pitchFamily="34" charset="0"/>
+                <a:cs typeface="Lato" panose="020F0502020204030203" pitchFamily="34" charset="0"/>
+              </a:rPr>
+              <a:t>Fig. 1. Locations of major studies of Antarctic marine sediment (Carter et al. 2017) . </a:t>
             </a:r>
           </a:p>
         </p:txBody>

</xml_diff>

<commit_message>
esc4: p: finding right format to print in
</commit_message>
<xml_diff>
--- a/earth_system_and_climate_4/term_2/poster/oxygen_poster.pptx
+++ b/earth_system_and_climate_4/term_2/poster/oxygen_poster.pptx
@@ -4279,8 +4279,8 @@
         </p:nvSpPr>
         <p:spPr>
           <a:xfrm>
-            <a:off x="10047107" y="7332665"/>
-            <a:ext cx="1163969" cy="248857"/>
+            <a:off x="10051373" y="7354036"/>
+            <a:ext cx="1086940" cy="248857"/>
           </a:xfrm>
           <a:prstGeom prst="rect">
             <a:avLst/>
@@ -4527,7 +4527,7 @@
         </p:nvSpPr>
         <p:spPr>
           <a:xfrm>
-            <a:off x="8633695" y="3707040"/>
+            <a:off x="8633671" y="3990517"/>
             <a:ext cx="3922369" cy="2060576"/>
           </a:xfrm>
           <a:prstGeom prst="rect">
@@ -4585,7 +4585,7 @@
         </p:nvSpPr>
         <p:spPr>
           <a:xfrm>
-            <a:off x="8633694" y="3707040"/>
+            <a:off x="8633670" y="3990517"/>
             <a:ext cx="3922362" cy="305510"/>
           </a:xfrm>
           <a:prstGeom prst="rect">
@@ -4641,8 +4641,8 @@
         </p:nvSpPr>
         <p:spPr>
           <a:xfrm>
-            <a:off x="9948670" y="3714951"/>
-            <a:ext cx="1360844" cy="256931"/>
+            <a:off x="10019267" y="4018843"/>
+            <a:ext cx="1151152" cy="248857"/>
           </a:xfrm>
           <a:prstGeom prst="rect">
             <a:avLst/>
@@ -4683,7 +4683,7 @@
         </p:nvSpPr>
         <p:spPr>
           <a:xfrm>
-            <a:off x="8633686" y="4012550"/>
+            <a:off x="8633662" y="4296027"/>
             <a:ext cx="3922362" cy="276999"/>
           </a:xfrm>
           <a:prstGeom prst="rect">
@@ -4781,7 +4781,7 @@
         <p:spPr>
           <a:xfrm>
             <a:off x="8633694" y="1146871"/>
-            <a:ext cx="3922373" cy="2274567"/>
+            <a:ext cx="3922373" cy="2695471"/>
           </a:xfrm>
           <a:prstGeom prst="rect">
             <a:avLst/>
@@ -5344,7 +5344,7 @@
         </p:nvSpPr>
         <p:spPr>
           <a:xfrm>
-            <a:off x="1996878" y="9074241"/>
+            <a:off x="1996878" y="9055580"/>
             <a:ext cx="2198153" cy="338554"/>
           </a:xfrm>
           <a:prstGeom prst="rect">
@@ -5365,6 +5365,104 @@
                 <a:cs typeface="Lato" panose="020F0502020204030203" pitchFamily="34" charset="0"/>
               </a:rPr>
               <a:t>Fig. 1. Locations of major studies of Antarctic marine sediment (Carter et al. 2017) . </a:t>
+            </a:r>
+          </a:p>
+        </p:txBody>
+      </p:sp>
+      <p:sp>
+        <p:nvSpPr>
+          <p:cNvPr id="58" name="Rectangle 57">
+            <a:extLst>
+              <a:ext uri="{FF2B5EF4-FFF2-40B4-BE49-F238E27FC236}">
+                <a16:creationId xmlns:a16="http://schemas.microsoft.com/office/drawing/2014/main" id="{6B80B7F1-BC2A-CD4C-BC6B-796F13A01CDD}"/>
+              </a:ext>
+            </a:extLst>
+          </p:cNvPr>
+          <p:cNvSpPr/>
+          <p:nvPr/>
+        </p:nvSpPr>
+        <p:spPr>
+          <a:xfrm>
+            <a:off x="4438400" y="1131838"/>
+            <a:ext cx="3922365" cy="343981"/>
+          </a:xfrm>
+          <a:prstGeom prst="rect">
+            <a:avLst/>
+          </a:prstGeom>
+          <a:solidFill>
+            <a:srgbClr val="2096F4"/>
+          </a:solidFill>
+          <a:ln w="25400">
+            <a:noFill/>
+          </a:ln>
+        </p:spPr>
+        <p:style>
+          <a:lnRef idx="2">
+            <a:schemeClr val="accent1">
+              <a:shade val="50000"/>
+            </a:schemeClr>
+          </a:lnRef>
+          <a:fillRef idx="1">
+            <a:schemeClr val="accent1"/>
+          </a:fillRef>
+          <a:effectRef idx="0">
+            <a:schemeClr val="accent1"/>
+          </a:effectRef>
+          <a:fontRef idx="minor">
+            <a:schemeClr val="lt1"/>
+          </a:fontRef>
+        </p:style>
+        <p:txBody>
+          <a:bodyPr rtlCol="0" anchor="ctr"/>
+          <a:lstStyle/>
+          <a:p>
+            <a:pPr algn="ctr"/>
+            <a:endParaRPr lang="en-GB" sz="2439" dirty="0">
+              <a:latin typeface="Lato" panose="020F0502020204030203" pitchFamily="34" charset="0"/>
+              <a:ea typeface="Lato" panose="020F0502020204030203" pitchFamily="34" charset="0"/>
+              <a:cs typeface="Lato" panose="020F0502020204030203" pitchFamily="34" charset="0"/>
+            </a:endParaRPr>
+          </a:p>
+        </p:txBody>
+      </p:sp>
+      <p:sp>
+        <p:nvSpPr>
+          <p:cNvPr id="59" name="TextBox 58">
+            <a:extLst>
+              <a:ext uri="{FF2B5EF4-FFF2-40B4-BE49-F238E27FC236}">
+                <a16:creationId xmlns:a16="http://schemas.microsoft.com/office/drawing/2014/main" id="{780F6350-9916-8D47-AB35-699F554FF015}"/>
+              </a:ext>
+            </a:extLst>
+          </p:cNvPr>
+          <p:cNvSpPr txBox="1"/>
+          <p:nvPr/>
+        </p:nvSpPr>
+        <p:spPr>
+          <a:xfrm>
+            <a:off x="5627864" y="1177470"/>
+            <a:ext cx="1543435" cy="246677"/>
+          </a:xfrm>
+          <a:prstGeom prst="rect">
+            <a:avLst/>
+          </a:prstGeom>
+          <a:noFill/>
+        </p:spPr>
+        <p:txBody>
+          <a:bodyPr wrap="square" tIns="33090" bIns="0" rtlCol="0">
+            <a:spAutoFit/>
+          </a:bodyPr>
+          <a:lstStyle/>
+          <a:p>
+            <a:r>
+              <a:rPr lang="en-GB" sz="1400" b="1" dirty="0">
+                <a:solidFill>
+                  <a:schemeClr val="bg1"/>
+                </a:solidFill>
+                <a:latin typeface="Lato" panose="020F0502020204030203" pitchFamily="34" charset="0"/>
+                <a:ea typeface="Lato" panose="020F0502020204030203" pitchFamily="34" charset="0"/>
+                <a:cs typeface="Lato" panose="020F0502020204030203" pitchFamily="34" charset="0"/>
+              </a:rPr>
+              <a:t>Antarctic Drilling</a:t>
             </a:r>
           </a:p>
         </p:txBody>

</xml_diff>

<commit_message>
esc4: p: ice cores and paeleotemperatures reconstruction
</commit_message>
<xml_diff>
--- a/earth_system_and_climate_4/term_2/poster/oxygen_poster.pptx
+++ b/earth_system_and_climate_4/term_2/poster/oxygen_poster.pptx
@@ -4087,7 +4087,7 @@
                     <a:ea typeface="Lato" panose="020F0502020204030203" pitchFamily="34" charset="0"/>
                     <a:cs typeface="Lato" panose="020F0502020204030203" pitchFamily="34" charset="0"/>
                   </a:rPr>
-                  <a:t>Is there oxygen isotope evidence which demonstrates Antarctic glaciation? </a:t>
+                  <a:t>Is there oxygen isotopic evidence which demonstrates Antarctic glaciation? </a:t>
                 </a:r>
                 <a:endParaRPr lang="en-GB" sz="1200" dirty="0">
                   <a:latin typeface="Lato" panose="020F0502020204030203" pitchFamily="34" charset="0"/>
@@ -5050,8 +5050,8 @@
         </p:nvSpPr>
         <p:spPr>
           <a:xfrm>
-            <a:off x="1441503" y="7048626"/>
-            <a:ext cx="1543435" cy="246677"/>
+            <a:off x="882676" y="7029752"/>
+            <a:ext cx="2648049" cy="247780"/>
           </a:xfrm>
           <a:prstGeom prst="rect">
             <a:avLst/>
@@ -5073,7 +5073,7 @@
                 <a:ea typeface="Lato" panose="020F0502020204030203" pitchFamily="34" charset="0"/>
                 <a:cs typeface="Lato" panose="020F0502020204030203" pitchFamily="34" charset="0"/>
               </a:rPr>
-              <a:t>Antarctic Drilling</a:t>
+              <a:t>Ice cores and Antarctic drilling</a:t>
             </a:r>
           </a:p>
         </p:txBody>
@@ -5285,51 +5285,162 @@
           </p:txBody>
         </p:sp>
       </p:grpSp>
-      <p:sp>
-        <p:nvSpPr>
-          <p:cNvPr id="56" name="TextBox 55">
-            <a:extLst>
-              <a:ext uri="{FF2B5EF4-FFF2-40B4-BE49-F238E27FC236}">
-                <a16:creationId xmlns:a16="http://schemas.microsoft.com/office/drawing/2014/main" id="{B0771E8B-C509-AB42-9E94-D671A6460B04}"/>
-              </a:ext>
-            </a:extLst>
-          </p:cNvPr>
-          <p:cNvSpPr txBox="1"/>
-          <p:nvPr/>
-        </p:nvSpPr>
-        <p:spPr>
-          <a:xfrm>
-            <a:off x="244213" y="7339966"/>
-            <a:ext cx="1752665" cy="276999"/>
-          </a:xfrm>
-          <a:prstGeom prst="rect">
-            <a:avLst/>
-          </a:prstGeom>
-          <a:noFill/>
-        </p:spPr>
-        <p:txBody>
-          <a:bodyPr wrap="square" rtlCol="0">
-            <a:spAutoFit/>
-          </a:bodyPr>
-          <a:lstStyle/>
-          <a:p>
-            <a:pPr algn="just"/>
-            <a:r>
-              <a:rPr lang="en-GB" sz="1200" b="0" dirty="0" err="1">
-                <a:latin typeface="Lato" panose="020F0502020204030203" pitchFamily="34" charset="0"/>
-                <a:ea typeface="Lato" panose="020F0502020204030203" pitchFamily="34" charset="0"/>
-                <a:cs typeface="Lato" panose="020F0502020204030203" pitchFamily="34" charset="0"/>
-              </a:rPr>
-              <a:t>asdlaksdml</a:t>
-            </a:r>
-            <a:endParaRPr lang="en-GB" sz="1200" b="0" dirty="0">
-              <a:latin typeface="Lato" panose="020F0502020204030203" pitchFamily="34" charset="0"/>
-              <a:ea typeface="Lato" panose="020F0502020204030203" pitchFamily="34" charset="0"/>
-              <a:cs typeface="Lato" panose="020F0502020204030203" pitchFamily="34" charset="0"/>
-            </a:endParaRPr>
-          </a:p>
-        </p:txBody>
-      </p:sp>
+      <mc:AlternateContent xmlns:mc="http://schemas.openxmlformats.org/markup-compatibility/2006">
+        <mc:Choice xmlns:a14="http://schemas.microsoft.com/office/drawing/2010/main" Requires="a14">
+          <p:sp>
+            <p:nvSpPr>
+              <p:cNvPr id="56" name="TextBox 55">
+                <a:extLst>
+                  <a:ext uri="{FF2B5EF4-FFF2-40B4-BE49-F238E27FC236}">
+                    <a16:creationId xmlns:a16="http://schemas.microsoft.com/office/drawing/2014/main" id="{B0771E8B-C509-AB42-9E94-D671A6460B04}"/>
+                  </a:ext>
+                </a:extLst>
+              </p:cNvPr>
+              <p:cNvSpPr txBox="1"/>
+              <p:nvPr/>
+            </p:nvSpPr>
+            <p:spPr>
+              <a:xfrm>
+                <a:off x="244213" y="7292876"/>
+                <a:ext cx="1890986" cy="2123658"/>
+              </a:xfrm>
+              <a:prstGeom prst="rect">
+                <a:avLst/>
+              </a:prstGeom>
+              <a:noFill/>
+            </p:spPr>
+            <p:txBody>
+              <a:bodyPr wrap="square" rtlCol="0">
+                <a:spAutoFit/>
+              </a:bodyPr>
+              <a:lstStyle/>
+              <a:p>
+                <a:r>
+                  <a:rPr lang="en-GB" sz="1200" dirty="0">
+                    <a:latin typeface="Lato" panose="020F0502020204030203" pitchFamily="34" charset="0"/>
+                    <a:ea typeface="Lato" panose="020F0502020204030203" pitchFamily="34" charset="0"/>
+                    <a:cs typeface="Lato" panose="020F0502020204030203" pitchFamily="34" charset="0"/>
+                  </a:rPr>
+                  <a:t>I</a:t>
+                </a:r>
+                <a:r>
+                  <a:rPr lang="en-GB" sz="1200" b="0" dirty="0">
+                    <a:latin typeface="Lato" panose="020F0502020204030203" pitchFamily="34" charset="0"/>
+                    <a:ea typeface="Lato" panose="020F0502020204030203" pitchFamily="34" charset="0"/>
+                    <a:cs typeface="Lato" panose="020F0502020204030203" pitchFamily="34" charset="0"/>
+                  </a:rPr>
+                  <a:t>ce cores are the key data used to reassemble past Antarctic climate chronology. Projects such as the Deep-Sea Drilling Project in the 1970s (Kennett 1977) utilised the </a:t>
+                </a:r>
+                <a14:m>
+                  <m:oMath xmlns:m="http://schemas.openxmlformats.org/officeDocument/2006/math">
+                    <m:sSup>
+                      <m:sSupPr>
+                        <m:ctrlPr>
+                          <a:rPr lang="en-GB" sz="1200" i="1">
+                            <a:latin typeface="Cambria Math" panose="02040503050406030204" pitchFamily="18" charset="0"/>
+                            <a:ea typeface="Cambria Math" panose="02040503050406030204" pitchFamily="18" charset="0"/>
+                          </a:rPr>
+                        </m:ctrlPr>
+                      </m:sSupPr>
+                      <m:e>
+                        <m:r>
+                          <a:rPr lang="en-GB" sz="1200" i="1">
+                            <a:latin typeface="Cambria Math" panose="02040503050406030204" pitchFamily="18" charset="0"/>
+                            <a:ea typeface="Cambria Math" panose="02040503050406030204" pitchFamily="18" charset="0"/>
+                          </a:rPr>
+                          <m:t>𝛿</m:t>
+                        </m:r>
+                      </m:e>
+                      <m:sup>
+                        <m:r>
+                          <a:rPr lang="en-GB" sz="1200" i="1">
+                            <a:latin typeface="Cambria Math" panose="02040503050406030204" pitchFamily="18" charset="0"/>
+                            <a:ea typeface="Cambria Math" panose="02040503050406030204" pitchFamily="18" charset="0"/>
+                          </a:rPr>
+                          <m:t>18</m:t>
+                        </m:r>
+                      </m:sup>
+                    </m:sSup>
+                  </m:oMath>
+                </a14:m>
+                <a:r>
+                  <a:rPr lang="en-GB" sz="1200" dirty="0">
+                    <a:latin typeface="Lato" panose="020F0502020204030203" pitchFamily="34" charset="0"/>
+                    <a:ea typeface="Lato" panose="020F0502020204030203" pitchFamily="34" charset="0"/>
+                    <a:cs typeface="Lato" panose="020F0502020204030203" pitchFamily="34" charset="0"/>
+                  </a:rPr>
+                  <a:t>O tracer for paleotemperature calculations across the early and mid </a:t>
+                </a:r>
+                <a:r>
+                  <a:rPr lang="en-GB" sz="1200" dirty="0" err="1">
+                    <a:latin typeface="Lato" panose="020F0502020204030203" pitchFamily="34" charset="0"/>
+                    <a:ea typeface="Lato" panose="020F0502020204030203" pitchFamily="34" charset="0"/>
+                    <a:cs typeface="Lato" panose="020F0502020204030203" pitchFamily="34" charset="0"/>
+                  </a:rPr>
+                  <a:t>Cenozoic</a:t>
+                </a:r>
+                <a:r>
+                  <a:rPr lang="en-GB" sz="1200" dirty="0">
+                    <a:latin typeface="Lato" panose="020F0502020204030203" pitchFamily="34" charset="0"/>
+                    <a:ea typeface="Lato" panose="020F0502020204030203" pitchFamily="34" charset="0"/>
+                    <a:cs typeface="Lato" panose="020F0502020204030203" pitchFamily="34" charset="0"/>
+                  </a:rPr>
+                  <a:t>.</a:t>
+                </a:r>
+                <a:endParaRPr lang="en-GB" sz="1200" b="0" dirty="0">
+                  <a:latin typeface="Lato" panose="020F0502020204030203" pitchFamily="34" charset="0"/>
+                  <a:ea typeface="Lato" panose="020F0502020204030203" pitchFamily="34" charset="0"/>
+                  <a:cs typeface="Lato" panose="020F0502020204030203" pitchFamily="34" charset="0"/>
+                </a:endParaRPr>
+              </a:p>
+            </p:txBody>
+          </p:sp>
+        </mc:Choice>
+        <mc:Fallback>
+          <p:sp>
+            <p:nvSpPr>
+              <p:cNvPr id="56" name="TextBox 55">
+                <a:extLst>
+                  <a:ext uri="{FF2B5EF4-FFF2-40B4-BE49-F238E27FC236}">
+                    <a16:creationId xmlns:a16="http://schemas.microsoft.com/office/drawing/2014/main" id="{B0771E8B-C509-AB42-9E94-D671A6460B04}"/>
+                  </a:ext>
+                </a:extLst>
+              </p:cNvPr>
+              <p:cNvSpPr txBox="1">
+                <a:spLocks noRot="1" noChangeAspect="1" noMove="1" noResize="1" noEditPoints="1" noAdjustHandles="1" noChangeArrowheads="1" noChangeShapeType="1" noTextEdit="1"/>
+              </p:cNvSpPr>
+              <p:nvPr/>
+            </p:nvSpPr>
+            <p:spPr>
+              <a:xfrm>
+                <a:off x="244213" y="7292876"/>
+                <a:ext cx="1890986" cy="2123658"/>
+              </a:xfrm>
+              <a:prstGeom prst="rect">
+                <a:avLst/>
+              </a:prstGeom>
+              <a:blipFill>
+                <a:blip r:embed="rId6"/>
+                <a:stretch>
+                  <a:fillRect b="-1786"/>
+                </a:stretch>
+              </a:blipFill>
+            </p:spPr>
+            <p:txBody>
+              <a:bodyPr/>
+              <a:lstStyle/>
+              <a:p>
+                <a:r>
+                  <a:rPr lang="en-GB">
+                    <a:noFill/>
+                  </a:rPr>
+                  <a:t> </a:t>
+                </a:r>
+              </a:p>
+            </p:txBody>
+          </p:sp>
+        </mc:Fallback>
+      </mc:AlternateContent>
       <p:sp>
         <p:nvSpPr>
           <p:cNvPr id="57" name="TextBox 56">

</xml_diff>

<commit_message>
esc4: p: main body of text
</commit_message>
<xml_diff>
--- a/earth_system_and_climate_4/term_2/poster/oxygen_poster.pptx
+++ b/earth_system_and_climate_4/term_2/poster/oxygen_poster.pptx
@@ -492,7 +492,12 @@
             <p:ph type="sldImg"/>
           </p:nvPr>
         </p:nvSpPr>
-        <p:spPr/>
+        <p:spPr>
+          <a:xfrm>
+            <a:off x="1371600" y="1143000"/>
+            <a:ext cx="4114800" cy="3086100"/>
+          </a:xfrm>
+        </p:spPr>
       </p:sp>
       <p:sp>
         <p:nvSpPr>
@@ -610,7 +615,7 @@
         </p:nvSpPr>
         <p:spPr>
           <a:xfrm>
-            <a:off x="1600200" y="5042853"/>
+            <a:off x="1600200" y="5042854"/>
             <a:ext cx="9601200" cy="2318067"/>
           </a:xfrm>
         </p:spPr>
@@ -621,35 +626,35 @@
               <a:buNone/>
               <a:defRPr sz="3360"/>
             </a:lvl1pPr>
-            <a:lvl2pPr marL="640080" indent="0" algn="ctr">
+            <a:lvl2pPr marL="640064" indent="0" algn="ctr">
               <a:buNone/>
               <a:defRPr sz="2800"/>
             </a:lvl2pPr>
-            <a:lvl3pPr marL="1280160" indent="0" algn="ctr">
+            <a:lvl3pPr marL="1280128" indent="0" algn="ctr">
               <a:buNone/>
               <a:defRPr sz="2520"/>
             </a:lvl3pPr>
-            <a:lvl4pPr marL="1920240" indent="0" algn="ctr">
+            <a:lvl4pPr marL="1920192" indent="0" algn="ctr">
               <a:buNone/>
               <a:defRPr sz="2240"/>
             </a:lvl4pPr>
-            <a:lvl5pPr marL="2560320" indent="0" algn="ctr">
+            <a:lvl5pPr marL="2560256" indent="0" algn="ctr">
               <a:buNone/>
               <a:defRPr sz="2240"/>
             </a:lvl5pPr>
-            <a:lvl6pPr marL="3200400" indent="0" algn="ctr">
+            <a:lvl6pPr marL="3200320" indent="0" algn="ctr">
               <a:buNone/>
               <a:defRPr sz="2240"/>
             </a:lvl6pPr>
-            <a:lvl7pPr marL="3840480" indent="0" algn="ctr">
+            <a:lvl7pPr marL="3840384" indent="0" algn="ctr">
               <a:buNone/>
               <a:defRPr sz="2240"/>
             </a:lvl7pPr>
-            <a:lvl8pPr marL="4480560" indent="0" algn="ctr">
+            <a:lvl8pPr marL="4480448" indent="0" algn="ctr">
               <a:buNone/>
               <a:defRPr sz="2240"/>
             </a:lvl8pPr>
-            <a:lvl9pPr marL="5120640" indent="0" algn="ctr">
+            <a:lvl9pPr marL="5120512" indent="0" algn="ctr">
               <a:buNone/>
               <a:defRPr sz="2240"/>
             </a:lvl9pPr>
@@ -940,7 +945,7 @@
         </p:nvSpPr>
         <p:spPr>
           <a:xfrm>
-            <a:off x="9161146" y="511175"/>
+            <a:off x="9161147" y="511177"/>
             <a:ext cx="2760345" cy="8136573"/>
           </a:xfrm>
         </p:spPr>
@@ -968,7 +973,7 @@
         </p:nvSpPr>
         <p:spPr>
           <a:xfrm>
-            <a:off x="880111" y="511175"/>
+            <a:off x="880112" y="511177"/>
             <a:ext cx="8121015" cy="8136573"/>
           </a:xfrm>
         </p:spPr>
@@ -1337,7 +1342,7 @@
                 </a:solidFill>
               </a:defRPr>
             </a:lvl1pPr>
-            <a:lvl2pPr marL="640080" indent="0">
+            <a:lvl2pPr marL="640064" indent="0">
               <a:buNone/>
               <a:defRPr sz="2800">
                 <a:solidFill>
@@ -1347,7 +1352,7 @@
                 </a:solidFill>
               </a:defRPr>
             </a:lvl2pPr>
-            <a:lvl3pPr marL="1280160" indent="0">
+            <a:lvl3pPr marL="1280128" indent="0">
               <a:buNone/>
               <a:defRPr sz="2520">
                 <a:solidFill>
@@ -1357,7 +1362,7 @@
                 </a:solidFill>
               </a:defRPr>
             </a:lvl3pPr>
-            <a:lvl4pPr marL="1920240" indent="0">
+            <a:lvl4pPr marL="1920192" indent="0">
               <a:buNone/>
               <a:defRPr sz="2240">
                 <a:solidFill>
@@ -1367,7 +1372,7 @@
                 </a:solidFill>
               </a:defRPr>
             </a:lvl4pPr>
-            <a:lvl5pPr marL="2560320" indent="0">
+            <a:lvl5pPr marL="2560256" indent="0">
               <a:buNone/>
               <a:defRPr sz="2240">
                 <a:solidFill>
@@ -1377,7 +1382,7 @@
                 </a:solidFill>
               </a:defRPr>
             </a:lvl5pPr>
-            <a:lvl6pPr marL="3200400" indent="0">
+            <a:lvl6pPr marL="3200320" indent="0">
               <a:buNone/>
               <a:defRPr sz="2240">
                 <a:solidFill>
@@ -1387,7 +1392,7 @@
                 </a:solidFill>
               </a:defRPr>
             </a:lvl6pPr>
-            <a:lvl7pPr marL="3840480" indent="0">
+            <a:lvl7pPr marL="3840384" indent="0">
               <a:buNone/>
               <a:defRPr sz="2240">
                 <a:solidFill>
@@ -1397,7 +1402,7 @@
                 </a:solidFill>
               </a:defRPr>
             </a:lvl7pPr>
-            <a:lvl8pPr marL="4480560" indent="0">
+            <a:lvl8pPr marL="4480448" indent="0">
               <a:buNone/>
               <a:defRPr sz="2240">
                 <a:solidFill>
@@ -1407,7 +1412,7 @@
                 </a:solidFill>
               </a:defRPr>
             </a:lvl8pPr>
-            <a:lvl9pPr marL="5120640" indent="0">
+            <a:lvl9pPr marL="5120512" indent="0">
               <a:buNone/>
               <a:defRPr sz="2240">
                 <a:solidFill>
@@ -1557,7 +1562,7 @@
         </p:nvSpPr>
         <p:spPr>
           <a:xfrm>
-            <a:off x="880110" y="2555875"/>
+            <a:off x="880110" y="2555876"/>
             <a:ext cx="5440680" cy="6091873"/>
           </a:xfrm>
         </p:spPr>
@@ -1614,7 +1619,7 @@
         </p:nvSpPr>
         <p:spPr>
           <a:xfrm>
-            <a:off x="6480810" y="2555875"/>
+            <a:off x="6480810" y="2555876"/>
             <a:ext cx="5440680" cy="6091873"/>
           </a:xfrm>
         </p:spPr>
@@ -1794,7 +1799,7 @@
         </p:nvSpPr>
         <p:spPr>
           <a:xfrm>
-            <a:off x="881779" y="2353628"/>
+            <a:off x="881780" y="2353630"/>
             <a:ext cx="5415676" cy="1153477"/>
           </a:xfrm>
         </p:spPr>
@@ -1805,35 +1810,35 @@
               <a:buNone/>
               <a:defRPr sz="3360" b="1"/>
             </a:lvl1pPr>
-            <a:lvl2pPr marL="640080" indent="0">
+            <a:lvl2pPr marL="640064" indent="0">
               <a:buNone/>
               <a:defRPr sz="2800" b="1"/>
             </a:lvl2pPr>
-            <a:lvl3pPr marL="1280160" indent="0">
+            <a:lvl3pPr marL="1280128" indent="0">
               <a:buNone/>
               <a:defRPr sz="2520" b="1"/>
             </a:lvl3pPr>
-            <a:lvl4pPr marL="1920240" indent="0">
+            <a:lvl4pPr marL="1920192" indent="0">
               <a:buNone/>
               <a:defRPr sz="2240" b="1"/>
             </a:lvl4pPr>
-            <a:lvl5pPr marL="2560320" indent="0">
+            <a:lvl5pPr marL="2560256" indent="0">
               <a:buNone/>
               <a:defRPr sz="2240" b="1"/>
             </a:lvl5pPr>
-            <a:lvl6pPr marL="3200400" indent="0">
+            <a:lvl6pPr marL="3200320" indent="0">
               <a:buNone/>
               <a:defRPr sz="2240" b="1"/>
             </a:lvl6pPr>
-            <a:lvl7pPr marL="3840480" indent="0">
+            <a:lvl7pPr marL="3840384" indent="0">
               <a:buNone/>
               <a:defRPr sz="2240" b="1"/>
             </a:lvl7pPr>
-            <a:lvl8pPr marL="4480560" indent="0">
+            <a:lvl8pPr marL="4480448" indent="0">
               <a:buNone/>
               <a:defRPr sz="2240" b="1"/>
             </a:lvl8pPr>
-            <a:lvl9pPr marL="5120640" indent="0">
+            <a:lvl9pPr marL="5120512" indent="0">
               <a:buNone/>
               <a:defRPr sz="2240" b="1"/>
             </a:lvl9pPr>
@@ -1859,7 +1864,7 @@
         </p:nvSpPr>
         <p:spPr>
           <a:xfrm>
-            <a:off x="881779" y="3507105"/>
+            <a:off x="881780" y="3507107"/>
             <a:ext cx="5415676" cy="5158423"/>
           </a:xfrm>
         </p:spPr>
@@ -1916,7 +1921,7 @@
         </p:nvSpPr>
         <p:spPr>
           <a:xfrm>
-            <a:off x="6480811" y="2353628"/>
+            <a:off x="6480812" y="2353630"/>
             <a:ext cx="5442347" cy="1153477"/>
           </a:xfrm>
         </p:spPr>
@@ -1927,35 +1932,35 @@
               <a:buNone/>
               <a:defRPr sz="3360" b="1"/>
             </a:lvl1pPr>
-            <a:lvl2pPr marL="640080" indent="0">
+            <a:lvl2pPr marL="640064" indent="0">
               <a:buNone/>
               <a:defRPr sz="2800" b="1"/>
             </a:lvl2pPr>
-            <a:lvl3pPr marL="1280160" indent="0">
+            <a:lvl3pPr marL="1280128" indent="0">
               <a:buNone/>
               <a:defRPr sz="2520" b="1"/>
             </a:lvl3pPr>
-            <a:lvl4pPr marL="1920240" indent="0">
+            <a:lvl4pPr marL="1920192" indent="0">
               <a:buNone/>
               <a:defRPr sz="2240" b="1"/>
             </a:lvl4pPr>
-            <a:lvl5pPr marL="2560320" indent="0">
+            <a:lvl5pPr marL="2560256" indent="0">
               <a:buNone/>
               <a:defRPr sz="2240" b="1"/>
             </a:lvl5pPr>
-            <a:lvl6pPr marL="3200400" indent="0">
+            <a:lvl6pPr marL="3200320" indent="0">
               <a:buNone/>
               <a:defRPr sz="2240" b="1"/>
             </a:lvl6pPr>
-            <a:lvl7pPr marL="3840480" indent="0">
+            <a:lvl7pPr marL="3840384" indent="0">
               <a:buNone/>
               <a:defRPr sz="2240" b="1"/>
             </a:lvl7pPr>
-            <a:lvl8pPr marL="4480560" indent="0">
+            <a:lvl8pPr marL="4480448" indent="0">
               <a:buNone/>
               <a:defRPr sz="2240" b="1"/>
             </a:lvl8pPr>
-            <a:lvl9pPr marL="5120640" indent="0">
+            <a:lvl9pPr marL="5120512" indent="0">
               <a:buNone/>
               <a:defRPr sz="2240" b="1"/>
             </a:lvl9pPr>
@@ -1981,7 +1986,7 @@
         </p:nvSpPr>
         <p:spPr>
           <a:xfrm>
-            <a:off x="6480811" y="3507105"/>
+            <a:off x="6480812" y="3507107"/>
             <a:ext cx="5442347" cy="5158423"/>
           </a:xfrm>
         </p:spPr>
@@ -2346,7 +2351,7 @@
         </p:nvSpPr>
         <p:spPr>
           <a:xfrm>
-            <a:off x="881778" y="640080"/>
+            <a:off x="881779" y="640080"/>
             <a:ext cx="4128849" cy="2240280"/>
           </a:xfrm>
         </p:spPr>
@@ -2378,7 +2383,7 @@
         </p:nvSpPr>
         <p:spPr>
           <a:xfrm>
-            <a:off x="5442347" y="1382397"/>
+            <a:off x="5442347" y="1382399"/>
             <a:ext cx="6480810" cy="6823075"/>
           </a:xfrm>
         </p:spPr>
@@ -2463,7 +2468,7 @@
         </p:nvSpPr>
         <p:spPr>
           <a:xfrm>
-            <a:off x="881778" y="2880360"/>
+            <a:off x="881779" y="2880360"/>
             <a:ext cx="4128849" cy="5336223"/>
           </a:xfrm>
         </p:spPr>
@@ -2474,35 +2479,35 @@
               <a:buNone/>
               <a:defRPr sz="2240"/>
             </a:lvl1pPr>
-            <a:lvl2pPr marL="640080" indent="0">
+            <a:lvl2pPr marL="640064" indent="0">
               <a:buNone/>
               <a:defRPr sz="1960"/>
             </a:lvl2pPr>
-            <a:lvl3pPr marL="1280160" indent="0">
+            <a:lvl3pPr marL="1280128" indent="0">
               <a:buNone/>
               <a:defRPr sz="1680"/>
             </a:lvl3pPr>
-            <a:lvl4pPr marL="1920240" indent="0">
+            <a:lvl4pPr marL="1920192" indent="0">
               <a:buNone/>
               <a:defRPr sz="1400"/>
             </a:lvl4pPr>
-            <a:lvl5pPr marL="2560320" indent="0">
+            <a:lvl5pPr marL="2560256" indent="0">
               <a:buNone/>
               <a:defRPr sz="1400"/>
             </a:lvl5pPr>
-            <a:lvl6pPr marL="3200400" indent="0">
+            <a:lvl6pPr marL="3200320" indent="0">
               <a:buNone/>
               <a:defRPr sz="1400"/>
             </a:lvl6pPr>
-            <a:lvl7pPr marL="3840480" indent="0">
+            <a:lvl7pPr marL="3840384" indent="0">
               <a:buNone/>
               <a:defRPr sz="1400"/>
             </a:lvl7pPr>
-            <a:lvl8pPr marL="4480560" indent="0">
+            <a:lvl8pPr marL="4480448" indent="0">
               <a:buNone/>
               <a:defRPr sz="1400"/>
             </a:lvl8pPr>
-            <a:lvl9pPr marL="5120640" indent="0">
+            <a:lvl9pPr marL="5120512" indent="0">
               <a:buNone/>
               <a:defRPr sz="1400"/>
             </a:lvl9pPr>
@@ -2623,7 +2628,7 @@
         </p:nvSpPr>
         <p:spPr>
           <a:xfrm>
-            <a:off x="881778" y="640080"/>
+            <a:off x="881779" y="640080"/>
             <a:ext cx="4128849" cy="2240280"/>
           </a:xfrm>
         </p:spPr>
@@ -2655,7 +2660,7 @@
         </p:nvSpPr>
         <p:spPr>
           <a:xfrm>
-            <a:off x="5442347" y="1382397"/>
+            <a:off x="5442347" y="1382399"/>
             <a:ext cx="6480810" cy="6823075"/>
           </a:xfrm>
         </p:spPr>
@@ -2666,35 +2671,35 @@
               <a:buNone/>
               <a:defRPr sz="4480"/>
             </a:lvl1pPr>
-            <a:lvl2pPr marL="640080" indent="0">
+            <a:lvl2pPr marL="640064" indent="0">
               <a:buNone/>
               <a:defRPr sz="3920"/>
             </a:lvl2pPr>
-            <a:lvl3pPr marL="1280160" indent="0">
+            <a:lvl3pPr marL="1280128" indent="0">
               <a:buNone/>
               <a:defRPr sz="3360"/>
             </a:lvl3pPr>
-            <a:lvl4pPr marL="1920240" indent="0">
+            <a:lvl4pPr marL="1920192" indent="0">
               <a:buNone/>
               <a:defRPr sz="2800"/>
             </a:lvl4pPr>
-            <a:lvl5pPr marL="2560320" indent="0">
+            <a:lvl5pPr marL="2560256" indent="0">
               <a:buNone/>
               <a:defRPr sz="2800"/>
             </a:lvl5pPr>
-            <a:lvl6pPr marL="3200400" indent="0">
+            <a:lvl6pPr marL="3200320" indent="0">
               <a:buNone/>
               <a:defRPr sz="2800"/>
             </a:lvl6pPr>
-            <a:lvl7pPr marL="3840480" indent="0">
+            <a:lvl7pPr marL="3840384" indent="0">
               <a:buNone/>
               <a:defRPr sz="2800"/>
             </a:lvl7pPr>
-            <a:lvl8pPr marL="4480560" indent="0">
+            <a:lvl8pPr marL="4480448" indent="0">
               <a:buNone/>
               <a:defRPr sz="2800"/>
             </a:lvl8pPr>
-            <a:lvl9pPr marL="5120640" indent="0">
+            <a:lvl9pPr marL="5120512" indent="0">
               <a:buNone/>
               <a:defRPr sz="2800"/>
             </a:lvl9pPr>
@@ -2720,7 +2725,7 @@
         </p:nvSpPr>
         <p:spPr>
           <a:xfrm>
-            <a:off x="881778" y="2880360"/>
+            <a:off x="881779" y="2880360"/>
             <a:ext cx="4128849" cy="5336223"/>
           </a:xfrm>
         </p:spPr>
@@ -2731,35 +2736,35 @@
               <a:buNone/>
               <a:defRPr sz="2240"/>
             </a:lvl1pPr>
-            <a:lvl2pPr marL="640080" indent="0">
+            <a:lvl2pPr marL="640064" indent="0">
               <a:buNone/>
               <a:defRPr sz="1960"/>
             </a:lvl2pPr>
-            <a:lvl3pPr marL="1280160" indent="0">
+            <a:lvl3pPr marL="1280128" indent="0">
               <a:buNone/>
               <a:defRPr sz="1680"/>
             </a:lvl3pPr>
-            <a:lvl4pPr marL="1920240" indent="0">
+            <a:lvl4pPr marL="1920192" indent="0">
               <a:buNone/>
               <a:defRPr sz="1400"/>
             </a:lvl4pPr>
-            <a:lvl5pPr marL="2560320" indent="0">
+            <a:lvl5pPr marL="2560256" indent="0">
               <a:buNone/>
               <a:defRPr sz="1400"/>
             </a:lvl5pPr>
-            <a:lvl6pPr marL="3200400" indent="0">
+            <a:lvl6pPr marL="3200320" indent="0">
               <a:buNone/>
               <a:defRPr sz="1400"/>
             </a:lvl6pPr>
-            <a:lvl7pPr marL="3840480" indent="0">
+            <a:lvl7pPr marL="3840384" indent="0">
               <a:buNone/>
               <a:defRPr sz="1400"/>
             </a:lvl7pPr>
-            <a:lvl8pPr marL="4480560" indent="0">
+            <a:lvl8pPr marL="4480448" indent="0">
               <a:buNone/>
               <a:defRPr sz="1400"/>
             </a:lvl8pPr>
-            <a:lvl9pPr marL="5120640" indent="0">
+            <a:lvl9pPr marL="5120512" indent="0">
               <a:buNone/>
               <a:defRPr sz="1400"/>
             </a:lvl9pPr>
@@ -2918,7 +2923,7 @@
         </p:nvSpPr>
         <p:spPr>
           <a:xfrm>
-            <a:off x="880110" y="2555875"/>
+            <a:off x="880110" y="2555876"/>
             <a:ext cx="11041380" cy="6091873"/>
           </a:xfrm>
           <a:prstGeom prst="rect">
@@ -2980,7 +2985,7 @@
         </p:nvSpPr>
         <p:spPr>
           <a:xfrm>
-            <a:off x="880110" y="8898892"/>
+            <a:off x="880110" y="8898894"/>
             <a:ext cx="2880360" cy="511175"/>
           </a:xfrm>
           <a:prstGeom prst="rect">
@@ -3021,7 +3026,7 @@
         </p:nvSpPr>
         <p:spPr>
           <a:xfrm>
-            <a:off x="4240530" y="8898892"/>
+            <a:off x="4240530" y="8898894"/>
             <a:ext cx="4320540" cy="511175"/>
           </a:xfrm>
           <a:prstGeom prst="rect">
@@ -3058,7 +3063,7 @@
         </p:nvSpPr>
         <p:spPr>
           <a:xfrm>
-            <a:off x="9041130" y="8898892"/>
+            <a:off x="9041130" y="8898894"/>
             <a:ext cx="2880360" cy="511175"/>
           </a:xfrm>
           <a:prstGeom prst="rect">
@@ -3110,7 +3115,7 @@
   </p:sldLayoutIdLst>
   <p:txStyles>
     <p:titleStyle>
-      <a:lvl1pPr algn="l" defTabSz="1280160" rtl="0" eaLnBrk="1" latinLnBrk="0" hangingPunct="1">
+      <a:lvl1pPr algn="l" defTabSz="1280128" rtl="0" eaLnBrk="1" latinLnBrk="0" hangingPunct="1">
         <a:lnSpc>
           <a:spcPct val="90000"/>
         </a:lnSpc>
@@ -3129,7 +3134,7 @@
       </a:lvl1pPr>
     </p:titleStyle>
     <p:bodyStyle>
-      <a:lvl1pPr marL="320040" indent="-320040" algn="l" defTabSz="1280160" rtl="0" eaLnBrk="1" latinLnBrk="0" hangingPunct="1">
+      <a:lvl1pPr marL="320032" indent="-320032" algn="l" defTabSz="1280128" rtl="0" eaLnBrk="1" latinLnBrk="0" hangingPunct="1">
         <a:lnSpc>
           <a:spcPct val="90000"/>
         </a:lnSpc>
@@ -3147,7 +3152,7 @@
           <a:cs typeface="+mn-cs"/>
         </a:defRPr>
       </a:lvl1pPr>
-      <a:lvl2pPr marL="960120" indent="-320040" algn="l" defTabSz="1280160" rtl="0" eaLnBrk="1" latinLnBrk="0" hangingPunct="1">
+      <a:lvl2pPr marL="960096" indent="-320032" algn="l" defTabSz="1280128" rtl="0" eaLnBrk="1" latinLnBrk="0" hangingPunct="1">
         <a:lnSpc>
           <a:spcPct val="90000"/>
         </a:lnSpc>
@@ -3165,7 +3170,7 @@
           <a:cs typeface="+mn-cs"/>
         </a:defRPr>
       </a:lvl2pPr>
-      <a:lvl3pPr marL="1600200" indent="-320040" algn="l" defTabSz="1280160" rtl="0" eaLnBrk="1" latinLnBrk="0" hangingPunct="1">
+      <a:lvl3pPr marL="1600160" indent="-320032" algn="l" defTabSz="1280128" rtl="0" eaLnBrk="1" latinLnBrk="0" hangingPunct="1">
         <a:lnSpc>
           <a:spcPct val="90000"/>
         </a:lnSpc>
@@ -3183,7 +3188,7 @@
           <a:cs typeface="+mn-cs"/>
         </a:defRPr>
       </a:lvl3pPr>
-      <a:lvl4pPr marL="2240280" indent="-320040" algn="l" defTabSz="1280160" rtl="0" eaLnBrk="1" latinLnBrk="0" hangingPunct="1">
+      <a:lvl4pPr marL="2240224" indent="-320032" algn="l" defTabSz="1280128" rtl="0" eaLnBrk="1" latinLnBrk="0" hangingPunct="1">
         <a:lnSpc>
           <a:spcPct val="90000"/>
         </a:lnSpc>
@@ -3201,7 +3206,7 @@
           <a:cs typeface="+mn-cs"/>
         </a:defRPr>
       </a:lvl4pPr>
-      <a:lvl5pPr marL="2880360" indent="-320040" algn="l" defTabSz="1280160" rtl="0" eaLnBrk="1" latinLnBrk="0" hangingPunct="1">
+      <a:lvl5pPr marL="2880288" indent="-320032" algn="l" defTabSz="1280128" rtl="0" eaLnBrk="1" latinLnBrk="0" hangingPunct="1">
         <a:lnSpc>
           <a:spcPct val="90000"/>
         </a:lnSpc>
@@ -3219,7 +3224,7 @@
           <a:cs typeface="+mn-cs"/>
         </a:defRPr>
       </a:lvl5pPr>
-      <a:lvl6pPr marL="3520440" indent="-320040" algn="l" defTabSz="1280160" rtl="0" eaLnBrk="1" latinLnBrk="0" hangingPunct="1">
+      <a:lvl6pPr marL="3520352" indent="-320032" algn="l" defTabSz="1280128" rtl="0" eaLnBrk="1" latinLnBrk="0" hangingPunct="1">
         <a:lnSpc>
           <a:spcPct val="90000"/>
         </a:lnSpc>
@@ -3237,7 +3242,7 @@
           <a:cs typeface="+mn-cs"/>
         </a:defRPr>
       </a:lvl6pPr>
-      <a:lvl7pPr marL="4160520" indent="-320040" algn="l" defTabSz="1280160" rtl="0" eaLnBrk="1" latinLnBrk="0" hangingPunct="1">
+      <a:lvl7pPr marL="4160416" indent="-320032" algn="l" defTabSz="1280128" rtl="0" eaLnBrk="1" latinLnBrk="0" hangingPunct="1">
         <a:lnSpc>
           <a:spcPct val="90000"/>
         </a:lnSpc>
@@ -3255,7 +3260,7 @@
           <a:cs typeface="+mn-cs"/>
         </a:defRPr>
       </a:lvl7pPr>
-      <a:lvl8pPr marL="4800600" indent="-320040" algn="l" defTabSz="1280160" rtl="0" eaLnBrk="1" latinLnBrk="0" hangingPunct="1">
+      <a:lvl8pPr marL="4800480" indent="-320032" algn="l" defTabSz="1280128" rtl="0" eaLnBrk="1" latinLnBrk="0" hangingPunct="1">
         <a:lnSpc>
           <a:spcPct val="90000"/>
         </a:lnSpc>
@@ -3273,7 +3278,7 @@
           <a:cs typeface="+mn-cs"/>
         </a:defRPr>
       </a:lvl8pPr>
-      <a:lvl9pPr marL="5440680" indent="-320040" algn="l" defTabSz="1280160" rtl="0" eaLnBrk="1" latinLnBrk="0" hangingPunct="1">
+      <a:lvl9pPr marL="5440544" indent="-320032" algn="l" defTabSz="1280128" rtl="0" eaLnBrk="1" latinLnBrk="0" hangingPunct="1">
         <a:lnSpc>
           <a:spcPct val="90000"/>
         </a:lnSpc>
@@ -3296,7 +3301,7 @@
       <a:defPPr>
         <a:defRPr lang="en-US"/>
       </a:defPPr>
-      <a:lvl1pPr marL="0" algn="l" defTabSz="1280160" rtl="0" eaLnBrk="1" latinLnBrk="0" hangingPunct="1">
+      <a:lvl1pPr marL="0" algn="l" defTabSz="1280128" rtl="0" eaLnBrk="1" latinLnBrk="0" hangingPunct="1">
         <a:defRPr sz="2520" kern="1200">
           <a:solidFill>
             <a:schemeClr val="tx1"/>
@@ -3306,7 +3311,7 @@
           <a:cs typeface="+mn-cs"/>
         </a:defRPr>
       </a:lvl1pPr>
-      <a:lvl2pPr marL="640080" algn="l" defTabSz="1280160" rtl="0" eaLnBrk="1" latinLnBrk="0" hangingPunct="1">
+      <a:lvl2pPr marL="640064" algn="l" defTabSz="1280128" rtl="0" eaLnBrk="1" latinLnBrk="0" hangingPunct="1">
         <a:defRPr sz="2520" kern="1200">
           <a:solidFill>
             <a:schemeClr val="tx1"/>
@@ -3316,7 +3321,7 @@
           <a:cs typeface="+mn-cs"/>
         </a:defRPr>
       </a:lvl2pPr>
-      <a:lvl3pPr marL="1280160" algn="l" defTabSz="1280160" rtl="0" eaLnBrk="1" latinLnBrk="0" hangingPunct="1">
+      <a:lvl3pPr marL="1280128" algn="l" defTabSz="1280128" rtl="0" eaLnBrk="1" latinLnBrk="0" hangingPunct="1">
         <a:defRPr sz="2520" kern="1200">
           <a:solidFill>
             <a:schemeClr val="tx1"/>
@@ -3326,7 +3331,7 @@
           <a:cs typeface="+mn-cs"/>
         </a:defRPr>
       </a:lvl3pPr>
-      <a:lvl4pPr marL="1920240" algn="l" defTabSz="1280160" rtl="0" eaLnBrk="1" latinLnBrk="0" hangingPunct="1">
+      <a:lvl4pPr marL="1920192" algn="l" defTabSz="1280128" rtl="0" eaLnBrk="1" latinLnBrk="0" hangingPunct="1">
         <a:defRPr sz="2520" kern="1200">
           <a:solidFill>
             <a:schemeClr val="tx1"/>
@@ -3336,7 +3341,7 @@
           <a:cs typeface="+mn-cs"/>
         </a:defRPr>
       </a:lvl4pPr>
-      <a:lvl5pPr marL="2560320" algn="l" defTabSz="1280160" rtl="0" eaLnBrk="1" latinLnBrk="0" hangingPunct="1">
+      <a:lvl5pPr marL="2560256" algn="l" defTabSz="1280128" rtl="0" eaLnBrk="1" latinLnBrk="0" hangingPunct="1">
         <a:defRPr sz="2520" kern="1200">
           <a:solidFill>
             <a:schemeClr val="tx1"/>
@@ -3346,7 +3351,7 @@
           <a:cs typeface="+mn-cs"/>
         </a:defRPr>
       </a:lvl5pPr>
-      <a:lvl6pPr marL="3200400" algn="l" defTabSz="1280160" rtl="0" eaLnBrk="1" latinLnBrk="0" hangingPunct="1">
+      <a:lvl6pPr marL="3200320" algn="l" defTabSz="1280128" rtl="0" eaLnBrk="1" latinLnBrk="0" hangingPunct="1">
         <a:defRPr sz="2520" kern="1200">
           <a:solidFill>
             <a:schemeClr val="tx1"/>
@@ -3356,7 +3361,7 @@
           <a:cs typeface="+mn-cs"/>
         </a:defRPr>
       </a:lvl6pPr>
-      <a:lvl7pPr marL="3840480" algn="l" defTabSz="1280160" rtl="0" eaLnBrk="1" latinLnBrk="0" hangingPunct="1">
+      <a:lvl7pPr marL="3840384" algn="l" defTabSz="1280128" rtl="0" eaLnBrk="1" latinLnBrk="0" hangingPunct="1">
         <a:defRPr sz="2520" kern="1200">
           <a:solidFill>
             <a:schemeClr val="tx1"/>
@@ -3366,7 +3371,7 @@
           <a:cs typeface="+mn-cs"/>
         </a:defRPr>
       </a:lvl7pPr>
-      <a:lvl8pPr marL="4480560" algn="l" defTabSz="1280160" rtl="0" eaLnBrk="1" latinLnBrk="0" hangingPunct="1">
+      <a:lvl8pPr marL="4480448" algn="l" defTabSz="1280128" rtl="0" eaLnBrk="1" latinLnBrk="0" hangingPunct="1">
         <a:defRPr sz="2520" kern="1200">
           <a:solidFill>
             <a:schemeClr val="tx1"/>
@@ -3376,7 +3381,7 @@
           <a:cs typeface="+mn-cs"/>
         </a:defRPr>
       </a:lvl8pPr>
-      <a:lvl9pPr marL="5120640" algn="l" defTabSz="1280160" rtl="0" eaLnBrk="1" latinLnBrk="0" hangingPunct="1">
+      <a:lvl9pPr marL="5120512" algn="l" defTabSz="1280128" rtl="0" eaLnBrk="1" latinLnBrk="0" hangingPunct="1">
         <a:defRPr sz="2520" kern="1200">
           <a:solidFill>
             <a:schemeClr val="tx1"/>
@@ -3751,7 +3756,7 @@
         </p:nvSpPr>
         <p:spPr>
           <a:xfrm>
-            <a:off x="245527" y="1433661"/>
+            <a:off x="245528" y="1433661"/>
             <a:ext cx="3922365" cy="307777"/>
           </a:xfrm>
           <a:prstGeom prst="rect">
@@ -3798,7 +3803,7 @@
         </p:nvSpPr>
         <p:spPr>
           <a:xfrm>
-            <a:off x="245535" y="3583799"/>
+            <a:off x="245536" y="3583800"/>
             <a:ext cx="3922370" cy="3248801"/>
           </a:xfrm>
           <a:prstGeom prst="rect">
@@ -3856,7 +3861,7 @@
         </p:nvSpPr>
         <p:spPr>
           <a:xfrm>
-            <a:off x="245533" y="3583799"/>
+            <a:off x="245534" y="3583800"/>
             <a:ext cx="3922365" cy="343981"/>
           </a:xfrm>
           <a:prstGeom prst="rect">
@@ -3912,7 +3917,7 @@
         </p:nvSpPr>
         <p:spPr>
           <a:xfrm>
-            <a:off x="1588025" y="3612960"/>
+            <a:off x="1588026" y="3612960"/>
             <a:ext cx="1237373" cy="248857"/>
           </a:xfrm>
           <a:prstGeom prst="rect">
@@ -3972,7 +3977,7 @@
               <a:p>
                 <a:pPr algn="just"/>
                 <a:r>
-                  <a:rPr lang="en-GB" sz="1200" b="0" dirty="0">
+                  <a:rPr lang="en-GB" sz="1200" dirty="0">
                     <a:latin typeface="Lato" panose="020F0502020204030203" pitchFamily="34" charset="0"/>
                     <a:ea typeface="Lato" panose="020F0502020204030203" pitchFamily="34" charset="0"/>
                     <a:cs typeface="Lato" panose="020F0502020204030203" pitchFamily="34" charset="0"/>
@@ -3980,7 +3985,7 @@
                   <a:t>One of the most prominent climatic changes in Earth’s history occurred in the </a:t>
                 </a:r>
                 <a:r>
-                  <a:rPr lang="en-GB" sz="1200" b="0" dirty="0" err="1">
+                  <a:rPr lang="en-GB" sz="1200" dirty="0" err="1">
                     <a:latin typeface="Lato" panose="020F0502020204030203" pitchFamily="34" charset="0"/>
                     <a:ea typeface="Lato" panose="020F0502020204030203" pitchFamily="34" charset="0"/>
                     <a:cs typeface="Lato" panose="020F0502020204030203" pitchFamily="34" charset="0"/>
@@ -3988,20 +3993,12 @@
                   <a:t>Cenozoic</a:t>
                 </a:r>
                 <a:r>
-                  <a:rPr lang="en-GB" sz="1200" b="0" dirty="0">
-                    <a:latin typeface="Lato" panose="020F0502020204030203" pitchFamily="34" charset="0"/>
-                    <a:ea typeface="Lato" panose="020F0502020204030203" pitchFamily="34" charset="0"/>
-                    <a:cs typeface="Lato" panose="020F0502020204030203" pitchFamily="34" charset="0"/>
-                  </a:rPr>
-                  <a:t> near to the Eocene-Oligocene transition, ca. 33.8 Ma</a:t>
-                </a:r>
-                <a:r>
                   <a:rPr lang="en-GB" sz="1200" dirty="0">
                     <a:latin typeface="Lato" panose="020F0502020204030203" pitchFamily="34" charset="0"/>
                     <a:ea typeface="Lato" panose="020F0502020204030203" pitchFamily="34" charset="0"/>
                     <a:cs typeface="Lato" panose="020F0502020204030203" pitchFamily="34" charset="0"/>
                   </a:rPr>
-                  <a:t>. At this boundary the decrease in global temperatures lead to effects such as permanent ice-sheet formation on Antarctica. Through studying the </a:t>
+                  <a:t> near to the Eocene-Oligocene transition, ca. 33.8 Ma. At this boundary the decrease in global temperatures lead to effects such as permanent ice-sheet formation on Antarctica. Through studying the </a:t>
                 </a:r>
                 <a14:m>
                   <m:oMath xmlns:m="http://schemas.openxmlformats.org/officeDocument/2006/math">
@@ -4097,7 +4094,7 @@
               </a:p>
               <a:p>
                 <a:pPr algn="just"/>
-                <a:endParaRPr lang="en-GB" sz="1200" b="0" dirty="0">
+                <a:endParaRPr lang="en-GB" sz="1200" dirty="0">
                   <a:latin typeface="Lato" panose="020F0502020204030203" pitchFamily="34" charset="0"/>
                   <a:ea typeface="Lato" panose="020F0502020204030203" pitchFamily="34" charset="0"/>
                   <a:cs typeface="Lato" panose="020F0502020204030203" pitchFamily="34" charset="0"/>
@@ -4165,7 +4162,7 @@
         </p:nvSpPr>
         <p:spPr>
           <a:xfrm>
-            <a:off x="8633688" y="7332665"/>
+            <a:off x="8633688" y="7332666"/>
             <a:ext cx="3922360" cy="2060576"/>
           </a:xfrm>
           <a:prstGeom prst="rect">
@@ -4223,7 +4220,7 @@
         </p:nvSpPr>
         <p:spPr>
           <a:xfrm>
-            <a:off x="8633686" y="7332665"/>
+            <a:off x="8633687" y="7332666"/>
             <a:ext cx="3922353" cy="305510"/>
           </a:xfrm>
           <a:prstGeom prst="rect">
@@ -4279,7 +4276,7 @@
         </p:nvSpPr>
         <p:spPr>
           <a:xfrm>
-            <a:off x="10051373" y="7354036"/>
+            <a:off x="10051374" y="7354036"/>
             <a:ext cx="1086940" cy="248857"/>
           </a:xfrm>
           <a:prstGeom prst="rect">
@@ -4321,7 +4318,7 @@
         </p:nvSpPr>
         <p:spPr>
           <a:xfrm>
-            <a:off x="8633679" y="7616965"/>
+            <a:off x="8633680" y="7616965"/>
             <a:ext cx="3922353" cy="830997"/>
           </a:xfrm>
           <a:prstGeom prst="rect">
@@ -4527,7 +4524,7 @@
         </p:nvSpPr>
         <p:spPr>
           <a:xfrm>
-            <a:off x="8633671" y="3990517"/>
+            <a:off x="8633672" y="3990517"/>
             <a:ext cx="3922369" cy="2060576"/>
           </a:xfrm>
           <a:prstGeom prst="rect">
@@ -4641,7 +4638,7 @@
         </p:nvSpPr>
         <p:spPr>
           <a:xfrm>
-            <a:off x="10019267" y="4018843"/>
+            <a:off x="10019268" y="4018843"/>
             <a:ext cx="1151152" cy="248857"/>
           </a:xfrm>
           <a:prstGeom prst="rect">
@@ -4683,7 +4680,7 @@
         </p:nvSpPr>
         <p:spPr>
           <a:xfrm>
-            <a:off x="8633662" y="4296027"/>
+            <a:off x="8633662" y="4296028"/>
             <a:ext cx="3922362" cy="276999"/>
           </a:xfrm>
           <a:prstGeom prst="rect">
@@ -4722,7 +4719,7 @@
         </p:nvSpPr>
         <p:spPr>
           <a:xfrm>
-            <a:off x="4439613" y="1142646"/>
+            <a:off x="4439614" y="1142647"/>
             <a:ext cx="3922373" cy="8250595"/>
           </a:xfrm>
           <a:prstGeom prst="rect">
@@ -4896,7 +4893,7 @@
         </p:nvSpPr>
         <p:spPr>
           <a:xfrm>
-            <a:off x="8633674" y="6199268"/>
+            <a:off x="8633675" y="6199269"/>
             <a:ext cx="3922365" cy="1015663"/>
           </a:xfrm>
           <a:prstGeom prst="rect">
@@ -4912,7 +4909,7 @@
           <a:p>
             <a:pPr algn="just"/>
             <a:r>
-              <a:rPr lang="en-GB" sz="1200" b="0" dirty="0">
+              <a:rPr lang="en-GB" sz="1200" dirty="0">
                 <a:latin typeface="Lato" panose="020F0502020204030203" pitchFamily="34" charset="0"/>
                 <a:ea typeface="Lato" panose="020F0502020204030203" pitchFamily="34" charset="0"/>
                 <a:cs typeface="Lato" panose="020F0502020204030203" pitchFamily="34" charset="0"/>
@@ -4936,7 +4933,7 @@
         </p:nvSpPr>
         <p:spPr>
           <a:xfrm>
-            <a:off x="246728" y="7005378"/>
+            <a:off x="246729" y="7005379"/>
             <a:ext cx="3922373" cy="2387863"/>
           </a:xfrm>
           <a:prstGeom prst="rect">
@@ -4994,7 +4991,7 @@
         </p:nvSpPr>
         <p:spPr>
           <a:xfrm>
-            <a:off x="246740" y="7000158"/>
+            <a:off x="246740" y="7000159"/>
             <a:ext cx="3922365" cy="343981"/>
           </a:xfrm>
           <a:prstGeom prst="rect">
@@ -5050,8 +5047,8 @@
         </p:nvSpPr>
         <p:spPr>
           <a:xfrm>
-            <a:off x="882676" y="7029752"/>
-            <a:ext cx="2648049" cy="247780"/>
+            <a:off x="882677" y="7029752"/>
+            <a:ext cx="2648049" cy="248857"/>
           </a:xfrm>
           <a:prstGeom prst="rect">
             <a:avLst/>
@@ -5092,7 +5089,7 @@
         </p:nvGrpSpPr>
         <p:grpSpPr>
           <a:xfrm>
-            <a:off x="2162008" y="7349359"/>
+            <a:off x="2162009" y="7349359"/>
             <a:ext cx="1933843" cy="1756322"/>
             <a:chOff x="4422325" y="2088976"/>
             <a:chExt cx="7543796" cy="6851297"/>
@@ -5172,7 +5169,12 @@
             </a:fontRef>
           </p:style>
           <p:txBody>
-            <a:bodyPr rtlCol="0" anchor="ctr"/>
+            <a:bodyPr rot="0" spcFirstLastPara="0" vertOverflow="overflow" horzOverflow="overflow" vert="horz" wrap="square" lIns="91440" tIns="45720" rIns="91440" bIns="45720" numCol="1" spcCol="0" rtlCol="0" fromWordArt="0" anchor="ctr" anchorCtr="0" forceAA="0" compatLnSpc="1">
+              <a:prstTxWarp prst="textNoShape">
+                <a:avLst/>
+              </a:prstTxWarp>
+              <a:noAutofit/>
+            </a:bodyPr>
             <a:lstStyle/>
             <a:p>
               <a:pPr algn="ctr"/>
@@ -5224,7 +5226,12 @@
             </a:fontRef>
           </p:style>
           <p:txBody>
-            <a:bodyPr rtlCol="0" anchor="ctr"/>
+            <a:bodyPr rot="0" spcFirstLastPara="0" vertOverflow="overflow" horzOverflow="overflow" vert="horz" wrap="square" lIns="91440" tIns="45720" rIns="91440" bIns="45720" numCol="1" spcCol="0" rtlCol="0" fromWordArt="0" anchor="ctr" anchorCtr="0" forceAA="0" compatLnSpc="1">
+              <a:prstTxWarp prst="textNoShape">
+                <a:avLst/>
+              </a:prstTxWarp>
+              <a:noAutofit/>
+            </a:bodyPr>
             <a:lstStyle/>
             <a:p>
               <a:pPr algn="ctr"/>
@@ -5276,7 +5283,12 @@
             </a:fontRef>
           </p:style>
           <p:txBody>
-            <a:bodyPr rtlCol="0" anchor="ctr"/>
+            <a:bodyPr rot="0" spcFirstLastPara="0" vertOverflow="overflow" horzOverflow="overflow" vert="horz" wrap="square" lIns="91440" tIns="45720" rIns="91440" bIns="45720" numCol="1" spcCol="0" rtlCol="0" fromWordArt="0" anchor="ctr" anchorCtr="0" forceAA="0" compatLnSpc="1">
+              <a:prstTxWarp prst="textNoShape">
+                <a:avLst/>
+              </a:prstTxWarp>
+              <a:noAutofit/>
+            </a:bodyPr>
             <a:lstStyle/>
             <a:p>
               <a:pPr algn="ctr"/>
@@ -5321,15 +5333,7 @@
                     <a:ea typeface="Lato" panose="020F0502020204030203" pitchFamily="34" charset="0"/>
                     <a:cs typeface="Lato" panose="020F0502020204030203" pitchFamily="34" charset="0"/>
                   </a:rPr>
-                  <a:t>I</a:t>
-                </a:r>
-                <a:r>
-                  <a:rPr lang="en-GB" sz="1200" b="0" dirty="0">
-                    <a:latin typeface="Lato" panose="020F0502020204030203" pitchFamily="34" charset="0"/>
-                    <a:ea typeface="Lato" panose="020F0502020204030203" pitchFamily="34" charset="0"/>
-                    <a:cs typeface="Lato" panose="020F0502020204030203" pitchFamily="34" charset="0"/>
-                  </a:rPr>
-                  <a:t>ce cores are the key data used to reassemble past Antarctic climate chronology. Projects such as the Deep-Sea Drilling Project in the 1970s (Kennett 1977) utilised the </a:t>
+                  <a:t>Ice cores are the key data used to reassemble past Antarctic climate chronology. Projects such as the Deep-Sea Drilling Project in the 1970s (Kennett 1977) utilised the </a:t>
                 </a:r>
                 <a14:m>
                   <m:oMath xmlns:m="http://schemas.openxmlformats.org/officeDocument/2006/math">
@@ -5387,11 +5391,6 @@
                   </a:rPr>
                   <a:t>.</a:t>
                 </a:r>
-                <a:endParaRPr lang="en-GB" sz="1200" b="0" dirty="0">
-                  <a:latin typeface="Lato" panose="020F0502020204030203" pitchFamily="34" charset="0"/>
-                  <a:ea typeface="Lato" panose="020F0502020204030203" pitchFamily="34" charset="0"/>
-                  <a:cs typeface="Lato" panose="020F0502020204030203" pitchFamily="34" charset="0"/>
-                </a:endParaRPr>
               </a:p>
             </p:txBody>
           </p:sp>
@@ -5550,8 +5549,8 @@
         </p:nvSpPr>
         <p:spPr>
           <a:xfrm>
-            <a:off x="5627864" y="1177470"/>
-            <a:ext cx="1543435" cy="246677"/>
+            <a:off x="5173359" y="1189116"/>
+            <a:ext cx="2452446" cy="248857"/>
           </a:xfrm>
           <a:prstGeom prst="rect">
             <a:avLst/>
@@ -5573,7 +5572,7 @@
                 <a:ea typeface="Lato" panose="020F0502020204030203" pitchFamily="34" charset="0"/>
                 <a:cs typeface="Lato" panose="020F0502020204030203" pitchFamily="34" charset="0"/>
               </a:rPr>
-              <a:t>Antarctic Drilling</a:t>
+              <a:t>Eocene-Oligocene glaciation</a:t>
             </a:r>
           </a:p>
         </p:txBody>

</xml_diff>

<commit_message>
esc4: p: main body work
</commit_message>
<xml_diff>
--- a/earth_system_and_climate_4/term_2/poster/oxygen_poster.pptx
+++ b/earth_system_and_climate_4/term_2/poster/oxygen_poster.pptx
@@ -197,7 +197,7 @@
           <a:p>
             <a:fld id="{9CF0DE25-9E52-B648-AE1D-256A10D77DBE}" type="datetimeFigureOut">
               <a:rPr lang="en-GB" smtClean="0"/>
-              <a:t>27/02/2019</a:t>
+              <a:t>02/03/2019</a:t>
             </a:fld>
             <a:endParaRPr lang="en-GB"/>
           </a:p>
@@ -685,7 +685,7 @@
           <a:p>
             <a:fld id="{A89845D4-B2ED-304C-AF78-76488BE9F915}" type="datetimeFigureOut">
               <a:rPr lang="en-GB" smtClean="0"/>
-              <a:t>27/02/2019</a:t>
+              <a:t>02/03/2019</a:t>
             </a:fld>
             <a:endParaRPr lang="en-GB"/>
           </a:p>
@@ -855,7 +855,7 @@
           <a:p>
             <a:fld id="{A89845D4-B2ED-304C-AF78-76488BE9F915}" type="datetimeFigureOut">
               <a:rPr lang="en-GB" smtClean="0"/>
-              <a:t>27/02/2019</a:t>
+              <a:t>02/03/2019</a:t>
             </a:fld>
             <a:endParaRPr lang="en-GB"/>
           </a:p>
@@ -1035,7 +1035,7 @@
           <a:p>
             <a:fld id="{A89845D4-B2ED-304C-AF78-76488BE9F915}" type="datetimeFigureOut">
               <a:rPr lang="en-GB" smtClean="0"/>
-              <a:t>27/02/2019</a:t>
+              <a:t>02/03/2019</a:t>
             </a:fld>
             <a:endParaRPr lang="en-GB"/>
           </a:p>
@@ -1205,7 +1205,7 @@
           <a:p>
             <a:fld id="{A89845D4-B2ED-304C-AF78-76488BE9F915}" type="datetimeFigureOut">
               <a:rPr lang="en-GB" smtClean="0"/>
-              <a:t>27/02/2019</a:t>
+              <a:t>02/03/2019</a:t>
             </a:fld>
             <a:endParaRPr lang="en-GB"/>
           </a:p>
@@ -1449,7 +1449,7 @@
           <a:p>
             <a:fld id="{A89845D4-B2ED-304C-AF78-76488BE9F915}" type="datetimeFigureOut">
               <a:rPr lang="en-GB" smtClean="0"/>
-              <a:t>27/02/2019</a:t>
+              <a:t>02/03/2019</a:t>
             </a:fld>
             <a:endParaRPr lang="en-GB"/>
           </a:p>
@@ -1681,7 +1681,7 @@
           <a:p>
             <a:fld id="{A89845D4-B2ED-304C-AF78-76488BE9F915}" type="datetimeFigureOut">
               <a:rPr lang="en-GB" smtClean="0"/>
-              <a:t>27/02/2019</a:t>
+              <a:t>02/03/2019</a:t>
             </a:fld>
             <a:endParaRPr lang="en-GB"/>
           </a:p>
@@ -2048,7 +2048,7 @@
           <a:p>
             <a:fld id="{A89845D4-B2ED-304C-AF78-76488BE9F915}" type="datetimeFigureOut">
               <a:rPr lang="en-GB" smtClean="0"/>
-              <a:t>27/02/2019</a:t>
+              <a:t>02/03/2019</a:t>
             </a:fld>
             <a:endParaRPr lang="en-GB"/>
           </a:p>
@@ -2166,7 +2166,7 @@
           <a:p>
             <a:fld id="{A89845D4-B2ED-304C-AF78-76488BE9F915}" type="datetimeFigureOut">
               <a:rPr lang="en-GB" smtClean="0"/>
-              <a:t>27/02/2019</a:t>
+              <a:t>02/03/2019</a:t>
             </a:fld>
             <a:endParaRPr lang="en-GB"/>
           </a:p>
@@ -2261,7 +2261,7 @@
           <a:p>
             <a:fld id="{A89845D4-B2ED-304C-AF78-76488BE9F915}" type="datetimeFigureOut">
               <a:rPr lang="en-GB" smtClean="0"/>
-              <a:t>27/02/2019</a:t>
+              <a:t>02/03/2019</a:t>
             </a:fld>
             <a:endParaRPr lang="en-GB"/>
           </a:p>
@@ -2538,7 +2538,7 @@
           <a:p>
             <a:fld id="{A89845D4-B2ED-304C-AF78-76488BE9F915}" type="datetimeFigureOut">
               <a:rPr lang="en-GB" smtClean="0"/>
-              <a:t>27/02/2019</a:t>
+              <a:t>02/03/2019</a:t>
             </a:fld>
             <a:endParaRPr lang="en-GB"/>
           </a:p>
@@ -2795,7 +2795,7 @@
           <a:p>
             <a:fld id="{A89845D4-B2ED-304C-AF78-76488BE9F915}" type="datetimeFigureOut">
               <a:rPr lang="en-GB" smtClean="0"/>
-              <a:t>27/02/2019</a:t>
+              <a:t>02/03/2019</a:t>
             </a:fld>
             <a:endParaRPr lang="en-GB"/>
           </a:p>
@@ -3008,7 +3008,7 @@
           <a:p>
             <a:fld id="{A89845D4-B2ED-304C-AF78-76488BE9F915}" type="datetimeFigureOut">
               <a:rPr lang="en-GB" smtClean="0"/>
-              <a:t>27/02/2019</a:t>
+              <a:t>02/03/2019</a:t>
             </a:fld>
             <a:endParaRPr lang="en-GB"/>
           </a:p>
@@ -3646,104 +3646,6 @@
       </p:sp>
       <p:sp>
         <p:nvSpPr>
-          <p:cNvPr id="31" name="Rectangle 30">
-            <a:extLst>
-              <a:ext uri="{FF2B5EF4-FFF2-40B4-BE49-F238E27FC236}">
-                <a16:creationId xmlns:a16="http://schemas.microsoft.com/office/drawing/2014/main" id="{D8B18BB1-3EFC-DD4D-951B-DD4AB14E2E42}"/>
-              </a:ext>
-            </a:extLst>
-          </p:cNvPr>
-          <p:cNvSpPr/>
-          <p:nvPr/>
-        </p:nvSpPr>
-        <p:spPr>
-          <a:xfrm>
-            <a:off x="245534" y="1142647"/>
-            <a:ext cx="3922371" cy="333172"/>
-          </a:xfrm>
-          <a:prstGeom prst="rect">
-            <a:avLst/>
-          </a:prstGeom>
-          <a:solidFill>
-            <a:srgbClr val="2096F4"/>
-          </a:solidFill>
-          <a:ln w="25400">
-            <a:noFill/>
-          </a:ln>
-        </p:spPr>
-        <p:style>
-          <a:lnRef idx="2">
-            <a:schemeClr val="accent1">
-              <a:shade val="50000"/>
-            </a:schemeClr>
-          </a:lnRef>
-          <a:fillRef idx="1">
-            <a:schemeClr val="accent1"/>
-          </a:fillRef>
-          <a:effectRef idx="0">
-            <a:schemeClr val="accent1"/>
-          </a:effectRef>
-          <a:fontRef idx="minor">
-            <a:schemeClr val="lt1"/>
-          </a:fontRef>
-        </p:style>
-        <p:txBody>
-          <a:bodyPr rtlCol="0" anchor="ctr"/>
-          <a:lstStyle/>
-          <a:p>
-            <a:pPr algn="ctr"/>
-            <a:endParaRPr lang="en-GB" sz="2439" dirty="0">
-              <a:latin typeface="Lato" panose="020F0502020204030203" pitchFamily="34" charset="0"/>
-              <a:ea typeface="Lato" panose="020F0502020204030203" pitchFamily="34" charset="0"/>
-              <a:cs typeface="Lato" panose="020F0502020204030203" pitchFamily="34" charset="0"/>
-            </a:endParaRPr>
-          </a:p>
-        </p:txBody>
-      </p:sp>
-      <p:sp>
-        <p:nvSpPr>
-          <p:cNvPr id="32" name="TextBox 31">
-            <a:extLst>
-              <a:ext uri="{FF2B5EF4-FFF2-40B4-BE49-F238E27FC236}">
-                <a16:creationId xmlns:a16="http://schemas.microsoft.com/office/drawing/2014/main" id="{A1B961FD-759D-4A4F-8641-48EFF1CFD032}"/>
-              </a:ext>
-            </a:extLst>
-          </p:cNvPr>
-          <p:cNvSpPr txBox="1"/>
-          <p:nvPr/>
-        </p:nvSpPr>
-        <p:spPr>
-          <a:xfrm>
-            <a:off x="1747639" y="1184804"/>
-            <a:ext cx="918143" cy="248857"/>
-          </a:xfrm>
-          <a:prstGeom prst="rect">
-            <a:avLst/>
-          </a:prstGeom>
-          <a:noFill/>
-        </p:spPr>
-        <p:txBody>
-          <a:bodyPr wrap="square" tIns="33090" bIns="0" rtlCol="0">
-            <a:spAutoFit/>
-          </a:bodyPr>
-          <a:lstStyle/>
-          <a:p>
-            <a:r>
-              <a:rPr lang="en-GB" sz="1400" b="1" dirty="0">
-                <a:solidFill>
-                  <a:schemeClr val="bg1"/>
-                </a:solidFill>
-                <a:latin typeface="Lato" panose="020F0502020204030203" pitchFamily="34" charset="0"/>
-                <a:ea typeface="Lato" panose="020F0502020204030203" pitchFamily="34" charset="0"/>
-                <a:cs typeface="Lato" panose="020F0502020204030203" pitchFamily="34" charset="0"/>
-              </a:rPr>
-              <a:t>Abstract</a:t>
-            </a:r>
-          </a:p>
-        </p:txBody>
-      </p:sp>
-      <p:sp>
-        <p:nvSpPr>
           <p:cNvPr id="33" name="TextBox 32">
             <a:extLst>
               <a:ext uri="{FF2B5EF4-FFF2-40B4-BE49-F238E27FC236}">
@@ -3756,7 +3658,7 @@
         </p:nvSpPr>
         <p:spPr>
           <a:xfrm>
-            <a:off x="245528" y="1433661"/>
+            <a:off x="245528" y="1471761"/>
             <a:ext cx="3922365" cy="307777"/>
           </a:xfrm>
           <a:prstGeom prst="rect">
@@ -3804,7 +3706,7 @@
         <p:spPr>
           <a:xfrm>
             <a:off x="245536" y="3583800"/>
-            <a:ext cx="3922370" cy="3248801"/>
+            <a:ext cx="3922370" cy="3319744"/>
           </a:xfrm>
           <a:prstGeom prst="rect">
             <a:avLst/>
@@ -3961,8 +3863,8 @@
             </p:nvSpPr>
             <p:spPr>
               <a:xfrm>
-                <a:off x="245519" y="3923164"/>
-                <a:ext cx="3922365" cy="3046988"/>
+                <a:off x="245520" y="3885064"/>
+                <a:ext cx="3907200" cy="3231654"/>
               </a:xfrm>
               <a:prstGeom prst="rect">
                 <a:avLst/>
@@ -3998,7 +3900,7 @@
                     <a:ea typeface="Lato" panose="020F0502020204030203" pitchFamily="34" charset="0"/>
                     <a:cs typeface="Lato" panose="020F0502020204030203" pitchFamily="34" charset="0"/>
                   </a:rPr>
-                  <a:t> near to the Eocene-Oligocene transition, ca. 33.8 Ma. At this boundary the decrease in global temperatures lead to effects such as permanent ice-sheet formation on Antarctica. Through studying the </a:t>
+                  <a:t> near to the Eocene-Oligocene transition (EOT), ca. 33.8 Ma. At this boundary the decrease in global temperatures lead to effects such as permanent ice-sheet formation on Antarctica. Through studying the </a:t>
                 </a:r>
                 <a14:m>
                   <m:oMath xmlns:m="http://schemas.openxmlformats.org/officeDocument/2006/math">
@@ -4120,8 +4022,8 @@
             </p:nvSpPr>
             <p:spPr>
               <a:xfrm>
-                <a:off x="245519" y="3923164"/>
-                <a:ext cx="3922365" cy="3046988"/>
+                <a:off x="245520" y="3885064"/>
+                <a:ext cx="3907200" cy="3231654"/>
               </a:xfrm>
               <a:prstGeom prst="rect">
                 <a:avLst/>
@@ -4319,7 +4221,7 @@
         <p:spPr>
           <a:xfrm>
             <a:off x="8633680" y="7616965"/>
-            <a:ext cx="3922353" cy="830997"/>
+            <a:ext cx="3922353" cy="1446550"/>
           </a:xfrm>
           <a:prstGeom prst="rect">
             <a:avLst/>
@@ -4327,7 +4229,7 @@
           <a:noFill/>
         </p:spPr>
         <p:txBody>
-          <a:bodyPr wrap="square" rtlCol="0">
+          <a:bodyPr wrap="square" numCol="1" rtlCol="0">
             <a:spAutoFit/>
           </a:bodyPr>
           <a:lstStyle/>
@@ -4355,7 +4257,7 @@
                 <a:ea typeface="Lato" panose="020F0502020204030203" pitchFamily="34" charset="0"/>
                 <a:cs typeface="Lato" panose="020F0502020204030203" pitchFamily="34" charset="0"/>
               </a:rPr>
-              <a:t>, M. (2017). Widespread Antarctic glaciation during the late Eocene. </a:t>
+              <a:t>, M. (2017). Widespread Antarctic    glaciation during the late Eocene. </a:t>
             </a:r>
             <a:r>
               <a:rPr lang="en-GB" sz="800" i="1" dirty="0">
@@ -4506,6 +4408,84 @@
                 <a:cs typeface="Lato" panose="020F0502020204030203" pitchFamily="34" charset="0"/>
               </a:rPr>
               <a:t>(27), 3843-3860.</a:t>
+            </a:r>
+          </a:p>
+          <a:p>
+            <a:pPr algn="just"/>
+            <a:r>
+              <a:rPr lang="en-GB" sz="800" dirty="0" err="1">
+                <a:latin typeface="Lato" panose="020F0502020204030203" pitchFamily="34" charset="0"/>
+                <a:ea typeface="Lato" panose="020F0502020204030203" pitchFamily="34" charset="0"/>
+                <a:cs typeface="Lato" panose="020F0502020204030203" pitchFamily="34" charset="0"/>
+              </a:rPr>
+              <a:t>Scher</a:t>
+            </a:r>
+            <a:r>
+              <a:rPr lang="en-GB" sz="800" dirty="0">
+                <a:latin typeface="Lato" panose="020F0502020204030203" pitchFamily="34" charset="0"/>
+                <a:ea typeface="Lato" panose="020F0502020204030203" pitchFamily="34" charset="0"/>
+                <a:cs typeface="Lato" panose="020F0502020204030203" pitchFamily="34" charset="0"/>
+              </a:rPr>
+              <a:t>, H. D., </a:t>
+            </a:r>
+            <a:r>
+              <a:rPr lang="en-GB" sz="800" dirty="0" err="1">
+                <a:latin typeface="Lato" panose="020F0502020204030203" pitchFamily="34" charset="0"/>
+                <a:ea typeface="Lato" panose="020F0502020204030203" pitchFamily="34" charset="0"/>
+                <a:cs typeface="Lato" panose="020F0502020204030203" pitchFamily="34" charset="0"/>
+              </a:rPr>
+              <a:t>Bohaty</a:t>
+            </a:r>
+            <a:r>
+              <a:rPr lang="en-GB" sz="800" dirty="0">
+                <a:latin typeface="Lato" panose="020F0502020204030203" pitchFamily="34" charset="0"/>
+                <a:ea typeface="Lato" panose="020F0502020204030203" pitchFamily="34" charset="0"/>
+                <a:cs typeface="Lato" panose="020F0502020204030203" pitchFamily="34" charset="0"/>
+              </a:rPr>
+              <a:t>, S. M., Smith, &amp; others. (2014). Isotopic interrogation of a suspected late Eocene glaciation. </a:t>
+            </a:r>
+            <a:r>
+              <a:rPr lang="en-GB" sz="800" dirty="0" err="1">
+                <a:latin typeface="Lato" panose="020F0502020204030203" pitchFamily="34" charset="0"/>
+                <a:ea typeface="Lato" panose="020F0502020204030203" pitchFamily="34" charset="0"/>
+                <a:cs typeface="Lato" panose="020F0502020204030203" pitchFamily="34" charset="0"/>
+              </a:rPr>
+              <a:t>Paleoceanography</a:t>
+            </a:r>
+            <a:r>
+              <a:rPr lang="en-GB" sz="800" dirty="0">
+                <a:latin typeface="Lato" panose="020F0502020204030203" pitchFamily="34" charset="0"/>
+                <a:ea typeface="Lato" panose="020F0502020204030203" pitchFamily="34" charset="0"/>
+                <a:cs typeface="Lato" panose="020F0502020204030203" pitchFamily="34" charset="0"/>
+              </a:rPr>
+              <a:t>, 29(6), 628-644.</a:t>
+            </a:r>
+          </a:p>
+          <a:p>
+            <a:pPr algn="just"/>
+            <a:r>
+              <a:rPr lang="en-GB" sz="800" dirty="0">
+                <a:latin typeface="Lato" panose="020F0502020204030203" pitchFamily="34" charset="0"/>
+                <a:ea typeface="Lato" panose="020F0502020204030203" pitchFamily="34" charset="0"/>
+                <a:cs typeface="Lato" panose="020F0502020204030203" pitchFamily="34" charset="0"/>
+              </a:rPr>
+              <a:t>Sheldon, N. D., Grimes, S. T., Hooker, J. J., Collinson, M. E., Bugler, M. J., </a:t>
+            </a:r>
+            <a:r>
+              <a:rPr lang="en-GB" sz="800" dirty="0" err="1">
+                <a:latin typeface="Lato" panose="020F0502020204030203" pitchFamily="34" charset="0"/>
+                <a:ea typeface="Lato" panose="020F0502020204030203" pitchFamily="34" charset="0"/>
+                <a:cs typeface="Lato" panose="020F0502020204030203" pitchFamily="34" charset="0"/>
+              </a:rPr>
+              <a:t>Hren</a:t>
+            </a:r>
+            <a:r>
+              <a:rPr lang="en-GB" sz="800" dirty="0">
+                <a:latin typeface="Lato" panose="020F0502020204030203" pitchFamily="34" charset="0"/>
+                <a:ea typeface="Lato" panose="020F0502020204030203" pitchFamily="34" charset="0"/>
+                <a:cs typeface="Lato" panose="020F0502020204030203" pitchFamily="34" charset="0"/>
+              </a:rPr>
+              <a:t>, M. T., ... &amp; Sutton, P. A. (2016). Coupling of marine and continental oxygen isotope records during the Eocene-Oligocene transition. Bulletin, 128(3-4), 502-510.</a:t>
             </a:r>
           </a:p>
         </p:txBody>
@@ -5047,8 +5027,8 @@
         </p:nvSpPr>
         <p:spPr>
           <a:xfrm>
-            <a:off x="882677" y="7029752"/>
-            <a:ext cx="2648049" cy="248857"/>
+            <a:off x="602670" y="7031614"/>
+            <a:ext cx="3208079" cy="248857"/>
           </a:xfrm>
           <a:prstGeom prst="rect">
             <a:avLst/>
@@ -5070,7 +5050,7 @@
                 <a:ea typeface="Lato" panose="020F0502020204030203" pitchFamily="34" charset="0"/>
                 <a:cs typeface="Lato" panose="020F0502020204030203" pitchFamily="34" charset="0"/>
               </a:rPr>
-              <a:t>Ice cores and Antarctic drilling</a:t>
+              <a:t>Sediment cores and Antarctic drilling</a:t>
             </a:r>
           </a:p>
         </p:txBody>
@@ -5178,7 +5158,11 @@
             <a:lstStyle/>
             <a:p>
               <a:pPr algn="ctr"/>
-              <a:endParaRPr lang="en-GB" dirty="0"/>
+              <a:endParaRPr lang="en-GB" dirty="0">
+                <a:latin typeface="Lato" panose="020F0502020204030203" pitchFamily="34" charset="0"/>
+                <a:ea typeface="Lato" panose="020F0502020204030203" pitchFamily="34" charset="0"/>
+                <a:cs typeface="Lato" panose="020F0502020204030203" pitchFamily="34" charset="0"/>
+              </a:endParaRPr>
             </a:p>
           </p:txBody>
         </p:sp>
@@ -5235,7 +5219,11 @@
             <a:lstStyle/>
             <a:p>
               <a:pPr algn="ctr"/>
-              <a:endParaRPr lang="en-GB" dirty="0"/>
+              <a:endParaRPr lang="en-GB" dirty="0">
+                <a:latin typeface="Lato" panose="020F0502020204030203" pitchFamily="34" charset="0"/>
+                <a:ea typeface="Lato" panose="020F0502020204030203" pitchFamily="34" charset="0"/>
+                <a:cs typeface="Lato" panose="020F0502020204030203" pitchFamily="34" charset="0"/>
+              </a:endParaRPr>
             </a:p>
           </p:txBody>
         </p:sp>
@@ -5292,7 +5280,11 @@
             <a:lstStyle/>
             <a:p>
               <a:pPr algn="ctr"/>
-              <a:endParaRPr lang="en-GB"/>
+              <a:endParaRPr lang="en-GB">
+                <a:latin typeface="Lato" panose="020F0502020204030203" pitchFamily="34" charset="0"/>
+                <a:ea typeface="Lato" panose="020F0502020204030203" pitchFamily="34" charset="0"/>
+                <a:cs typeface="Lato" panose="020F0502020204030203" pitchFamily="34" charset="0"/>
+              </a:endParaRPr>
             </a:p>
           </p:txBody>
         </p:sp>
@@ -5313,7 +5305,7 @@
             </p:nvSpPr>
             <p:spPr>
               <a:xfrm>
-                <a:off x="244213" y="7292876"/>
+                <a:off x="244213" y="7300051"/>
                 <a:ext cx="1890986" cy="2123658"/>
               </a:xfrm>
               <a:prstGeom prst="rect">
@@ -5333,7 +5325,7 @@
                     <a:ea typeface="Lato" panose="020F0502020204030203" pitchFamily="34" charset="0"/>
                     <a:cs typeface="Lato" panose="020F0502020204030203" pitchFamily="34" charset="0"/>
                   </a:rPr>
-                  <a:t>Ice cores are the key data used to reassemble past Antarctic climate chronology. Projects such as the Deep-Sea Drilling Project in the 1970s (Kennett 1977) utilised the </a:t>
+                  <a:t>Sediment cores are key in reassembling past Antarctic climate chronology. Projects such as the Deep-Sea Drilling Project in the 1970s (Kennett 1977) utilised the </a:t>
                 </a:r>
                 <a14:m>
                   <m:oMath xmlns:m="http://schemas.openxmlformats.org/officeDocument/2006/math">
@@ -5412,7 +5404,7 @@
             </p:nvSpPr>
             <p:spPr>
               <a:xfrm>
-                <a:off x="244213" y="7292876"/>
+                <a:off x="244213" y="7300051"/>
                 <a:ext cx="1890986" cy="2123658"/>
               </a:xfrm>
               <a:prstGeom prst="rect">
@@ -5421,7 +5413,7 @@
               <a:blipFill>
                 <a:blip r:embed="rId6"/>
                 <a:stretch>
-                  <a:fillRect b="-1786"/>
+                  <a:fillRect b="-1190"/>
                 </a:stretch>
               </a:blipFill>
             </p:spPr>
@@ -5479,12 +5471,156 @@
           </a:p>
         </p:txBody>
       </p:sp>
-      <p:sp>
-        <p:nvSpPr>
-          <p:cNvPr id="58" name="Rectangle 57">
+      <mc:AlternateContent xmlns:mc="http://schemas.openxmlformats.org/markup-compatibility/2006">
+        <mc:Choice xmlns:a14="http://schemas.microsoft.com/office/drawing/2010/main" Requires="a14">
+          <p:sp>
+            <p:nvSpPr>
+              <p:cNvPr id="55" name="TextBox 54">
+                <a:extLst>
+                  <a:ext uri="{FF2B5EF4-FFF2-40B4-BE49-F238E27FC236}">
+                    <a16:creationId xmlns:a16="http://schemas.microsoft.com/office/drawing/2014/main" id="{8E9DA8B4-498F-C744-9F69-4BE1E7404AE2}"/>
+                  </a:ext>
+                </a:extLst>
+              </p:cNvPr>
+              <p:cNvSpPr txBox="1"/>
+              <p:nvPr/>
+            </p:nvSpPr>
+            <p:spPr>
+              <a:xfrm>
+                <a:off x="4437178" y="1471761"/>
+                <a:ext cx="3922365" cy="830997"/>
+              </a:xfrm>
+              <a:prstGeom prst="rect">
+                <a:avLst/>
+              </a:prstGeom>
+              <a:noFill/>
+            </p:spPr>
+            <p:txBody>
+              <a:bodyPr wrap="square" rtlCol="0">
+                <a:spAutoFit/>
+              </a:bodyPr>
+              <a:lstStyle/>
+              <a:p>
+                <a:pPr algn="just"/>
+                <a:r>
+                  <a:rPr lang="en-GB" sz="1200" dirty="0">
+                    <a:latin typeface="Lato" panose="020F0502020204030203" pitchFamily="34" charset="0"/>
+                    <a:ea typeface="Lato" panose="020F0502020204030203" pitchFamily="34" charset="0"/>
+                    <a:cs typeface="Lato" panose="020F0502020204030203" pitchFamily="34" charset="0"/>
+                  </a:rPr>
+                  <a:t>Recent work by </a:t>
+                </a:r>
+                <a:r>
+                  <a:rPr lang="en-GB" sz="1200" dirty="0" err="1">
+                    <a:latin typeface="Lato" panose="020F0502020204030203" pitchFamily="34" charset="0"/>
+                    <a:ea typeface="Lato" panose="020F0502020204030203" pitchFamily="34" charset="0"/>
+                    <a:cs typeface="Lato" panose="020F0502020204030203" pitchFamily="34" charset="0"/>
+                  </a:rPr>
+                  <a:t>Scher</a:t>
+                </a:r>
+                <a:r>
+                  <a:rPr lang="en-GB" sz="1200" dirty="0">
+                    <a:latin typeface="Lato" panose="020F0502020204030203" pitchFamily="34" charset="0"/>
+                    <a:ea typeface="Lato" panose="020F0502020204030203" pitchFamily="34" charset="0"/>
+                    <a:cs typeface="Lato" panose="020F0502020204030203" pitchFamily="34" charset="0"/>
+                  </a:rPr>
+                  <a:t> et al. (2014) provided results from marine sediment analysis which contains the clear </a:t>
+                </a:r>
+                <a14:m>
+                  <m:oMath xmlns:m="http://schemas.openxmlformats.org/officeDocument/2006/math">
+                    <m:sSup>
+                      <m:sSupPr>
+                        <m:ctrlPr>
+                          <a:rPr lang="en-GB" sz="1200" i="1">
+                            <a:latin typeface="Cambria Math" panose="02040503050406030204" pitchFamily="18" charset="0"/>
+                            <a:ea typeface="Cambria Math" panose="02040503050406030204" pitchFamily="18" charset="0"/>
+                          </a:rPr>
+                        </m:ctrlPr>
+                      </m:sSupPr>
+                      <m:e>
+                        <m:r>
+                          <a:rPr lang="en-GB" sz="1200" i="1">
+                            <a:latin typeface="Cambria Math" panose="02040503050406030204" pitchFamily="18" charset="0"/>
+                            <a:ea typeface="Cambria Math" panose="02040503050406030204" pitchFamily="18" charset="0"/>
+                          </a:rPr>
+                          <m:t>𝛿</m:t>
+                        </m:r>
+                      </m:e>
+                      <m:sup>
+                        <m:r>
+                          <a:rPr lang="en-GB" sz="1200" i="1">
+                            <a:latin typeface="Cambria Math" panose="02040503050406030204" pitchFamily="18" charset="0"/>
+                            <a:ea typeface="Cambria Math" panose="02040503050406030204" pitchFamily="18" charset="0"/>
+                          </a:rPr>
+                          <m:t>18</m:t>
+                        </m:r>
+                      </m:sup>
+                    </m:sSup>
+                  </m:oMath>
+                </a14:m>
+                <a:r>
+                  <a:rPr lang="en-GB" sz="1200" dirty="0">
+                    <a:latin typeface="Lato" panose="020F0502020204030203" pitchFamily="34" charset="0"/>
+                    <a:ea typeface="Lato" panose="020F0502020204030203" pitchFamily="34" charset="0"/>
+                    <a:cs typeface="Lato" panose="020F0502020204030203" pitchFamily="34" charset="0"/>
+                  </a:rPr>
+                  <a:t>O rise associated with ice-volume growth and thus supporting the idea of Antarctic glaciation. </a:t>
+                </a:r>
+              </a:p>
+            </p:txBody>
+          </p:sp>
+        </mc:Choice>
+        <mc:Fallback>
+          <p:sp>
+            <p:nvSpPr>
+              <p:cNvPr id="55" name="TextBox 54">
+                <a:extLst>
+                  <a:ext uri="{FF2B5EF4-FFF2-40B4-BE49-F238E27FC236}">
+                    <a16:creationId xmlns:a16="http://schemas.microsoft.com/office/drawing/2014/main" id="{8E9DA8B4-498F-C744-9F69-4BE1E7404AE2}"/>
+                  </a:ext>
+                </a:extLst>
+              </p:cNvPr>
+              <p:cNvSpPr txBox="1">
+                <a:spLocks noRot="1" noChangeAspect="1" noMove="1" noResize="1" noEditPoints="1" noAdjustHandles="1" noChangeArrowheads="1" noChangeShapeType="1" noTextEdit="1"/>
+              </p:cNvSpPr>
+              <p:nvPr/>
+            </p:nvSpPr>
+            <p:spPr>
+              <a:xfrm>
+                <a:off x="4437178" y="1471761"/>
+                <a:ext cx="3922365" cy="830997"/>
+              </a:xfrm>
+              <a:prstGeom prst="rect">
+                <a:avLst/>
+              </a:prstGeom>
+              <a:blipFill>
+                <a:blip r:embed="rId7"/>
+                <a:stretch>
+                  <a:fillRect b="-4545"/>
+                </a:stretch>
+              </a:blipFill>
+            </p:spPr>
+            <p:txBody>
+              <a:bodyPr/>
+              <a:lstStyle/>
+              <a:p>
+                <a:r>
+                  <a:rPr lang="en-GB">
+                    <a:noFill/>
+                  </a:rPr>
+                  <a:t> </a:t>
+                </a:r>
+              </a:p>
+            </p:txBody>
+          </p:sp>
+        </mc:Fallback>
+      </mc:AlternateContent>
+      <p:sp>
+        <p:nvSpPr>
+          <p:cNvPr id="60" name="Rectangle 59">
             <a:extLst>
               <a:ext uri="{FF2B5EF4-FFF2-40B4-BE49-F238E27FC236}">
-                <a16:creationId xmlns:a16="http://schemas.microsoft.com/office/drawing/2014/main" id="{6B80B7F1-BC2A-CD4C-BC6B-796F13A01CDD}"/>
+                <a16:creationId xmlns:a16="http://schemas.microsoft.com/office/drawing/2014/main" id="{E1A6920A-788E-4743-8389-2CABAEE47FE9}"/>
               </a:ext>
             </a:extLst>
           </p:cNvPr>
@@ -5493,7 +5629,7 @@
         </p:nvSpPr>
         <p:spPr>
           <a:xfrm>
-            <a:off x="4438400" y="1131838"/>
+            <a:off x="243084" y="1147217"/>
             <a:ext cx="3922365" cy="343981"/>
           </a:xfrm>
           <a:prstGeom prst="rect">
@@ -5537,6 +5673,104 @@
       </p:sp>
       <p:sp>
         <p:nvSpPr>
+          <p:cNvPr id="32" name="TextBox 31">
+            <a:extLst>
+              <a:ext uri="{FF2B5EF4-FFF2-40B4-BE49-F238E27FC236}">
+                <a16:creationId xmlns:a16="http://schemas.microsoft.com/office/drawing/2014/main" id="{A1B961FD-759D-4A4F-8641-48EFF1CFD032}"/>
+              </a:ext>
+            </a:extLst>
+          </p:cNvPr>
+          <p:cNvSpPr txBox="1"/>
+          <p:nvPr/>
+        </p:nvSpPr>
+        <p:spPr>
+          <a:xfrm>
+            <a:off x="1685622" y="1159235"/>
+            <a:ext cx="952773" cy="248857"/>
+          </a:xfrm>
+          <a:prstGeom prst="rect">
+            <a:avLst/>
+          </a:prstGeom>
+          <a:noFill/>
+        </p:spPr>
+        <p:txBody>
+          <a:bodyPr wrap="square" tIns="33090" bIns="0" rtlCol="0">
+            <a:spAutoFit/>
+          </a:bodyPr>
+          <a:lstStyle/>
+          <a:p>
+            <a:r>
+              <a:rPr lang="en-GB" sz="1400" b="1" dirty="0">
+                <a:solidFill>
+                  <a:schemeClr val="bg1"/>
+                </a:solidFill>
+                <a:latin typeface="Lato" panose="020F0502020204030203" pitchFamily="34" charset="0"/>
+                <a:ea typeface="Lato" panose="020F0502020204030203" pitchFamily="34" charset="0"/>
+                <a:cs typeface="Lato" panose="020F0502020204030203" pitchFamily="34" charset="0"/>
+              </a:rPr>
+              <a:t>Abstract</a:t>
+            </a:r>
+          </a:p>
+        </p:txBody>
+      </p:sp>
+      <p:sp>
+        <p:nvSpPr>
+          <p:cNvPr id="61" name="Rectangle 60">
+            <a:extLst>
+              <a:ext uri="{FF2B5EF4-FFF2-40B4-BE49-F238E27FC236}">
+                <a16:creationId xmlns:a16="http://schemas.microsoft.com/office/drawing/2014/main" id="{52274F46-9555-D04D-91EE-733E3F353B6F}"/>
+              </a:ext>
+            </a:extLst>
+          </p:cNvPr>
+          <p:cNvSpPr/>
+          <p:nvPr/>
+        </p:nvSpPr>
+        <p:spPr>
+          <a:xfrm>
+            <a:off x="4452343" y="1147217"/>
+            <a:ext cx="3922365" cy="343981"/>
+          </a:xfrm>
+          <a:prstGeom prst="rect">
+            <a:avLst/>
+          </a:prstGeom>
+          <a:solidFill>
+            <a:srgbClr val="2096F4"/>
+          </a:solidFill>
+          <a:ln w="25400">
+            <a:noFill/>
+          </a:ln>
+        </p:spPr>
+        <p:style>
+          <a:lnRef idx="2">
+            <a:schemeClr val="accent1">
+              <a:shade val="50000"/>
+            </a:schemeClr>
+          </a:lnRef>
+          <a:fillRef idx="1">
+            <a:schemeClr val="accent1"/>
+          </a:fillRef>
+          <a:effectRef idx="0">
+            <a:schemeClr val="accent1"/>
+          </a:effectRef>
+          <a:fontRef idx="minor">
+            <a:schemeClr val="lt1"/>
+          </a:fontRef>
+        </p:style>
+        <p:txBody>
+          <a:bodyPr rtlCol="0" anchor="ctr"/>
+          <a:lstStyle/>
+          <a:p>
+            <a:pPr algn="ctr"/>
+            <a:endParaRPr lang="en-GB" sz="2439" dirty="0">
+              <a:latin typeface="Lato" panose="020F0502020204030203" pitchFamily="34" charset="0"/>
+              <a:ea typeface="Lato" panose="020F0502020204030203" pitchFamily="34" charset="0"/>
+              <a:cs typeface="Lato" panose="020F0502020204030203" pitchFamily="34" charset="0"/>
+            </a:endParaRPr>
+          </a:p>
+        </p:txBody>
+      </p:sp>
+      <p:sp>
+        <p:nvSpPr>
           <p:cNvPr id="59" name="TextBox 58">
             <a:extLst>
               <a:ext uri="{FF2B5EF4-FFF2-40B4-BE49-F238E27FC236}">
@@ -5549,7 +5783,7 @@
         </p:nvSpPr>
         <p:spPr>
           <a:xfrm>
-            <a:off x="5173359" y="1189116"/>
+            <a:off x="5199975" y="1159234"/>
             <a:ext cx="2452446" cy="248857"/>
           </a:xfrm>
           <a:prstGeom prst="rect">
@@ -5577,6 +5811,467 @@
           </a:p>
         </p:txBody>
       </p:sp>
+      <p:grpSp>
+        <p:nvGrpSpPr>
+          <p:cNvPr id="15" name="Group 14">
+            <a:extLst>
+              <a:ext uri="{FF2B5EF4-FFF2-40B4-BE49-F238E27FC236}">
+                <a16:creationId xmlns:a16="http://schemas.microsoft.com/office/drawing/2014/main" id="{8AD07BB0-5860-5C43-A3B9-FD44A39C1AFC}"/>
+              </a:ext>
+            </a:extLst>
+          </p:cNvPr>
+          <p:cNvGrpSpPr/>
+          <p:nvPr/>
+        </p:nvGrpSpPr>
+        <p:grpSpPr>
+          <a:xfrm>
+            <a:off x="4446134" y="2279930"/>
+            <a:ext cx="3913408" cy="2414513"/>
+            <a:chOff x="4446134" y="2063703"/>
+            <a:chExt cx="3913408" cy="2414513"/>
+          </a:xfrm>
+        </p:grpSpPr>
+        <mc:AlternateContent xmlns:mc="http://schemas.openxmlformats.org/markup-compatibility/2006">
+          <mc:Choice xmlns:a14="http://schemas.microsoft.com/office/drawing/2010/main" Requires="a14">
+            <p:sp>
+              <p:nvSpPr>
+                <p:cNvPr id="62" name="TextBox 61">
+                  <a:extLst>
+                    <a:ext uri="{FF2B5EF4-FFF2-40B4-BE49-F238E27FC236}">
+                      <a16:creationId xmlns:a16="http://schemas.microsoft.com/office/drawing/2014/main" id="{72D2A247-A653-1F49-94CF-3413A3E93AFD}"/>
+                    </a:ext>
+                  </a:extLst>
+                </p:cNvPr>
+                <p:cNvSpPr txBox="1"/>
+                <p:nvPr/>
+              </p:nvSpPr>
+              <p:spPr>
+                <a:xfrm>
+                  <a:off x="4446134" y="4262772"/>
+                  <a:ext cx="3913408" cy="215444"/>
+                </a:xfrm>
+                <a:prstGeom prst="rect">
+                  <a:avLst/>
+                </a:prstGeom>
+                <a:noFill/>
+              </p:spPr>
+              <p:txBody>
+                <a:bodyPr wrap="square" rtlCol="0">
+                  <a:spAutoFit/>
+                </a:bodyPr>
+                <a:lstStyle/>
+                <a:p>
+                  <a:r>
+                    <a:rPr lang="en-GB" sz="800" dirty="0">
+                      <a:latin typeface="Lato" panose="020F0502020204030203" pitchFamily="34" charset="0"/>
+                      <a:ea typeface="Lato" panose="020F0502020204030203" pitchFamily="34" charset="0"/>
+                      <a:cs typeface="Lato" panose="020F0502020204030203" pitchFamily="34" charset="0"/>
+                    </a:rPr>
+                    <a:t>Fig. 2. Varying </a:t>
+                  </a:r>
+                  <a14:m>
+                    <m:oMath xmlns:m="http://schemas.openxmlformats.org/officeDocument/2006/math">
+                      <m:sSup>
+                        <m:sSupPr>
+                          <m:ctrlPr>
+                            <a:rPr lang="en-GB" sz="800" i="1">
+                              <a:latin typeface="Cambria Math" panose="02040503050406030204" pitchFamily="18" charset="0"/>
+                              <a:ea typeface="Cambria Math" panose="02040503050406030204" pitchFamily="18" charset="0"/>
+                            </a:rPr>
+                          </m:ctrlPr>
+                        </m:sSupPr>
+                        <m:e>
+                          <m:r>
+                            <a:rPr lang="en-GB" sz="800" i="1">
+                              <a:latin typeface="Cambria Math" panose="02040503050406030204" pitchFamily="18" charset="0"/>
+                              <a:ea typeface="Cambria Math" panose="02040503050406030204" pitchFamily="18" charset="0"/>
+                            </a:rPr>
+                            <m:t>𝛿</m:t>
+                          </m:r>
+                        </m:e>
+                        <m:sup>
+                          <m:r>
+                            <a:rPr lang="en-GB" sz="800" i="1">
+                              <a:latin typeface="Cambria Math" panose="02040503050406030204" pitchFamily="18" charset="0"/>
+                              <a:ea typeface="Cambria Math" panose="02040503050406030204" pitchFamily="18" charset="0"/>
+                            </a:rPr>
+                            <m:t>18</m:t>
+                          </m:r>
+                        </m:sup>
+                      </m:sSup>
+                    </m:oMath>
+                  </a14:m>
+                  <a:r>
+                    <a:rPr lang="en-GB" sz="800" dirty="0">
+                      <a:latin typeface="Lato" panose="020F0502020204030203" pitchFamily="34" charset="0"/>
+                      <a:ea typeface="Lato" panose="020F0502020204030203" pitchFamily="34" charset="0"/>
+                      <a:cs typeface="Lato" panose="020F0502020204030203" pitchFamily="34" charset="0"/>
+                    </a:rPr>
+                    <a:t>O ratio across the Eocene and Oligocene (</a:t>
+                  </a:r>
+                  <a:r>
+                    <a:rPr lang="en-GB" sz="800" dirty="0" err="1">
+                      <a:latin typeface="Lato" panose="020F0502020204030203" pitchFamily="34" charset="0"/>
+                      <a:ea typeface="Lato" panose="020F0502020204030203" pitchFamily="34" charset="0"/>
+                      <a:cs typeface="Lato" panose="020F0502020204030203" pitchFamily="34" charset="0"/>
+                    </a:rPr>
+                    <a:t>Scher</a:t>
+                  </a:r>
+                  <a:r>
+                    <a:rPr lang="en-GB" sz="800" dirty="0">
+                      <a:latin typeface="Lato" panose="020F0502020204030203" pitchFamily="34" charset="0"/>
+                      <a:ea typeface="Lato" panose="020F0502020204030203" pitchFamily="34" charset="0"/>
+                      <a:cs typeface="Lato" panose="020F0502020204030203" pitchFamily="34" charset="0"/>
+                    </a:rPr>
+                    <a:t> et al. 2014) . </a:t>
+                  </a:r>
+                </a:p>
+              </p:txBody>
+            </p:sp>
+          </mc:Choice>
+          <mc:Fallback>
+            <p:sp>
+              <p:nvSpPr>
+                <p:cNvPr id="62" name="TextBox 61">
+                  <a:extLst>
+                    <a:ext uri="{FF2B5EF4-FFF2-40B4-BE49-F238E27FC236}">
+                      <a16:creationId xmlns:a16="http://schemas.microsoft.com/office/drawing/2014/main" id="{72D2A247-A653-1F49-94CF-3413A3E93AFD}"/>
+                    </a:ext>
+                  </a:extLst>
+                </p:cNvPr>
+                <p:cNvSpPr txBox="1">
+                  <a:spLocks noRot="1" noChangeAspect="1" noMove="1" noResize="1" noEditPoints="1" noAdjustHandles="1" noChangeArrowheads="1" noChangeShapeType="1" noTextEdit="1"/>
+                </p:cNvSpPr>
+                <p:nvPr/>
+              </p:nvSpPr>
+              <p:spPr>
+                <a:xfrm>
+                  <a:off x="4446134" y="4262772"/>
+                  <a:ext cx="3913408" cy="215444"/>
+                </a:xfrm>
+                <a:prstGeom prst="rect">
+                  <a:avLst/>
+                </a:prstGeom>
+                <a:blipFill>
+                  <a:blip r:embed="rId8"/>
+                  <a:stretch>
+                    <a:fillRect b="-5556"/>
+                  </a:stretch>
+                </a:blipFill>
+              </p:spPr>
+              <p:txBody>
+                <a:bodyPr/>
+                <a:lstStyle/>
+                <a:p>
+                  <a:r>
+                    <a:rPr lang="en-GB">
+                      <a:noFill/>
+                    </a:rPr>
+                    <a:t> </a:t>
+                  </a:r>
+                </a:p>
+              </p:txBody>
+            </p:sp>
+          </mc:Fallback>
+        </mc:AlternateContent>
+        <p:grpSp>
+          <p:nvGrpSpPr>
+            <p:cNvPr id="14" name="Group 13">
+              <a:extLst>
+                <a:ext uri="{FF2B5EF4-FFF2-40B4-BE49-F238E27FC236}">
+                  <a16:creationId xmlns:a16="http://schemas.microsoft.com/office/drawing/2014/main" id="{6575FE1E-E64F-3441-B30D-5F4C7C8ECA65}"/>
+                </a:ext>
+              </a:extLst>
+            </p:cNvPr>
+            <p:cNvGrpSpPr/>
+            <p:nvPr/>
+          </p:nvGrpSpPr>
+          <p:grpSpPr>
+            <a:xfrm>
+              <a:off x="4722849" y="2063703"/>
+              <a:ext cx="3351021" cy="2218510"/>
+              <a:chOff x="4722849" y="2063703"/>
+              <a:chExt cx="3351021" cy="2218510"/>
+            </a:xfrm>
+          </p:grpSpPr>
+          <p:grpSp>
+            <p:nvGrpSpPr>
+              <p:cNvPr id="12" name="Group 11">
+                <a:extLst>
+                  <a:ext uri="{FF2B5EF4-FFF2-40B4-BE49-F238E27FC236}">
+                    <a16:creationId xmlns:a16="http://schemas.microsoft.com/office/drawing/2014/main" id="{A8C64A85-A7FB-DA4C-AE09-439D87D471D6}"/>
+                  </a:ext>
+                </a:extLst>
+              </p:cNvPr>
+              <p:cNvGrpSpPr/>
+              <p:nvPr/>
+            </p:nvGrpSpPr>
+            <p:grpSpPr>
+              <a:xfrm>
+                <a:off x="4722849" y="2063703"/>
+                <a:ext cx="3351021" cy="2218510"/>
+                <a:chOff x="4724071" y="2077517"/>
+                <a:chExt cx="3351021" cy="2218510"/>
+              </a:xfrm>
+            </p:grpSpPr>
+            <p:pic>
+              <p:nvPicPr>
+                <p:cNvPr id="6" name="Picture 5">
+                  <a:extLst>
+                    <a:ext uri="{FF2B5EF4-FFF2-40B4-BE49-F238E27FC236}">
+                      <a16:creationId xmlns:a16="http://schemas.microsoft.com/office/drawing/2014/main" id="{9932D54C-D880-B943-8653-6C7D6DE3FDCD}"/>
+                    </a:ext>
+                  </a:extLst>
+                </p:cNvPr>
+                <p:cNvPicPr>
+                  <a:picLocks noChangeAspect="1"/>
+                </p:cNvPicPr>
+                <p:nvPr/>
+              </p:nvPicPr>
+              <p:blipFill rotWithShape="1">
+                <a:blip r:embed="rId9"/>
+                <a:srcRect l="5053" t="2855"/>
+                <a:stretch/>
+              </p:blipFill>
+              <p:spPr>
+                <a:xfrm>
+                  <a:off x="4724071" y="2077517"/>
+                  <a:ext cx="3351021" cy="2218510"/>
+                </a:xfrm>
+                <a:prstGeom prst="rect">
+                  <a:avLst/>
+                </a:prstGeom>
+              </p:spPr>
+            </p:pic>
+            <p:cxnSp>
+              <p:nvCxnSpPr>
+                <p:cNvPr id="10" name="Straight Arrow Connector 9">
+                  <a:extLst>
+                    <a:ext uri="{FF2B5EF4-FFF2-40B4-BE49-F238E27FC236}">
+                      <a16:creationId xmlns:a16="http://schemas.microsoft.com/office/drawing/2014/main" id="{A039C5DB-0C2F-2246-B9F3-2A695D856EAA}"/>
+                    </a:ext>
+                  </a:extLst>
+                </p:cNvPr>
+                <p:cNvCxnSpPr>
+                  <a:cxnSpLocks/>
+                </p:cNvCxnSpPr>
+                <p:nvPr/>
+              </p:nvCxnSpPr>
+              <p:spPr>
+                <a:xfrm flipV="1">
+                  <a:off x="5592176" y="2943543"/>
+                  <a:ext cx="0" cy="285270"/>
+                </a:xfrm>
+                <a:prstGeom prst="straightConnector1">
+                  <a:avLst/>
+                </a:prstGeom>
+                <a:ln w="34925">
+                  <a:solidFill>
+                    <a:srgbClr val="FF0000">
+                      <a:alpha val="75000"/>
+                    </a:srgbClr>
+                  </a:solidFill>
+                  <a:tailEnd type="triangle"/>
+                </a:ln>
+              </p:spPr>
+              <p:style>
+                <a:lnRef idx="1">
+                  <a:schemeClr val="accent1"/>
+                </a:lnRef>
+                <a:fillRef idx="0">
+                  <a:schemeClr val="accent1"/>
+                </a:fillRef>
+                <a:effectRef idx="0">
+                  <a:schemeClr val="accent1"/>
+                </a:effectRef>
+                <a:fontRef idx="minor">
+                  <a:schemeClr val="tx1"/>
+                </a:fontRef>
+              </p:style>
+            </p:cxnSp>
+          </p:grpSp>
+          <p:sp>
+            <p:nvSpPr>
+              <p:cNvPr id="13" name="TextBox 12">
+                <a:extLst>
+                  <a:ext uri="{FF2B5EF4-FFF2-40B4-BE49-F238E27FC236}">
+                    <a16:creationId xmlns:a16="http://schemas.microsoft.com/office/drawing/2014/main" id="{23B0EF3C-8688-D143-A4C0-018A14EA0D8D}"/>
+                  </a:ext>
+                </a:extLst>
+              </p:cNvPr>
+              <p:cNvSpPr txBox="1"/>
+              <p:nvPr/>
+            </p:nvSpPr>
+            <p:spPr>
+              <a:xfrm>
+                <a:off x="5578233" y="3072249"/>
+                <a:ext cx="461986" cy="261610"/>
+              </a:xfrm>
+              <a:prstGeom prst="rect">
+                <a:avLst/>
+              </a:prstGeom>
+              <a:noFill/>
+            </p:spPr>
+            <p:txBody>
+              <a:bodyPr wrap="none" rtlCol="0">
+                <a:spAutoFit/>
+              </a:bodyPr>
+              <a:lstStyle/>
+              <a:p>
+                <a:r>
+                  <a:rPr lang="en-GB" sz="1100" dirty="0">
+                    <a:latin typeface="Lato" panose="020F0502020204030203" pitchFamily="34" charset="0"/>
+                    <a:ea typeface="Lato" panose="020F0502020204030203" pitchFamily="34" charset="0"/>
+                    <a:cs typeface="Lato" panose="020F0502020204030203" pitchFamily="34" charset="0"/>
+                  </a:rPr>
+                  <a:t>EOT</a:t>
+                </a:r>
+              </a:p>
+            </p:txBody>
+          </p:sp>
+        </p:grpSp>
+      </p:grpSp>
+      <mc:AlternateContent xmlns:mc="http://schemas.openxmlformats.org/markup-compatibility/2006">
+        <mc:Choice xmlns:a14="http://schemas.microsoft.com/office/drawing/2010/main" Requires="a14">
+          <p:sp>
+            <p:nvSpPr>
+              <p:cNvPr id="64" name="TextBox 63">
+                <a:extLst>
+                  <a:ext uri="{FF2B5EF4-FFF2-40B4-BE49-F238E27FC236}">
+                    <a16:creationId xmlns:a16="http://schemas.microsoft.com/office/drawing/2014/main" id="{14A86E43-64EC-0D4C-A791-60E75B53ABE7}"/>
+                  </a:ext>
+                </a:extLst>
+              </p:cNvPr>
+              <p:cNvSpPr txBox="1"/>
+              <p:nvPr/>
+            </p:nvSpPr>
+            <p:spPr>
+              <a:xfrm>
+                <a:off x="4423229" y="4694443"/>
+                <a:ext cx="3922365" cy="830997"/>
+              </a:xfrm>
+              <a:prstGeom prst="rect">
+                <a:avLst/>
+              </a:prstGeom>
+              <a:noFill/>
+            </p:spPr>
+            <p:txBody>
+              <a:bodyPr wrap="square" rtlCol="0">
+                <a:spAutoFit/>
+              </a:bodyPr>
+              <a:lstStyle/>
+              <a:p>
+                <a:pPr algn="just"/>
+                <a:r>
+                  <a:rPr lang="en-GB" sz="1200" dirty="0">
+                    <a:latin typeface="Lato" panose="020F0502020204030203" pitchFamily="34" charset="0"/>
+                    <a:ea typeface="Lato" panose="020F0502020204030203" pitchFamily="34" charset="0"/>
+                    <a:cs typeface="Lato" panose="020F0502020204030203" pitchFamily="34" charset="0"/>
+                  </a:rPr>
+                  <a:t>This work amongst others demonstrates that the EOT is categorised by a~+1.1‰ shift in the foraminifera </a:t>
+                </a:r>
+                <a14:m>
+                  <m:oMath xmlns:m="http://schemas.openxmlformats.org/officeDocument/2006/math">
+                    <m:sSup>
+                      <m:sSupPr>
+                        <m:ctrlPr>
+                          <a:rPr lang="en-GB" sz="1200" i="1">
+                            <a:latin typeface="Cambria Math" panose="02040503050406030204" pitchFamily="18" charset="0"/>
+                            <a:ea typeface="Cambria Math" panose="02040503050406030204" pitchFamily="18" charset="0"/>
+                          </a:rPr>
+                        </m:ctrlPr>
+                      </m:sSupPr>
+                      <m:e>
+                        <m:r>
+                          <a:rPr lang="en-GB" sz="1200" i="1">
+                            <a:latin typeface="Cambria Math" panose="02040503050406030204" pitchFamily="18" charset="0"/>
+                            <a:ea typeface="Cambria Math" panose="02040503050406030204" pitchFamily="18" charset="0"/>
+                          </a:rPr>
+                          <m:t>𝛿</m:t>
+                        </m:r>
+                      </m:e>
+                      <m:sup>
+                        <m:r>
+                          <a:rPr lang="en-GB" sz="1200" i="1">
+                            <a:latin typeface="Cambria Math" panose="02040503050406030204" pitchFamily="18" charset="0"/>
+                            <a:ea typeface="Cambria Math" panose="02040503050406030204" pitchFamily="18" charset="0"/>
+                          </a:rPr>
+                          <m:t>18</m:t>
+                        </m:r>
+                      </m:sup>
+                    </m:sSup>
+                  </m:oMath>
+                </a14:m>
+                <a:r>
+                  <a:rPr lang="en-GB" sz="1200" dirty="0">
+                    <a:latin typeface="Lato" panose="020F0502020204030203" pitchFamily="34" charset="0"/>
+                    <a:ea typeface="Lato" panose="020F0502020204030203" pitchFamily="34" charset="0"/>
+                    <a:cs typeface="Lato" panose="020F0502020204030203" pitchFamily="34" charset="0"/>
+                  </a:rPr>
+                  <a:t>O. Alternative studies which make use of continental oxygen </a:t>
+                </a:r>
+                <a:r>
+                  <a:rPr lang="en-GB" sz="1200">
+                    <a:latin typeface="Lato" panose="020F0502020204030203" pitchFamily="34" charset="0"/>
+                    <a:ea typeface="Lato" panose="020F0502020204030203" pitchFamily="34" charset="0"/>
+                    <a:cs typeface="Lato" panose="020F0502020204030203" pitchFamily="34" charset="0"/>
+                  </a:rPr>
+                  <a:t>isotope records reveals that</a:t>
+                </a:r>
+                <a:endParaRPr lang="en-GB" sz="1200" dirty="0">
+                  <a:latin typeface="Lato" panose="020F0502020204030203" pitchFamily="34" charset="0"/>
+                  <a:ea typeface="Lato" panose="020F0502020204030203" pitchFamily="34" charset="0"/>
+                  <a:cs typeface="Lato" panose="020F0502020204030203" pitchFamily="34" charset="0"/>
+                </a:endParaRPr>
+              </a:p>
+            </p:txBody>
+          </p:sp>
+        </mc:Choice>
+        <mc:Fallback>
+          <p:sp>
+            <p:nvSpPr>
+              <p:cNvPr id="64" name="TextBox 63">
+                <a:extLst>
+                  <a:ext uri="{FF2B5EF4-FFF2-40B4-BE49-F238E27FC236}">
+                    <a16:creationId xmlns:a16="http://schemas.microsoft.com/office/drawing/2014/main" id="{14A86E43-64EC-0D4C-A791-60E75B53ABE7}"/>
+                  </a:ext>
+                </a:extLst>
+              </p:cNvPr>
+              <p:cNvSpPr txBox="1">
+                <a:spLocks noRot="1" noChangeAspect="1" noMove="1" noResize="1" noEditPoints="1" noAdjustHandles="1" noChangeArrowheads="1" noChangeShapeType="1" noTextEdit="1"/>
+              </p:cNvSpPr>
+              <p:nvPr/>
+            </p:nvSpPr>
+            <p:spPr>
+              <a:xfrm>
+                <a:off x="4423229" y="4694443"/>
+                <a:ext cx="3922365" cy="830997"/>
+              </a:xfrm>
+              <a:prstGeom prst="rect">
+                <a:avLst/>
+              </a:prstGeom>
+              <a:blipFill>
+                <a:blip r:embed="rId10"/>
+                <a:stretch>
+                  <a:fillRect b="-4545"/>
+                </a:stretch>
+              </a:blipFill>
+            </p:spPr>
+            <p:txBody>
+              <a:bodyPr/>
+              <a:lstStyle/>
+              <a:p>
+                <a:r>
+                  <a:rPr lang="en-GB">
+                    <a:noFill/>
+                  </a:rPr>
+                  <a:t> </a:t>
+                </a:r>
+              </a:p>
+            </p:txBody>
+          </p:sp>
+        </mc:Fallback>
+      </mc:AlternateContent>
     </p:spTree>
     <p:extLst>
       <p:ext uri="{BB962C8B-B14F-4D97-AF65-F5344CB8AC3E}">

</xml_diff>

<commit_message>
esc4: p: poster complete?
- at least one version of it
</commit_message>
<xml_diff>
--- a/earth_system_and_climate_4/term_2/poster/oxygen_poster.pptx
+++ b/earth_system_and_climate_4/term_2/poster/oxygen_poster.pptx
@@ -3644,53 +3644,150 @@
           </a:p>
         </p:txBody>
       </p:sp>
-      <p:sp>
-        <p:nvSpPr>
-          <p:cNvPr id="33" name="TextBox 32">
-            <a:extLst>
-              <a:ext uri="{FF2B5EF4-FFF2-40B4-BE49-F238E27FC236}">
-                <a16:creationId xmlns:a16="http://schemas.microsoft.com/office/drawing/2014/main" id="{BDAD9AC9-8A6C-CC4B-8B30-50D35A98743E}"/>
-              </a:ext>
-            </a:extLst>
-          </p:cNvPr>
-          <p:cNvSpPr txBox="1"/>
-          <p:nvPr/>
-        </p:nvSpPr>
-        <p:spPr>
-          <a:xfrm>
-            <a:off x="245528" y="1471761"/>
-            <a:ext cx="3922365" cy="307777"/>
-          </a:xfrm>
-          <a:prstGeom prst="rect">
-            <a:avLst/>
-          </a:prstGeom>
-          <a:noFill/>
-        </p:spPr>
-        <p:txBody>
-          <a:bodyPr wrap="square" rtlCol="0">
-            <a:spAutoFit/>
-          </a:bodyPr>
-          <a:lstStyle/>
-          <a:p>
-            <a:r>
-              <a:rPr lang="en-GB" sz="1200" dirty="0">
-                <a:latin typeface="Lato" panose="020F0502020204030203" pitchFamily="34" charset="0"/>
-                <a:ea typeface="Lato" panose="020F0502020204030203" pitchFamily="34" charset="0"/>
-                <a:cs typeface="Lato" panose="020F0502020204030203" pitchFamily="34" charset="0"/>
-              </a:rPr>
-              <a:t>Through ice-core studies </a:t>
-            </a:r>
-            <a:r>
-              <a:rPr lang="en-GB" sz="1400" dirty="0">
-                <a:latin typeface="Lato" panose="020F0502020204030203" pitchFamily="34" charset="0"/>
-                <a:ea typeface="Lato" panose="020F0502020204030203" pitchFamily="34" charset="0"/>
-                <a:cs typeface="Lato" panose="020F0502020204030203" pitchFamily="34" charset="0"/>
-              </a:rPr>
-              <a:t> </a:t>
-            </a:r>
-          </a:p>
-        </p:txBody>
-      </p:sp>
+      <mc:AlternateContent xmlns:mc="http://schemas.openxmlformats.org/markup-compatibility/2006">
+        <mc:Choice xmlns:a14="http://schemas.microsoft.com/office/drawing/2010/main" Requires="a14">
+          <p:sp>
+            <p:nvSpPr>
+              <p:cNvPr id="33" name="TextBox 32">
+                <a:extLst>
+                  <a:ext uri="{FF2B5EF4-FFF2-40B4-BE49-F238E27FC236}">
+                    <a16:creationId xmlns:a16="http://schemas.microsoft.com/office/drawing/2014/main" id="{BDAD9AC9-8A6C-CC4B-8B30-50D35A98743E}"/>
+                  </a:ext>
+                </a:extLst>
+              </p:cNvPr>
+              <p:cNvSpPr txBox="1"/>
+              <p:nvPr/>
+            </p:nvSpPr>
+            <p:spPr>
+              <a:xfrm>
+                <a:off x="245528" y="1471761"/>
+                <a:ext cx="3922365" cy="1938992"/>
+              </a:xfrm>
+              <a:prstGeom prst="rect">
+                <a:avLst/>
+              </a:prstGeom>
+              <a:noFill/>
+            </p:spPr>
+            <p:txBody>
+              <a:bodyPr wrap="square" rtlCol="0">
+                <a:spAutoFit/>
+              </a:bodyPr>
+              <a:lstStyle/>
+              <a:p>
+                <a:pPr algn="just"/>
+                <a:r>
+                  <a:rPr lang="en-GB" sz="1200" dirty="0">
+                    <a:latin typeface="Lato" panose="020F0502020204030203" pitchFamily="34" charset="0"/>
+                    <a:ea typeface="Lato" panose="020F0502020204030203" pitchFamily="34" charset="0"/>
+                    <a:cs typeface="Lato" panose="020F0502020204030203" pitchFamily="34" charset="0"/>
+                  </a:rPr>
+                  <a:t>Modern-day Antarctica is a continent which is frozen over. The formation of permanent ice-sheets occurred approximately 34 Ma at the Eocene-Oligocene boundary. This glaciation can be studied through obtaining sedimentary cores, isolating the fossilised foraminifera, and then reconstructing the chronology by using the oxygen isotope ratio </a:t>
+                </a:r>
+                <a14:m>
+                  <m:oMath xmlns:m="http://schemas.openxmlformats.org/officeDocument/2006/math">
+                    <m:sSup>
+                      <m:sSupPr>
+                        <m:ctrlPr>
+                          <a:rPr lang="en-GB" sz="1200" i="1">
+                            <a:latin typeface="Cambria Math" panose="02040503050406030204" pitchFamily="18" charset="0"/>
+                            <a:ea typeface="Cambria Math" panose="02040503050406030204" pitchFamily="18" charset="0"/>
+                          </a:rPr>
+                        </m:ctrlPr>
+                      </m:sSupPr>
+                      <m:e>
+                        <m:r>
+                          <a:rPr lang="en-GB" sz="1200" i="1">
+                            <a:latin typeface="Cambria Math" panose="02040503050406030204" pitchFamily="18" charset="0"/>
+                            <a:ea typeface="Cambria Math" panose="02040503050406030204" pitchFamily="18" charset="0"/>
+                          </a:rPr>
+                          <m:t>𝛿</m:t>
+                        </m:r>
+                      </m:e>
+                      <m:sup>
+                        <m:r>
+                          <a:rPr lang="en-GB" sz="1200" i="1">
+                            <a:latin typeface="Cambria Math" panose="02040503050406030204" pitchFamily="18" charset="0"/>
+                            <a:ea typeface="Cambria Math" panose="02040503050406030204" pitchFamily="18" charset="0"/>
+                          </a:rPr>
+                          <m:t>18</m:t>
+                        </m:r>
+                      </m:sup>
+                    </m:sSup>
+                  </m:oMath>
+                </a14:m>
+                <a:r>
+                  <a:rPr lang="en-GB" sz="1200" dirty="0">
+                    <a:latin typeface="Lato" panose="020F0502020204030203" pitchFamily="34" charset="0"/>
+                    <a:ea typeface="Lato" panose="020F0502020204030203" pitchFamily="34" charset="0"/>
+                    <a:cs typeface="Lato" panose="020F0502020204030203" pitchFamily="34" charset="0"/>
+                  </a:rPr>
+                  <a:t>O as a tracer. Comparing marine-based and continental-based cores shows that a glaciation did occur in the </a:t>
+                </a:r>
+                <a:r>
+                  <a:rPr lang="en-GB" sz="1200" dirty="0" err="1">
+                    <a:latin typeface="Lato" panose="020F0502020204030203" pitchFamily="34" charset="0"/>
+                    <a:ea typeface="Lato" panose="020F0502020204030203" pitchFamily="34" charset="0"/>
+                    <a:cs typeface="Lato" panose="020F0502020204030203" pitchFamily="34" charset="0"/>
+                  </a:rPr>
+                  <a:t>Cenozoic</a:t>
+                </a:r>
+                <a:r>
+                  <a:rPr lang="en-GB" sz="1200" dirty="0">
+                    <a:latin typeface="Lato" panose="020F0502020204030203" pitchFamily="34" charset="0"/>
+                    <a:ea typeface="Lato" panose="020F0502020204030203" pitchFamily="34" charset="0"/>
+                    <a:cs typeface="Lato" panose="020F0502020204030203" pitchFamily="34" charset="0"/>
+                  </a:rPr>
+                  <a:t> and that it can be traced using oxygen isotopes.</a:t>
+                </a:r>
+              </a:p>
+            </p:txBody>
+          </p:sp>
+        </mc:Choice>
+        <mc:Fallback>
+          <p:sp>
+            <p:nvSpPr>
+              <p:cNvPr id="33" name="TextBox 32">
+                <a:extLst>
+                  <a:ext uri="{FF2B5EF4-FFF2-40B4-BE49-F238E27FC236}">
+                    <a16:creationId xmlns:a16="http://schemas.microsoft.com/office/drawing/2014/main" id="{BDAD9AC9-8A6C-CC4B-8B30-50D35A98743E}"/>
+                  </a:ext>
+                </a:extLst>
+              </p:cNvPr>
+              <p:cNvSpPr txBox="1">
+                <a:spLocks noRot="1" noChangeAspect="1" noMove="1" noResize="1" noEditPoints="1" noAdjustHandles="1" noChangeArrowheads="1" noChangeShapeType="1" noTextEdit="1"/>
+              </p:cNvSpPr>
+              <p:nvPr/>
+            </p:nvSpPr>
+            <p:spPr>
+              <a:xfrm>
+                <a:off x="245528" y="1471761"/>
+                <a:ext cx="3922365" cy="1938992"/>
+              </a:xfrm>
+              <a:prstGeom prst="rect">
+                <a:avLst/>
+              </a:prstGeom>
+              <a:blipFill>
+                <a:blip r:embed="rId4"/>
+                <a:stretch>
+                  <a:fillRect b="-649"/>
+                </a:stretch>
+              </a:blipFill>
+            </p:spPr>
+            <p:txBody>
+              <a:bodyPr/>
+              <a:lstStyle/>
+              <a:p>
+                <a:r>
+                  <a:rPr lang="en-GB">
+                    <a:noFill/>
+                  </a:rPr>
+                  <a:t> </a:t>
+                </a:r>
+              </a:p>
+            </p:txBody>
+          </p:sp>
+        </mc:Fallback>
+      </mc:AlternateContent>
       <p:sp>
         <p:nvSpPr>
           <p:cNvPr id="34" name="Rectangle 33">
@@ -4029,7 +4126,7 @@
                 <a:avLst/>
               </a:prstGeom>
               <a:blipFill>
-                <a:blip r:embed="rId4"/>
+                <a:blip r:embed="rId5"/>
                 <a:stretch>
                   <a:fillRect/>
                 </a:stretch>
@@ -4064,8 +4161,8 @@
         </p:nvSpPr>
         <p:spPr>
           <a:xfrm>
-            <a:off x="8633688" y="7332666"/>
-            <a:ext cx="3922360" cy="2060576"/>
+            <a:off x="8633688" y="7239021"/>
+            <a:ext cx="3922360" cy="2154222"/>
           </a:xfrm>
           <a:prstGeom prst="rect">
             <a:avLst/>
@@ -4110,104 +4207,6 @@
       </p:sp>
       <p:sp>
         <p:nvSpPr>
-          <p:cNvPr id="39" name="Rectangle 38">
-            <a:extLst>
-              <a:ext uri="{FF2B5EF4-FFF2-40B4-BE49-F238E27FC236}">
-                <a16:creationId xmlns:a16="http://schemas.microsoft.com/office/drawing/2014/main" id="{5966A89F-F6BD-D142-9582-9BB3E9733D85}"/>
-              </a:ext>
-            </a:extLst>
-          </p:cNvPr>
-          <p:cNvSpPr/>
-          <p:nvPr/>
-        </p:nvSpPr>
-        <p:spPr>
-          <a:xfrm>
-            <a:off x="8633687" y="7332666"/>
-            <a:ext cx="3922353" cy="305510"/>
-          </a:xfrm>
-          <a:prstGeom prst="rect">
-            <a:avLst/>
-          </a:prstGeom>
-          <a:solidFill>
-            <a:srgbClr val="2096F4"/>
-          </a:solidFill>
-          <a:ln w="25400">
-            <a:noFill/>
-          </a:ln>
-        </p:spPr>
-        <p:style>
-          <a:lnRef idx="2">
-            <a:schemeClr val="accent1">
-              <a:shade val="50000"/>
-            </a:schemeClr>
-          </a:lnRef>
-          <a:fillRef idx="1">
-            <a:schemeClr val="accent1"/>
-          </a:fillRef>
-          <a:effectRef idx="0">
-            <a:schemeClr val="accent1"/>
-          </a:effectRef>
-          <a:fontRef idx="minor">
-            <a:schemeClr val="lt1"/>
-          </a:fontRef>
-        </p:style>
-        <p:txBody>
-          <a:bodyPr rtlCol="0" anchor="ctr"/>
-          <a:lstStyle/>
-          <a:p>
-            <a:pPr algn="ctr"/>
-            <a:endParaRPr lang="en-GB" sz="2439" dirty="0">
-              <a:latin typeface="Lato" panose="020F0502020204030203" pitchFamily="34" charset="0"/>
-              <a:ea typeface="Lato" panose="020F0502020204030203" pitchFamily="34" charset="0"/>
-              <a:cs typeface="Lato" panose="020F0502020204030203" pitchFamily="34" charset="0"/>
-            </a:endParaRPr>
-          </a:p>
-        </p:txBody>
-      </p:sp>
-      <p:sp>
-        <p:nvSpPr>
-          <p:cNvPr id="40" name="TextBox 39">
-            <a:extLst>
-              <a:ext uri="{FF2B5EF4-FFF2-40B4-BE49-F238E27FC236}">
-                <a16:creationId xmlns:a16="http://schemas.microsoft.com/office/drawing/2014/main" id="{EEAD3DFD-0300-B84D-8410-55F3F02F4FFD}"/>
-              </a:ext>
-            </a:extLst>
-          </p:cNvPr>
-          <p:cNvSpPr txBox="1"/>
-          <p:nvPr/>
-        </p:nvSpPr>
-        <p:spPr>
-          <a:xfrm>
-            <a:off x="10051374" y="7354036"/>
-            <a:ext cx="1086940" cy="248857"/>
-          </a:xfrm>
-          <a:prstGeom prst="rect">
-            <a:avLst/>
-          </a:prstGeom>
-          <a:noFill/>
-        </p:spPr>
-        <p:txBody>
-          <a:bodyPr wrap="square" tIns="33090" bIns="0" rtlCol="0">
-            <a:spAutoFit/>
-          </a:bodyPr>
-          <a:lstStyle/>
-          <a:p>
-            <a:r>
-              <a:rPr lang="en-GB" sz="1400" b="1" dirty="0">
-                <a:solidFill>
-                  <a:schemeClr val="bg1"/>
-                </a:solidFill>
-                <a:latin typeface="Lato" panose="020F0502020204030203" pitchFamily="34" charset="0"/>
-                <a:ea typeface="Lato" panose="020F0502020204030203" pitchFamily="34" charset="0"/>
-                <a:cs typeface="Lato" panose="020F0502020204030203" pitchFamily="34" charset="0"/>
-              </a:rPr>
-              <a:t>References</a:t>
-            </a:r>
-          </a:p>
-        </p:txBody>
-      </p:sp>
-      <p:sp>
-        <p:nvSpPr>
           <p:cNvPr id="41" name="TextBox 40">
             <a:extLst>
               <a:ext uri="{FF2B5EF4-FFF2-40B4-BE49-F238E27FC236}">
@@ -4220,8 +4219,8 @@
         </p:nvSpPr>
         <p:spPr>
           <a:xfrm>
-            <a:off x="8633680" y="7616965"/>
-            <a:ext cx="3922353" cy="1446550"/>
+            <a:off x="8626776" y="7587143"/>
+            <a:ext cx="3922353" cy="1815882"/>
           </a:xfrm>
           <a:prstGeom prst="rect">
             <a:avLst/>
@@ -4413,6 +4412,49 @@
           <a:p>
             <a:pPr algn="just"/>
             <a:r>
+              <a:rPr lang="en-GB" sz="800" dirty="0">
+                <a:latin typeface="Lato" panose="020F0502020204030203" pitchFamily="34" charset="0"/>
+                <a:ea typeface="Lato" panose="020F0502020204030203" pitchFamily="34" charset="0"/>
+                <a:cs typeface="Lato" panose="020F0502020204030203" pitchFamily="34" charset="0"/>
+              </a:rPr>
+              <a:t>Liu, Z., Pagani, M., </a:t>
+            </a:r>
+            <a:r>
+              <a:rPr lang="en-GB" sz="800" dirty="0" err="1">
+                <a:latin typeface="Lato" panose="020F0502020204030203" pitchFamily="34" charset="0"/>
+                <a:ea typeface="Lato" panose="020F0502020204030203" pitchFamily="34" charset="0"/>
+                <a:cs typeface="Lato" panose="020F0502020204030203" pitchFamily="34" charset="0"/>
+              </a:rPr>
+              <a:t>Zinniker</a:t>
+            </a:r>
+            <a:r>
+              <a:rPr lang="en-GB" sz="800" dirty="0">
+                <a:latin typeface="Lato" panose="020F0502020204030203" pitchFamily="34" charset="0"/>
+                <a:ea typeface="Lato" panose="020F0502020204030203" pitchFamily="34" charset="0"/>
+                <a:cs typeface="Lato" panose="020F0502020204030203" pitchFamily="34" charset="0"/>
+              </a:rPr>
+              <a:t>, D., </a:t>
+            </a:r>
+            <a:r>
+              <a:rPr lang="en-GB" sz="800" dirty="0" err="1">
+                <a:latin typeface="Lato" panose="020F0502020204030203" pitchFamily="34" charset="0"/>
+                <a:ea typeface="Lato" panose="020F0502020204030203" pitchFamily="34" charset="0"/>
+                <a:cs typeface="Lato" panose="020F0502020204030203" pitchFamily="34" charset="0"/>
+              </a:rPr>
+              <a:t>DeConto</a:t>
+            </a:r>
+            <a:r>
+              <a:rPr lang="en-GB" sz="800" dirty="0">
+                <a:latin typeface="Lato" panose="020F0502020204030203" pitchFamily="34" charset="0"/>
+                <a:ea typeface="Lato" panose="020F0502020204030203" pitchFamily="34" charset="0"/>
+                <a:cs typeface="Lato" panose="020F0502020204030203" pitchFamily="34" charset="0"/>
+              </a:rPr>
+              <a:t>, &amp; others (2009). Global cooling during the Eocene-Oligocene climate transition. Science, 323(5918), 1187-1190.</a:t>
+            </a:r>
+          </a:p>
+          <a:p>
+            <a:pPr algn="just"/>
+            <a:r>
               <a:rPr lang="en-GB" sz="800" dirty="0" err="1">
                 <a:latin typeface="Lato" panose="020F0502020204030203" pitchFamily="34" charset="0"/>
                 <a:ea typeface="Lato" panose="020F0502020204030203" pitchFamily="34" charset="0"/>
@@ -4469,15 +4511,18 @@
                 <a:ea typeface="Lato" panose="020F0502020204030203" pitchFamily="34" charset="0"/>
                 <a:cs typeface="Lato" panose="020F0502020204030203" pitchFamily="34" charset="0"/>
               </a:rPr>
-              <a:t>Sheldon, N. D., Grimes, S. T., Hooker, J. J., Collinson, M. E., Bugler, M. J., </a:t>
-            </a:r>
+              <a:t>Sheldon, N. D., &amp; others (2016). Coupling of marine and continental oxygen isotope records during the Eocene-Oligocene transition. Bulletin, 128(3-4), 502-510.</a:t>
+            </a:r>
+          </a:p>
+          <a:p>
+            <a:pPr algn="just"/>
             <a:r>
               <a:rPr lang="en-GB" sz="800" dirty="0" err="1">
                 <a:latin typeface="Lato" panose="020F0502020204030203" pitchFamily="34" charset="0"/>
                 <a:ea typeface="Lato" panose="020F0502020204030203" pitchFamily="34" charset="0"/>
                 <a:cs typeface="Lato" panose="020F0502020204030203" pitchFamily="34" charset="0"/>
               </a:rPr>
-              <a:t>Hren</a:t>
+              <a:t>Zachos</a:t>
             </a:r>
             <a:r>
               <a:rPr lang="en-GB" sz="800" dirty="0">
@@ -4485,7 +4530,39 @@
                 <a:ea typeface="Lato" panose="020F0502020204030203" pitchFamily="34" charset="0"/>
                 <a:cs typeface="Lato" panose="020F0502020204030203" pitchFamily="34" charset="0"/>
               </a:rPr>
-              <a:t>, M. T., ... &amp; Sutton, P. A. (2016). Coupling of marine and continental oxygen isotope records during the Eocene-Oligocene transition. Bulletin, 128(3-4), 502-510.</a:t>
+              <a:t>, J. C., Dickens, G. R., &amp; </a:t>
+            </a:r>
+            <a:r>
+              <a:rPr lang="en-GB" sz="800" dirty="0" err="1">
+                <a:latin typeface="Lato" panose="020F0502020204030203" pitchFamily="34" charset="0"/>
+                <a:ea typeface="Lato" panose="020F0502020204030203" pitchFamily="34" charset="0"/>
+                <a:cs typeface="Lato" panose="020F0502020204030203" pitchFamily="34" charset="0"/>
+              </a:rPr>
+              <a:t>Zeebe</a:t>
+            </a:r>
+            <a:r>
+              <a:rPr lang="en-GB" sz="800" dirty="0">
+                <a:latin typeface="Lato" panose="020F0502020204030203" pitchFamily="34" charset="0"/>
+                <a:ea typeface="Lato" panose="020F0502020204030203" pitchFamily="34" charset="0"/>
+                <a:cs typeface="Lato" panose="020F0502020204030203" pitchFamily="34" charset="0"/>
+              </a:rPr>
+              <a:t>, R. E. (2008). An early </a:t>
+            </a:r>
+            <a:r>
+              <a:rPr lang="en-GB" sz="800" dirty="0" err="1">
+                <a:latin typeface="Lato" panose="020F0502020204030203" pitchFamily="34" charset="0"/>
+                <a:ea typeface="Lato" panose="020F0502020204030203" pitchFamily="34" charset="0"/>
+                <a:cs typeface="Lato" panose="020F0502020204030203" pitchFamily="34" charset="0"/>
+              </a:rPr>
+              <a:t>Cenozoic</a:t>
+            </a:r>
+            <a:r>
+              <a:rPr lang="en-GB" sz="800" dirty="0">
+                <a:latin typeface="Lato" panose="020F0502020204030203" pitchFamily="34" charset="0"/>
+                <a:ea typeface="Lato" panose="020F0502020204030203" pitchFamily="34" charset="0"/>
+                <a:cs typeface="Lato" panose="020F0502020204030203" pitchFamily="34" charset="0"/>
+              </a:rPr>
+              <a:t> perspective on greenhouse warming and carbon-cycle dynamics. Nature, 451(7176), 279.</a:t>
             </a:r>
           </a:p>
         </p:txBody>
@@ -4504,7 +4581,7 @@
         </p:nvSpPr>
         <p:spPr>
           <a:xfrm>
-            <a:off x="8633672" y="3990517"/>
+            <a:off x="8633657" y="3837402"/>
             <a:ext cx="3922369" cy="2060576"/>
           </a:xfrm>
           <a:prstGeom prst="rect">
@@ -4548,143 +4625,179 @@
           </a:p>
         </p:txBody>
       </p:sp>
-      <p:sp>
-        <p:nvSpPr>
-          <p:cNvPr id="43" name="Rectangle 42">
-            <a:extLst>
-              <a:ext uri="{FF2B5EF4-FFF2-40B4-BE49-F238E27FC236}">
-                <a16:creationId xmlns:a16="http://schemas.microsoft.com/office/drawing/2014/main" id="{23FE515B-2C34-8E4A-8AAB-0EC1CACACE68}"/>
-              </a:ext>
-            </a:extLst>
-          </p:cNvPr>
-          <p:cNvSpPr/>
-          <p:nvPr/>
-        </p:nvSpPr>
-        <p:spPr>
-          <a:xfrm>
-            <a:off x="8633670" y="3990517"/>
-            <a:ext cx="3922362" cy="305510"/>
-          </a:xfrm>
-          <a:prstGeom prst="rect">
-            <a:avLst/>
-          </a:prstGeom>
-          <a:solidFill>
-            <a:srgbClr val="2096F4"/>
-          </a:solidFill>
-          <a:ln w="25400">
-            <a:noFill/>
-          </a:ln>
-        </p:spPr>
-        <p:style>
-          <a:lnRef idx="2">
-            <a:schemeClr val="accent1">
-              <a:shade val="50000"/>
-            </a:schemeClr>
-          </a:lnRef>
-          <a:fillRef idx="1">
-            <a:schemeClr val="accent1"/>
-          </a:fillRef>
-          <a:effectRef idx="0">
-            <a:schemeClr val="accent1"/>
-          </a:effectRef>
-          <a:fontRef idx="minor">
-            <a:schemeClr val="lt1"/>
-          </a:fontRef>
-        </p:style>
-        <p:txBody>
-          <a:bodyPr rtlCol="0" anchor="ctr"/>
-          <a:lstStyle/>
-          <a:p>
-            <a:pPr algn="ctr"/>
-            <a:endParaRPr lang="en-GB" sz="2439" dirty="0">
-              <a:latin typeface="Lato" panose="020F0502020204030203" pitchFamily="34" charset="0"/>
-              <a:ea typeface="Lato" panose="020F0502020204030203" pitchFamily="34" charset="0"/>
-              <a:cs typeface="Lato" panose="020F0502020204030203" pitchFamily="34" charset="0"/>
-            </a:endParaRPr>
-          </a:p>
-        </p:txBody>
-      </p:sp>
-      <p:sp>
-        <p:nvSpPr>
-          <p:cNvPr id="44" name="TextBox 43">
-            <a:extLst>
-              <a:ext uri="{FF2B5EF4-FFF2-40B4-BE49-F238E27FC236}">
-                <a16:creationId xmlns:a16="http://schemas.microsoft.com/office/drawing/2014/main" id="{8D3E38F7-8C75-1140-BA60-5E3F5D293071}"/>
-              </a:ext>
-            </a:extLst>
-          </p:cNvPr>
-          <p:cNvSpPr txBox="1"/>
-          <p:nvPr/>
-        </p:nvSpPr>
-        <p:spPr>
-          <a:xfrm>
-            <a:off x="10019268" y="4018843"/>
-            <a:ext cx="1151152" cy="248857"/>
-          </a:xfrm>
-          <a:prstGeom prst="rect">
-            <a:avLst/>
-          </a:prstGeom>
-          <a:noFill/>
-        </p:spPr>
-        <p:txBody>
-          <a:bodyPr wrap="square" tIns="33090" bIns="0" rtlCol="0">
-            <a:spAutoFit/>
-          </a:bodyPr>
-          <a:lstStyle/>
-          <a:p>
-            <a:r>
-              <a:rPr lang="en-GB" sz="1400" b="1" dirty="0">
-                <a:solidFill>
-                  <a:schemeClr val="bg1"/>
-                </a:solidFill>
-                <a:latin typeface="Lato" panose="020F0502020204030203" pitchFamily="34" charset="0"/>
-                <a:ea typeface="Lato" panose="020F0502020204030203" pitchFamily="34" charset="0"/>
-                <a:cs typeface="Lato" panose="020F0502020204030203" pitchFamily="34" charset="0"/>
-              </a:rPr>
-              <a:t>Conclusions</a:t>
-            </a:r>
-          </a:p>
-        </p:txBody>
-      </p:sp>
-      <p:sp>
-        <p:nvSpPr>
-          <p:cNvPr id="45" name="TextBox 44">
-            <a:extLst>
-              <a:ext uri="{FF2B5EF4-FFF2-40B4-BE49-F238E27FC236}">
-                <a16:creationId xmlns:a16="http://schemas.microsoft.com/office/drawing/2014/main" id="{9DABFDE9-1655-E944-8CE8-6B2021FA0C54}"/>
-              </a:ext>
-            </a:extLst>
-          </p:cNvPr>
-          <p:cNvSpPr txBox="1"/>
-          <p:nvPr/>
-        </p:nvSpPr>
-        <p:spPr>
-          <a:xfrm>
-            <a:off x="8633662" y="4296028"/>
-            <a:ext cx="3922362" cy="276999"/>
-          </a:xfrm>
-          <a:prstGeom prst="rect">
-            <a:avLst/>
-          </a:prstGeom>
-          <a:noFill/>
-        </p:spPr>
-        <p:txBody>
-          <a:bodyPr wrap="square" rtlCol="0">
-            <a:spAutoFit/>
-          </a:bodyPr>
-          <a:lstStyle/>
-          <a:p>
-            <a:r>
-              <a:rPr lang="en-GB" sz="1200" dirty="0">
-                <a:latin typeface="Lato" panose="020F0502020204030203" pitchFamily="34" charset="0"/>
-                <a:ea typeface="Lato" panose="020F0502020204030203" pitchFamily="34" charset="0"/>
-                <a:cs typeface="Lato" panose="020F0502020204030203" pitchFamily="34" charset="0"/>
-              </a:rPr>
-              <a:t>Through </a:t>
-            </a:r>
-          </a:p>
-        </p:txBody>
-      </p:sp>
+      <mc:AlternateContent xmlns:mc="http://schemas.openxmlformats.org/markup-compatibility/2006">
+        <mc:Choice xmlns:a14="http://schemas.microsoft.com/office/drawing/2010/main" Requires="a14">
+          <p:sp>
+            <p:nvSpPr>
+              <p:cNvPr id="45" name="TextBox 44">
+                <a:extLst>
+                  <a:ext uri="{FF2B5EF4-FFF2-40B4-BE49-F238E27FC236}">
+                    <a16:creationId xmlns:a16="http://schemas.microsoft.com/office/drawing/2014/main" id="{9DABFDE9-1655-E944-8CE8-6B2021FA0C54}"/>
+                  </a:ext>
+                </a:extLst>
+              </p:cNvPr>
+              <p:cNvSpPr txBox="1"/>
+              <p:nvPr/>
+            </p:nvSpPr>
+            <p:spPr>
+              <a:xfrm>
+                <a:off x="8636538" y="4145259"/>
+                <a:ext cx="3922362" cy="1754326"/>
+              </a:xfrm>
+              <a:prstGeom prst="rect">
+                <a:avLst/>
+              </a:prstGeom>
+              <a:noFill/>
+            </p:spPr>
+            <p:txBody>
+              <a:bodyPr wrap="square" rtlCol="0">
+                <a:spAutoFit/>
+              </a:bodyPr>
+              <a:lstStyle/>
+              <a:p>
+                <a:r>
+                  <a:rPr lang="en-GB" sz="1200" dirty="0">
+                    <a:latin typeface="Lato" panose="020F0502020204030203" pitchFamily="34" charset="0"/>
+                    <a:ea typeface="Lato" panose="020F0502020204030203" pitchFamily="34" charset="0"/>
+                    <a:cs typeface="Lato" panose="020F0502020204030203" pitchFamily="34" charset="0"/>
+                  </a:rPr>
+                  <a:t>Through the analysis of sedimentary cores around the Antarctic, evidence for continental glaciation can be obtained by studying oxygen isotopes within fossilised foraminifera. Marine and continental cores show an approximate ~+1.3‰ shift in the </a:t>
+                </a:r>
+                <a14:m>
+                  <m:oMath xmlns:m="http://schemas.openxmlformats.org/officeDocument/2006/math">
+                    <m:sSup>
+                      <m:sSupPr>
+                        <m:ctrlPr>
+                          <a:rPr lang="en-GB" sz="1200" i="1">
+                            <a:latin typeface="Cambria Math" panose="02040503050406030204" pitchFamily="18" charset="0"/>
+                            <a:ea typeface="Cambria Math" panose="02040503050406030204" pitchFamily="18" charset="0"/>
+                          </a:rPr>
+                        </m:ctrlPr>
+                      </m:sSupPr>
+                      <m:e>
+                        <m:r>
+                          <a:rPr lang="en-GB" sz="1200" i="1">
+                            <a:latin typeface="Cambria Math" panose="02040503050406030204" pitchFamily="18" charset="0"/>
+                            <a:ea typeface="Cambria Math" panose="02040503050406030204" pitchFamily="18" charset="0"/>
+                          </a:rPr>
+                          <m:t>𝛿</m:t>
+                        </m:r>
+                      </m:e>
+                      <m:sup>
+                        <m:r>
+                          <a:rPr lang="en-GB" sz="1200" i="1">
+                            <a:latin typeface="Cambria Math" panose="02040503050406030204" pitchFamily="18" charset="0"/>
+                            <a:ea typeface="Cambria Math" panose="02040503050406030204" pitchFamily="18" charset="0"/>
+                          </a:rPr>
+                          <m:t>18</m:t>
+                        </m:r>
+                      </m:sup>
+                    </m:sSup>
+                  </m:oMath>
+                </a14:m>
+                <a:r>
+                  <a:rPr lang="en-GB" sz="1200" dirty="0">
+                    <a:latin typeface="Lato" panose="020F0502020204030203" pitchFamily="34" charset="0"/>
+                    <a:ea typeface="Lato" panose="020F0502020204030203" pitchFamily="34" charset="0"/>
+                    <a:cs typeface="Lato" panose="020F0502020204030203" pitchFamily="34" charset="0"/>
+                  </a:rPr>
+                  <a:t>O which signifies the glaciation of Antarctica. Possible drivers for this shift could be due to changes in atmospheric </a:t>
+                </a:r>
+                <a14:m>
+                  <m:oMath xmlns:m="http://schemas.openxmlformats.org/officeDocument/2006/math">
+                    <m:sSub>
+                      <m:sSubPr>
+                        <m:ctrlPr>
+                          <a:rPr lang="en-GB" sz="1200" i="1">
+                            <a:latin typeface="Cambria Math" panose="02040503050406030204" pitchFamily="18" charset="0"/>
+                            <a:ea typeface="Lato" panose="020F0502020204030203" pitchFamily="34" charset="0"/>
+                            <a:cs typeface="Lato" panose="020F0502020204030203" pitchFamily="34" charset="0"/>
+                          </a:rPr>
+                        </m:ctrlPr>
+                      </m:sSubPr>
+                      <m:e>
+                        <m:r>
+                          <m:rPr>
+                            <m:nor/>
+                          </m:rPr>
+                          <a:rPr lang="en-GB" sz="1200" dirty="0">
+                            <a:latin typeface="Lato" panose="020F0502020204030203" pitchFamily="34" charset="0"/>
+                            <a:ea typeface="Lato" panose="020F0502020204030203" pitchFamily="34" charset="0"/>
+                            <a:cs typeface="Lato" panose="020F0502020204030203" pitchFamily="34" charset="0"/>
+                          </a:rPr>
+                          <m:t>CO</m:t>
+                        </m:r>
+                      </m:e>
+                      <m:sub>
+                        <m:r>
+                          <a:rPr lang="en-GB" sz="1200" i="1">
+                            <a:latin typeface="Cambria Math" panose="02040503050406030204" pitchFamily="18" charset="0"/>
+                            <a:ea typeface="Lato" panose="020F0502020204030203" pitchFamily="34" charset="0"/>
+                            <a:cs typeface="Lato" panose="020F0502020204030203" pitchFamily="34" charset="0"/>
+                          </a:rPr>
+                          <m:t>2</m:t>
+                        </m:r>
+                      </m:sub>
+                    </m:sSub>
+                  </m:oMath>
+                </a14:m>
+                <a:r>
+                  <a:rPr lang="en-GB" sz="1200" dirty="0">
+                    <a:latin typeface="Lato" panose="020F0502020204030203" pitchFamily="34" charset="0"/>
+                    <a:ea typeface="Lato" panose="020F0502020204030203" pitchFamily="34" charset="0"/>
+                    <a:cs typeface="Lato" panose="020F0502020204030203" pitchFamily="34" charset="0"/>
+                  </a:rPr>
+                  <a:t>, or even potentially due to global cooling as a result of orbital forcing. </a:t>
+                </a:r>
+              </a:p>
+            </p:txBody>
+          </p:sp>
+        </mc:Choice>
+        <mc:Fallback>
+          <p:sp>
+            <p:nvSpPr>
+              <p:cNvPr id="45" name="TextBox 44">
+                <a:extLst>
+                  <a:ext uri="{FF2B5EF4-FFF2-40B4-BE49-F238E27FC236}">
+                    <a16:creationId xmlns:a16="http://schemas.microsoft.com/office/drawing/2014/main" id="{9DABFDE9-1655-E944-8CE8-6B2021FA0C54}"/>
+                  </a:ext>
+                </a:extLst>
+              </p:cNvPr>
+              <p:cNvSpPr txBox="1">
+                <a:spLocks noRot="1" noChangeAspect="1" noMove="1" noResize="1" noEditPoints="1" noAdjustHandles="1" noChangeArrowheads="1" noChangeShapeType="1" noTextEdit="1"/>
+              </p:cNvSpPr>
+              <p:nvPr/>
+            </p:nvSpPr>
+            <p:spPr>
+              <a:xfrm>
+                <a:off x="8636538" y="4145259"/>
+                <a:ext cx="3922362" cy="1754326"/>
+              </a:xfrm>
+              <a:prstGeom prst="rect">
+                <a:avLst/>
+              </a:prstGeom>
+              <a:blipFill>
+                <a:blip r:embed="rId6"/>
+                <a:stretch>
+                  <a:fillRect b="-1429"/>
+                </a:stretch>
+              </a:blipFill>
+            </p:spPr>
+            <p:txBody>
+              <a:bodyPr/>
+              <a:lstStyle/>
+              <a:p>
+                <a:r>
+                  <a:rPr lang="en-GB">
+                    <a:noFill/>
+                  </a:rPr>
+                  <a:t> </a:t>
+                </a:r>
+              </a:p>
+            </p:txBody>
+          </p:sp>
+        </mc:Fallback>
+      </mc:AlternateContent>
       <p:sp>
         <p:nvSpPr>
           <p:cNvPr id="51" name="Rectangle 50">
@@ -4757,8 +4870,8 @@
         </p:nvSpPr>
         <p:spPr>
           <a:xfrm>
-            <a:off x="8633694" y="1146871"/>
-            <a:ext cx="3922373" cy="2695471"/>
+            <a:off x="8633694" y="1146872"/>
+            <a:ext cx="3922373" cy="2510390"/>
           </a:xfrm>
           <a:prstGeom prst="rect">
             <a:avLst/>
@@ -4801,104 +4914,125 @@
           </a:p>
         </p:txBody>
       </p:sp>
-      <p:sp>
-        <p:nvSpPr>
-          <p:cNvPr id="30" name="Rectangle 29">
+      <p:grpSp>
+        <p:nvGrpSpPr>
+          <p:cNvPr id="18" name="Group 17">
             <a:extLst>
               <a:ext uri="{FF2B5EF4-FFF2-40B4-BE49-F238E27FC236}">
-                <a16:creationId xmlns:a16="http://schemas.microsoft.com/office/drawing/2014/main" id="{080FDE6A-C607-E74A-9CEE-BE42562C605A}"/>
+                <a16:creationId xmlns:a16="http://schemas.microsoft.com/office/drawing/2014/main" id="{E9E93546-3B19-C749-B439-88F6F2126337}"/>
               </a:ext>
             </a:extLst>
           </p:cNvPr>
-          <p:cNvSpPr/>
+          <p:cNvGrpSpPr/>
           <p:nvPr/>
-        </p:nvSpPr>
-        <p:spPr>
+        </p:nvGrpSpPr>
+        <p:grpSpPr>
           <a:xfrm>
-            <a:off x="8633679" y="6179763"/>
-            <a:ext cx="3922360" cy="1030288"/>
+            <a:off x="8626776" y="6059901"/>
+            <a:ext cx="3934147" cy="1033125"/>
+            <a:chOff x="8626752" y="5963382"/>
+            <a:chExt cx="3934147" cy="1033125"/>
           </a:xfrm>
-          <a:prstGeom prst="rect">
-            <a:avLst/>
-          </a:prstGeom>
-          <a:solidFill>
-            <a:srgbClr val="FFFFFF"/>
-          </a:solidFill>
-          <a:ln w="25400">
+        </p:grpSpPr>
+        <p:sp>
+          <p:nvSpPr>
+            <p:cNvPr id="30" name="Rectangle 29">
+              <a:extLst>
+                <a:ext uri="{FF2B5EF4-FFF2-40B4-BE49-F238E27FC236}">
+                  <a16:creationId xmlns:a16="http://schemas.microsoft.com/office/drawing/2014/main" id="{080FDE6A-C607-E74A-9CEE-BE42562C605A}"/>
+                </a:ext>
+              </a:extLst>
+            </p:cNvPr>
+            <p:cNvSpPr/>
+            <p:nvPr/>
+          </p:nvSpPr>
+          <p:spPr>
+            <a:xfrm>
+              <a:off x="8638539" y="5963382"/>
+              <a:ext cx="3922360" cy="1030288"/>
+            </a:xfrm>
+            <a:prstGeom prst="rect">
+              <a:avLst/>
+            </a:prstGeom>
             <a:solidFill>
-              <a:srgbClr val="2096F4"/>
+              <a:srgbClr val="FFFFFF"/>
             </a:solidFill>
-          </a:ln>
-        </p:spPr>
-        <p:style>
-          <a:lnRef idx="2">
-            <a:schemeClr val="accent1">
-              <a:shade val="50000"/>
-            </a:schemeClr>
-          </a:lnRef>
-          <a:fillRef idx="1">
-            <a:schemeClr val="accent1"/>
-          </a:fillRef>
-          <a:effectRef idx="0">
-            <a:schemeClr val="accent1"/>
-          </a:effectRef>
-          <a:fontRef idx="minor">
-            <a:schemeClr val="lt1"/>
-          </a:fontRef>
-        </p:style>
-        <p:txBody>
-          <a:bodyPr rtlCol="0" anchor="ctr"/>
-          <a:lstStyle/>
-          <a:p>
-            <a:pPr algn="ctr"/>
-            <a:endParaRPr lang="en-GB" sz="2439" dirty="0">
-              <a:latin typeface="Lato" panose="020F0502020204030203" pitchFamily="34" charset="0"/>
-              <a:ea typeface="Lato" panose="020F0502020204030203" pitchFamily="34" charset="0"/>
-              <a:cs typeface="Lato" panose="020F0502020204030203" pitchFamily="34" charset="0"/>
-            </a:endParaRPr>
-          </a:p>
-        </p:txBody>
-      </p:sp>
-      <p:sp>
-        <p:nvSpPr>
-          <p:cNvPr id="46" name="TextBox 45">
-            <a:extLst>
-              <a:ext uri="{FF2B5EF4-FFF2-40B4-BE49-F238E27FC236}">
-                <a16:creationId xmlns:a16="http://schemas.microsoft.com/office/drawing/2014/main" id="{AF71F8FE-2F69-7447-AE47-DC47CD3E58A4}"/>
-              </a:ext>
-            </a:extLst>
-          </p:cNvPr>
-          <p:cNvSpPr txBox="1"/>
-          <p:nvPr/>
-        </p:nvSpPr>
-        <p:spPr>
-          <a:xfrm>
-            <a:off x="8633675" y="6199269"/>
-            <a:ext cx="3922365" cy="1015663"/>
-          </a:xfrm>
-          <a:prstGeom prst="rect">
-            <a:avLst/>
-          </a:prstGeom>
-          <a:noFill/>
-        </p:spPr>
-        <p:txBody>
-          <a:bodyPr wrap="square" rtlCol="0">
-            <a:spAutoFit/>
-          </a:bodyPr>
-          <a:lstStyle/>
-          <a:p>
-            <a:pPr algn="just"/>
-            <a:r>
-              <a:rPr lang="en-GB" sz="1200" dirty="0">
+            <a:ln w="25400">
+              <a:solidFill>
+                <a:srgbClr val="2096F4"/>
+              </a:solidFill>
+            </a:ln>
+          </p:spPr>
+          <p:style>
+            <a:lnRef idx="2">
+              <a:schemeClr val="accent1">
+                <a:shade val="50000"/>
+              </a:schemeClr>
+            </a:lnRef>
+            <a:fillRef idx="1">
+              <a:schemeClr val="accent1"/>
+            </a:fillRef>
+            <a:effectRef idx="0">
+              <a:schemeClr val="accent1"/>
+            </a:effectRef>
+            <a:fontRef idx="minor">
+              <a:schemeClr val="lt1"/>
+            </a:fontRef>
+          </p:style>
+          <p:txBody>
+            <a:bodyPr rtlCol="0" anchor="ctr"/>
+            <a:lstStyle/>
+            <a:p>
+              <a:pPr algn="ctr"/>
+              <a:endParaRPr lang="en-GB" sz="2439" dirty="0">
                 <a:latin typeface="Lato" panose="020F0502020204030203" pitchFamily="34" charset="0"/>
                 <a:ea typeface="Lato" panose="020F0502020204030203" pitchFamily="34" charset="0"/>
                 <a:cs typeface="Lato" panose="020F0502020204030203" pitchFamily="34" charset="0"/>
-              </a:rPr>
-              <a:t>This topic returns to the idea of how isotopes such as oxygen can be used to reconstruct paleotemperatures and climates, this in turn could provide potential evidence and support for hypotheses such as the “over-chill”, “over-kill”, or “over-ill” theories. </a:t>
-            </a:r>
-          </a:p>
-        </p:txBody>
-      </p:sp>
+              </a:endParaRPr>
+            </a:p>
+          </p:txBody>
+        </p:sp>
+        <p:sp>
+          <p:nvSpPr>
+            <p:cNvPr id="46" name="TextBox 45">
+              <a:extLst>
+                <a:ext uri="{FF2B5EF4-FFF2-40B4-BE49-F238E27FC236}">
+                  <a16:creationId xmlns:a16="http://schemas.microsoft.com/office/drawing/2014/main" id="{AF71F8FE-2F69-7447-AE47-DC47CD3E58A4}"/>
+                </a:ext>
+              </a:extLst>
+            </p:cNvPr>
+            <p:cNvSpPr txBox="1"/>
+            <p:nvPr/>
+          </p:nvSpPr>
+          <p:spPr>
+            <a:xfrm>
+              <a:off x="8626752" y="5980844"/>
+              <a:ext cx="3922365" cy="1015663"/>
+            </a:xfrm>
+            <a:prstGeom prst="rect">
+              <a:avLst/>
+            </a:prstGeom>
+            <a:noFill/>
+          </p:spPr>
+          <p:txBody>
+            <a:bodyPr wrap="square" rtlCol="0">
+              <a:spAutoFit/>
+            </a:bodyPr>
+            <a:lstStyle/>
+            <a:p>
+              <a:pPr algn="just"/>
+              <a:r>
+                <a:rPr lang="en-GB" sz="1200" dirty="0">
+                  <a:latin typeface="Lato" panose="020F0502020204030203" pitchFamily="34" charset="0"/>
+                  <a:ea typeface="Lato" panose="020F0502020204030203" pitchFamily="34" charset="0"/>
+                  <a:cs typeface="Lato" panose="020F0502020204030203" pitchFamily="34" charset="0"/>
+                </a:rPr>
+                <a:t>This topic returns to the idea of how isotopes such as oxygen can be used to reconstruct paleotemperatures and climates, this in turn could provide potential evidence and support for hypotheses such as the “over-chill”, “over-kill”, or “over-ill” theories. </a:t>
+              </a:r>
+            </a:p>
+          </p:txBody>
+        </p:sp>
+      </p:grpSp>
       <p:sp>
         <p:nvSpPr>
           <p:cNvPr id="50" name="Rectangle 49">
@@ -5090,7 +5224,7 @@
             <p:nvPr/>
           </p:nvPicPr>
           <p:blipFill>
-            <a:blip r:embed="rId5"/>
+            <a:blip r:embed="rId7"/>
             <a:stretch>
               <a:fillRect/>
             </a:stretch>
@@ -5411,7 +5545,7 @@
                 <a:avLst/>
               </a:prstGeom>
               <a:blipFill>
-                <a:blip r:embed="rId6"/>
+                <a:blip r:embed="rId8"/>
                 <a:stretch>
                   <a:fillRect b="-1190"/>
                 </a:stretch>
@@ -5594,7 +5728,7 @@
                 <a:avLst/>
               </a:prstGeom>
               <a:blipFill>
-                <a:blip r:embed="rId7"/>
+                <a:blip r:embed="rId9"/>
                 <a:stretch>
                   <a:fillRect b="-4545"/>
                 </a:stretch>
@@ -5685,7 +5819,7 @@
         </p:nvSpPr>
         <p:spPr>
           <a:xfrm>
-            <a:off x="1685622" y="1159235"/>
+            <a:off x="1722733" y="1179272"/>
             <a:ext cx="952773" cy="248857"/>
           </a:xfrm>
           <a:prstGeom prst="rect">
@@ -5953,7 +6087,7 @@
                   <a:avLst/>
                 </a:prstGeom>
                 <a:blipFill>
-                  <a:blip r:embed="rId8"/>
+                  <a:blip r:embed="rId10"/>
                   <a:stretch>
                     <a:fillRect b="-5556"/>
                   </a:stretch>
@@ -6029,7 +6163,7 @@
                 <p:nvPr/>
               </p:nvPicPr>
               <p:blipFill rotWithShape="1">
-                <a:blip r:embed="rId9"/>
+                <a:blip r:embed="rId11"/>
                 <a:srcRect l="5053" t="2855"/>
                 <a:stretch/>
               </p:blipFill>
@@ -6168,7 +6302,7 @@
                     <a:ea typeface="Lato" panose="020F0502020204030203" pitchFamily="34" charset="0"/>
                     <a:cs typeface="Lato" panose="020F0502020204030203" pitchFamily="34" charset="0"/>
                   </a:rPr>
-                  <a:t>This work amongst others demonstrates that the EOT is categorised by an ~+1.1‰ shift in the foraminifera </a:t>
+                  <a:t>This work amongst others demonstrates that the EOT can be categorised by an ~+1.1‰ shift in the foraminifera </a:t>
                 </a:r>
                 <a14:m>
                   <m:oMath xmlns:m="http://schemas.openxmlformats.org/officeDocument/2006/math">
@@ -6208,7 +6342,7 @@
                     <a:ea typeface="Lato" panose="020F0502020204030203" pitchFamily="34" charset="0"/>
                     <a:cs typeface="Lato" panose="020F0502020204030203" pitchFamily="34" charset="0"/>
                   </a:rPr>
-                  <a:t>O. Alternative studies which make use of continental oxygen isotope records verify and support the marine derived signal. </a:t>
+                  <a:t>O. Alternative studies make use of continental oxygen isotope records which verify and support the marine derived signal. </a:t>
                 </a:r>
               </a:p>
             </p:txBody>
@@ -6238,7 +6372,7 @@
                 <a:avLst/>
               </a:prstGeom>
               <a:blipFill>
-                <a:blip r:embed="rId10"/>
+                <a:blip r:embed="rId12"/>
                 <a:stretch>
                   <a:fillRect b="-2469"/>
                 </a:stretch>
@@ -6294,7 +6428,7 @@
             <p:nvPr/>
           </p:nvPicPr>
           <p:blipFill rotWithShape="1">
-            <a:blip r:embed="rId11">
+            <a:blip r:embed="rId13">
               <a:extLst>
                 <a:ext uri="{28A0092B-C50C-407E-A947-70E740481C1C}">
                   <a14:useLocalDpi xmlns:a14="http://schemas.microsoft.com/office/drawing/2010/main" val="0"/>
@@ -6339,7 +6473,7 @@
             <p:nvPr/>
           </p:nvPicPr>
           <p:blipFill rotWithShape="1">
-            <a:blip r:embed="rId11">
+            <a:blip r:embed="rId13">
               <a:extLst>
                 <a:ext uri="{28A0092B-C50C-407E-A947-70E740481C1C}">
                   <a14:useLocalDpi xmlns:a14="http://schemas.microsoft.com/office/drawing/2010/main" val="0"/>
@@ -6387,7 +6521,7 @@
             <p:spPr>
               <a:xfrm>
                 <a:off x="4441655" y="8050236"/>
-                <a:ext cx="3913408" cy="338554"/>
+                <a:ext cx="3913408" cy="461665"/>
               </a:xfrm>
               <a:prstGeom prst="rect">
                 <a:avLst/>
@@ -6446,7 +6580,7 @@
                     <a:ea typeface="Lato" panose="020F0502020204030203" pitchFamily="34" charset="0"/>
                     <a:cs typeface="Lato" panose="020F0502020204030203" pitchFamily="34" charset="0"/>
                   </a:rPr>
-                  <a:t>O  records derived from continental records compared to those derived from marine foraminifera (Sheldon et al. 2016). </a:t>
+                  <a:t>O  records derived from continental records compared to those derived from marine foraminifera (Sheldon et al. 2016): (A) The continental isotope records. (B) Data derived from marine foraminifera. </a:t>
                 </a:r>
               </a:p>
             </p:txBody>
@@ -6470,15 +6604,15 @@
             <p:spPr>
               <a:xfrm>
                 <a:off x="4441655" y="8050236"/>
-                <a:ext cx="3913408" cy="338554"/>
+                <a:ext cx="3913408" cy="461665"/>
               </a:xfrm>
               <a:prstGeom prst="rect">
                 <a:avLst/>
               </a:prstGeom>
               <a:blipFill>
-                <a:blip r:embed="rId12"/>
+                <a:blip r:embed="rId14"/>
                 <a:stretch>
-                  <a:fillRect b="-3571"/>
+                  <a:fillRect b="-2703"/>
                 </a:stretch>
               </a:blipFill>
             </p:spPr>
@@ -6557,7 +6691,7 @@
         </p:nvSpPr>
         <p:spPr>
           <a:xfrm>
-            <a:off x="6156407" y="6380039"/>
+            <a:off x="6163911" y="6347279"/>
             <a:ext cx="461986" cy="261610"/>
           </a:xfrm>
           <a:prstGeom prst="rect">
@@ -6578,6 +6712,513 @@
                 <a:cs typeface="Lato" panose="020F0502020204030203" pitchFamily="34" charset="0"/>
               </a:rPr>
               <a:t>EOT</a:t>
+            </a:r>
+          </a:p>
+        </p:txBody>
+      </p:sp>
+      <p:sp>
+        <p:nvSpPr>
+          <p:cNvPr id="77" name="TextBox 76">
+            <a:extLst>
+              <a:ext uri="{FF2B5EF4-FFF2-40B4-BE49-F238E27FC236}">
+                <a16:creationId xmlns:a16="http://schemas.microsoft.com/office/drawing/2014/main" id="{B3287BF8-C881-974C-A6CA-8AFC709CA0FB}"/>
+              </a:ext>
+            </a:extLst>
+          </p:cNvPr>
+          <p:cNvSpPr txBox="1"/>
+          <p:nvPr/>
+        </p:nvSpPr>
+        <p:spPr>
+          <a:xfrm>
+            <a:off x="4439622" y="8511901"/>
+            <a:ext cx="3922365" cy="830997"/>
+          </a:xfrm>
+          <a:prstGeom prst="rect">
+            <a:avLst/>
+          </a:prstGeom>
+          <a:noFill/>
+        </p:spPr>
+        <p:txBody>
+          <a:bodyPr wrap="square" rtlCol="0">
+            <a:spAutoFit/>
+          </a:bodyPr>
+          <a:lstStyle/>
+          <a:p>
+            <a:pPr algn="just"/>
+            <a:r>
+              <a:rPr lang="en-GB" sz="1200" dirty="0">
+                <a:latin typeface="Lato" panose="020F0502020204030203" pitchFamily="34" charset="0"/>
+                <a:ea typeface="Lato" panose="020F0502020204030203" pitchFamily="34" charset="0"/>
+                <a:cs typeface="Lato" panose="020F0502020204030203" pitchFamily="34" charset="0"/>
+              </a:rPr>
+              <a:t>Sheldon et al. (2016) makes use of freshwater gastropods as the source of the oxygen tracer. They conclude a higher magnitude shift of &gt;+1.4 ‰ in the isotope ratio than when compared to the marine data.</a:t>
+            </a:r>
+          </a:p>
+        </p:txBody>
+      </p:sp>
+      <mc:AlternateContent xmlns:mc="http://schemas.openxmlformats.org/markup-compatibility/2006">
+        <mc:Choice xmlns:a14="http://schemas.microsoft.com/office/drawing/2010/main" Requires="a14">
+          <p:sp>
+            <p:nvSpPr>
+              <p:cNvPr id="78" name="TextBox 77">
+                <a:extLst>
+                  <a:ext uri="{FF2B5EF4-FFF2-40B4-BE49-F238E27FC236}">
+                    <a16:creationId xmlns:a16="http://schemas.microsoft.com/office/drawing/2014/main" id="{8BB442DD-00D2-0546-99AF-11C825EED55C}"/>
+                  </a:ext>
+                </a:extLst>
+              </p:cNvPr>
+              <p:cNvSpPr txBox="1"/>
+              <p:nvPr/>
+            </p:nvSpPr>
+            <p:spPr>
+              <a:xfrm>
+                <a:off x="8633661" y="1136410"/>
+                <a:ext cx="3922365" cy="2492990"/>
+              </a:xfrm>
+              <a:prstGeom prst="rect">
+                <a:avLst/>
+              </a:prstGeom>
+              <a:noFill/>
+            </p:spPr>
+            <p:txBody>
+              <a:bodyPr wrap="square" rtlCol="0">
+                <a:spAutoFit/>
+              </a:bodyPr>
+              <a:lstStyle/>
+              <a:p>
+                <a:pPr algn="just"/>
+                <a:r>
+                  <a:rPr lang="en-GB" sz="1200" dirty="0">
+                    <a:latin typeface="Lato" panose="020F0502020204030203" pitchFamily="34" charset="0"/>
+                    <a:ea typeface="Lato" panose="020F0502020204030203" pitchFamily="34" charset="0"/>
+                    <a:cs typeface="Lato" panose="020F0502020204030203" pitchFamily="34" charset="0"/>
+                  </a:rPr>
+                  <a:t>This higher magnitude could be attributed to the change in isotopic composition of the source meteoric water where the gastropods grew. As Antarctic ice sheets developed, the marine source waters would tend towards more enriched </a:t>
+                </a:r>
+                <a14:m>
+                  <m:oMath xmlns:m="http://schemas.openxmlformats.org/officeDocument/2006/math">
+                    <m:sSup>
+                      <m:sSupPr>
+                        <m:ctrlPr>
+                          <a:rPr lang="en-GB" sz="1200" i="1">
+                            <a:latin typeface="Cambria Math" panose="02040503050406030204" pitchFamily="18" charset="0"/>
+                            <a:ea typeface="Cambria Math" panose="02040503050406030204" pitchFamily="18" charset="0"/>
+                          </a:rPr>
+                        </m:ctrlPr>
+                      </m:sSupPr>
+                      <m:e>
+                        <m:r>
+                          <a:rPr lang="en-GB" sz="1200" i="1">
+                            <a:latin typeface="Cambria Math" panose="02040503050406030204" pitchFamily="18" charset="0"/>
+                            <a:ea typeface="Cambria Math" panose="02040503050406030204" pitchFamily="18" charset="0"/>
+                          </a:rPr>
+                          <m:t>𝛿</m:t>
+                        </m:r>
+                      </m:e>
+                      <m:sup>
+                        <m:r>
+                          <a:rPr lang="en-GB" sz="1200" i="1">
+                            <a:latin typeface="Cambria Math" panose="02040503050406030204" pitchFamily="18" charset="0"/>
+                            <a:ea typeface="Cambria Math" panose="02040503050406030204" pitchFamily="18" charset="0"/>
+                          </a:rPr>
+                          <m:t>18</m:t>
+                        </m:r>
+                      </m:sup>
+                    </m:sSup>
+                  </m:oMath>
+                </a14:m>
+                <a:r>
+                  <a:rPr lang="en-GB" sz="1200" dirty="0">
+                    <a:latin typeface="Lato" panose="020F0502020204030203" pitchFamily="34" charset="0"/>
+                    <a:ea typeface="Lato" panose="020F0502020204030203" pitchFamily="34" charset="0"/>
+                    <a:cs typeface="Lato" panose="020F0502020204030203" pitchFamily="34" charset="0"/>
+                  </a:rPr>
+                  <a:t>O values.</a:t>
+                </a:r>
+              </a:p>
+              <a:p>
+                <a:pPr algn="just"/>
+                <a:endParaRPr lang="en-GB" sz="1200" dirty="0">
+                  <a:latin typeface="Lato" panose="020F0502020204030203" pitchFamily="34" charset="0"/>
+                  <a:ea typeface="Lato" panose="020F0502020204030203" pitchFamily="34" charset="0"/>
+                  <a:cs typeface="Lato" panose="020F0502020204030203" pitchFamily="34" charset="0"/>
+                </a:endParaRPr>
+              </a:p>
+              <a:p>
+                <a:pPr algn="just"/>
+                <a:r>
+                  <a:rPr lang="en-GB" sz="1200" dirty="0">
+                    <a:latin typeface="Lato" panose="020F0502020204030203" pitchFamily="34" charset="0"/>
+                    <a:ea typeface="Lato" panose="020F0502020204030203" pitchFamily="34" charset="0"/>
+                    <a:cs typeface="Lato" panose="020F0502020204030203" pitchFamily="34" charset="0"/>
+                  </a:rPr>
+                  <a:t>Proxy indicators </a:t>
+                </a:r>
+                <a:r>
+                  <a:rPr lang="en-GB" sz="1200" b="0" dirty="0">
+                    <a:latin typeface="Lato" panose="020F0502020204030203" pitchFamily="34" charset="0"/>
+                    <a:ea typeface="Lato" panose="020F0502020204030203" pitchFamily="34" charset="0"/>
+                    <a:cs typeface="Lato" panose="020F0502020204030203" pitchFamily="34" charset="0"/>
+                  </a:rPr>
+                  <a:t>could also be employed, for example, </a:t>
+                </a:r>
+                <a:r>
+                  <a:rPr lang="en-GB" sz="1200" dirty="0" err="1">
+                    <a:latin typeface="Lato" panose="020F0502020204030203" pitchFamily="34" charset="0"/>
+                    <a:ea typeface="Lato" panose="020F0502020204030203" pitchFamily="34" charset="0"/>
+                    <a:cs typeface="Lato" panose="020F0502020204030203" pitchFamily="34" charset="0"/>
+                  </a:rPr>
+                  <a:t>Zachos</a:t>
+                </a:r>
+                <a:r>
+                  <a:rPr lang="en-GB" sz="1200" dirty="0">
+                    <a:latin typeface="Lato" panose="020F0502020204030203" pitchFamily="34" charset="0"/>
+                    <a:ea typeface="Lato" panose="020F0502020204030203" pitchFamily="34" charset="0"/>
+                    <a:cs typeface="Lato" panose="020F0502020204030203" pitchFamily="34" charset="0"/>
+                  </a:rPr>
+                  <a:t> et al. 2008 uses </a:t>
+                </a:r>
+                <a14:m>
+                  <m:oMath xmlns:m="http://schemas.openxmlformats.org/officeDocument/2006/math">
+                    <m:sSub>
+                      <m:sSubPr>
+                        <m:ctrlPr>
+                          <a:rPr lang="en-GB" sz="1200" i="1">
+                            <a:latin typeface="Cambria Math" panose="02040503050406030204" pitchFamily="18" charset="0"/>
+                            <a:ea typeface="Lato" panose="020F0502020204030203" pitchFamily="34" charset="0"/>
+                            <a:cs typeface="Lato" panose="020F0502020204030203" pitchFamily="34" charset="0"/>
+                          </a:rPr>
+                        </m:ctrlPr>
+                      </m:sSubPr>
+                      <m:e>
+                        <m:r>
+                          <m:rPr>
+                            <m:nor/>
+                          </m:rPr>
+                          <a:rPr lang="en-GB" sz="1200" dirty="0">
+                            <a:latin typeface="Lato" panose="020F0502020204030203" pitchFamily="34" charset="0"/>
+                            <a:ea typeface="Lato" panose="020F0502020204030203" pitchFamily="34" charset="0"/>
+                            <a:cs typeface="Lato" panose="020F0502020204030203" pitchFamily="34" charset="0"/>
+                          </a:rPr>
+                          <m:t>CO</m:t>
+                        </m:r>
+                      </m:e>
+                      <m:sub>
+                        <m:r>
+                          <a:rPr lang="en-GB" sz="1200" i="1">
+                            <a:latin typeface="Cambria Math" panose="02040503050406030204" pitchFamily="18" charset="0"/>
+                            <a:ea typeface="Lato" panose="020F0502020204030203" pitchFamily="34" charset="0"/>
+                            <a:cs typeface="Lato" panose="020F0502020204030203" pitchFamily="34" charset="0"/>
+                          </a:rPr>
+                          <m:t>2</m:t>
+                        </m:r>
+                      </m:sub>
+                    </m:sSub>
+                  </m:oMath>
+                </a14:m>
+                <a:r>
+                  <a:rPr lang="en-GB" sz="1200" dirty="0">
+                    <a:latin typeface="Lato" panose="020F0502020204030203" pitchFamily="34" charset="0"/>
+                    <a:ea typeface="Lato" panose="020F0502020204030203" pitchFamily="34" charset="0"/>
+                    <a:cs typeface="Lato" panose="020F0502020204030203" pitchFamily="34" charset="0"/>
+                  </a:rPr>
+                  <a:t> records to </a:t>
+                </a:r>
+                <a:r>
+                  <a:rPr lang="en-GB" sz="1200" b="0" dirty="0">
+                    <a:latin typeface="Lato" panose="020F0502020204030203" pitchFamily="34" charset="0"/>
+                    <a:ea typeface="Lato" panose="020F0502020204030203" pitchFamily="34" charset="0"/>
+                    <a:cs typeface="Lato" panose="020F0502020204030203" pitchFamily="34" charset="0"/>
+                  </a:rPr>
+                  <a:t>suggests that changes in atmospheric </a:t>
+                </a:r>
+                <a14:m>
+                  <m:oMath xmlns:m="http://schemas.openxmlformats.org/officeDocument/2006/math">
+                    <m:sSub>
+                      <m:sSubPr>
+                        <m:ctrlPr>
+                          <a:rPr lang="en-GB" sz="1200" i="1">
+                            <a:latin typeface="Cambria Math" panose="02040503050406030204" pitchFamily="18" charset="0"/>
+                            <a:ea typeface="Lato" panose="020F0502020204030203" pitchFamily="34" charset="0"/>
+                            <a:cs typeface="Lato" panose="020F0502020204030203" pitchFamily="34" charset="0"/>
+                          </a:rPr>
+                        </m:ctrlPr>
+                      </m:sSubPr>
+                      <m:e>
+                        <m:r>
+                          <m:rPr>
+                            <m:nor/>
+                          </m:rPr>
+                          <a:rPr lang="en-GB" sz="1200" dirty="0">
+                            <a:latin typeface="Lato" panose="020F0502020204030203" pitchFamily="34" charset="0"/>
+                            <a:ea typeface="Lato" panose="020F0502020204030203" pitchFamily="34" charset="0"/>
+                            <a:cs typeface="Lato" panose="020F0502020204030203" pitchFamily="34" charset="0"/>
+                          </a:rPr>
+                          <m:t>CO</m:t>
+                        </m:r>
+                      </m:e>
+                      <m:sub>
+                        <m:r>
+                          <a:rPr lang="en-GB" sz="1200" i="1">
+                            <a:latin typeface="Cambria Math" panose="02040503050406030204" pitchFamily="18" charset="0"/>
+                            <a:ea typeface="Lato" panose="020F0502020204030203" pitchFamily="34" charset="0"/>
+                            <a:cs typeface="Lato" panose="020F0502020204030203" pitchFamily="34" charset="0"/>
+                          </a:rPr>
+                          <m:t>2</m:t>
+                        </m:r>
+                      </m:sub>
+                    </m:sSub>
+                  </m:oMath>
+                </a14:m>
+                <a:r>
+                  <a:rPr lang="en-GB" sz="1200" dirty="0">
+                    <a:latin typeface="Lato" panose="020F0502020204030203" pitchFamily="34" charset="0"/>
+                    <a:ea typeface="Lato" panose="020F0502020204030203" pitchFamily="34" charset="0"/>
+                    <a:cs typeface="Lato" panose="020F0502020204030203" pitchFamily="34" charset="0"/>
+                  </a:rPr>
+                  <a:t> could be the driver in Antarctic glaciation at the Eocene-Oligocene period. On the other hand, there are some suggestions that orbital forcing may have contributed to global cooling (Liu et al. 2009).</a:t>
+                </a:r>
+              </a:p>
+            </p:txBody>
+          </p:sp>
+        </mc:Choice>
+        <mc:Fallback>
+          <p:sp>
+            <p:nvSpPr>
+              <p:cNvPr id="78" name="TextBox 77">
+                <a:extLst>
+                  <a:ext uri="{FF2B5EF4-FFF2-40B4-BE49-F238E27FC236}">
+                    <a16:creationId xmlns:a16="http://schemas.microsoft.com/office/drawing/2014/main" id="{8BB442DD-00D2-0546-99AF-11C825EED55C}"/>
+                  </a:ext>
+                </a:extLst>
+              </p:cNvPr>
+              <p:cNvSpPr txBox="1">
+                <a:spLocks noRot="1" noChangeAspect="1" noMove="1" noResize="1" noEditPoints="1" noAdjustHandles="1" noChangeArrowheads="1" noChangeShapeType="1" noTextEdit="1"/>
+              </p:cNvSpPr>
+              <p:nvPr/>
+            </p:nvSpPr>
+            <p:spPr>
+              <a:xfrm>
+                <a:off x="8633661" y="1136410"/>
+                <a:ext cx="3922365" cy="2492990"/>
+              </a:xfrm>
+              <a:prstGeom prst="rect">
+                <a:avLst/>
+              </a:prstGeom>
+              <a:blipFill>
+                <a:blip r:embed="rId15"/>
+                <a:stretch>
+                  <a:fillRect b="-1010"/>
+                </a:stretch>
+              </a:blipFill>
+            </p:spPr>
+            <p:txBody>
+              <a:bodyPr/>
+              <a:lstStyle/>
+              <a:p>
+                <a:r>
+                  <a:rPr lang="en-GB">
+                    <a:noFill/>
+                  </a:rPr>
+                  <a:t> </a:t>
+                </a:r>
+              </a:p>
+            </p:txBody>
+          </p:sp>
+        </mc:Fallback>
+      </mc:AlternateContent>
+      <p:sp>
+        <p:nvSpPr>
+          <p:cNvPr id="79" name="Rectangle 78">
+            <a:extLst>
+              <a:ext uri="{FF2B5EF4-FFF2-40B4-BE49-F238E27FC236}">
+                <a16:creationId xmlns:a16="http://schemas.microsoft.com/office/drawing/2014/main" id="{BC38C4D7-EADE-FA40-8208-C03DA5924F65}"/>
+              </a:ext>
+            </a:extLst>
+          </p:cNvPr>
+          <p:cNvSpPr/>
+          <p:nvPr/>
+        </p:nvSpPr>
+        <p:spPr>
+          <a:xfrm>
+            <a:off x="8626776" y="3841198"/>
+            <a:ext cx="3922365" cy="343981"/>
+          </a:xfrm>
+          <a:prstGeom prst="rect">
+            <a:avLst/>
+          </a:prstGeom>
+          <a:solidFill>
+            <a:srgbClr val="2096F4"/>
+          </a:solidFill>
+          <a:ln w="25400">
+            <a:noFill/>
+          </a:ln>
+        </p:spPr>
+        <p:style>
+          <a:lnRef idx="2">
+            <a:schemeClr val="accent1">
+              <a:shade val="50000"/>
+            </a:schemeClr>
+          </a:lnRef>
+          <a:fillRef idx="1">
+            <a:schemeClr val="accent1"/>
+          </a:fillRef>
+          <a:effectRef idx="0">
+            <a:schemeClr val="accent1"/>
+          </a:effectRef>
+          <a:fontRef idx="minor">
+            <a:schemeClr val="lt1"/>
+          </a:fontRef>
+        </p:style>
+        <p:txBody>
+          <a:bodyPr rtlCol="0" anchor="ctr"/>
+          <a:lstStyle/>
+          <a:p>
+            <a:pPr algn="ctr"/>
+            <a:endParaRPr lang="en-GB" sz="2439" dirty="0">
+              <a:latin typeface="Lato" panose="020F0502020204030203" pitchFamily="34" charset="0"/>
+              <a:ea typeface="Lato" panose="020F0502020204030203" pitchFamily="34" charset="0"/>
+              <a:cs typeface="Lato" panose="020F0502020204030203" pitchFamily="34" charset="0"/>
+            </a:endParaRPr>
+          </a:p>
+        </p:txBody>
+      </p:sp>
+      <p:sp>
+        <p:nvSpPr>
+          <p:cNvPr id="44" name="TextBox 43">
+            <a:extLst>
+              <a:ext uri="{FF2B5EF4-FFF2-40B4-BE49-F238E27FC236}">
+                <a16:creationId xmlns:a16="http://schemas.microsoft.com/office/drawing/2014/main" id="{8D3E38F7-8C75-1140-BA60-5E3F5D293071}"/>
+              </a:ext>
+            </a:extLst>
+          </p:cNvPr>
+          <p:cNvSpPr txBox="1"/>
+          <p:nvPr/>
+        </p:nvSpPr>
+        <p:spPr>
+          <a:xfrm>
+            <a:off x="10017232" y="3878940"/>
+            <a:ext cx="1151152" cy="248857"/>
+          </a:xfrm>
+          <a:prstGeom prst="rect">
+            <a:avLst/>
+          </a:prstGeom>
+          <a:noFill/>
+        </p:spPr>
+        <p:txBody>
+          <a:bodyPr wrap="square" tIns="33090" bIns="0" rtlCol="0">
+            <a:spAutoFit/>
+          </a:bodyPr>
+          <a:lstStyle/>
+          <a:p>
+            <a:r>
+              <a:rPr lang="en-GB" sz="1400" b="1" dirty="0">
+                <a:solidFill>
+                  <a:schemeClr val="bg1"/>
+                </a:solidFill>
+                <a:latin typeface="Lato" panose="020F0502020204030203" pitchFamily="34" charset="0"/>
+                <a:ea typeface="Lato" panose="020F0502020204030203" pitchFamily="34" charset="0"/>
+                <a:cs typeface="Lato" panose="020F0502020204030203" pitchFamily="34" charset="0"/>
+              </a:rPr>
+              <a:t>Conclusions</a:t>
+            </a:r>
+          </a:p>
+        </p:txBody>
+      </p:sp>
+      <p:sp>
+        <p:nvSpPr>
+          <p:cNvPr id="80" name="Rectangle 79">
+            <a:extLst>
+              <a:ext uri="{FF2B5EF4-FFF2-40B4-BE49-F238E27FC236}">
+                <a16:creationId xmlns:a16="http://schemas.microsoft.com/office/drawing/2014/main" id="{EAF1911C-5AD5-314E-AC40-19D80E4836BA}"/>
+              </a:ext>
+            </a:extLst>
+          </p:cNvPr>
+          <p:cNvSpPr/>
+          <p:nvPr/>
+        </p:nvSpPr>
+        <p:spPr>
+          <a:xfrm>
+            <a:off x="8633661" y="7239021"/>
+            <a:ext cx="3922365" cy="343981"/>
+          </a:xfrm>
+          <a:prstGeom prst="rect">
+            <a:avLst/>
+          </a:prstGeom>
+          <a:solidFill>
+            <a:srgbClr val="2096F4"/>
+          </a:solidFill>
+          <a:ln w="25400">
+            <a:noFill/>
+          </a:ln>
+        </p:spPr>
+        <p:style>
+          <a:lnRef idx="2">
+            <a:schemeClr val="accent1">
+              <a:shade val="50000"/>
+            </a:schemeClr>
+          </a:lnRef>
+          <a:fillRef idx="1">
+            <a:schemeClr val="accent1"/>
+          </a:fillRef>
+          <a:effectRef idx="0">
+            <a:schemeClr val="accent1"/>
+          </a:effectRef>
+          <a:fontRef idx="minor">
+            <a:schemeClr val="lt1"/>
+          </a:fontRef>
+        </p:style>
+        <p:txBody>
+          <a:bodyPr rtlCol="0" anchor="ctr"/>
+          <a:lstStyle/>
+          <a:p>
+            <a:pPr algn="ctr"/>
+            <a:endParaRPr lang="en-GB" sz="2439" dirty="0">
+              <a:latin typeface="Lato" panose="020F0502020204030203" pitchFamily="34" charset="0"/>
+              <a:ea typeface="Lato" panose="020F0502020204030203" pitchFamily="34" charset="0"/>
+              <a:cs typeface="Lato" panose="020F0502020204030203" pitchFamily="34" charset="0"/>
+            </a:endParaRPr>
+          </a:p>
+        </p:txBody>
+      </p:sp>
+      <p:sp>
+        <p:nvSpPr>
+          <p:cNvPr id="40" name="TextBox 39">
+            <a:extLst>
+              <a:ext uri="{FF2B5EF4-FFF2-40B4-BE49-F238E27FC236}">
+                <a16:creationId xmlns:a16="http://schemas.microsoft.com/office/drawing/2014/main" id="{EEAD3DFD-0300-B84D-8410-55F3F02F4FFD}"/>
+              </a:ext>
+            </a:extLst>
+          </p:cNvPr>
+          <p:cNvSpPr txBox="1"/>
+          <p:nvPr/>
+        </p:nvSpPr>
+        <p:spPr>
+          <a:xfrm>
+            <a:off x="10044476" y="7280973"/>
+            <a:ext cx="1086940" cy="248857"/>
+          </a:xfrm>
+          <a:prstGeom prst="rect">
+            <a:avLst/>
+          </a:prstGeom>
+          <a:noFill/>
+        </p:spPr>
+        <p:txBody>
+          <a:bodyPr wrap="square" tIns="33090" bIns="0" rtlCol="0">
+            <a:spAutoFit/>
+          </a:bodyPr>
+          <a:lstStyle/>
+          <a:p>
+            <a:r>
+              <a:rPr lang="en-GB" sz="1400" b="1" dirty="0">
+                <a:solidFill>
+                  <a:schemeClr val="bg1"/>
+                </a:solidFill>
+                <a:latin typeface="Lato" panose="020F0502020204030203" pitchFamily="34" charset="0"/>
+                <a:ea typeface="Lato" panose="020F0502020204030203" pitchFamily="34" charset="0"/>
+                <a:cs typeface="Lato" panose="020F0502020204030203" pitchFamily="34" charset="0"/>
+              </a:rPr>
+              <a:t>References</a:t>
             </a:r>
           </a:p>
         </p:txBody>

</xml_diff>

<commit_message>
esc4: p: handed in poster
</commit_message>
<xml_diff>
--- a/earth_system_and_climate_4/term_2/poster/oxygen_poster.pptx
+++ b/earth_system_and_climate_4/term_2/poster/oxygen_poster.pptx
@@ -197,7 +197,7 @@
           <a:p>
             <a:fld id="{9CF0DE25-9E52-B648-AE1D-256A10D77DBE}" type="datetimeFigureOut">
               <a:rPr lang="en-GB" smtClean="0"/>
-              <a:t>02/03/2019</a:t>
+              <a:t>07/03/2019</a:t>
             </a:fld>
             <a:endParaRPr lang="en-GB"/>
           </a:p>
@@ -685,7 +685,7 @@
           <a:p>
             <a:fld id="{A89845D4-B2ED-304C-AF78-76488BE9F915}" type="datetimeFigureOut">
               <a:rPr lang="en-GB" smtClean="0"/>
-              <a:t>02/03/2019</a:t>
+              <a:t>07/03/2019</a:t>
             </a:fld>
             <a:endParaRPr lang="en-GB"/>
           </a:p>
@@ -855,7 +855,7 @@
           <a:p>
             <a:fld id="{A89845D4-B2ED-304C-AF78-76488BE9F915}" type="datetimeFigureOut">
               <a:rPr lang="en-GB" smtClean="0"/>
-              <a:t>02/03/2019</a:t>
+              <a:t>07/03/2019</a:t>
             </a:fld>
             <a:endParaRPr lang="en-GB"/>
           </a:p>
@@ -1035,7 +1035,7 @@
           <a:p>
             <a:fld id="{A89845D4-B2ED-304C-AF78-76488BE9F915}" type="datetimeFigureOut">
               <a:rPr lang="en-GB" smtClean="0"/>
-              <a:t>02/03/2019</a:t>
+              <a:t>07/03/2019</a:t>
             </a:fld>
             <a:endParaRPr lang="en-GB"/>
           </a:p>
@@ -1205,7 +1205,7 @@
           <a:p>
             <a:fld id="{A89845D4-B2ED-304C-AF78-76488BE9F915}" type="datetimeFigureOut">
               <a:rPr lang="en-GB" smtClean="0"/>
-              <a:t>02/03/2019</a:t>
+              <a:t>07/03/2019</a:t>
             </a:fld>
             <a:endParaRPr lang="en-GB"/>
           </a:p>
@@ -1449,7 +1449,7 @@
           <a:p>
             <a:fld id="{A89845D4-B2ED-304C-AF78-76488BE9F915}" type="datetimeFigureOut">
               <a:rPr lang="en-GB" smtClean="0"/>
-              <a:t>02/03/2019</a:t>
+              <a:t>07/03/2019</a:t>
             </a:fld>
             <a:endParaRPr lang="en-GB"/>
           </a:p>
@@ -1681,7 +1681,7 @@
           <a:p>
             <a:fld id="{A89845D4-B2ED-304C-AF78-76488BE9F915}" type="datetimeFigureOut">
               <a:rPr lang="en-GB" smtClean="0"/>
-              <a:t>02/03/2019</a:t>
+              <a:t>07/03/2019</a:t>
             </a:fld>
             <a:endParaRPr lang="en-GB"/>
           </a:p>
@@ -2048,7 +2048,7 @@
           <a:p>
             <a:fld id="{A89845D4-B2ED-304C-AF78-76488BE9F915}" type="datetimeFigureOut">
               <a:rPr lang="en-GB" smtClean="0"/>
-              <a:t>02/03/2019</a:t>
+              <a:t>07/03/2019</a:t>
             </a:fld>
             <a:endParaRPr lang="en-GB"/>
           </a:p>
@@ -2166,7 +2166,7 @@
           <a:p>
             <a:fld id="{A89845D4-B2ED-304C-AF78-76488BE9F915}" type="datetimeFigureOut">
               <a:rPr lang="en-GB" smtClean="0"/>
-              <a:t>02/03/2019</a:t>
+              <a:t>07/03/2019</a:t>
             </a:fld>
             <a:endParaRPr lang="en-GB"/>
           </a:p>
@@ -2261,7 +2261,7 @@
           <a:p>
             <a:fld id="{A89845D4-B2ED-304C-AF78-76488BE9F915}" type="datetimeFigureOut">
               <a:rPr lang="en-GB" smtClean="0"/>
-              <a:t>02/03/2019</a:t>
+              <a:t>07/03/2019</a:t>
             </a:fld>
             <a:endParaRPr lang="en-GB"/>
           </a:p>
@@ -2538,7 +2538,7 @@
           <a:p>
             <a:fld id="{A89845D4-B2ED-304C-AF78-76488BE9F915}" type="datetimeFigureOut">
               <a:rPr lang="en-GB" smtClean="0"/>
-              <a:t>02/03/2019</a:t>
+              <a:t>07/03/2019</a:t>
             </a:fld>
             <a:endParaRPr lang="en-GB"/>
           </a:p>
@@ -2795,7 +2795,7 @@
           <a:p>
             <a:fld id="{A89845D4-B2ED-304C-AF78-76488BE9F915}" type="datetimeFigureOut">
               <a:rPr lang="en-GB" smtClean="0"/>
-              <a:t>02/03/2019</a:t>
+              <a:t>07/03/2019</a:t>
             </a:fld>
             <a:endParaRPr lang="en-GB"/>
           </a:p>
@@ -3008,7 +3008,7 @@
           <a:p>
             <a:fld id="{A89845D4-B2ED-304C-AF78-76488BE9F915}" type="datetimeFigureOut">
               <a:rPr lang="en-GB" smtClean="0"/>
-              <a:t>02/03/2019</a:t>
+              <a:t>07/03/2019</a:t>
             </a:fld>
             <a:endParaRPr lang="en-GB"/>
           </a:p>
@@ -3681,7 +3681,23 @@
                     <a:ea typeface="Lato" panose="020F0502020204030203" pitchFamily="34" charset="0"/>
                     <a:cs typeface="Lato" panose="020F0502020204030203" pitchFamily="34" charset="0"/>
                   </a:rPr>
-                  <a:t>Modern-day Antarctica is a continent which is frozen over. The formation of permanent ice-sheets occurred approximately 34 Ma at the Eocene-Oligocene boundary. This glaciation can be studied through obtaining sedimentary cores, isolating the fossilised foraminifera, and then reconstructing the chronology by using the oxygen isotope ratio </a:t>
+                  <a:t>Modern-day Antarctica is a frozen continent. The formation of permanent ice-sheets occurred approximately 34 Ma at the Eocene-Oligocene boundary in the </a:t>
+                </a:r>
+                <a:r>
+                  <a:rPr lang="en-GB" sz="1200" dirty="0" err="1">
+                    <a:latin typeface="Lato" panose="020F0502020204030203" pitchFamily="34" charset="0"/>
+                    <a:ea typeface="Lato" panose="020F0502020204030203" pitchFamily="34" charset="0"/>
+                    <a:cs typeface="Lato" panose="020F0502020204030203" pitchFamily="34" charset="0"/>
+                  </a:rPr>
+                  <a:t>Cenozoic</a:t>
+                </a:r>
+                <a:r>
+                  <a:rPr lang="en-GB" sz="1200" dirty="0">
+                    <a:latin typeface="Lato" panose="020F0502020204030203" pitchFamily="34" charset="0"/>
+                    <a:ea typeface="Lato" panose="020F0502020204030203" pitchFamily="34" charset="0"/>
+                    <a:cs typeface="Lato" panose="020F0502020204030203" pitchFamily="34" charset="0"/>
+                  </a:rPr>
+                  <a:t>. This glaciation can be studied through obtaining sedimentary cores, isolating the fossilised foraminifera, and then reconstructing the chronology by using the oxygen isotope ratio </a:t>
                 </a:r>
                 <a14:m>
                   <m:oMath xmlns:m="http://schemas.openxmlformats.org/officeDocument/2006/math">
@@ -4037,7 +4053,7 @@
                     <a:ea typeface="Lato" panose="020F0502020204030203" pitchFamily="34" charset="0"/>
                     <a:cs typeface="Lato" panose="020F0502020204030203" pitchFamily="34" charset="0"/>
                   </a:rPr>
-                  <a:t>O ratio in sedimented foraminifera from ice-core samples, this glaciation can be placed into a long history of glacial-interglacial shifts. Changes in the isotopic composition and temperature of seawater results in variations in the oxygen ratio (</a:t>
+                  <a:t>O ratio in sedimented foraminifera from sediment-core samples, this glaciation can be placed into a long history of glacial-interglacial shifts. Changes in the isotopic composition and temperature of seawater results in variations in the oxygen ratio (</a:t>
                 </a:r>
                 <a:r>
                   <a:rPr lang="en-GB" sz="1200" dirty="0" err="1">
@@ -4641,7 +4657,7 @@
             </p:nvSpPr>
             <p:spPr>
               <a:xfrm>
-                <a:off x="8636538" y="4145259"/>
+                <a:off x="8636538" y="4161301"/>
                 <a:ext cx="3922362" cy="1754326"/>
               </a:xfrm>
               <a:prstGeom prst="rect">
@@ -4655,13 +4671,14 @@
               </a:bodyPr>
               <a:lstStyle/>
               <a:p>
+                <a:pPr algn="just"/>
                 <a:r>
                   <a:rPr lang="en-GB" sz="1200" dirty="0">
                     <a:latin typeface="Lato" panose="020F0502020204030203" pitchFamily="34" charset="0"/>
                     <a:ea typeface="Lato" panose="020F0502020204030203" pitchFamily="34" charset="0"/>
                     <a:cs typeface="Lato" panose="020F0502020204030203" pitchFamily="34" charset="0"/>
                   </a:rPr>
-                  <a:t>Through the analysis of sedimentary cores around the Antarctic, evidence for continental glaciation can be obtained by studying oxygen isotopes within fossilised foraminifera. Marine and continental cores show an approximate ~+1.3‰ shift in the </a:t>
+                  <a:t>Through the analysis of sediment cores around the Antarctic, evidence for continental glaciation can be obtained by studying oxygen isotopes within fossilised foraminifera. Marine and continental cores show an approximate ~+1.3‰ shift in the </a:t>
                 </a:r>
                 <a14:m>
                   <m:oMath xmlns:m="http://schemas.openxmlformats.org/officeDocument/2006/math">
@@ -4770,7 +4787,7 @@
             </p:nvSpPr>
             <p:spPr>
               <a:xfrm>
-                <a:off x="8636538" y="4145259"/>
+                <a:off x="8636538" y="4161301"/>
                 <a:ext cx="3922362" cy="1754326"/>
               </a:xfrm>
               <a:prstGeom prst="rect">
@@ -4779,7 +4796,7 @@
               <a:blipFill>
                 <a:blip r:embed="rId6"/>
                 <a:stretch>
-                  <a:fillRect b="-1429"/>
+                  <a:fillRect b="-1439"/>
                 </a:stretch>
               </a:blipFill>
             </p:spPr>
@@ -5027,7 +5044,7 @@
                   <a:ea typeface="Lato" panose="020F0502020204030203" pitchFamily="34" charset="0"/>
                   <a:cs typeface="Lato" panose="020F0502020204030203" pitchFamily="34" charset="0"/>
                 </a:rPr>
-                <a:t>This topic returns to the idea of how isotopes such as oxygen can be used to reconstruct paleotemperatures and climates, this in turn could provide potential evidence and support for hypotheses such as the “over-chill”, “over-kill”, or “over-ill” theories. </a:t>
+                <a:t>This topic explores the idea of how isotopes such as oxygen can be used to reconstruct paleotemperatures and climates, this in turn could provide potential evidence and support for hypotheses such as the “over-chill”, “over-kill”, or “over-ill” theories. </a:t>
               </a:r>
             </a:p>
           </p:txBody>
@@ -5423,8 +5440,8 @@
           </p:txBody>
         </p:sp>
       </p:grpSp>
-      <mc:AlternateContent xmlns:mc="http://schemas.openxmlformats.org/markup-compatibility/2006">
-        <mc:Choice xmlns:a14="http://schemas.microsoft.com/office/drawing/2010/main" Requires="a14">
+      <mc:AlternateContent xmlns:mc="http://schemas.openxmlformats.org/markup-compatibility/2006" xmlns:a14="http://schemas.microsoft.com/office/drawing/2010/main">
+        <mc:Choice Requires="a14">
           <p:sp>
             <p:nvSpPr>
               <p:cNvPr id="56" name="TextBox 55">
@@ -5521,7 +5538,7 @@
             </p:txBody>
           </p:sp>
         </mc:Choice>
-        <mc:Fallback>
+        <mc:Fallback xmlns="">
           <p:sp>
             <p:nvSpPr>
               <p:cNvPr id="56" name="TextBox 55">
@@ -5605,8 +5622,8 @@
           </a:p>
         </p:txBody>
       </p:sp>
-      <mc:AlternateContent xmlns:mc="http://schemas.openxmlformats.org/markup-compatibility/2006">
-        <mc:Choice xmlns:a14="http://schemas.microsoft.com/office/drawing/2010/main" Requires="a14">
+      <mc:AlternateContent xmlns:mc="http://schemas.openxmlformats.org/markup-compatibility/2006" xmlns:a14="http://schemas.microsoft.com/office/drawing/2010/main">
+        <mc:Choice Requires="a14">
           <p:sp>
             <p:nvSpPr>
               <p:cNvPr id="55" name="TextBox 54">
@@ -5704,7 +5721,7 @@
             </p:txBody>
           </p:sp>
         </mc:Choice>
-        <mc:Fallback>
+        <mc:Fallback xmlns="">
           <p:sp>
             <p:nvSpPr>
               <p:cNvPr id="55" name="TextBox 54">
@@ -5965,8 +5982,8 @@
             <a:chExt cx="3913408" cy="2414513"/>
           </a:xfrm>
         </p:grpSpPr>
-        <mc:AlternateContent xmlns:mc="http://schemas.openxmlformats.org/markup-compatibility/2006">
-          <mc:Choice xmlns:a14="http://schemas.microsoft.com/office/drawing/2010/main" Requires="a14">
+        <mc:AlternateContent xmlns:mc="http://schemas.openxmlformats.org/markup-compatibility/2006" xmlns:a14="http://schemas.microsoft.com/office/drawing/2010/main">
+          <mc:Choice Requires="a14">
             <p:sp>
               <p:nvSpPr>
                 <p:cNvPr id="62" name="TextBox 61">
@@ -6063,7 +6080,7 @@
               </p:txBody>
             </p:sp>
           </mc:Choice>
-          <mc:Fallback>
+          <mc:Fallback xmlns="">
             <p:sp>
               <p:nvSpPr>
                 <p:cNvPr id="62" name="TextBox 61">
@@ -6265,8 +6282,8 @@
           </p:sp>
         </p:grpSp>
       </p:grpSp>
-      <mc:AlternateContent xmlns:mc="http://schemas.openxmlformats.org/markup-compatibility/2006">
-        <mc:Choice xmlns:a14="http://schemas.microsoft.com/office/drawing/2010/main" Requires="a14">
+      <mc:AlternateContent xmlns:mc="http://schemas.openxmlformats.org/markup-compatibility/2006" xmlns:a14="http://schemas.microsoft.com/office/drawing/2010/main">
+        <mc:Choice Requires="a14">
           <p:sp>
             <p:nvSpPr>
               <p:cNvPr id="64" name="TextBox 63">
@@ -6348,7 +6365,7 @@
             </p:txBody>
           </p:sp>
         </mc:Choice>
-        <mc:Fallback>
+        <mc:Fallback xmlns="">
           <p:sp>
             <p:nvSpPr>
               <p:cNvPr id="64" name="TextBox 63">
@@ -6504,8 +6521,8 @@
           </p:spPr>
         </p:pic>
       </p:grpSp>
-      <mc:AlternateContent xmlns:mc="http://schemas.openxmlformats.org/markup-compatibility/2006">
-        <mc:Choice xmlns:a14="http://schemas.microsoft.com/office/drawing/2010/main" Requires="a14">
+      <mc:AlternateContent xmlns:mc="http://schemas.openxmlformats.org/markup-compatibility/2006" xmlns:a14="http://schemas.microsoft.com/office/drawing/2010/main">
+        <mc:Choice Requires="a14">
           <p:sp>
             <p:nvSpPr>
               <p:cNvPr id="67" name="TextBox 66">
@@ -6586,7 +6603,7 @@
             </p:txBody>
           </p:sp>
         </mc:Choice>
-        <mc:Fallback>
+        <mc:Fallback xmlns="">
           <p:sp>
             <p:nvSpPr>
               <p:cNvPr id="67" name="TextBox 66">
@@ -6751,13 +6768,13 @@
                 <a:ea typeface="Lato" panose="020F0502020204030203" pitchFamily="34" charset="0"/>
                 <a:cs typeface="Lato" panose="020F0502020204030203" pitchFamily="34" charset="0"/>
               </a:rPr>
-              <a:t>Sheldon et al. (2016) makes use of freshwater gastropods as the source of the oxygen tracer. They conclude a higher magnitude shift of &gt;+1.4 ‰ in the isotope ratio than when compared to the marine data.</a:t>
-            </a:r>
-          </a:p>
-        </p:txBody>
-      </p:sp>
-      <mc:AlternateContent xmlns:mc="http://schemas.openxmlformats.org/markup-compatibility/2006">
-        <mc:Choice xmlns:a14="http://schemas.microsoft.com/office/drawing/2010/main" Requires="a14">
+              <a:t>Sheldon et al. (2016) makes use of freshwater gastropods as their source of the oxygen tracer. They conclude a higher magnitude shift of &gt;+1.4 ‰ in the isotope ratio than when compared to the marine data.</a:t>
+            </a:r>
+          </a:p>
+        </p:txBody>
+      </p:sp>
+      <mc:AlternateContent xmlns:mc="http://schemas.openxmlformats.org/markup-compatibility/2006" xmlns:a14="http://schemas.microsoft.com/office/drawing/2010/main">
+        <mc:Choice Requires="a14">
           <p:sp>
             <p:nvSpPr>
               <p:cNvPr id="78" name="TextBox 77">
@@ -6982,7 +6999,7 @@
             </p:txBody>
           </p:sp>
         </mc:Choice>
-        <mc:Fallback>
+        <mc:Fallback xmlns="">
           <p:sp>
             <p:nvSpPr>
               <p:cNvPr id="78" name="TextBox 77">
@@ -7097,7 +7114,7 @@
         </p:nvSpPr>
         <p:spPr>
           <a:xfrm>
-            <a:off x="10017232" y="3878940"/>
+            <a:off x="9948646" y="3865264"/>
             <a:ext cx="1151152" cy="248857"/>
           </a:xfrm>
           <a:prstGeom prst="rect">
@@ -7195,7 +7212,7 @@
         </p:nvSpPr>
         <p:spPr>
           <a:xfrm>
-            <a:off x="10044476" y="7280973"/>
+            <a:off x="9980752" y="7263870"/>
             <a:ext cx="1086940" cy="248857"/>
           </a:xfrm>
           <a:prstGeom prst="rect">

</xml_diff>